<commit_message>
Half-way finish with part 1 write-up
</commit_message>
<xml_diff>
--- a/ppt/Duality.pptx
+++ b/ppt/Duality.pptx
@@ -3662,7 +3662,7 @@
           <a:p>
             <a:fld id="{846CE7D5-CF57-46EF-B807-FDD0502418D4}" type="datetimeFigureOut">
               <a:rPr lang="en-US" smtClean="0"/>
-              <a:t>4/27/20</a:t>
+              <a:t>7/8/20</a:t>
             </a:fld>
             <a:endParaRPr lang="en-US"/>
           </a:p>
@@ -3832,7 +3832,7 @@
           <a:p>
             <a:fld id="{846CE7D5-CF57-46EF-B807-FDD0502418D4}" type="datetimeFigureOut">
               <a:rPr lang="en-US" smtClean="0"/>
-              <a:t>4/27/20</a:t>
+              <a:t>7/8/20</a:t>
             </a:fld>
             <a:endParaRPr lang="en-US"/>
           </a:p>
@@ -4012,7 +4012,7 @@
           <a:p>
             <a:fld id="{846CE7D5-CF57-46EF-B807-FDD0502418D4}" type="datetimeFigureOut">
               <a:rPr lang="en-US" smtClean="0"/>
-              <a:t>4/27/20</a:t>
+              <a:t>7/8/20</a:t>
             </a:fld>
             <a:endParaRPr lang="en-US"/>
           </a:p>
@@ -4182,7 +4182,7 @@
           <a:p>
             <a:fld id="{846CE7D5-CF57-46EF-B807-FDD0502418D4}" type="datetimeFigureOut">
               <a:rPr lang="en-US" smtClean="0"/>
-              <a:t>4/27/20</a:t>
+              <a:t>7/8/20</a:t>
             </a:fld>
             <a:endParaRPr lang="en-US"/>
           </a:p>
@@ -4428,7 +4428,7 @@
           <a:p>
             <a:fld id="{846CE7D5-CF57-46EF-B807-FDD0502418D4}" type="datetimeFigureOut">
               <a:rPr lang="en-US" smtClean="0"/>
-              <a:t>4/27/20</a:t>
+              <a:t>7/8/20</a:t>
             </a:fld>
             <a:endParaRPr lang="en-US"/>
           </a:p>
@@ -4660,7 +4660,7 @@
           <a:p>
             <a:fld id="{846CE7D5-CF57-46EF-B807-FDD0502418D4}" type="datetimeFigureOut">
               <a:rPr lang="en-US" smtClean="0"/>
-              <a:t>4/27/20</a:t>
+              <a:t>7/8/20</a:t>
             </a:fld>
             <a:endParaRPr lang="en-US"/>
           </a:p>
@@ -5027,7 +5027,7 @@
           <a:p>
             <a:fld id="{846CE7D5-CF57-46EF-B807-FDD0502418D4}" type="datetimeFigureOut">
               <a:rPr lang="en-US" smtClean="0"/>
-              <a:t>4/27/20</a:t>
+              <a:t>7/8/20</a:t>
             </a:fld>
             <a:endParaRPr lang="en-US"/>
           </a:p>
@@ -5145,7 +5145,7 @@
           <a:p>
             <a:fld id="{846CE7D5-CF57-46EF-B807-FDD0502418D4}" type="datetimeFigureOut">
               <a:rPr lang="en-US" smtClean="0"/>
-              <a:t>4/27/20</a:t>
+              <a:t>7/8/20</a:t>
             </a:fld>
             <a:endParaRPr lang="en-US"/>
           </a:p>
@@ -5240,7 +5240,7 @@
           <a:p>
             <a:fld id="{846CE7D5-CF57-46EF-B807-FDD0502418D4}" type="datetimeFigureOut">
               <a:rPr lang="en-US" smtClean="0"/>
-              <a:t>4/27/20</a:t>
+              <a:t>7/8/20</a:t>
             </a:fld>
             <a:endParaRPr lang="en-US"/>
           </a:p>
@@ -5517,7 +5517,7 @@
           <a:p>
             <a:fld id="{846CE7D5-CF57-46EF-B807-FDD0502418D4}" type="datetimeFigureOut">
               <a:rPr lang="en-US" smtClean="0"/>
-              <a:t>4/27/20</a:t>
+              <a:t>7/8/20</a:t>
             </a:fld>
             <a:endParaRPr lang="en-US"/>
           </a:p>
@@ -5774,7 +5774,7 @@
           <a:p>
             <a:fld id="{846CE7D5-CF57-46EF-B807-FDD0502418D4}" type="datetimeFigureOut">
               <a:rPr lang="en-US" smtClean="0"/>
-              <a:t>4/27/20</a:t>
+              <a:t>7/8/20</a:t>
             </a:fld>
             <a:endParaRPr lang="en-US"/>
           </a:p>
@@ -5987,7 +5987,7 @@
           <a:p>
             <a:fld id="{846CE7D5-CF57-46EF-B807-FDD0502418D4}" type="datetimeFigureOut">
               <a:rPr lang="en-US" smtClean="0"/>
-              <a:t>4/27/20</a:t>
+              <a:t>7/8/20</a:t>
             </a:fld>
             <a:endParaRPr lang="en-US"/>
           </a:p>
@@ -6478,7 +6478,7 @@
           <p:cNvPr id="2" name="Title 1">
             <a:extLst>
               <a:ext uri="{FF2B5EF4-FFF2-40B4-BE49-F238E27FC236}">
-                <a16:creationId xmlns="" xmlns:a16="http://schemas.microsoft.com/office/drawing/2014/main" id="{99760F66-ED22-4D99-83D9-AF132B641E2C}"/>
+                <a16:creationId xmlns:a16="http://schemas.microsoft.com/office/drawing/2014/main" xmlns="" id="{99760F66-ED22-4D99-83D9-AF132B641E2C}"/>
               </a:ext>
             </a:extLst>
           </p:cNvPr>
@@ -6509,7 +6509,7 @@
           <p:cNvPr id="4" name="Picture 3" descr="A close up of a logo&#10;&#10;Description generated with very high confidence">
             <a:extLst>
               <a:ext uri="{FF2B5EF4-FFF2-40B4-BE49-F238E27FC236}">
-                <a16:creationId xmlns="" xmlns:a16="http://schemas.microsoft.com/office/drawing/2014/main" id="{6E87F861-F9AC-4F21-B0C8-58EB55E95B97}"/>
+                <a16:creationId xmlns:a16="http://schemas.microsoft.com/office/drawing/2014/main" xmlns="" id="{6E87F861-F9AC-4F21-B0C8-58EB55E95B97}"/>
               </a:ext>
             </a:extLst>
           </p:cNvPr>
@@ -6539,7 +6539,7 @@
           <p:cNvPr id="8" name="Arrow: Down 7">
             <a:extLst>
               <a:ext uri="{FF2B5EF4-FFF2-40B4-BE49-F238E27FC236}">
-                <a16:creationId xmlns="" xmlns:a16="http://schemas.microsoft.com/office/drawing/2014/main" id="{82AB09DD-DB63-4806-A980-AE0CB9781D42}"/>
+                <a16:creationId xmlns:a16="http://schemas.microsoft.com/office/drawing/2014/main" xmlns="" id="{82AB09DD-DB63-4806-A980-AE0CB9781D42}"/>
               </a:ext>
             </a:extLst>
           </p:cNvPr>
@@ -6593,7 +6593,7 @@
           <p:cNvPr id="7" name="Picture 8" descr="A picture containing object, clock, meter&#10;&#10;Description generated with very high confidence">
             <a:extLst>
               <a:ext uri="{FF2B5EF4-FFF2-40B4-BE49-F238E27FC236}">
-                <a16:creationId xmlns="" xmlns:a16="http://schemas.microsoft.com/office/drawing/2014/main" id="{24E34536-1F12-4496-ADBF-5DDFD8BD27B0}"/>
+                <a16:creationId xmlns:a16="http://schemas.microsoft.com/office/drawing/2014/main" xmlns="" id="{24E34536-1F12-4496-ADBF-5DDFD8BD27B0}"/>
               </a:ext>
             </a:extLst>
           </p:cNvPr>
@@ -6623,7 +6623,7 @@
           <p:cNvPr id="10" name="Arrow: Down 9">
             <a:extLst>
               <a:ext uri="{FF2B5EF4-FFF2-40B4-BE49-F238E27FC236}">
-                <a16:creationId xmlns="" xmlns:a16="http://schemas.microsoft.com/office/drawing/2014/main" id="{C0BCF31F-630B-4B9F-8929-EFCB1E78F4C9}"/>
+                <a16:creationId xmlns:a16="http://schemas.microsoft.com/office/drawing/2014/main" xmlns="" id="{C0BCF31F-630B-4B9F-8929-EFCB1E78F4C9}"/>
               </a:ext>
             </a:extLst>
           </p:cNvPr>
@@ -6677,7 +6677,7 @@
           <p:cNvPr id="11" name="TextBox 10">
             <a:extLst>
               <a:ext uri="{FF2B5EF4-FFF2-40B4-BE49-F238E27FC236}">
-                <a16:creationId xmlns="" xmlns:a16="http://schemas.microsoft.com/office/drawing/2014/main" id="{02939EE3-25E8-4AA1-A0EF-AEA68207BAAD}"/>
+                <a16:creationId xmlns:a16="http://schemas.microsoft.com/office/drawing/2014/main" xmlns="" id="{02939EE3-25E8-4AA1-A0EF-AEA68207BAAD}"/>
               </a:ext>
             </a:extLst>
           </p:cNvPr>
@@ -6740,7 +6740,7 @@
           <p:cNvPr id="12" name="TextBox 11">
             <a:extLst>
               <a:ext uri="{FF2B5EF4-FFF2-40B4-BE49-F238E27FC236}">
-                <a16:creationId xmlns="" xmlns:a16="http://schemas.microsoft.com/office/drawing/2014/main" id="{E8C512F0-66D0-4B8A-B0A7-993EEF9E5139}"/>
+                <a16:creationId xmlns:a16="http://schemas.microsoft.com/office/drawing/2014/main" xmlns="" id="{E8C512F0-66D0-4B8A-B0A7-993EEF9E5139}"/>
               </a:ext>
             </a:extLst>
           </p:cNvPr>
@@ -6799,7 +6799,7 @@
           <p:cNvPr id="13" name="TextBox 12">
             <a:extLst>
               <a:ext uri="{FF2B5EF4-FFF2-40B4-BE49-F238E27FC236}">
-                <a16:creationId xmlns="" xmlns:a16="http://schemas.microsoft.com/office/drawing/2014/main" id="{7E86E019-DB97-4D67-8777-EE3CB4990CA9}"/>
+                <a16:creationId xmlns:a16="http://schemas.microsoft.com/office/drawing/2014/main" xmlns="" id="{7E86E019-DB97-4D67-8777-EE3CB4990CA9}"/>
               </a:ext>
             </a:extLst>
           </p:cNvPr>
@@ -6858,7 +6858,7 @@
           <p:cNvPr id="14" name="Arrow: Right 13">
             <a:extLst>
               <a:ext uri="{FF2B5EF4-FFF2-40B4-BE49-F238E27FC236}">
-                <a16:creationId xmlns="" xmlns:a16="http://schemas.microsoft.com/office/drawing/2014/main" id="{169BB430-EBE9-48D3-BBC7-66B17AF3C24B}"/>
+                <a16:creationId xmlns:a16="http://schemas.microsoft.com/office/drawing/2014/main" xmlns="" id="{169BB430-EBE9-48D3-BBC7-66B17AF3C24B}"/>
               </a:ext>
             </a:extLst>
           </p:cNvPr>
@@ -6902,7 +6902,7 @@
           <p:cNvPr id="15" name="Arrow: Right 14">
             <a:extLst>
               <a:ext uri="{FF2B5EF4-FFF2-40B4-BE49-F238E27FC236}">
-                <a16:creationId xmlns="" xmlns:a16="http://schemas.microsoft.com/office/drawing/2014/main" id="{6E7FAE65-47EA-4920-B326-5A67AA7A8459}"/>
+                <a16:creationId xmlns:a16="http://schemas.microsoft.com/office/drawing/2014/main" xmlns="" id="{6E7FAE65-47EA-4920-B326-5A67AA7A8459}"/>
               </a:ext>
             </a:extLst>
           </p:cNvPr>
@@ -7435,7 +7435,7 @@
           <p:cNvPr id="2" name="Title 1">
             <a:extLst>
               <a:ext uri="{FF2B5EF4-FFF2-40B4-BE49-F238E27FC236}">
-                <a16:creationId xmlns="" xmlns:a16="http://schemas.microsoft.com/office/drawing/2014/main" id="{049D73AB-69AC-4C26-8CC0-8588A649B93D}"/>
+                <a16:creationId xmlns:a16="http://schemas.microsoft.com/office/drawing/2014/main" xmlns="" id="{049D73AB-69AC-4C26-8CC0-8588A649B93D}"/>
               </a:ext>
             </a:extLst>
           </p:cNvPr>
@@ -7466,7 +7466,7 @@
           <p:cNvPr id="3" name="Picture 3" descr="A close up of a logo&#10;&#10;Description generated with very high confidence">
             <a:extLst>
               <a:ext uri="{FF2B5EF4-FFF2-40B4-BE49-F238E27FC236}">
-                <a16:creationId xmlns="" xmlns:a16="http://schemas.microsoft.com/office/drawing/2014/main" id="{F02ACA80-2AC2-480A-B525-77E55A69968C}"/>
+                <a16:creationId xmlns:a16="http://schemas.microsoft.com/office/drawing/2014/main" xmlns="" id="{F02ACA80-2AC2-480A-B525-77E55A69968C}"/>
               </a:ext>
             </a:extLst>
           </p:cNvPr>
@@ -7496,7 +7496,7 @@
           <p:cNvPr id="8" name="TextBox 7">
             <a:extLst>
               <a:ext uri="{FF2B5EF4-FFF2-40B4-BE49-F238E27FC236}">
-                <a16:creationId xmlns="" xmlns:a16="http://schemas.microsoft.com/office/drawing/2014/main" id="{835FC702-9D17-4D93-ADB1-41187423B13D}"/>
+                <a16:creationId xmlns:a16="http://schemas.microsoft.com/office/drawing/2014/main" xmlns="" id="{835FC702-9D17-4D93-ADB1-41187423B13D}"/>
               </a:ext>
             </a:extLst>
           </p:cNvPr>
@@ -7550,7 +7550,7 @@
           <p:cNvPr id="9" name="TextBox 8">
             <a:extLst>
               <a:ext uri="{FF2B5EF4-FFF2-40B4-BE49-F238E27FC236}">
-                <a16:creationId xmlns="" xmlns:a16="http://schemas.microsoft.com/office/drawing/2014/main" id="{37F40EBB-2055-4760-B908-EBF1D946DEBB}"/>
+                <a16:creationId xmlns:a16="http://schemas.microsoft.com/office/drawing/2014/main" xmlns="" id="{37F40EBB-2055-4760-B908-EBF1D946DEBB}"/>
               </a:ext>
             </a:extLst>
           </p:cNvPr>
@@ -7700,7 +7700,7 @@
           <p:cNvPr id="2" name="Title 1">
             <a:extLst>
               <a:ext uri="{FF2B5EF4-FFF2-40B4-BE49-F238E27FC236}">
-                <a16:creationId xmlns="" xmlns:a16="http://schemas.microsoft.com/office/drawing/2014/main" id="{087C7EC8-1E92-40CF-90E0-1A53D90D6843}"/>
+                <a16:creationId xmlns:a16="http://schemas.microsoft.com/office/drawing/2014/main" xmlns="" id="{087C7EC8-1E92-40CF-90E0-1A53D90D6843}"/>
               </a:ext>
             </a:extLst>
           </p:cNvPr>
@@ -7796,7 +7796,7 @@
           <p:cNvPr id="6" name="TextBox 5">
             <a:extLst>
               <a:ext uri="{FF2B5EF4-FFF2-40B4-BE49-F238E27FC236}">
-                <a16:creationId xmlns="" xmlns:a16="http://schemas.microsoft.com/office/drawing/2014/main" id="{835FC702-9D17-4D93-ADB1-41187423B13D}"/>
+                <a16:creationId xmlns:a16="http://schemas.microsoft.com/office/drawing/2014/main" xmlns="" id="{835FC702-9D17-4D93-ADB1-41187423B13D}"/>
               </a:ext>
             </a:extLst>
           </p:cNvPr>
@@ -7970,7 +7970,7 @@
           <p:cNvPr id="14" name="Left Brace 13">
             <a:extLst>
               <a:ext uri="{FF2B5EF4-FFF2-40B4-BE49-F238E27FC236}">
-                <a16:creationId xmlns="" xmlns:a16="http://schemas.microsoft.com/office/drawing/2014/main" id="{B0FCB8FB-0BF8-4D3B-A796-DF6C215E4800}"/>
+                <a16:creationId xmlns:a16="http://schemas.microsoft.com/office/drawing/2014/main" xmlns="" id="{B0FCB8FB-0BF8-4D3B-A796-DF6C215E4800}"/>
               </a:ext>
             </a:extLst>
           </p:cNvPr>
@@ -8022,7 +8022,7 @@
           <p:cNvPr id="15" name="Left Brace 14">
             <a:extLst>
               <a:ext uri="{FF2B5EF4-FFF2-40B4-BE49-F238E27FC236}">
-                <a16:creationId xmlns="" xmlns:a16="http://schemas.microsoft.com/office/drawing/2014/main" id="{B0FCB8FB-0BF8-4D3B-A796-DF6C215E4800}"/>
+                <a16:creationId xmlns:a16="http://schemas.microsoft.com/office/drawing/2014/main" xmlns="" id="{B0FCB8FB-0BF8-4D3B-A796-DF6C215E4800}"/>
               </a:ext>
             </a:extLst>
           </p:cNvPr>
@@ -8377,7 +8377,7 @@
           <p:cNvPr id="2" name="Title 1">
             <a:extLst>
               <a:ext uri="{FF2B5EF4-FFF2-40B4-BE49-F238E27FC236}">
-                <a16:creationId xmlns="" xmlns:a16="http://schemas.microsoft.com/office/drawing/2014/main" id="{087C7EC8-1E92-40CF-90E0-1A53D90D6843}"/>
+                <a16:creationId xmlns:a16="http://schemas.microsoft.com/office/drawing/2014/main" xmlns="" id="{087C7EC8-1E92-40CF-90E0-1A53D90D6843}"/>
               </a:ext>
             </a:extLst>
           </p:cNvPr>
@@ -8443,7 +8443,7 @@
           <p:cNvPr id="8" name="TextBox 7">
             <a:extLst>
               <a:ext uri="{FF2B5EF4-FFF2-40B4-BE49-F238E27FC236}">
-                <a16:creationId xmlns="" xmlns:a16="http://schemas.microsoft.com/office/drawing/2014/main" id="{37F40EBB-2055-4760-B908-EBF1D946DEBB}"/>
+                <a16:creationId xmlns:a16="http://schemas.microsoft.com/office/drawing/2014/main" xmlns="" id="{37F40EBB-2055-4760-B908-EBF1D946DEBB}"/>
               </a:ext>
             </a:extLst>
           </p:cNvPr>
@@ -8587,7 +8587,7 @@
           <p:cNvPr id="18" name="Arrow: Right 47">
             <a:extLst>
               <a:ext uri="{FF2B5EF4-FFF2-40B4-BE49-F238E27FC236}">
-                <a16:creationId xmlns="" xmlns:a16="http://schemas.microsoft.com/office/drawing/2014/main" id="{2D05F327-8A08-41D8-93AF-95C1FFD2CEA2}"/>
+                <a16:creationId xmlns:a16="http://schemas.microsoft.com/office/drawing/2014/main" xmlns="" id="{2D05F327-8A08-41D8-93AF-95C1FFD2CEA2}"/>
               </a:ext>
             </a:extLst>
           </p:cNvPr>
@@ -9016,7 +9016,7 @@
           <p:cNvPr id="2" name="Title 1">
             <a:extLst>
               <a:ext uri="{FF2B5EF4-FFF2-40B4-BE49-F238E27FC236}">
-                <a16:creationId xmlns="" xmlns:a16="http://schemas.microsoft.com/office/drawing/2014/main" id="{087C7EC8-1E92-40CF-90E0-1A53D90D6843}"/>
+                <a16:creationId xmlns:a16="http://schemas.microsoft.com/office/drawing/2014/main" xmlns="" id="{087C7EC8-1E92-40CF-90E0-1A53D90D6843}"/>
               </a:ext>
             </a:extLst>
           </p:cNvPr>
@@ -9082,7 +9082,7 @@
           <p:cNvPr id="8" name="TextBox 7">
             <a:extLst>
               <a:ext uri="{FF2B5EF4-FFF2-40B4-BE49-F238E27FC236}">
-                <a16:creationId xmlns="" xmlns:a16="http://schemas.microsoft.com/office/drawing/2014/main" id="{37F40EBB-2055-4760-B908-EBF1D946DEBB}"/>
+                <a16:creationId xmlns:a16="http://schemas.microsoft.com/office/drawing/2014/main" xmlns="" id="{37F40EBB-2055-4760-B908-EBF1D946DEBB}"/>
               </a:ext>
             </a:extLst>
           </p:cNvPr>
@@ -9226,7 +9226,7 @@
           <p:cNvPr id="24" name="TextBox 23">
             <a:extLst>
               <a:ext uri="{FF2B5EF4-FFF2-40B4-BE49-F238E27FC236}">
-                <a16:creationId xmlns="" xmlns:a16="http://schemas.microsoft.com/office/drawing/2014/main" id="{02939EE3-25E8-4AA1-A0EF-AEA68207BAAD}"/>
+                <a16:creationId xmlns:a16="http://schemas.microsoft.com/office/drawing/2014/main" xmlns="" id="{02939EE3-25E8-4AA1-A0EF-AEA68207BAAD}"/>
               </a:ext>
             </a:extLst>
           </p:cNvPr>
@@ -9638,7 +9638,7 @@
           <p:cNvPr id="2" name="Title 1">
             <a:extLst>
               <a:ext uri="{FF2B5EF4-FFF2-40B4-BE49-F238E27FC236}">
-                <a16:creationId xmlns="" xmlns:a16="http://schemas.microsoft.com/office/drawing/2014/main" id="{087C7EC8-1E92-40CF-90E0-1A53D90D6843}"/>
+                <a16:creationId xmlns:a16="http://schemas.microsoft.com/office/drawing/2014/main" xmlns="" id="{087C7EC8-1E92-40CF-90E0-1A53D90D6843}"/>
               </a:ext>
             </a:extLst>
           </p:cNvPr>
@@ -9902,7 +9902,7 @@
           <p:cNvPr id="14" name="TextBox 13">
             <a:extLst>
               <a:ext uri="{FF2B5EF4-FFF2-40B4-BE49-F238E27FC236}">
-                <a16:creationId xmlns="" xmlns:a16="http://schemas.microsoft.com/office/drawing/2014/main" id="{37F40EBB-2055-4760-B908-EBF1D946DEBB}"/>
+                <a16:creationId xmlns:a16="http://schemas.microsoft.com/office/drawing/2014/main" xmlns="" id="{37F40EBB-2055-4760-B908-EBF1D946DEBB}"/>
               </a:ext>
             </a:extLst>
           </p:cNvPr>
@@ -9956,7 +9956,7 @@
           <p:cNvPr id="15" name="TextBox 14">
             <a:extLst>
               <a:ext uri="{FF2B5EF4-FFF2-40B4-BE49-F238E27FC236}">
-                <a16:creationId xmlns="" xmlns:a16="http://schemas.microsoft.com/office/drawing/2014/main" id="{835FC702-9D17-4D93-ADB1-41187423B13D}"/>
+                <a16:creationId xmlns:a16="http://schemas.microsoft.com/office/drawing/2014/main" xmlns="" id="{835FC702-9D17-4D93-ADB1-41187423B13D}"/>
               </a:ext>
             </a:extLst>
           </p:cNvPr>
@@ -10328,7 +10328,7 @@
           <p:cNvPr id="2" name="Title 1">
             <a:extLst>
               <a:ext uri="{FF2B5EF4-FFF2-40B4-BE49-F238E27FC236}">
-                <a16:creationId xmlns="" xmlns:a16="http://schemas.microsoft.com/office/drawing/2014/main" id="{9D61FA45-C005-4B51-BCE8-53CB92897839}"/>
+                <a16:creationId xmlns:a16="http://schemas.microsoft.com/office/drawing/2014/main" xmlns="" id="{9D61FA45-C005-4B51-BCE8-53CB92897839}"/>
               </a:ext>
             </a:extLst>
           </p:cNvPr>
@@ -10359,7 +10359,7 @@
           <p:cNvPr id="5" name="Picture 5" descr="A close up of a sign&#10;&#10;Description generated with very high confidence">
             <a:extLst>
               <a:ext uri="{FF2B5EF4-FFF2-40B4-BE49-F238E27FC236}">
-                <a16:creationId xmlns="" xmlns:a16="http://schemas.microsoft.com/office/drawing/2014/main" id="{974CF11A-D544-4A6E-BD08-1F17C99FC2DA}"/>
+                <a16:creationId xmlns:a16="http://schemas.microsoft.com/office/drawing/2014/main" xmlns="" id="{974CF11A-D544-4A6E-BD08-1F17C99FC2DA}"/>
               </a:ext>
             </a:extLst>
           </p:cNvPr>
@@ -10389,7 +10389,7 @@
           <p:cNvPr id="7" name="Picture 7" descr="A close up of a logo&#10;&#10;Description generated with very high confidence">
             <a:extLst>
               <a:ext uri="{FF2B5EF4-FFF2-40B4-BE49-F238E27FC236}">
-                <a16:creationId xmlns="" xmlns:a16="http://schemas.microsoft.com/office/drawing/2014/main" id="{0D9DF479-3D2A-4F0E-B4D7-A7FD23103304}"/>
+                <a16:creationId xmlns:a16="http://schemas.microsoft.com/office/drawing/2014/main" xmlns="" id="{0D9DF479-3D2A-4F0E-B4D7-A7FD23103304}"/>
               </a:ext>
             </a:extLst>
           </p:cNvPr>
@@ -10419,7 +10419,7 @@
           <p:cNvPr id="10" name="TextBox 9">
             <a:extLst>
               <a:ext uri="{FF2B5EF4-FFF2-40B4-BE49-F238E27FC236}">
-                <a16:creationId xmlns="" xmlns:a16="http://schemas.microsoft.com/office/drawing/2014/main" id="{22CD767A-B4EC-4BF1-9ED3-D71A5E3C700F}"/>
+                <a16:creationId xmlns:a16="http://schemas.microsoft.com/office/drawing/2014/main" xmlns="" id="{22CD767A-B4EC-4BF1-9ED3-D71A5E3C700F}"/>
               </a:ext>
             </a:extLst>
           </p:cNvPr>
@@ -10460,7 +10460,7 @@
           <p:cNvPr id="6" name="TextBox 5">
             <a:extLst>
               <a:ext uri="{FF2B5EF4-FFF2-40B4-BE49-F238E27FC236}">
-                <a16:creationId xmlns="" xmlns:a16="http://schemas.microsoft.com/office/drawing/2014/main" id="{16A576E4-CB05-410A-A7B7-E1D5082BB440}"/>
+                <a16:creationId xmlns:a16="http://schemas.microsoft.com/office/drawing/2014/main" xmlns="" id="{16A576E4-CB05-410A-A7B7-E1D5082BB440}"/>
               </a:ext>
             </a:extLst>
           </p:cNvPr>
@@ -10501,7 +10501,7 @@
           <p:cNvPr id="4" name="TextBox 3">
             <a:extLst>
               <a:ext uri="{FF2B5EF4-FFF2-40B4-BE49-F238E27FC236}">
-                <a16:creationId xmlns="" xmlns:a16="http://schemas.microsoft.com/office/drawing/2014/main" id="{250592F7-BF1B-4D15-B7BE-568378A0093B}"/>
+                <a16:creationId xmlns:a16="http://schemas.microsoft.com/office/drawing/2014/main" xmlns="" id="{250592F7-BF1B-4D15-B7BE-568378A0093B}"/>
               </a:ext>
             </a:extLst>
           </p:cNvPr>
@@ -10555,7 +10555,7 @@
           <p:cNvPr id="14" name="TextBox 13">
             <a:extLst>
               <a:ext uri="{FF2B5EF4-FFF2-40B4-BE49-F238E27FC236}">
-                <a16:creationId xmlns="" xmlns:a16="http://schemas.microsoft.com/office/drawing/2014/main" id="{686536B4-EF0B-4FEC-B9A4-01510F6556F2}"/>
+                <a16:creationId xmlns:a16="http://schemas.microsoft.com/office/drawing/2014/main" xmlns="" id="{686536B4-EF0B-4FEC-B9A4-01510F6556F2}"/>
               </a:ext>
             </a:extLst>
           </p:cNvPr>
@@ -10609,7 +10609,7 @@
           <p:cNvPr id="11" name="TextBox 10">
             <a:extLst>
               <a:ext uri="{FF2B5EF4-FFF2-40B4-BE49-F238E27FC236}">
-                <a16:creationId xmlns="" xmlns:a16="http://schemas.microsoft.com/office/drawing/2014/main" id="{250592F7-BF1B-4D15-B7BE-568378A0093B}"/>
+                <a16:creationId xmlns:a16="http://schemas.microsoft.com/office/drawing/2014/main" xmlns="" id="{250592F7-BF1B-4D15-B7BE-568378A0093B}"/>
               </a:ext>
             </a:extLst>
           </p:cNvPr>
@@ -10663,7 +10663,7 @@
           <p:cNvPr id="15" name="TextBox 14">
             <a:extLst>
               <a:ext uri="{FF2B5EF4-FFF2-40B4-BE49-F238E27FC236}">
-                <a16:creationId xmlns="" xmlns:a16="http://schemas.microsoft.com/office/drawing/2014/main" id="{250592F7-BF1B-4D15-B7BE-568378A0093B}"/>
+                <a16:creationId xmlns:a16="http://schemas.microsoft.com/office/drawing/2014/main" xmlns="" id="{250592F7-BF1B-4D15-B7BE-568378A0093B}"/>
               </a:ext>
             </a:extLst>
           </p:cNvPr>
@@ -10908,7 +10908,7 @@
           <p:cNvPr id="2" name="Title 1">
             <a:extLst>
               <a:ext uri="{FF2B5EF4-FFF2-40B4-BE49-F238E27FC236}">
-                <a16:creationId xmlns="" xmlns:a16="http://schemas.microsoft.com/office/drawing/2014/main" id="{D1E7EFF5-11B8-4F32-8476-49E84585F05A}"/>
+                <a16:creationId xmlns:a16="http://schemas.microsoft.com/office/drawing/2014/main" xmlns="" id="{D1E7EFF5-11B8-4F32-8476-49E84585F05A}"/>
               </a:ext>
             </a:extLst>
           </p:cNvPr>
@@ -10939,7 +10939,7 @@
           <p:cNvPr id="5" name="Picture 5" descr="A close up of a logo&#10;&#10;Description generated with very high confidence">
             <a:extLst>
               <a:ext uri="{FF2B5EF4-FFF2-40B4-BE49-F238E27FC236}">
-                <a16:creationId xmlns="" xmlns:a16="http://schemas.microsoft.com/office/drawing/2014/main" id="{FE49CDEE-6D69-4779-8171-6088CFE5B861}"/>
+                <a16:creationId xmlns:a16="http://schemas.microsoft.com/office/drawing/2014/main" xmlns="" id="{FE49CDEE-6D69-4779-8171-6088CFE5B861}"/>
               </a:ext>
             </a:extLst>
           </p:cNvPr>
@@ -10969,7 +10969,7 @@
           <p:cNvPr id="19" name="Picture 19" descr="A close up of a logo&#10;&#10;Description generated with very high confidence">
             <a:extLst>
               <a:ext uri="{FF2B5EF4-FFF2-40B4-BE49-F238E27FC236}">
-                <a16:creationId xmlns="" xmlns:a16="http://schemas.microsoft.com/office/drawing/2014/main" id="{373E1E67-9DC9-45A9-ABF4-E4C962A52693}"/>
+                <a16:creationId xmlns:a16="http://schemas.microsoft.com/office/drawing/2014/main" xmlns="" id="{373E1E67-9DC9-45A9-ABF4-E4C962A52693}"/>
               </a:ext>
             </a:extLst>
           </p:cNvPr>
@@ -10999,7 +10999,7 @@
           <p:cNvPr id="21" name="Picture 21" descr="A picture containing clock&#10;&#10;Description generated with very high confidence">
             <a:extLst>
               <a:ext uri="{FF2B5EF4-FFF2-40B4-BE49-F238E27FC236}">
-                <a16:creationId xmlns="" xmlns:a16="http://schemas.microsoft.com/office/drawing/2014/main" id="{FF232AEA-FD06-4CA8-8824-5AC34E209566}"/>
+                <a16:creationId xmlns:a16="http://schemas.microsoft.com/office/drawing/2014/main" xmlns="" id="{FF232AEA-FD06-4CA8-8824-5AC34E209566}"/>
               </a:ext>
             </a:extLst>
           </p:cNvPr>
@@ -11029,7 +11029,7 @@
           <p:cNvPr id="23" name="Picture 23">
             <a:extLst>
               <a:ext uri="{FF2B5EF4-FFF2-40B4-BE49-F238E27FC236}">
-                <a16:creationId xmlns="" xmlns:a16="http://schemas.microsoft.com/office/drawing/2014/main" id="{2B879844-8BE1-4CCE-88B8-10531FB57445}"/>
+                <a16:creationId xmlns:a16="http://schemas.microsoft.com/office/drawing/2014/main" xmlns="" id="{2B879844-8BE1-4CCE-88B8-10531FB57445}"/>
               </a:ext>
             </a:extLst>
           </p:cNvPr>
@@ -11059,7 +11059,7 @@
           <p:cNvPr id="25" name="Picture 25" descr="A picture containing clock, traffic, street&#10;&#10;Description generated with very high confidence">
             <a:extLst>
               <a:ext uri="{FF2B5EF4-FFF2-40B4-BE49-F238E27FC236}">
-                <a16:creationId xmlns="" xmlns:a16="http://schemas.microsoft.com/office/drawing/2014/main" id="{31C4CA6E-64D5-4644-A0B0-E7F77CB31720}"/>
+                <a16:creationId xmlns:a16="http://schemas.microsoft.com/office/drawing/2014/main" xmlns="" id="{31C4CA6E-64D5-4644-A0B0-E7F77CB31720}"/>
               </a:ext>
             </a:extLst>
           </p:cNvPr>
@@ -11089,7 +11089,7 @@
           <p:cNvPr id="27" name="Picture 27" descr="A picture containing clock&#10;&#10;Description generated with very high confidence">
             <a:extLst>
               <a:ext uri="{FF2B5EF4-FFF2-40B4-BE49-F238E27FC236}">
-                <a16:creationId xmlns="" xmlns:a16="http://schemas.microsoft.com/office/drawing/2014/main" id="{47AD4336-E823-420A-8B46-C5DF09A594FB}"/>
+                <a16:creationId xmlns:a16="http://schemas.microsoft.com/office/drawing/2014/main" xmlns="" id="{47AD4336-E823-420A-8B46-C5DF09A594FB}"/>
               </a:ext>
             </a:extLst>
           </p:cNvPr>
@@ -11119,7 +11119,7 @@
           <p:cNvPr id="31" name="Picture 31">
             <a:extLst>
               <a:ext uri="{FF2B5EF4-FFF2-40B4-BE49-F238E27FC236}">
-                <a16:creationId xmlns="" xmlns:a16="http://schemas.microsoft.com/office/drawing/2014/main" id="{CF195AAB-5B37-4012-A55E-F21CB6F4AE21}"/>
+                <a16:creationId xmlns:a16="http://schemas.microsoft.com/office/drawing/2014/main" xmlns="" id="{CF195AAB-5B37-4012-A55E-F21CB6F4AE21}"/>
               </a:ext>
             </a:extLst>
           </p:cNvPr>
@@ -11149,7 +11149,7 @@
           <p:cNvPr id="33" name="Picture 33">
             <a:extLst>
               <a:ext uri="{FF2B5EF4-FFF2-40B4-BE49-F238E27FC236}">
-                <a16:creationId xmlns="" xmlns:a16="http://schemas.microsoft.com/office/drawing/2014/main" id="{A42BFE66-B805-45F0-AC9C-33C7A041FC28}"/>
+                <a16:creationId xmlns:a16="http://schemas.microsoft.com/office/drawing/2014/main" xmlns="" id="{A42BFE66-B805-45F0-AC9C-33C7A041FC28}"/>
               </a:ext>
             </a:extLst>
           </p:cNvPr>
@@ -11179,7 +11179,7 @@
           <p:cNvPr id="38" name="Arrow: Up-Down 37">
             <a:extLst>
               <a:ext uri="{FF2B5EF4-FFF2-40B4-BE49-F238E27FC236}">
-                <a16:creationId xmlns="" xmlns:a16="http://schemas.microsoft.com/office/drawing/2014/main" id="{E9C791D2-D3ED-4C76-A4FB-9E49E9BC2A8C}"/>
+                <a16:creationId xmlns:a16="http://schemas.microsoft.com/office/drawing/2014/main" xmlns="" id="{E9C791D2-D3ED-4C76-A4FB-9E49E9BC2A8C}"/>
               </a:ext>
             </a:extLst>
           </p:cNvPr>
@@ -11239,7 +11239,7 @@
           <p:cNvPr id="39" name="Arrow: Up-Down 38">
             <a:extLst>
               <a:ext uri="{FF2B5EF4-FFF2-40B4-BE49-F238E27FC236}">
-                <a16:creationId xmlns="" xmlns:a16="http://schemas.microsoft.com/office/drawing/2014/main" id="{3CA03F87-6632-40D2-B199-A96D1396CA2E}"/>
+                <a16:creationId xmlns:a16="http://schemas.microsoft.com/office/drawing/2014/main" xmlns="" id="{3CA03F87-6632-40D2-B199-A96D1396CA2E}"/>
               </a:ext>
             </a:extLst>
           </p:cNvPr>
@@ -11299,7 +11299,7 @@
           <p:cNvPr id="40" name="Arrow: Up-Down 39">
             <a:extLst>
               <a:ext uri="{FF2B5EF4-FFF2-40B4-BE49-F238E27FC236}">
-                <a16:creationId xmlns="" xmlns:a16="http://schemas.microsoft.com/office/drawing/2014/main" id="{B1C9AD59-4552-405C-A60E-18BD55E874C3}"/>
+                <a16:creationId xmlns:a16="http://schemas.microsoft.com/office/drawing/2014/main" xmlns="" id="{B1C9AD59-4552-405C-A60E-18BD55E874C3}"/>
               </a:ext>
             </a:extLst>
           </p:cNvPr>
@@ -11359,7 +11359,7 @@
           <p:cNvPr id="41" name="Arrow: Up-Down 40">
             <a:extLst>
               <a:ext uri="{FF2B5EF4-FFF2-40B4-BE49-F238E27FC236}">
-                <a16:creationId xmlns="" xmlns:a16="http://schemas.microsoft.com/office/drawing/2014/main" id="{C9EC8E87-D8C8-4D1C-9357-BBC1276FAB13}"/>
+                <a16:creationId xmlns:a16="http://schemas.microsoft.com/office/drawing/2014/main" xmlns="" id="{C9EC8E87-D8C8-4D1C-9357-BBC1276FAB13}"/>
               </a:ext>
             </a:extLst>
           </p:cNvPr>
@@ -11419,7 +11419,7 @@
           <p:cNvPr id="42" name="TextBox 41">
             <a:extLst>
               <a:ext uri="{FF2B5EF4-FFF2-40B4-BE49-F238E27FC236}">
-                <a16:creationId xmlns="" xmlns:a16="http://schemas.microsoft.com/office/drawing/2014/main" id="{32A4F61E-5D45-4050-9E11-874E0112D5BC}"/>
+                <a16:creationId xmlns:a16="http://schemas.microsoft.com/office/drawing/2014/main" xmlns="" id="{32A4F61E-5D45-4050-9E11-874E0112D5BC}"/>
               </a:ext>
             </a:extLst>
           </p:cNvPr>
@@ -11467,7 +11467,7 @@
           <p:cNvPr id="44" name="Picture 44" descr="A close up of a logo&#10;&#10;Description generated with very high confidence">
             <a:extLst>
               <a:ext uri="{FF2B5EF4-FFF2-40B4-BE49-F238E27FC236}">
-                <a16:creationId xmlns="" xmlns:a16="http://schemas.microsoft.com/office/drawing/2014/main" id="{C6EEF647-02C4-4AB2-8E03-C31475DC8075}"/>
+                <a16:creationId xmlns:a16="http://schemas.microsoft.com/office/drawing/2014/main" xmlns="" id="{C6EEF647-02C4-4AB2-8E03-C31475DC8075}"/>
               </a:ext>
             </a:extLst>
           </p:cNvPr>
@@ -11497,7 +11497,7 @@
           <p:cNvPr id="48" name="Arrow: Left-Right 47">
             <a:extLst>
               <a:ext uri="{FF2B5EF4-FFF2-40B4-BE49-F238E27FC236}">
-                <a16:creationId xmlns="" xmlns:a16="http://schemas.microsoft.com/office/drawing/2014/main" id="{7C21C0E3-9C9C-4326-9824-2DC17174A4D2}"/>
+                <a16:creationId xmlns:a16="http://schemas.microsoft.com/office/drawing/2014/main" xmlns="" id="{7C21C0E3-9C9C-4326-9824-2DC17174A4D2}"/>
               </a:ext>
             </a:extLst>
           </p:cNvPr>
@@ -11551,7 +11551,7 @@
           <p:cNvPr id="49" name="TextBox 48">
             <a:extLst>
               <a:ext uri="{FF2B5EF4-FFF2-40B4-BE49-F238E27FC236}">
-                <a16:creationId xmlns="" xmlns:a16="http://schemas.microsoft.com/office/drawing/2014/main" id="{8592CD3C-3310-4584-80B6-52CFA75970D9}"/>
+                <a16:creationId xmlns:a16="http://schemas.microsoft.com/office/drawing/2014/main" xmlns="" id="{8592CD3C-3310-4584-80B6-52CFA75970D9}"/>
               </a:ext>
             </a:extLst>
           </p:cNvPr>
@@ -11593,7 +11593,7 @@
           <p:cNvPr id="53" name="TextBox 52">
             <a:extLst>
               <a:ext uri="{FF2B5EF4-FFF2-40B4-BE49-F238E27FC236}">
-                <a16:creationId xmlns="" xmlns:a16="http://schemas.microsoft.com/office/drawing/2014/main" id="{721FC622-66BA-4ABB-8445-B59337E8241B}"/>
+                <a16:creationId xmlns:a16="http://schemas.microsoft.com/office/drawing/2014/main" xmlns="" id="{721FC622-66BA-4ABB-8445-B59337E8241B}"/>
               </a:ext>
             </a:extLst>
           </p:cNvPr>
@@ -11641,7 +11641,7 @@
           <p:cNvPr id="54" name="Picture 54" descr="A picture containing flower&#10;&#10;Description generated with very high confidence">
             <a:extLst>
               <a:ext uri="{FF2B5EF4-FFF2-40B4-BE49-F238E27FC236}">
-                <a16:creationId xmlns="" xmlns:a16="http://schemas.microsoft.com/office/drawing/2014/main" id="{1D0A2DA2-D53F-4BBC-94F9-9BF85BC8CF6E}"/>
+                <a16:creationId xmlns:a16="http://schemas.microsoft.com/office/drawing/2014/main" xmlns="" id="{1D0A2DA2-D53F-4BBC-94F9-9BF85BC8CF6E}"/>
               </a:ext>
             </a:extLst>
           </p:cNvPr>
@@ -11671,7 +11671,7 @@
           <p:cNvPr id="56" name="Picture 56">
             <a:extLst>
               <a:ext uri="{FF2B5EF4-FFF2-40B4-BE49-F238E27FC236}">
-                <a16:creationId xmlns="" xmlns:a16="http://schemas.microsoft.com/office/drawing/2014/main" id="{FFE612E4-785B-43FB-8986-D173D313736D}"/>
+                <a16:creationId xmlns:a16="http://schemas.microsoft.com/office/drawing/2014/main" xmlns="" id="{FFE612E4-785B-43FB-8986-D173D313736D}"/>
               </a:ext>
             </a:extLst>
           </p:cNvPr>
@@ -11701,7 +11701,7 @@
           <p:cNvPr id="58" name="Picture 58">
             <a:extLst>
               <a:ext uri="{FF2B5EF4-FFF2-40B4-BE49-F238E27FC236}">
-                <a16:creationId xmlns="" xmlns:a16="http://schemas.microsoft.com/office/drawing/2014/main" id="{A1894F98-FBC1-4EA9-AE3E-E924B620D6B5}"/>
+                <a16:creationId xmlns:a16="http://schemas.microsoft.com/office/drawing/2014/main" xmlns="" id="{A1894F98-FBC1-4EA9-AE3E-E924B620D6B5}"/>
               </a:ext>
             </a:extLst>
           </p:cNvPr>
@@ -11731,7 +11731,7 @@
           <p:cNvPr id="60" name="Straight Arrow Connector 59">
             <a:extLst>
               <a:ext uri="{FF2B5EF4-FFF2-40B4-BE49-F238E27FC236}">
-                <a16:creationId xmlns="" xmlns:a16="http://schemas.microsoft.com/office/drawing/2014/main" id="{81909CDE-C273-43DE-B727-BB2E4824E638}"/>
+                <a16:creationId xmlns:a16="http://schemas.microsoft.com/office/drawing/2014/main" xmlns="" id="{81909CDE-C273-43DE-B727-BB2E4824E638}"/>
               </a:ext>
             </a:extLst>
           </p:cNvPr>
@@ -11776,7 +11776,7 @@
           <p:cNvPr id="63" name="Straight Arrow Connector 62">
             <a:extLst>
               <a:ext uri="{FF2B5EF4-FFF2-40B4-BE49-F238E27FC236}">
-                <a16:creationId xmlns="" xmlns:a16="http://schemas.microsoft.com/office/drawing/2014/main" id="{5B14458C-B165-430E-9B2E-624426981001}"/>
+                <a16:creationId xmlns:a16="http://schemas.microsoft.com/office/drawing/2014/main" xmlns="" id="{5B14458C-B165-430E-9B2E-624426981001}"/>
               </a:ext>
             </a:extLst>
           </p:cNvPr>
@@ -11823,7 +11823,7 @@
           <p:cNvPr id="65" name="Arrow: Up-Down 64">
             <a:extLst>
               <a:ext uri="{FF2B5EF4-FFF2-40B4-BE49-F238E27FC236}">
-                <a16:creationId xmlns="" xmlns:a16="http://schemas.microsoft.com/office/drawing/2014/main" id="{CEEDAC1F-3995-48A3-95AC-4360D2B63AA4}"/>
+                <a16:creationId xmlns:a16="http://schemas.microsoft.com/office/drawing/2014/main" xmlns="" id="{CEEDAC1F-3995-48A3-95AC-4360D2B63AA4}"/>
               </a:ext>
             </a:extLst>
           </p:cNvPr>
@@ -11883,7 +11883,7 @@
           <p:cNvPr id="66" name="Arrow: Up-Down 65">
             <a:extLst>
               <a:ext uri="{FF2B5EF4-FFF2-40B4-BE49-F238E27FC236}">
-                <a16:creationId xmlns="" xmlns:a16="http://schemas.microsoft.com/office/drawing/2014/main" id="{C0DDF17E-1D11-4EE6-AAA2-86EDEBC92981}"/>
+                <a16:creationId xmlns:a16="http://schemas.microsoft.com/office/drawing/2014/main" xmlns="" id="{C0DDF17E-1D11-4EE6-AAA2-86EDEBC92981}"/>
               </a:ext>
             </a:extLst>
           </p:cNvPr>
@@ -11943,7 +11943,7 @@
           <p:cNvPr id="67" name="Arrow: Up-Down 66">
             <a:extLst>
               <a:ext uri="{FF2B5EF4-FFF2-40B4-BE49-F238E27FC236}">
-                <a16:creationId xmlns="" xmlns:a16="http://schemas.microsoft.com/office/drawing/2014/main" id="{1CD6044B-BF46-4164-9D61-B6CF8CEA9E9A}"/>
+                <a16:creationId xmlns:a16="http://schemas.microsoft.com/office/drawing/2014/main" xmlns="" id="{1CD6044B-BF46-4164-9D61-B6CF8CEA9E9A}"/>
               </a:ext>
             </a:extLst>
           </p:cNvPr>
@@ -12003,7 +12003,7 @@
           <p:cNvPr id="68" name="Arrow: Up-Down 67">
             <a:extLst>
               <a:ext uri="{FF2B5EF4-FFF2-40B4-BE49-F238E27FC236}">
-                <a16:creationId xmlns="" xmlns:a16="http://schemas.microsoft.com/office/drawing/2014/main" id="{652AF93C-C14E-450E-886F-105BC03FBA27}"/>
+                <a16:creationId xmlns:a16="http://schemas.microsoft.com/office/drawing/2014/main" xmlns="" id="{652AF93C-C14E-450E-886F-105BC03FBA27}"/>
               </a:ext>
             </a:extLst>
           </p:cNvPr>
@@ -12063,7 +12063,7 @@
           <p:cNvPr id="69" name="Arrow: Left-Right 68">
             <a:extLst>
               <a:ext uri="{FF2B5EF4-FFF2-40B4-BE49-F238E27FC236}">
-                <a16:creationId xmlns="" xmlns:a16="http://schemas.microsoft.com/office/drawing/2014/main" id="{5B885F2F-626B-4C7D-813E-0BE30A16C361}"/>
+                <a16:creationId xmlns:a16="http://schemas.microsoft.com/office/drawing/2014/main" xmlns="" id="{5B885F2F-626B-4C7D-813E-0BE30A16C361}"/>
               </a:ext>
             </a:extLst>
           </p:cNvPr>
@@ -12117,7 +12117,7 @@
           <p:cNvPr id="70" name="TextBox 69">
             <a:extLst>
               <a:ext uri="{FF2B5EF4-FFF2-40B4-BE49-F238E27FC236}">
-                <a16:creationId xmlns="" xmlns:a16="http://schemas.microsoft.com/office/drawing/2014/main" id="{584DD32C-0352-48F3-AC91-52FBC0A26400}"/>
+                <a16:creationId xmlns:a16="http://schemas.microsoft.com/office/drawing/2014/main" xmlns="" id="{584DD32C-0352-48F3-AC91-52FBC0A26400}"/>
               </a:ext>
             </a:extLst>
           </p:cNvPr>
@@ -12166,7 +12166,7 @@
           <p:cNvPr id="71" name="Picture 71">
             <a:extLst>
               <a:ext uri="{FF2B5EF4-FFF2-40B4-BE49-F238E27FC236}">
-                <a16:creationId xmlns="" xmlns:a16="http://schemas.microsoft.com/office/drawing/2014/main" id="{47FF408E-084C-4485-999E-140D8DD401F5}"/>
+                <a16:creationId xmlns:a16="http://schemas.microsoft.com/office/drawing/2014/main" xmlns="" id="{47FF408E-084C-4485-999E-140D8DD401F5}"/>
               </a:ext>
             </a:extLst>
           </p:cNvPr>
@@ -12196,7 +12196,7 @@
           <p:cNvPr id="35" name="TextBox 34">
             <a:extLst>
               <a:ext uri="{FF2B5EF4-FFF2-40B4-BE49-F238E27FC236}">
-                <a16:creationId xmlns="" xmlns:a16="http://schemas.microsoft.com/office/drawing/2014/main" id="{32A4F61E-5D45-4050-9E11-874E0112D5BC}"/>
+                <a16:creationId xmlns:a16="http://schemas.microsoft.com/office/drawing/2014/main" xmlns="" id="{32A4F61E-5D45-4050-9E11-874E0112D5BC}"/>
               </a:ext>
             </a:extLst>
           </p:cNvPr>
@@ -12244,7 +12244,7 @@
           <p:cNvPr id="36" name="TextBox 35">
             <a:extLst>
               <a:ext uri="{FF2B5EF4-FFF2-40B4-BE49-F238E27FC236}">
-                <a16:creationId xmlns="" xmlns:a16="http://schemas.microsoft.com/office/drawing/2014/main" id="{721FC622-66BA-4ABB-8445-B59337E8241B}"/>
+                <a16:creationId xmlns:a16="http://schemas.microsoft.com/office/drawing/2014/main" xmlns="" id="{721FC622-66BA-4ABB-8445-B59337E8241B}"/>
               </a:ext>
             </a:extLst>
           </p:cNvPr>
@@ -12292,7 +12292,7 @@
           <p:cNvPr id="37" name="Picture 33">
             <a:extLst>
               <a:ext uri="{FF2B5EF4-FFF2-40B4-BE49-F238E27FC236}">
-                <a16:creationId xmlns="" xmlns:a16="http://schemas.microsoft.com/office/drawing/2014/main" id="{A42BFE66-B805-45F0-AC9C-33C7A041FC28}"/>
+                <a16:creationId xmlns:a16="http://schemas.microsoft.com/office/drawing/2014/main" xmlns="" id="{A42BFE66-B805-45F0-AC9C-33C7A041FC28}"/>
               </a:ext>
             </a:extLst>
           </p:cNvPr>
@@ -12322,7 +12322,7 @@
           <p:cNvPr id="45" name="Left Brace 44">
             <a:extLst>
               <a:ext uri="{FF2B5EF4-FFF2-40B4-BE49-F238E27FC236}">
-                <a16:creationId xmlns="" xmlns:a16="http://schemas.microsoft.com/office/drawing/2014/main" id="{878D048C-4583-4231-86E3-AD69D44F351C}"/>
+                <a16:creationId xmlns:a16="http://schemas.microsoft.com/office/drawing/2014/main" xmlns="" id="{878D048C-4583-4231-86E3-AD69D44F351C}"/>
               </a:ext>
             </a:extLst>
           </p:cNvPr>
@@ -12374,7 +12374,7 @@
           <p:cNvPr id="47" name="Left Brace 46">
             <a:extLst>
               <a:ext uri="{FF2B5EF4-FFF2-40B4-BE49-F238E27FC236}">
-                <a16:creationId xmlns="" xmlns:a16="http://schemas.microsoft.com/office/drawing/2014/main" id="{878D048C-4583-4231-86E3-AD69D44F351C}"/>
+                <a16:creationId xmlns:a16="http://schemas.microsoft.com/office/drawing/2014/main" xmlns="" id="{878D048C-4583-4231-86E3-AD69D44F351C}"/>
               </a:ext>
             </a:extLst>
           </p:cNvPr>
@@ -12426,7 +12426,7 @@
           <p:cNvPr id="51" name="Left Brace 50">
             <a:extLst>
               <a:ext uri="{FF2B5EF4-FFF2-40B4-BE49-F238E27FC236}">
-                <a16:creationId xmlns="" xmlns:a16="http://schemas.microsoft.com/office/drawing/2014/main" id="{878D048C-4583-4231-86E3-AD69D44F351C}"/>
+                <a16:creationId xmlns:a16="http://schemas.microsoft.com/office/drawing/2014/main" xmlns="" id="{878D048C-4583-4231-86E3-AD69D44F351C}"/>
               </a:ext>
             </a:extLst>
           </p:cNvPr>
@@ -12478,7 +12478,7 @@
           <p:cNvPr id="52" name="Left Brace 51">
             <a:extLst>
               <a:ext uri="{FF2B5EF4-FFF2-40B4-BE49-F238E27FC236}">
-                <a16:creationId xmlns="" xmlns:a16="http://schemas.microsoft.com/office/drawing/2014/main" id="{878D048C-4583-4231-86E3-AD69D44F351C}"/>
+                <a16:creationId xmlns:a16="http://schemas.microsoft.com/office/drawing/2014/main" xmlns="" id="{878D048C-4583-4231-86E3-AD69D44F351C}"/>
               </a:ext>
             </a:extLst>
           </p:cNvPr>
@@ -13737,7 +13737,7 @@
           <p:cNvPr id="2" name="Title 1">
             <a:extLst>
               <a:ext uri="{FF2B5EF4-FFF2-40B4-BE49-F238E27FC236}">
-                <a16:creationId xmlns="" xmlns:a16="http://schemas.microsoft.com/office/drawing/2014/main" id="{99760F66-ED22-4D99-83D9-AF132B641E2C}"/>
+                <a16:creationId xmlns:a16="http://schemas.microsoft.com/office/drawing/2014/main" xmlns="" id="{99760F66-ED22-4D99-83D9-AF132B641E2C}"/>
               </a:ext>
             </a:extLst>
           </p:cNvPr>
@@ -13768,7 +13768,7 @@
           <p:cNvPr id="4" name="Picture 3" descr="A close up of a logo&#10;&#10;Description generated with very high confidence">
             <a:extLst>
               <a:ext uri="{FF2B5EF4-FFF2-40B4-BE49-F238E27FC236}">
-                <a16:creationId xmlns="" xmlns:a16="http://schemas.microsoft.com/office/drawing/2014/main" id="{6E87F861-F9AC-4F21-B0C8-58EB55E95B97}"/>
+                <a16:creationId xmlns:a16="http://schemas.microsoft.com/office/drawing/2014/main" xmlns="" id="{6E87F861-F9AC-4F21-B0C8-58EB55E95B97}"/>
               </a:ext>
             </a:extLst>
           </p:cNvPr>
@@ -13798,7 +13798,7 @@
           <p:cNvPr id="6" name="Picture 5" descr="A picture containing clock&#10;&#10;Description generated with very high confidence">
             <a:extLst>
               <a:ext uri="{FF2B5EF4-FFF2-40B4-BE49-F238E27FC236}">
-                <a16:creationId xmlns="" xmlns:a16="http://schemas.microsoft.com/office/drawing/2014/main" id="{4616AC99-6BB6-4ADE-BDE8-48395933FE5F}"/>
+                <a16:creationId xmlns:a16="http://schemas.microsoft.com/office/drawing/2014/main" xmlns="" id="{4616AC99-6BB6-4ADE-BDE8-48395933FE5F}"/>
               </a:ext>
             </a:extLst>
           </p:cNvPr>
@@ -13828,7 +13828,7 @@
           <p:cNvPr id="8" name="Arrow: Down 7">
             <a:extLst>
               <a:ext uri="{FF2B5EF4-FFF2-40B4-BE49-F238E27FC236}">
-                <a16:creationId xmlns="" xmlns:a16="http://schemas.microsoft.com/office/drawing/2014/main" id="{82AB09DD-DB63-4806-A980-AE0CB9781D42}"/>
+                <a16:creationId xmlns:a16="http://schemas.microsoft.com/office/drawing/2014/main" xmlns="" id="{82AB09DD-DB63-4806-A980-AE0CB9781D42}"/>
               </a:ext>
             </a:extLst>
           </p:cNvPr>
@@ -13919,7 +13919,7 @@
           <p:cNvPr id="2" name="Title 1">
             <a:extLst>
               <a:ext uri="{FF2B5EF4-FFF2-40B4-BE49-F238E27FC236}">
-                <a16:creationId xmlns="" xmlns:a16="http://schemas.microsoft.com/office/drawing/2014/main" id="{BC492351-3FD5-428F-9D50-3BB66AA31E82}"/>
+                <a16:creationId xmlns:a16="http://schemas.microsoft.com/office/drawing/2014/main" xmlns="" id="{BC492351-3FD5-428F-9D50-3BB66AA31E82}"/>
               </a:ext>
             </a:extLst>
           </p:cNvPr>
@@ -13950,7 +13950,7 @@
           <p:cNvPr id="4" name="Picture 3" descr="A picture containing clock&#10;&#10;Description generated with very high confidence">
             <a:extLst>
               <a:ext uri="{FF2B5EF4-FFF2-40B4-BE49-F238E27FC236}">
-                <a16:creationId xmlns="" xmlns:a16="http://schemas.microsoft.com/office/drawing/2014/main" id="{9AFDBF59-0CA0-43E9-B7BB-7722E9982C54}"/>
+                <a16:creationId xmlns:a16="http://schemas.microsoft.com/office/drawing/2014/main" xmlns="" id="{9AFDBF59-0CA0-43E9-B7BB-7722E9982C54}"/>
               </a:ext>
             </a:extLst>
           </p:cNvPr>
@@ -13985,7 +13985,7 @@
           <p:cNvPr id="28" name="TextBox 27">
             <a:extLst>
               <a:ext uri="{FF2B5EF4-FFF2-40B4-BE49-F238E27FC236}">
-                <a16:creationId xmlns="" xmlns:a16="http://schemas.microsoft.com/office/drawing/2014/main" id="{850ED155-9FB4-40E6-9358-599378ED01A9}"/>
+                <a16:creationId xmlns:a16="http://schemas.microsoft.com/office/drawing/2014/main" xmlns="" id="{850ED155-9FB4-40E6-9358-599378ED01A9}"/>
               </a:ext>
             </a:extLst>
           </p:cNvPr>
@@ -14026,7 +14026,7 @@
           <p:cNvPr id="30" name="Picture 12" descr="A close up of a logo&#10;&#10;Description generated with very high confidence">
             <a:extLst>
               <a:ext uri="{FF2B5EF4-FFF2-40B4-BE49-F238E27FC236}">
-                <a16:creationId xmlns="" xmlns:a16="http://schemas.microsoft.com/office/drawing/2014/main" id="{B22845EF-5901-4C71-934D-3685139CD83C}"/>
+                <a16:creationId xmlns:a16="http://schemas.microsoft.com/office/drawing/2014/main" xmlns="" id="{B22845EF-5901-4C71-934D-3685139CD83C}"/>
               </a:ext>
             </a:extLst>
           </p:cNvPr>
@@ -14061,7 +14061,7 @@
           <p:cNvPr id="33" name="Picture 33" descr="A close up of a logo&#10;&#10;Description generated with very high confidence">
             <a:extLst>
               <a:ext uri="{FF2B5EF4-FFF2-40B4-BE49-F238E27FC236}">
-                <a16:creationId xmlns="" xmlns:a16="http://schemas.microsoft.com/office/drawing/2014/main" id="{6B441168-8849-4DBC-B89C-F689BC14F6E9}"/>
+                <a16:creationId xmlns:a16="http://schemas.microsoft.com/office/drawing/2014/main" xmlns="" id="{6B441168-8849-4DBC-B89C-F689BC14F6E9}"/>
               </a:ext>
             </a:extLst>
           </p:cNvPr>
@@ -14091,7 +14091,7 @@
           <p:cNvPr id="35" name="Picture 35" descr="A picture containing flower&#10;&#10;Description generated with very high confidence">
             <a:extLst>
               <a:ext uri="{FF2B5EF4-FFF2-40B4-BE49-F238E27FC236}">
-                <a16:creationId xmlns="" xmlns:a16="http://schemas.microsoft.com/office/drawing/2014/main" id="{733960A3-062E-4857-9276-DEDCEE0ADF8E}"/>
+                <a16:creationId xmlns:a16="http://schemas.microsoft.com/office/drawing/2014/main" xmlns="" id="{733960A3-062E-4857-9276-DEDCEE0ADF8E}"/>
               </a:ext>
             </a:extLst>
           </p:cNvPr>
@@ -14121,7 +14121,7 @@
           <p:cNvPr id="37" name="Picture 37" descr="A picture containing flower&#10;&#10;Description generated with very high confidence">
             <a:extLst>
               <a:ext uri="{FF2B5EF4-FFF2-40B4-BE49-F238E27FC236}">
-                <a16:creationId xmlns="" xmlns:a16="http://schemas.microsoft.com/office/drawing/2014/main" id="{A7E0387A-69EF-47BE-BD30-07750F005C2E}"/>
+                <a16:creationId xmlns:a16="http://schemas.microsoft.com/office/drawing/2014/main" xmlns="" id="{A7E0387A-69EF-47BE-BD30-07750F005C2E}"/>
               </a:ext>
             </a:extLst>
           </p:cNvPr>
@@ -14151,7 +14151,7 @@
           <p:cNvPr id="39" name="Picture 39" descr="A picture containing flower&#10;&#10;Description generated with very high confidence">
             <a:extLst>
               <a:ext uri="{FF2B5EF4-FFF2-40B4-BE49-F238E27FC236}">
-                <a16:creationId xmlns="" xmlns:a16="http://schemas.microsoft.com/office/drawing/2014/main" id="{43241D24-F842-41E7-ADEB-074666405ED0}"/>
+                <a16:creationId xmlns:a16="http://schemas.microsoft.com/office/drawing/2014/main" xmlns="" id="{43241D24-F842-41E7-ADEB-074666405ED0}"/>
               </a:ext>
             </a:extLst>
           </p:cNvPr>
@@ -14181,7 +14181,7 @@
           <p:cNvPr id="41" name="Picture 41" descr="A close up of a logo&#10;&#10;Description generated with very high confidence">
             <a:extLst>
               <a:ext uri="{FF2B5EF4-FFF2-40B4-BE49-F238E27FC236}">
-                <a16:creationId xmlns="" xmlns:a16="http://schemas.microsoft.com/office/drawing/2014/main" id="{3339BAC3-8264-4532-BCC5-AA61AE38A9E3}"/>
+                <a16:creationId xmlns:a16="http://schemas.microsoft.com/office/drawing/2014/main" xmlns="" id="{3339BAC3-8264-4532-BCC5-AA61AE38A9E3}"/>
               </a:ext>
             </a:extLst>
           </p:cNvPr>
@@ -14211,7 +14211,7 @@
           <p:cNvPr id="43" name="Picture 43" descr="A close up of a logo&#10;&#10;Description generated with very high confidence">
             <a:extLst>
               <a:ext uri="{FF2B5EF4-FFF2-40B4-BE49-F238E27FC236}">
-                <a16:creationId xmlns="" xmlns:a16="http://schemas.microsoft.com/office/drawing/2014/main" id="{148CD550-325D-4286-BCEF-CEC14506D799}"/>
+                <a16:creationId xmlns:a16="http://schemas.microsoft.com/office/drawing/2014/main" xmlns="" id="{148CD550-325D-4286-BCEF-CEC14506D799}"/>
               </a:ext>
             </a:extLst>
           </p:cNvPr>
@@ -14271,7 +14271,7 @@
           <p:cNvPr id="18" name="Left Brace 17">
             <a:extLst>
               <a:ext uri="{FF2B5EF4-FFF2-40B4-BE49-F238E27FC236}">
-                <a16:creationId xmlns="" xmlns:a16="http://schemas.microsoft.com/office/drawing/2014/main" id="{878D048C-4583-4231-86E3-AD69D44F351C}"/>
+                <a16:creationId xmlns:a16="http://schemas.microsoft.com/office/drawing/2014/main" xmlns="" id="{878D048C-4583-4231-86E3-AD69D44F351C}"/>
               </a:ext>
             </a:extLst>
           </p:cNvPr>
@@ -14323,7 +14323,7 @@
           <p:cNvPr id="19" name="Left Brace 18">
             <a:extLst>
               <a:ext uri="{FF2B5EF4-FFF2-40B4-BE49-F238E27FC236}">
-                <a16:creationId xmlns="" xmlns:a16="http://schemas.microsoft.com/office/drawing/2014/main" id="{878D048C-4583-4231-86E3-AD69D44F351C}"/>
+                <a16:creationId xmlns:a16="http://schemas.microsoft.com/office/drawing/2014/main" xmlns="" id="{878D048C-4583-4231-86E3-AD69D44F351C}"/>
               </a:ext>
             </a:extLst>
           </p:cNvPr>
@@ -14435,7 +14435,7 @@
           <p:cNvPr id="25" name="Picture 9" descr="A picture containing drawing&#10;&#10;Description generated with very high confidence">
             <a:extLst>
               <a:ext uri="{FF2B5EF4-FFF2-40B4-BE49-F238E27FC236}">
-                <a16:creationId xmlns="" xmlns:a16="http://schemas.microsoft.com/office/drawing/2014/main" id="{02B44993-3D5D-4B1E-B348-A8AA765D22E8}"/>
+                <a16:creationId xmlns:a16="http://schemas.microsoft.com/office/drawing/2014/main" xmlns="" id="{02B44993-3D5D-4B1E-B348-A8AA765D22E8}"/>
               </a:ext>
             </a:extLst>
           </p:cNvPr>
@@ -14465,7 +14465,7 @@
           <p:cNvPr id="26" name="Picture 11" descr="A picture containing object, clock, meter&#10;&#10;Description generated with very high confidence">
             <a:extLst>
               <a:ext uri="{FF2B5EF4-FFF2-40B4-BE49-F238E27FC236}">
-                <a16:creationId xmlns="" xmlns:a16="http://schemas.microsoft.com/office/drawing/2014/main" id="{50B5677A-E1FB-4742-A2BB-B165C8289492}"/>
+                <a16:creationId xmlns:a16="http://schemas.microsoft.com/office/drawing/2014/main" xmlns="" id="{50B5677A-E1FB-4742-A2BB-B165C8289492}"/>
               </a:ext>
             </a:extLst>
           </p:cNvPr>
@@ -15514,7 +15514,7 @@
           <p:cNvPr id="2" name="Title 1">
             <a:extLst>
               <a:ext uri="{FF2B5EF4-FFF2-40B4-BE49-F238E27FC236}">
-                <a16:creationId xmlns="" xmlns:a16="http://schemas.microsoft.com/office/drawing/2014/main" id="{9B3E31B1-1524-4917-9285-17E913845064}"/>
+                <a16:creationId xmlns:a16="http://schemas.microsoft.com/office/drawing/2014/main" xmlns="" id="{9B3E31B1-1524-4917-9285-17E913845064}"/>
               </a:ext>
             </a:extLst>
           </p:cNvPr>
@@ -15545,7 +15545,7 @@
           <p:cNvPr id="7" name="TextBox 6">
             <a:extLst>
               <a:ext uri="{FF2B5EF4-FFF2-40B4-BE49-F238E27FC236}">
-                <a16:creationId xmlns="" xmlns:a16="http://schemas.microsoft.com/office/drawing/2014/main" id="{3C8D1A93-8E34-461B-AE33-3F2AF8EDEDE3}"/>
+                <a16:creationId xmlns:a16="http://schemas.microsoft.com/office/drawing/2014/main" xmlns="" id="{3C8D1A93-8E34-461B-AE33-3F2AF8EDEDE3}"/>
               </a:ext>
             </a:extLst>
           </p:cNvPr>
@@ -15586,7 +15586,7 @@
           <p:cNvPr id="12" name="Picture 12" descr="A close up of a logo&#10;&#10;Description generated with very high confidence">
             <a:extLst>
               <a:ext uri="{FF2B5EF4-FFF2-40B4-BE49-F238E27FC236}">
-                <a16:creationId xmlns="" xmlns:a16="http://schemas.microsoft.com/office/drawing/2014/main" id="{BCB28C98-A97C-401C-8299-EB6FC4F8EC07}"/>
+                <a16:creationId xmlns:a16="http://schemas.microsoft.com/office/drawing/2014/main" xmlns="" id="{BCB28C98-A97C-401C-8299-EB6FC4F8EC07}"/>
               </a:ext>
             </a:extLst>
           </p:cNvPr>
@@ -15616,7 +15616,7 @@
           <p:cNvPr id="15" name="TextBox 14">
             <a:extLst>
               <a:ext uri="{FF2B5EF4-FFF2-40B4-BE49-F238E27FC236}">
-                <a16:creationId xmlns="" xmlns:a16="http://schemas.microsoft.com/office/drawing/2014/main" id="{1AAE7903-DA0C-486B-BDC7-ADB80C60CE39}"/>
+                <a16:creationId xmlns:a16="http://schemas.microsoft.com/office/drawing/2014/main" xmlns="" id="{1AAE7903-DA0C-486B-BDC7-ADB80C60CE39}"/>
               </a:ext>
             </a:extLst>
           </p:cNvPr>
@@ -15655,7 +15655,7 @@
           <p:cNvPr id="16" name="Picture 16" descr="A close up of a logo&#10;&#10;Description generated with very high confidence">
             <a:extLst>
               <a:ext uri="{FF2B5EF4-FFF2-40B4-BE49-F238E27FC236}">
-                <a16:creationId xmlns="" xmlns:a16="http://schemas.microsoft.com/office/drawing/2014/main" id="{C7C82433-1251-4B07-9C0F-DB83878FB6CB}"/>
+                <a16:creationId xmlns:a16="http://schemas.microsoft.com/office/drawing/2014/main" xmlns="" id="{C7C82433-1251-4B07-9C0F-DB83878FB6CB}"/>
               </a:ext>
             </a:extLst>
           </p:cNvPr>
@@ -15685,7 +15685,7 @@
           <p:cNvPr id="32" name="TextBox 31">
             <a:extLst>
               <a:ext uri="{FF2B5EF4-FFF2-40B4-BE49-F238E27FC236}">
-                <a16:creationId xmlns="" xmlns:a16="http://schemas.microsoft.com/office/drawing/2014/main" id="{95FFBCCC-62A7-4B35-95D9-9DDDAD7F90FD}"/>
+                <a16:creationId xmlns:a16="http://schemas.microsoft.com/office/drawing/2014/main" xmlns="" id="{95FFBCCC-62A7-4B35-95D9-9DDDAD7F90FD}"/>
               </a:ext>
             </a:extLst>
           </p:cNvPr>
@@ -15724,7 +15724,7 @@
           <p:cNvPr id="33" name="Picture 33" descr="A close up of a logo&#10;&#10;Description generated with very high confidence">
             <a:extLst>
               <a:ext uri="{FF2B5EF4-FFF2-40B4-BE49-F238E27FC236}">
-                <a16:creationId xmlns="" xmlns:a16="http://schemas.microsoft.com/office/drawing/2014/main" id="{38088EDE-D1BD-4D90-BC05-DB9DB49BBAAD}"/>
+                <a16:creationId xmlns:a16="http://schemas.microsoft.com/office/drawing/2014/main" xmlns="" id="{38088EDE-D1BD-4D90-BC05-DB9DB49BBAAD}"/>
               </a:ext>
             </a:extLst>
           </p:cNvPr>
@@ -15759,7 +15759,7 @@
           <p:cNvPr id="3" name="Arrow: Right 2">
             <a:extLst>
               <a:ext uri="{FF2B5EF4-FFF2-40B4-BE49-F238E27FC236}">
-                <a16:creationId xmlns="" xmlns:a16="http://schemas.microsoft.com/office/drawing/2014/main" id="{A386E034-963A-452A-BA56-7A5B5FF1099E}"/>
+                <a16:creationId xmlns:a16="http://schemas.microsoft.com/office/drawing/2014/main" xmlns="" id="{A386E034-963A-452A-BA56-7A5B5FF1099E}"/>
               </a:ext>
             </a:extLst>
           </p:cNvPr>
@@ -15805,7 +15805,7 @@
           <p:cNvPr id="10" name="Arrow: Right 9">
             <a:extLst>
               <a:ext uri="{FF2B5EF4-FFF2-40B4-BE49-F238E27FC236}">
-                <a16:creationId xmlns="" xmlns:a16="http://schemas.microsoft.com/office/drawing/2014/main" id="{FC53BB6D-D8F9-4631-B0DB-C5D30F0A1ADE}"/>
+                <a16:creationId xmlns:a16="http://schemas.microsoft.com/office/drawing/2014/main" xmlns="" id="{FC53BB6D-D8F9-4631-B0DB-C5D30F0A1ADE}"/>
               </a:ext>
             </a:extLst>
           </p:cNvPr>
@@ -15888,7 +15888,7 @@
           <p:cNvPr id="2" name="Title 1">
             <a:extLst>
               <a:ext uri="{FF2B5EF4-FFF2-40B4-BE49-F238E27FC236}">
-                <a16:creationId xmlns="" xmlns:a16="http://schemas.microsoft.com/office/drawing/2014/main" id="{99760F66-ED22-4D99-83D9-AF132B641E2C}"/>
+                <a16:creationId xmlns:a16="http://schemas.microsoft.com/office/drawing/2014/main" xmlns="" id="{99760F66-ED22-4D99-83D9-AF132B641E2C}"/>
               </a:ext>
             </a:extLst>
           </p:cNvPr>
@@ -15919,7 +15919,7 @@
           <p:cNvPr id="4" name="Picture 3" descr="A close up of a logo&#10;&#10;Description generated with very high confidence">
             <a:extLst>
               <a:ext uri="{FF2B5EF4-FFF2-40B4-BE49-F238E27FC236}">
-                <a16:creationId xmlns="" xmlns:a16="http://schemas.microsoft.com/office/drawing/2014/main" id="{6E87F861-F9AC-4F21-B0C8-58EB55E95B97}"/>
+                <a16:creationId xmlns:a16="http://schemas.microsoft.com/office/drawing/2014/main" xmlns="" id="{6E87F861-F9AC-4F21-B0C8-58EB55E95B97}"/>
               </a:ext>
             </a:extLst>
           </p:cNvPr>
@@ -15949,7 +15949,7 @@
           <p:cNvPr id="6" name="Picture 5" descr="A picture containing clock&#10;&#10;Description generated with very high confidence">
             <a:extLst>
               <a:ext uri="{FF2B5EF4-FFF2-40B4-BE49-F238E27FC236}">
-                <a16:creationId xmlns="" xmlns:a16="http://schemas.microsoft.com/office/drawing/2014/main" id="{4616AC99-6BB6-4ADE-BDE8-48395933FE5F}"/>
+                <a16:creationId xmlns:a16="http://schemas.microsoft.com/office/drawing/2014/main" xmlns="" id="{4616AC99-6BB6-4ADE-BDE8-48395933FE5F}"/>
               </a:ext>
             </a:extLst>
           </p:cNvPr>
@@ -15979,7 +15979,7 @@
           <p:cNvPr id="8" name="Arrow: Down 7">
             <a:extLst>
               <a:ext uri="{FF2B5EF4-FFF2-40B4-BE49-F238E27FC236}">
-                <a16:creationId xmlns="" xmlns:a16="http://schemas.microsoft.com/office/drawing/2014/main" id="{82AB09DD-DB63-4806-A980-AE0CB9781D42}"/>
+                <a16:creationId xmlns:a16="http://schemas.microsoft.com/office/drawing/2014/main" xmlns="" id="{82AB09DD-DB63-4806-A980-AE0CB9781D42}"/>
               </a:ext>
             </a:extLst>
           </p:cNvPr>
@@ -16033,7 +16033,7 @@
           <p:cNvPr id="3" name="Picture 43" descr="A close up of a logo&#10;&#10;Description generated with very high confidence">
             <a:extLst>
               <a:ext uri="{FF2B5EF4-FFF2-40B4-BE49-F238E27FC236}">
-                <a16:creationId xmlns="" xmlns:a16="http://schemas.microsoft.com/office/drawing/2014/main" id="{1CFBEB4B-4C2C-468C-AD74-3B403A169AA1}"/>
+                <a16:creationId xmlns:a16="http://schemas.microsoft.com/office/drawing/2014/main" xmlns="" id="{1CFBEB4B-4C2C-468C-AD74-3B403A169AA1}"/>
               </a:ext>
             </a:extLst>
           </p:cNvPr>
@@ -16063,7 +16063,7 @@
           <p:cNvPr id="9" name="Picture 9" descr="A picture containing drawing&#10;&#10;Description generated with very high confidence">
             <a:extLst>
               <a:ext uri="{FF2B5EF4-FFF2-40B4-BE49-F238E27FC236}">
-                <a16:creationId xmlns="" xmlns:a16="http://schemas.microsoft.com/office/drawing/2014/main" id="{02B44993-3D5D-4B1E-B348-A8AA765D22E8}"/>
+                <a16:creationId xmlns:a16="http://schemas.microsoft.com/office/drawing/2014/main" xmlns="" id="{02B44993-3D5D-4B1E-B348-A8AA765D22E8}"/>
               </a:ext>
             </a:extLst>
           </p:cNvPr>
@@ -16093,7 +16093,7 @@
           <p:cNvPr id="11" name="Picture 11" descr="A picture containing object, clock, meter&#10;&#10;Description generated with very high confidence">
             <a:extLst>
               <a:ext uri="{FF2B5EF4-FFF2-40B4-BE49-F238E27FC236}">
-                <a16:creationId xmlns="" xmlns:a16="http://schemas.microsoft.com/office/drawing/2014/main" id="{50B5677A-E1FB-4742-A2BB-B165C8289492}"/>
+                <a16:creationId xmlns:a16="http://schemas.microsoft.com/office/drawing/2014/main" xmlns="" id="{50B5677A-E1FB-4742-A2BB-B165C8289492}"/>
               </a:ext>
             </a:extLst>
           </p:cNvPr>
@@ -16354,7 +16354,7 @@
           <p:cNvPr id="2" name="Title 1">
             <a:extLst>
               <a:ext uri="{FF2B5EF4-FFF2-40B4-BE49-F238E27FC236}">
-                <a16:creationId xmlns="" xmlns:a16="http://schemas.microsoft.com/office/drawing/2014/main" id="{99760F66-ED22-4D99-83D9-AF132B641E2C}"/>
+                <a16:creationId xmlns:a16="http://schemas.microsoft.com/office/drawing/2014/main" xmlns="" id="{99760F66-ED22-4D99-83D9-AF132B641E2C}"/>
               </a:ext>
             </a:extLst>
           </p:cNvPr>
@@ -16385,7 +16385,7 @@
           <p:cNvPr id="4" name="Picture 3" descr="A close up of a logo&#10;&#10;Description generated with very high confidence">
             <a:extLst>
               <a:ext uri="{FF2B5EF4-FFF2-40B4-BE49-F238E27FC236}">
-                <a16:creationId xmlns="" xmlns:a16="http://schemas.microsoft.com/office/drawing/2014/main" id="{6E87F861-F9AC-4F21-B0C8-58EB55E95B97}"/>
+                <a16:creationId xmlns:a16="http://schemas.microsoft.com/office/drawing/2014/main" xmlns="" id="{6E87F861-F9AC-4F21-B0C8-58EB55E95B97}"/>
               </a:ext>
             </a:extLst>
           </p:cNvPr>
@@ -16415,7 +16415,7 @@
           <p:cNvPr id="8" name="Arrow: Down 7">
             <a:extLst>
               <a:ext uri="{FF2B5EF4-FFF2-40B4-BE49-F238E27FC236}">
-                <a16:creationId xmlns="" xmlns:a16="http://schemas.microsoft.com/office/drawing/2014/main" id="{82AB09DD-DB63-4806-A980-AE0CB9781D42}"/>
+                <a16:creationId xmlns:a16="http://schemas.microsoft.com/office/drawing/2014/main" xmlns="" id="{82AB09DD-DB63-4806-A980-AE0CB9781D42}"/>
               </a:ext>
             </a:extLst>
           </p:cNvPr>
@@ -16469,7 +16469,7 @@
           <p:cNvPr id="13" name="Picture 13" descr="A close up of a logo&#10;&#10;Description generated with very high confidence">
             <a:extLst>
               <a:ext uri="{FF2B5EF4-FFF2-40B4-BE49-F238E27FC236}">
-                <a16:creationId xmlns="" xmlns:a16="http://schemas.microsoft.com/office/drawing/2014/main" id="{ECAD198D-1469-41D2-8E92-807888FE870D}"/>
+                <a16:creationId xmlns:a16="http://schemas.microsoft.com/office/drawing/2014/main" xmlns="" id="{ECAD198D-1469-41D2-8E92-807888FE870D}"/>
               </a:ext>
             </a:extLst>
           </p:cNvPr>
@@ -16499,7 +16499,7 @@
           <p:cNvPr id="5" name="Picture 6" descr="A close up of a logo&#10;&#10;Description generated with very high confidence">
             <a:extLst>
               <a:ext uri="{FF2B5EF4-FFF2-40B4-BE49-F238E27FC236}">
-                <a16:creationId xmlns="" xmlns:a16="http://schemas.microsoft.com/office/drawing/2014/main" id="{EB8556EE-68CC-40A7-B949-39599FC85FC9}"/>
+                <a16:creationId xmlns:a16="http://schemas.microsoft.com/office/drawing/2014/main" xmlns="" id="{EB8556EE-68CC-40A7-B949-39599FC85FC9}"/>
               </a:ext>
             </a:extLst>
           </p:cNvPr>
@@ -16529,7 +16529,7 @@
           <p:cNvPr id="10" name="Arrow: Up-Down 9">
             <a:extLst>
               <a:ext uri="{FF2B5EF4-FFF2-40B4-BE49-F238E27FC236}">
-                <a16:creationId xmlns="" xmlns:a16="http://schemas.microsoft.com/office/drawing/2014/main" id="{B955B9A0-C9CB-469D-A0ED-46BACD4AF8A9}"/>
+                <a16:creationId xmlns:a16="http://schemas.microsoft.com/office/drawing/2014/main" xmlns="" id="{B955B9A0-C9CB-469D-A0ED-46BACD4AF8A9}"/>
               </a:ext>
             </a:extLst>
           </p:cNvPr>
@@ -16575,7 +16575,7 @@
           <p:cNvPr id="12" name="Picture 5" descr="A close up of a sign&#10;&#10;Description generated with very high confidence">
             <a:extLst>
               <a:ext uri="{FF2B5EF4-FFF2-40B4-BE49-F238E27FC236}">
-                <a16:creationId xmlns="" xmlns:a16="http://schemas.microsoft.com/office/drawing/2014/main" id="{D150EFB3-437B-49AB-B6EA-481CED6C7865}"/>
+                <a16:creationId xmlns:a16="http://schemas.microsoft.com/office/drawing/2014/main" xmlns="" id="{D150EFB3-437B-49AB-B6EA-481CED6C7865}"/>
               </a:ext>
             </a:extLst>
           </p:cNvPr>
@@ -16605,7 +16605,7 @@
           <p:cNvPr id="19" name="TextBox 18">
             <a:extLst>
               <a:ext uri="{FF2B5EF4-FFF2-40B4-BE49-F238E27FC236}">
-                <a16:creationId xmlns="" xmlns:a16="http://schemas.microsoft.com/office/drawing/2014/main" id="{20B2480F-8E9E-46F5-8DB2-C398D4668F0A}"/>
+                <a16:creationId xmlns:a16="http://schemas.microsoft.com/office/drawing/2014/main" xmlns="" id="{20B2480F-8E9E-46F5-8DB2-C398D4668F0A}"/>
               </a:ext>
             </a:extLst>
           </p:cNvPr>
@@ -16653,7 +16653,7 @@
           <p:cNvPr id="20" name="TextBox 19">
             <a:extLst>
               <a:ext uri="{FF2B5EF4-FFF2-40B4-BE49-F238E27FC236}">
-                <a16:creationId xmlns="" xmlns:a16="http://schemas.microsoft.com/office/drawing/2014/main" id="{1F5BE492-E3B4-48FA-9694-8F82B920DAEB}"/>
+                <a16:creationId xmlns:a16="http://schemas.microsoft.com/office/drawing/2014/main" xmlns="" id="{1F5BE492-E3B4-48FA-9694-8F82B920DAEB}"/>
               </a:ext>
             </a:extLst>
           </p:cNvPr>
@@ -16701,7 +16701,7 @@
           <p:cNvPr id="22" name="TextBox 21">
             <a:extLst>
               <a:ext uri="{FF2B5EF4-FFF2-40B4-BE49-F238E27FC236}">
-                <a16:creationId xmlns="" xmlns:a16="http://schemas.microsoft.com/office/drawing/2014/main" id="{DCB07139-45CB-4B60-98DD-E2CBA1E8B558}"/>
+                <a16:creationId xmlns:a16="http://schemas.microsoft.com/office/drawing/2014/main" xmlns="" id="{DCB07139-45CB-4B60-98DD-E2CBA1E8B558}"/>
               </a:ext>
             </a:extLst>
           </p:cNvPr>
@@ -16750,7 +16750,7 @@
           <p:cNvPr id="16" name="Picture 9" descr="A picture containing drawing&#10;&#10;Description generated with very high confidence">
             <a:extLst>
               <a:ext uri="{FF2B5EF4-FFF2-40B4-BE49-F238E27FC236}">
-                <a16:creationId xmlns="" xmlns:a16="http://schemas.microsoft.com/office/drawing/2014/main" id="{02B44993-3D5D-4B1E-B348-A8AA765D22E8}"/>
+                <a16:creationId xmlns:a16="http://schemas.microsoft.com/office/drawing/2014/main" xmlns="" id="{02B44993-3D5D-4B1E-B348-A8AA765D22E8}"/>
               </a:ext>
             </a:extLst>
           </p:cNvPr>
@@ -16780,7 +16780,7 @@
           <p:cNvPr id="17" name="Picture 11" descr="A picture containing object, clock, meter&#10;&#10;Description generated with very high confidence">
             <a:extLst>
               <a:ext uri="{FF2B5EF4-FFF2-40B4-BE49-F238E27FC236}">
-                <a16:creationId xmlns="" xmlns:a16="http://schemas.microsoft.com/office/drawing/2014/main" id="{50B5677A-E1FB-4742-A2BB-B165C8289492}"/>
+                <a16:creationId xmlns:a16="http://schemas.microsoft.com/office/drawing/2014/main" xmlns="" id="{50B5677A-E1FB-4742-A2BB-B165C8289492}"/>
               </a:ext>
             </a:extLst>
           </p:cNvPr>
@@ -17074,7 +17074,7 @@
           <p:cNvPr id="2" name="Title 1">
             <a:extLst>
               <a:ext uri="{FF2B5EF4-FFF2-40B4-BE49-F238E27FC236}">
-                <a16:creationId xmlns="" xmlns:a16="http://schemas.microsoft.com/office/drawing/2014/main" id="{22DAD01F-DC17-4CB9-A59E-3B88FC10ACC0}"/>
+                <a16:creationId xmlns:a16="http://schemas.microsoft.com/office/drawing/2014/main" xmlns="" id="{22DAD01F-DC17-4CB9-A59E-3B88FC10ACC0}"/>
               </a:ext>
             </a:extLst>
           </p:cNvPr>
@@ -17105,7 +17105,7 @@
           <p:cNvPr id="4" name="Picture 6" descr="A close up of a logo&#10;&#10;Description generated with very high confidence">
             <a:extLst>
               <a:ext uri="{FF2B5EF4-FFF2-40B4-BE49-F238E27FC236}">
-                <a16:creationId xmlns="" xmlns:a16="http://schemas.microsoft.com/office/drawing/2014/main" id="{C0330C5C-C655-42A8-BF9C-90E788CC6A92}"/>
+                <a16:creationId xmlns:a16="http://schemas.microsoft.com/office/drawing/2014/main" xmlns="" id="{C0330C5C-C655-42A8-BF9C-90E788CC6A92}"/>
               </a:ext>
             </a:extLst>
           </p:cNvPr>
@@ -17140,7 +17140,7 @@
           <p:cNvPr id="6" name="Picture 9" descr="A picture containing drawing&#10;&#10;Description generated with very high confidence">
             <a:extLst>
               <a:ext uri="{FF2B5EF4-FFF2-40B4-BE49-F238E27FC236}">
-                <a16:creationId xmlns="" xmlns:a16="http://schemas.microsoft.com/office/drawing/2014/main" id="{69BBBA96-ED0F-4961-8C6B-6543A7A55BAE}"/>
+                <a16:creationId xmlns:a16="http://schemas.microsoft.com/office/drawing/2014/main" xmlns="" id="{69BBBA96-ED0F-4961-8C6B-6543A7A55BAE}"/>
               </a:ext>
             </a:extLst>
           </p:cNvPr>
@@ -17173,7 +17173,7 @@
           <p:cNvPr id="8" name="Picture 11" descr="A picture containing object, clock, meter&#10;&#10;Description generated with very high confidence">
             <a:extLst>
               <a:ext uri="{FF2B5EF4-FFF2-40B4-BE49-F238E27FC236}">
-                <a16:creationId xmlns="" xmlns:a16="http://schemas.microsoft.com/office/drawing/2014/main" id="{FF7323CE-66D1-43A5-B3E1-17A59B7D36B4}"/>
+                <a16:creationId xmlns:a16="http://schemas.microsoft.com/office/drawing/2014/main" xmlns="" id="{FF7323CE-66D1-43A5-B3E1-17A59B7D36B4}"/>
               </a:ext>
             </a:extLst>
           </p:cNvPr>
@@ -17206,7 +17206,7 @@
           <p:cNvPr id="9" name="Picture 9" descr="A close up of a logo&#10;&#10;Description generated with very high confidence">
             <a:extLst>
               <a:ext uri="{FF2B5EF4-FFF2-40B4-BE49-F238E27FC236}">
-                <a16:creationId xmlns="" xmlns:a16="http://schemas.microsoft.com/office/drawing/2014/main" id="{FE7DD4F2-A92E-4806-B792-8484FE70F8E3}"/>
+                <a16:creationId xmlns:a16="http://schemas.microsoft.com/office/drawing/2014/main" xmlns="" id="{FE7DD4F2-A92E-4806-B792-8484FE70F8E3}"/>
               </a:ext>
             </a:extLst>
           </p:cNvPr>
@@ -17236,7 +17236,7 @@
           <p:cNvPr id="18" name="Picture 18" descr="A picture containing clock&#10;&#10;Description generated with very high confidence">
             <a:extLst>
               <a:ext uri="{FF2B5EF4-FFF2-40B4-BE49-F238E27FC236}">
-                <a16:creationId xmlns="" xmlns:a16="http://schemas.microsoft.com/office/drawing/2014/main" id="{0554376B-EDEF-4D1D-9EAE-F4D103F6E769}"/>
+                <a16:creationId xmlns:a16="http://schemas.microsoft.com/office/drawing/2014/main" xmlns="" id="{0554376B-EDEF-4D1D-9EAE-F4D103F6E769}"/>
               </a:ext>
             </a:extLst>
           </p:cNvPr>
@@ -17266,7 +17266,7 @@
           <p:cNvPr id="24" name="Picture 24" descr="A picture containing clock, flower&#10;&#10;Description generated with very high confidence">
             <a:extLst>
               <a:ext uri="{FF2B5EF4-FFF2-40B4-BE49-F238E27FC236}">
-                <a16:creationId xmlns="" xmlns:a16="http://schemas.microsoft.com/office/drawing/2014/main" id="{A539457C-5E7D-4840-803E-FB9943A9E863}"/>
+                <a16:creationId xmlns:a16="http://schemas.microsoft.com/office/drawing/2014/main" xmlns="" id="{A539457C-5E7D-4840-803E-FB9943A9E863}"/>
               </a:ext>
             </a:extLst>
           </p:cNvPr>
@@ -17296,7 +17296,7 @@
           <p:cNvPr id="26" name="Picture 26" descr="A picture containing drawing&#10;&#10;Description generated with very high confidence">
             <a:extLst>
               <a:ext uri="{FF2B5EF4-FFF2-40B4-BE49-F238E27FC236}">
-                <a16:creationId xmlns="" xmlns:a16="http://schemas.microsoft.com/office/drawing/2014/main" id="{E9BBDA87-9334-48F6-B549-DF8332853EB8}"/>
+                <a16:creationId xmlns:a16="http://schemas.microsoft.com/office/drawing/2014/main" xmlns="" id="{E9BBDA87-9334-48F6-B549-DF8332853EB8}"/>
               </a:ext>
             </a:extLst>
           </p:cNvPr>
@@ -17326,7 +17326,7 @@
           <p:cNvPr id="28" name="Picture 28" descr="A close up of a logo&#10;&#10;Description generated with high confidence">
             <a:extLst>
               <a:ext uri="{FF2B5EF4-FFF2-40B4-BE49-F238E27FC236}">
-                <a16:creationId xmlns="" xmlns:a16="http://schemas.microsoft.com/office/drawing/2014/main" id="{81E243AB-F66C-4DE2-8AF3-5DB68711DB44}"/>
+                <a16:creationId xmlns:a16="http://schemas.microsoft.com/office/drawing/2014/main" xmlns="" id="{81E243AB-F66C-4DE2-8AF3-5DB68711DB44}"/>
               </a:ext>
             </a:extLst>
           </p:cNvPr>
@@ -17356,7 +17356,7 @@
           <p:cNvPr id="30" name="Picture 30" descr="A picture containing clock, meter&#10;&#10;Description generated with very high confidence">
             <a:extLst>
               <a:ext uri="{FF2B5EF4-FFF2-40B4-BE49-F238E27FC236}">
-                <a16:creationId xmlns="" xmlns:a16="http://schemas.microsoft.com/office/drawing/2014/main" id="{869F45C0-BEFD-4D0A-A30C-E3DE4CED26A1}"/>
+                <a16:creationId xmlns:a16="http://schemas.microsoft.com/office/drawing/2014/main" xmlns="" id="{869F45C0-BEFD-4D0A-A30C-E3DE4CED26A1}"/>
               </a:ext>
             </a:extLst>
           </p:cNvPr>
@@ -17386,7 +17386,7 @@
           <p:cNvPr id="32" name="Picture 32" descr="A close up of a logo&#10;&#10;Description generated with very high confidence">
             <a:extLst>
               <a:ext uri="{FF2B5EF4-FFF2-40B4-BE49-F238E27FC236}">
-                <a16:creationId xmlns="" xmlns:a16="http://schemas.microsoft.com/office/drawing/2014/main" id="{1ACF1988-3C5A-413A-B927-C4F08B32DC61}"/>
+                <a16:creationId xmlns:a16="http://schemas.microsoft.com/office/drawing/2014/main" xmlns="" id="{1ACF1988-3C5A-413A-B927-C4F08B32DC61}"/>
               </a:ext>
             </a:extLst>
           </p:cNvPr>
@@ -17416,7 +17416,7 @@
           <p:cNvPr id="34" name="Picture 34" descr="A close up of a logo&#10;&#10;Description generated with very high confidence">
             <a:extLst>
               <a:ext uri="{FF2B5EF4-FFF2-40B4-BE49-F238E27FC236}">
-                <a16:creationId xmlns="" xmlns:a16="http://schemas.microsoft.com/office/drawing/2014/main" id="{7923B112-21C2-45C5-A791-55128D24522B}"/>
+                <a16:creationId xmlns:a16="http://schemas.microsoft.com/office/drawing/2014/main" xmlns="" id="{7923B112-21C2-45C5-A791-55128D24522B}"/>
               </a:ext>
             </a:extLst>
           </p:cNvPr>
@@ -17446,7 +17446,7 @@
           <p:cNvPr id="38" name="Picture 38" descr="A picture containing clock&#10;&#10;Description generated with very high confidence">
             <a:extLst>
               <a:ext uri="{FF2B5EF4-FFF2-40B4-BE49-F238E27FC236}">
-                <a16:creationId xmlns="" xmlns:a16="http://schemas.microsoft.com/office/drawing/2014/main" id="{DDD232C9-6B70-4425-9087-619A72CFF32A}"/>
+                <a16:creationId xmlns:a16="http://schemas.microsoft.com/office/drawing/2014/main" xmlns="" id="{DDD232C9-6B70-4425-9087-619A72CFF32A}"/>
               </a:ext>
             </a:extLst>
           </p:cNvPr>
@@ -17476,7 +17476,7 @@
           <p:cNvPr id="40" name="Picture 40" descr="A close up of a logo&#10;&#10;Description generated with very high confidence">
             <a:extLst>
               <a:ext uri="{FF2B5EF4-FFF2-40B4-BE49-F238E27FC236}">
-                <a16:creationId xmlns="" xmlns:a16="http://schemas.microsoft.com/office/drawing/2014/main" id="{A85F4AA5-CF6F-417D-96A4-6AD1E292E6A5}"/>
+                <a16:creationId xmlns:a16="http://schemas.microsoft.com/office/drawing/2014/main" xmlns="" id="{A85F4AA5-CF6F-417D-96A4-6AD1E292E6A5}"/>
               </a:ext>
             </a:extLst>
           </p:cNvPr>
@@ -17506,7 +17506,7 @@
           <p:cNvPr id="43" name="Picture 43" descr="A close up of a logo&#10;&#10;Description generated with very high confidence">
             <a:extLst>
               <a:ext uri="{FF2B5EF4-FFF2-40B4-BE49-F238E27FC236}">
-                <a16:creationId xmlns="" xmlns:a16="http://schemas.microsoft.com/office/drawing/2014/main" id="{BAC78DDE-16D4-4F26-B28A-84F4415D8648}"/>
+                <a16:creationId xmlns:a16="http://schemas.microsoft.com/office/drawing/2014/main" xmlns="" id="{BAC78DDE-16D4-4F26-B28A-84F4415D8648}"/>
               </a:ext>
             </a:extLst>
           </p:cNvPr>
@@ -17536,7 +17536,7 @@
           <p:cNvPr id="45" name="Picture 45" descr="A picture containing clock&#10;&#10;Description generated with very high confidence">
             <a:extLst>
               <a:ext uri="{FF2B5EF4-FFF2-40B4-BE49-F238E27FC236}">
-                <a16:creationId xmlns="" xmlns:a16="http://schemas.microsoft.com/office/drawing/2014/main" id="{597ACDCF-1672-40B5-A8BF-D0F2FE28A71F}"/>
+                <a16:creationId xmlns:a16="http://schemas.microsoft.com/office/drawing/2014/main" xmlns="" id="{597ACDCF-1672-40B5-A8BF-D0F2FE28A71F}"/>
               </a:ext>
             </a:extLst>
           </p:cNvPr>
@@ -17566,7 +17566,7 @@
           <p:cNvPr id="47" name="Picture 40" descr="A close up of a logo&#10;&#10;Description generated with very high confidence">
             <a:extLst>
               <a:ext uri="{FF2B5EF4-FFF2-40B4-BE49-F238E27FC236}">
-                <a16:creationId xmlns="" xmlns:a16="http://schemas.microsoft.com/office/drawing/2014/main" id="{C45619DF-F101-4904-A04F-6621105A76DF}"/>
+                <a16:creationId xmlns:a16="http://schemas.microsoft.com/office/drawing/2014/main" xmlns="" id="{C45619DF-F101-4904-A04F-6621105A76DF}"/>
               </a:ext>
             </a:extLst>
           </p:cNvPr>
@@ -17596,7 +17596,7 @@
           <p:cNvPr id="48" name="Arrow: Right 47">
             <a:extLst>
               <a:ext uri="{FF2B5EF4-FFF2-40B4-BE49-F238E27FC236}">
-                <a16:creationId xmlns="" xmlns:a16="http://schemas.microsoft.com/office/drawing/2014/main" id="{2D05F327-8A08-41D8-93AF-95C1FFD2CEA2}"/>
+                <a16:creationId xmlns:a16="http://schemas.microsoft.com/office/drawing/2014/main" xmlns="" id="{2D05F327-8A08-41D8-93AF-95C1FFD2CEA2}"/>
               </a:ext>
             </a:extLst>
           </p:cNvPr>
@@ -17656,7 +17656,7 @@
           <p:cNvPr id="49" name="Arrow: Right 48">
             <a:extLst>
               <a:ext uri="{FF2B5EF4-FFF2-40B4-BE49-F238E27FC236}">
-                <a16:creationId xmlns="" xmlns:a16="http://schemas.microsoft.com/office/drawing/2014/main" id="{12342E48-7442-40ED-B882-627321DA0B53}"/>
+                <a16:creationId xmlns:a16="http://schemas.microsoft.com/office/drawing/2014/main" xmlns="" id="{12342E48-7442-40ED-B882-627321DA0B53}"/>
               </a:ext>
             </a:extLst>
           </p:cNvPr>
@@ -17716,7 +17716,7 @@
           <p:cNvPr id="50" name="Arrow: Right 49">
             <a:extLst>
               <a:ext uri="{FF2B5EF4-FFF2-40B4-BE49-F238E27FC236}">
-                <a16:creationId xmlns="" xmlns:a16="http://schemas.microsoft.com/office/drawing/2014/main" id="{67754761-3E3A-47A7-9447-7C60AA0E0358}"/>
+                <a16:creationId xmlns:a16="http://schemas.microsoft.com/office/drawing/2014/main" xmlns="" id="{67754761-3E3A-47A7-9447-7C60AA0E0358}"/>
               </a:ext>
             </a:extLst>
           </p:cNvPr>
@@ -18420,7 +18420,7 @@
           <p:cNvPr id="2" name="Title 1">
             <a:extLst>
               <a:ext uri="{FF2B5EF4-FFF2-40B4-BE49-F238E27FC236}">
-                <a16:creationId xmlns="" xmlns:a16="http://schemas.microsoft.com/office/drawing/2014/main" id="{22DAD01F-DC17-4CB9-A59E-3B88FC10ACC0}"/>
+                <a16:creationId xmlns:a16="http://schemas.microsoft.com/office/drawing/2014/main" xmlns="" id="{22DAD01F-DC17-4CB9-A59E-3B88FC10ACC0}"/>
               </a:ext>
             </a:extLst>
           </p:cNvPr>
@@ -18451,7 +18451,7 @@
           <p:cNvPr id="4" name="Picture 6" descr="A close up of a logo&#10;&#10;Description generated with very high confidence">
             <a:extLst>
               <a:ext uri="{FF2B5EF4-FFF2-40B4-BE49-F238E27FC236}">
-                <a16:creationId xmlns="" xmlns:a16="http://schemas.microsoft.com/office/drawing/2014/main" id="{C0330C5C-C655-42A8-BF9C-90E788CC6A92}"/>
+                <a16:creationId xmlns:a16="http://schemas.microsoft.com/office/drawing/2014/main" xmlns="" id="{C0330C5C-C655-42A8-BF9C-90E788CC6A92}"/>
               </a:ext>
             </a:extLst>
           </p:cNvPr>
@@ -18486,7 +18486,7 @@
           <p:cNvPr id="6" name="Picture 9" descr="A picture containing drawing&#10;&#10;Description generated with very high confidence">
             <a:extLst>
               <a:ext uri="{FF2B5EF4-FFF2-40B4-BE49-F238E27FC236}">
-                <a16:creationId xmlns="" xmlns:a16="http://schemas.microsoft.com/office/drawing/2014/main" id="{69BBBA96-ED0F-4961-8C6B-6543A7A55BAE}"/>
+                <a16:creationId xmlns:a16="http://schemas.microsoft.com/office/drawing/2014/main" xmlns="" id="{69BBBA96-ED0F-4961-8C6B-6543A7A55BAE}"/>
               </a:ext>
             </a:extLst>
           </p:cNvPr>
@@ -18519,7 +18519,7 @@
           <p:cNvPr id="8" name="Picture 11" descr="A picture containing object, clock, meter&#10;&#10;Description generated with very high confidence">
             <a:extLst>
               <a:ext uri="{FF2B5EF4-FFF2-40B4-BE49-F238E27FC236}">
-                <a16:creationId xmlns="" xmlns:a16="http://schemas.microsoft.com/office/drawing/2014/main" id="{FF7323CE-66D1-43A5-B3E1-17A59B7D36B4}"/>
+                <a16:creationId xmlns:a16="http://schemas.microsoft.com/office/drawing/2014/main" xmlns="" id="{FF7323CE-66D1-43A5-B3E1-17A59B7D36B4}"/>
               </a:ext>
             </a:extLst>
           </p:cNvPr>
@@ -18552,7 +18552,7 @@
           <p:cNvPr id="43" name="Picture 43" descr="A close up of a logo&#10;&#10;Description generated with very high confidence">
             <a:extLst>
               <a:ext uri="{FF2B5EF4-FFF2-40B4-BE49-F238E27FC236}">
-                <a16:creationId xmlns="" xmlns:a16="http://schemas.microsoft.com/office/drawing/2014/main" id="{BAC78DDE-16D4-4F26-B28A-84F4415D8648}"/>
+                <a16:creationId xmlns:a16="http://schemas.microsoft.com/office/drawing/2014/main" xmlns="" id="{BAC78DDE-16D4-4F26-B28A-84F4415D8648}"/>
               </a:ext>
             </a:extLst>
           </p:cNvPr>
@@ -18582,7 +18582,7 @@
           <p:cNvPr id="45" name="Picture 45" descr="A picture containing clock&#10;&#10;Description generated with very high confidence">
             <a:extLst>
               <a:ext uri="{FF2B5EF4-FFF2-40B4-BE49-F238E27FC236}">
-                <a16:creationId xmlns="" xmlns:a16="http://schemas.microsoft.com/office/drawing/2014/main" id="{597ACDCF-1672-40B5-A8BF-D0F2FE28A71F}"/>
+                <a16:creationId xmlns:a16="http://schemas.microsoft.com/office/drawing/2014/main" xmlns="" id="{597ACDCF-1672-40B5-A8BF-D0F2FE28A71F}"/>
               </a:ext>
             </a:extLst>
           </p:cNvPr>
@@ -18612,7 +18612,7 @@
           <p:cNvPr id="47" name="Picture 40" descr="A close up of a logo&#10;&#10;Description generated with very high confidence">
             <a:extLst>
               <a:ext uri="{FF2B5EF4-FFF2-40B4-BE49-F238E27FC236}">
-                <a16:creationId xmlns="" xmlns:a16="http://schemas.microsoft.com/office/drawing/2014/main" id="{C45619DF-F101-4904-A04F-6621105A76DF}"/>
+                <a16:creationId xmlns:a16="http://schemas.microsoft.com/office/drawing/2014/main" xmlns="" id="{C45619DF-F101-4904-A04F-6621105A76DF}"/>
               </a:ext>
             </a:extLst>
           </p:cNvPr>
@@ -18642,7 +18642,7 @@
           <p:cNvPr id="5" name="Picture 6" descr="A close up of a logo&#10;&#10;Description generated with very high confidence">
             <a:extLst>
               <a:ext uri="{FF2B5EF4-FFF2-40B4-BE49-F238E27FC236}">
-                <a16:creationId xmlns="" xmlns:a16="http://schemas.microsoft.com/office/drawing/2014/main" id="{BDB7C2E2-E916-4966-8640-B17B4BE28F3F}"/>
+                <a16:creationId xmlns:a16="http://schemas.microsoft.com/office/drawing/2014/main" xmlns="" id="{BDB7C2E2-E916-4966-8640-B17B4BE28F3F}"/>
               </a:ext>
             </a:extLst>
           </p:cNvPr>
@@ -18672,7 +18672,7 @@
           <p:cNvPr id="10" name="Picture 11" descr="A close up of a logo&#10;&#10;Description generated with very high confidence">
             <a:extLst>
               <a:ext uri="{FF2B5EF4-FFF2-40B4-BE49-F238E27FC236}">
-                <a16:creationId xmlns="" xmlns:a16="http://schemas.microsoft.com/office/drawing/2014/main" id="{775D7EFD-73DC-464B-8B91-4E49077509A6}"/>
+                <a16:creationId xmlns:a16="http://schemas.microsoft.com/office/drawing/2014/main" xmlns="" id="{775D7EFD-73DC-464B-8B91-4E49077509A6}"/>
               </a:ext>
             </a:extLst>
           </p:cNvPr>
@@ -18702,7 +18702,7 @@
           <p:cNvPr id="13" name="Picture 13" descr="A picture containing object, clock&#10;&#10;Description generated with very high confidence">
             <a:extLst>
               <a:ext uri="{FF2B5EF4-FFF2-40B4-BE49-F238E27FC236}">
-                <a16:creationId xmlns="" xmlns:a16="http://schemas.microsoft.com/office/drawing/2014/main" id="{5D923562-CC12-4447-985D-D04FC150126A}"/>
+                <a16:creationId xmlns:a16="http://schemas.microsoft.com/office/drawing/2014/main" xmlns="" id="{5D923562-CC12-4447-985D-D04FC150126A}"/>
               </a:ext>
             </a:extLst>
           </p:cNvPr>
@@ -18732,7 +18732,7 @@
           <p:cNvPr id="15" name="Picture 15" descr="A picture containing drawing&#10;&#10;Description generated with very high confidence">
             <a:extLst>
               <a:ext uri="{FF2B5EF4-FFF2-40B4-BE49-F238E27FC236}">
-                <a16:creationId xmlns="" xmlns:a16="http://schemas.microsoft.com/office/drawing/2014/main" id="{B93A8413-1715-41F4-9B7A-755CE9CFF50E}"/>
+                <a16:creationId xmlns:a16="http://schemas.microsoft.com/office/drawing/2014/main" xmlns="" id="{B93A8413-1715-41F4-9B7A-755CE9CFF50E}"/>
               </a:ext>
             </a:extLst>
           </p:cNvPr>
@@ -18762,7 +18762,7 @@
           <p:cNvPr id="19" name="Picture 19" descr="A close up of a logo&#10;&#10;Description generated with very high confidence">
             <a:extLst>
               <a:ext uri="{FF2B5EF4-FFF2-40B4-BE49-F238E27FC236}">
-                <a16:creationId xmlns="" xmlns:a16="http://schemas.microsoft.com/office/drawing/2014/main" id="{BF193353-5A74-4226-BBC8-CE1F5810E6E0}"/>
+                <a16:creationId xmlns:a16="http://schemas.microsoft.com/office/drawing/2014/main" xmlns="" id="{BF193353-5A74-4226-BBC8-CE1F5810E6E0}"/>
               </a:ext>
             </a:extLst>
           </p:cNvPr>
@@ -18792,7 +18792,7 @@
           <p:cNvPr id="21" name="TextBox 20">
             <a:extLst>
               <a:ext uri="{FF2B5EF4-FFF2-40B4-BE49-F238E27FC236}">
-                <a16:creationId xmlns="" xmlns:a16="http://schemas.microsoft.com/office/drawing/2014/main" id="{EB90B60B-55B1-438E-94CD-FD27D4371DD6}"/>
+                <a16:creationId xmlns:a16="http://schemas.microsoft.com/office/drawing/2014/main" xmlns="" id="{EB90B60B-55B1-438E-94CD-FD27D4371DD6}"/>
               </a:ext>
             </a:extLst>
           </p:cNvPr>
@@ -18831,7 +18831,7 @@
           <p:cNvPr id="22" name="Picture 16" descr="A close up of a logo&#10;&#10;Description generated with very high confidence">
             <a:extLst>
               <a:ext uri="{FF2B5EF4-FFF2-40B4-BE49-F238E27FC236}">
-                <a16:creationId xmlns="" xmlns:a16="http://schemas.microsoft.com/office/drawing/2014/main" id="{4B263D8A-1697-4233-B5A8-A0666187F79A}"/>
+                <a16:creationId xmlns:a16="http://schemas.microsoft.com/office/drawing/2014/main" xmlns="" id="{4B263D8A-1697-4233-B5A8-A0666187F79A}"/>
               </a:ext>
             </a:extLst>
           </p:cNvPr>
@@ -18866,7 +18866,7 @@
           <p:cNvPr id="25" name="Right Brace 24">
             <a:extLst>
               <a:ext uri="{FF2B5EF4-FFF2-40B4-BE49-F238E27FC236}">
-                <a16:creationId xmlns="" xmlns:a16="http://schemas.microsoft.com/office/drawing/2014/main" id="{B123DDFB-BA27-413F-8F72-48EF2FDDE207}"/>
+                <a16:creationId xmlns:a16="http://schemas.microsoft.com/office/drawing/2014/main" xmlns="" id="{B123DDFB-BA27-413F-8F72-48EF2FDDE207}"/>
               </a:ext>
             </a:extLst>
           </p:cNvPr>
@@ -18918,7 +18918,7 @@
           <p:cNvPr id="41" name="Right Brace 40">
             <a:extLst>
               <a:ext uri="{FF2B5EF4-FFF2-40B4-BE49-F238E27FC236}">
-                <a16:creationId xmlns="" xmlns:a16="http://schemas.microsoft.com/office/drawing/2014/main" id="{8D8C0313-13A4-4FAA-9612-4D1FC8C80DFF}"/>
+                <a16:creationId xmlns:a16="http://schemas.microsoft.com/office/drawing/2014/main" xmlns="" id="{8D8C0313-13A4-4FAA-9612-4D1FC8C80DFF}"/>
               </a:ext>
             </a:extLst>
           </p:cNvPr>
@@ -18970,7 +18970,7 @@
           <p:cNvPr id="27" name="Picture 28" descr="A close up of a sign&#10;&#10;Description generated with high confidence">
             <a:extLst>
               <a:ext uri="{FF2B5EF4-FFF2-40B4-BE49-F238E27FC236}">
-                <a16:creationId xmlns="" xmlns:a16="http://schemas.microsoft.com/office/drawing/2014/main" id="{A9F7282D-9E32-4A50-84EA-BE35636CF009}"/>
+                <a16:creationId xmlns:a16="http://schemas.microsoft.com/office/drawing/2014/main" xmlns="" id="{A9F7282D-9E32-4A50-84EA-BE35636CF009}"/>
               </a:ext>
             </a:extLst>
           </p:cNvPr>
@@ -19000,7 +19000,7 @@
           <p:cNvPr id="31" name="Picture 32" descr="A close up of a logo&#10;&#10;Description generated with very high confidence">
             <a:extLst>
               <a:ext uri="{FF2B5EF4-FFF2-40B4-BE49-F238E27FC236}">
-                <a16:creationId xmlns="" xmlns:a16="http://schemas.microsoft.com/office/drawing/2014/main" id="{7D7F121C-1B9A-47CF-A882-FA34E6A6E361}"/>
+                <a16:creationId xmlns:a16="http://schemas.microsoft.com/office/drawing/2014/main" xmlns="" id="{7D7F121C-1B9A-47CF-A882-FA34E6A6E361}"/>
               </a:ext>
             </a:extLst>
           </p:cNvPr>
@@ -19030,7 +19030,7 @@
           <p:cNvPr id="36" name="Picture 38" descr="A close up of a logo&#10;&#10;Description generated with very high confidence">
             <a:extLst>
               <a:ext uri="{FF2B5EF4-FFF2-40B4-BE49-F238E27FC236}">
-                <a16:creationId xmlns="" xmlns:a16="http://schemas.microsoft.com/office/drawing/2014/main" id="{420FFD42-44DD-44E8-A92B-9618CCA5334E}"/>
+                <a16:creationId xmlns:a16="http://schemas.microsoft.com/office/drawing/2014/main" xmlns="" id="{420FFD42-44DD-44E8-A92B-9618CCA5334E}"/>
               </a:ext>
             </a:extLst>
           </p:cNvPr>
@@ -19060,7 +19060,7 @@
           <p:cNvPr id="42" name="TextBox 41">
             <a:extLst>
               <a:ext uri="{FF2B5EF4-FFF2-40B4-BE49-F238E27FC236}">
-                <a16:creationId xmlns="" xmlns:a16="http://schemas.microsoft.com/office/drawing/2014/main" id="{4A1648FC-A785-47A2-972E-144548C6A37A}"/>
+                <a16:creationId xmlns:a16="http://schemas.microsoft.com/office/drawing/2014/main" xmlns="" id="{4A1648FC-A785-47A2-972E-144548C6A37A}"/>
               </a:ext>
             </a:extLst>
           </p:cNvPr>
@@ -19123,7 +19123,7 @@
           <p:cNvPr id="23" name="Arrow: Right 47">
             <a:extLst>
               <a:ext uri="{FF2B5EF4-FFF2-40B4-BE49-F238E27FC236}">
-                <a16:creationId xmlns="" xmlns:a16="http://schemas.microsoft.com/office/drawing/2014/main" id="{2D05F327-8A08-41D8-93AF-95C1FFD2CEA2}"/>
+                <a16:creationId xmlns:a16="http://schemas.microsoft.com/office/drawing/2014/main" xmlns="" id="{2D05F327-8A08-41D8-93AF-95C1FFD2CEA2}"/>
               </a:ext>
             </a:extLst>
           </p:cNvPr>
@@ -19183,7 +19183,7 @@
           <p:cNvPr id="24" name="Arrow: Right 47">
             <a:extLst>
               <a:ext uri="{FF2B5EF4-FFF2-40B4-BE49-F238E27FC236}">
-                <a16:creationId xmlns="" xmlns:a16="http://schemas.microsoft.com/office/drawing/2014/main" id="{2D05F327-8A08-41D8-93AF-95C1FFD2CEA2}"/>
+                <a16:creationId xmlns:a16="http://schemas.microsoft.com/office/drawing/2014/main" xmlns="" id="{2D05F327-8A08-41D8-93AF-95C1FFD2CEA2}"/>
               </a:ext>
             </a:extLst>
           </p:cNvPr>
@@ -19243,7 +19243,7 @@
           <p:cNvPr id="26" name="Arrow: Right 47">
             <a:extLst>
               <a:ext uri="{FF2B5EF4-FFF2-40B4-BE49-F238E27FC236}">
-                <a16:creationId xmlns="" xmlns:a16="http://schemas.microsoft.com/office/drawing/2014/main" id="{2D05F327-8A08-41D8-93AF-95C1FFD2CEA2}"/>
+                <a16:creationId xmlns:a16="http://schemas.microsoft.com/office/drawing/2014/main" xmlns="" id="{2D05F327-8A08-41D8-93AF-95C1FFD2CEA2}"/>
               </a:ext>
             </a:extLst>
           </p:cNvPr>
@@ -20086,7 +20086,7 @@
           <p:cNvPr id="4" name="Picture 6" descr="A close up of a logo&#10;&#10;Description generated with very high confidence">
             <a:extLst>
               <a:ext uri="{FF2B5EF4-FFF2-40B4-BE49-F238E27FC236}">
-                <a16:creationId xmlns="" xmlns:a16="http://schemas.microsoft.com/office/drawing/2014/main" id="{C0330C5C-C655-42A8-BF9C-90E788CC6A92}"/>
+                <a16:creationId xmlns:a16="http://schemas.microsoft.com/office/drawing/2014/main" xmlns="" id="{C0330C5C-C655-42A8-BF9C-90E788CC6A92}"/>
               </a:ext>
             </a:extLst>
           </p:cNvPr>
@@ -20121,7 +20121,7 @@
           <p:cNvPr id="6" name="Picture 9" descr="A picture containing drawing&#10;&#10;Description generated with very high confidence">
             <a:extLst>
               <a:ext uri="{FF2B5EF4-FFF2-40B4-BE49-F238E27FC236}">
-                <a16:creationId xmlns="" xmlns:a16="http://schemas.microsoft.com/office/drawing/2014/main" id="{69BBBA96-ED0F-4961-8C6B-6543A7A55BAE}"/>
+                <a16:creationId xmlns:a16="http://schemas.microsoft.com/office/drawing/2014/main" xmlns="" id="{69BBBA96-ED0F-4961-8C6B-6543A7A55BAE}"/>
               </a:ext>
             </a:extLst>
           </p:cNvPr>
@@ -20154,7 +20154,7 @@
           <p:cNvPr id="8" name="Picture 11" descr="A picture containing object, clock, meter&#10;&#10;Description generated with very high confidence">
             <a:extLst>
               <a:ext uri="{FF2B5EF4-FFF2-40B4-BE49-F238E27FC236}">
-                <a16:creationId xmlns="" xmlns:a16="http://schemas.microsoft.com/office/drawing/2014/main" id="{FF7323CE-66D1-43A5-B3E1-17A59B7D36B4}"/>
+                <a16:creationId xmlns:a16="http://schemas.microsoft.com/office/drawing/2014/main" xmlns="" id="{FF7323CE-66D1-43A5-B3E1-17A59B7D36B4}"/>
               </a:ext>
             </a:extLst>
           </p:cNvPr>
@@ -20187,7 +20187,7 @@
           <p:cNvPr id="9" name="Picture 9" descr="A close up of a logo&#10;&#10;Description generated with very high confidence">
             <a:extLst>
               <a:ext uri="{FF2B5EF4-FFF2-40B4-BE49-F238E27FC236}">
-                <a16:creationId xmlns="" xmlns:a16="http://schemas.microsoft.com/office/drawing/2014/main" id="{FE7DD4F2-A92E-4806-B792-8484FE70F8E3}"/>
+                <a16:creationId xmlns:a16="http://schemas.microsoft.com/office/drawing/2014/main" xmlns="" id="{FE7DD4F2-A92E-4806-B792-8484FE70F8E3}"/>
               </a:ext>
             </a:extLst>
           </p:cNvPr>
@@ -20217,7 +20217,7 @@
           <p:cNvPr id="18" name="Picture 18" descr="A picture containing clock&#10;&#10;Description generated with very high confidence">
             <a:extLst>
               <a:ext uri="{FF2B5EF4-FFF2-40B4-BE49-F238E27FC236}">
-                <a16:creationId xmlns="" xmlns:a16="http://schemas.microsoft.com/office/drawing/2014/main" id="{0554376B-EDEF-4D1D-9EAE-F4D103F6E769}"/>
+                <a16:creationId xmlns:a16="http://schemas.microsoft.com/office/drawing/2014/main" xmlns="" id="{0554376B-EDEF-4D1D-9EAE-F4D103F6E769}"/>
               </a:ext>
             </a:extLst>
           </p:cNvPr>
@@ -20247,7 +20247,7 @@
           <p:cNvPr id="24" name="Picture 24" descr="A picture containing clock, flower&#10;&#10;Description generated with very high confidence">
             <a:extLst>
               <a:ext uri="{FF2B5EF4-FFF2-40B4-BE49-F238E27FC236}">
-                <a16:creationId xmlns="" xmlns:a16="http://schemas.microsoft.com/office/drawing/2014/main" id="{A539457C-5E7D-4840-803E-FB9943A9E863}"/>
+                <a16:creationId xmlns:a16="http://schemas.microsoft.com/office/drawing/2014/main" xmlns="" id="{A539457C-5E7D-4840-803E-FB9943A9E863}"/>
               </a:ext>
             </a:extLst>
           </p:cNvPr>
@@ -20277,7 +20277,7 @@
           <p:cNvPr id="26" name="Picture 26" descr="A picture containing drawing&#10;&#10;Description generated with very high confidence">
             <a:extLst>
               <a:ext uri="{FF2B5EF4-FFF2-40B4-BE49-F238E27FC236}">
-                <a16:creationId xmlns="" xmlns:a16="http://schemas.microsoft.com/office/drawing/2014/main" id="{E9BBDA87-9334-48F6-B549-DF8332853EB8}"/>
+                <a16:creationId xmlns:a16="http://schemas.microsoft.com/office/drawing/2014/main" xmlns="" id="{E9BBDA87-9334-48F6-B549-DF8332853EB8}"/>
               </a:ext>
             </a:extLst>
           </p:cNvPr>
@@ -20307,7 +20307,7 @@
           <p:cNvPr id="30" name="Picture 30" descr="A picture containing clock, meter&#10;&#10;Description generated with very high confidence">
             <a:extLst>
               <a:ext uri="{FF2B5EF4-FFF2-40B4-BE49-F238E27FC236}">
-                <a16:creationId xmlns="" xmlns:a16="http://schemas.microsoft.com/office/drawing/2014/main" id="{869F45C0-BEFD-4D0A-A30C-E3DE4CED26A1}"/>
+                <a16:creationId xmlns:a16="http://schemas.microsoft.com/office/drawing/2014/main" xmlns="" id="{869F45C0-BEFD-4D0A-A30C-E3DE4CED26A1}"/>
               </a:ext>
             </a:extLst>
           </p:cNvPr>
@@ -20337,7 +20337,7 @@
           <p:cNvPr id="32" name="Picture 32" descr="A close up of a logo&#10;&#10;Description generated with very high confidence">
             <a:extLst>
               <a:ext uri="{FF2B5EF4-FFF2-40B4-BE49-F238E27FC236}">
-                <a16:creationId xmlns="" xmlns:a16="http://schemas.microsoft.com/office/drawing/2014/main" id="{1ACF1988-3C5A-413A-B927-C4F08B32DC61}"/>
+                <a16:creationId xmlns:a16="http://schemas.microsoft.com/office/drawing/2014/main" xmlns="" id="{1ACF1988-3C5A-413A-B927-C4F08B32DC61}"/>
               </a:ext>
             </a:extLst>
           </p:cNvPr>
@@ -20367,7 +20367,7 @@
           <p:cNvPr id="48" name="Arrow: Right 47">
             <a:extLst>
               <a:ext uri="{FF2B5EF4-FFF2-40B4-BE49-F238E27FC236}">
-                <a16:creationId xmlns="" xmlns:a16="http://schemas.microsoft.com/office/drawing/2014/main" id="{2D05F327-8A08-41D8-93AF-95C1FFD2CEA2}"/>
+                <a16:creationId xmlns:a16="http://schemas.microsoft.com/office/drawing/2014/main" xmlns="" id="{2D05F327-8A08-41D8-93AF-95C1FFD2CEA2}"/>
               </a:ext>
             </a:extLst>
           </p:cNvPr>
@@ -20427,7 +20427,7 @@
           <p:cNvPr id="49" name="Arrow: Right 48">
             <a:extLst>
               <a:ext uri="{FF2B5EF4-FFF2-40B4-BE49-F238E27FC236}">
-                <a16:creationId xmlns="" xmlns:a16="http://schemas.microsoft.com/office/drawing/2014/main" id="{12342E48-7442-40ED-B882-627321DA0B53}"/>
+                <a16:creationId xmlns:a16="http://schemas.microsoft.com/office/drawing/2014/main" xmlns="" id="{12342E48-7442-40ED-B882-627321DA0B53}"/>
               </a:ext>
             </a:extLst>
           </p:cNvPr>
@@ -20487,7 +20487,7 @@
           <p:cNvPr id="7" name="Picture 9" descr="A picture containing drawing, clock&#10;&#10;Description generated with very high confidence">
             <a:extLst>
               <a:ext uri="{FF2B5EF4-FFF2-40B4-BE49-F238E27FC236}">
-                <a16:creationId xmlns="" xmlns:a16="http://schemas.microsoft.com/office/drawing/2014/main" id="{E3BBF243-DE79-4A22-BEF9-948645E23353}"/>
+                <a16:creationId xmlns:a16="http://schemas.microsoft.com/office/drawing/2014/main" xmlns="" id="{E3BBF243-DE79-4A22-BEF9-948645E23353}"/>
               </a:ext>
             </a:extLst>
           </p:cNvPr>
@@ -20517,7 +20517,7 @@
           <p:cNvPr id="11" name="Picture 11" descr="A close up of a logo&#10;&#10;Description generated with very high confidence">
             <a:extLst>
               <a:ext uri="{FF2B5EF4-FFF2-40B4-BE49-F238E27FC236}">
-                <a16:creationId xmlns="" xmlns:a16="http://schemas.microsoft.com/office/drawing/2014/main" id="{D8A39830-8EDF-46BA-BE71-70D4C02DC930}"/>
+                <a16:creationId xmlns:a16="http://schemas.microsoft.com/office/drawing/2014/main" xmlns="" id="{D8A39830-8EDF-46BA-BE71-70D4C02DC930}"/>
               </a:ext>
             </a:extLst>
           </p:cNvPr>
@@ -20860,7 +20860,7 @@
           <p:cNvPr id="2" name="Title 1">
             <a:extLst>
               <a:ext uri="{FF2B5EF4-FFF2-40B4-BE49-F238E27FC236}">
-                <a16:creationId xmlns="" xmlns:a16="http://schemas.microsoft.com/office/drawing/2014/main" id="{22DAD01F-DC17-4CB9-A59E-3B88FC10ACC0}"/>
+                <a16:creationId xmlns:a16="http://schemas.microsoft.com/office/drawing/2014/main" xmlns="" id="{22DAD01F-DC17-4CB9-A59E-3B88FC10ACC0}"/>
               </a:ext>
             </a:extLst>
           </p:cNvPr>
@@ -20891,7 +20891,7 @@
           <p:cNvPr id="4" name="Picture 6" descr="A close up of a logo&#10;&#10;Description generated with very high confidence">
             <a:extLst>
               <a:ext uri="{FF2B5EF4-FFF2-40B4-BE49-F238E27FC236}">
-                <a16:creationId xmlns="" xmlns:a16="http://schemas.microsoft.com/office/drawing/2014/main" id="{C0330C5C-C655-42A8-BF9C-90E788CC6A92}"/>
+                <a16:creationId xmlns:a16="http://schemas.microsoft.com/office/drawing/2014/main" xmlns="" id="{C0330C5C-C655-42A8-BF9C-90E788CC6A92}"/>
               </a:ext>
             </a:extLst>
           </p:cNvPr>
@@ -20926,7 +20926,7 @@
           <p:cNvPr id="6" name="Picture 9" descr="A picture containing drawing&#10;&#10;Description generated with very high confidence">
             <a:extLst>
               <a:ext uri="{FF2B5EF4-FFF2-40B4-BE49-F238E27FC236}">
-                <a16:creationId xmlns="" xmlns:a16="http://schemas.microsoft.com/office/drawing/2014/main" id="{69BBBA96-ED0F-4961-8C6B-6543A7A55BAE}"/>
+                <a16:creationId xmlns:a16="http://schemas.microsoft.com/office/drawing/2014/main" xmlns="" id="{69BBBA96-ED0F-4961-8C6B-6543A7A55BAE}"/>
               </a:ext>
             </a:extLst>
           </p:cNvPr>
@@ -20959,7 +20959,7 @@
           <p:cNvPr id="8" name="Picture 11" descr="A picture containing object, clock, meter&#10;&#10;Description generated with very high confidence">
             <a:extLst>
               <a:ext uri="{FF2B5EF4-FFF2-40B4-BE49-F238E27FC236}">
-                <a16:creationId xmlns="" xmlns:a16="http://schemas.microsoft.com/office/drawing/2014/main" id="{FF7323CE-66D1-43A5-B3E1-17A59B7D36B4}"/>
+                <a16:creationId xmlns:a16="http://schemas.microsoft.com/office/drawing/2014/main" xmlns="" id="{FF7323CE-66D1-43A5-B3E1-17A59B7D36B4}"/>
               </a:ext>
             </a:extLst>
           </p:cNvPr>
@@ -20992,7 +20992,7 @@
           <p:cNvPr id="36" name="Picture 38" descr="A close up of a logo&#10;&#10;Description generated with very high confidence">
             <a:extLst>
               <a:ext uri="{FF2B5EF4-FFF2-40B4-BE49-F238E27FC236}">
-                <a16:creationId xmlns="" xmlns:a16="http://schemas.microsoft.com/office/drawing/2014/main" id="{420FFD42-44DD-44E8-A92B-9618CCA5334E}"/>
+                <a16:creationId xmlns:a16="http://schemas.microsoft.com/office/drawing/2014/main" xmlns="" id="{420FFD42-44DD-44E8-A92B-9618CCA5334E}"/>
               </a:ext>
             </a:extLst>
           </p:cNvPr>
@@ -21022,7 +21022,7 @@
           <p:cNvPr id="42" name="TextBox 41">
             <a:extLst>
               <a:ext uri="{FF2B5EF4-FFF2-40B4-BE49-F238E27FC236}">
-                <a16:creationId xmlns="" xmlns:a16="http://schemas.microsoft.com/office/drawing/2014/main" id="{4A1648FC-A785-47A2-972E-144548C6A37A}"/>
+                <a16:creationId xmlns:a16="http://schemas.microsoft.com/office/drawing/2014/main" xmlns="" id="{4A1648FC-A785-47A2-972E-144548C6A37A}"/>
               </a:ext>
             </a:extLst>
           </p:cNvPr>
@@ -21085,7 +21085,7 @@
           <p:cNvPr id="3" name="Picture 6" descr="A close up of a logo&#10;&#10;Description generated with very high confidence">
             <a:extLst>
               <a:ext uri="{FF2B5EF4-FFF2-40B4-BE49-F238E27FC236}">
-                <a16:creationId xmlns="" xmlns:a16="http://schemas.microsoft.com/office/drawing/2014/main" id="{EB0483D7-19D7-4ABE-BBD1-92C485E92A96}"/>
+                <a16:creationId xmlns:a16="http://schemas.microsoft.com/office/drawing/2014/main" xmlns="" id="{EB0483D7-19D7-4ABE-BBD1-92C485E92A96}"/>
               </a:ext>
             </a:extLst>
           </p:cNvPr>
@@ -21115,7 +21115,7 @@
           <p:cNvPr id="14" name="Picture 15" descr="A picture containing drawing&#10;&#10;Description generated with very high confidence">
             <a:extLst>
               <a:ext uri="{FF2B5EF4-FFF2-40B4-BE49-F238E27FC236}">
-                <a16:creationId xmlns="" xmlns:a16="http://schemas.microsoft.com/office/drawing/2014/main" id="{67173B02-00E6-431E-B1D9-2ED1D4D3BC15}"/>
+                <a16:creationId xmlns:a16="http://schemas.microsoft.com/office/drawing/2014/main" xmlns="" id="{67173B02-00E6-431E-B1D9-2ED1D4D3BC15}"/>
               </a:ext>
             </a:extLst>
           </p:cNvPr>
@@ -21145,7 +21145,7 @@
           <p:cNvPr id="17" name="Picture 17" descr="A close up of a sign&#10;&#10;Description generated with high confidence">
             <a:extLst>
               <a:ext uri="{FF2B5EF4-FFF2-40B4-BE49-F238E27FC236}">
-                <a16:creationId xmlns="" xmlns:a16="http://schemas.microsoft.com/office/drawing/2014/main" id="{0A8A96EA-BC25-47CB-9481-2730C59E39A6}"/>
+                <a16:creationId xmlns:a16="http://schemas.microsoft.com/office/drawing/2014/main" xmlns="" id="{0A8A96EA-BC25-47CB-9481-2730C59E39A6}"/>
               </a:ext>
             </a:extLst>
           </p:cNvPr>
@@ -21175,7 +21175,7 @@
           <p:cNvPr id="20" name="Picture 22" descr="A close up of a logo&#10;&#10;Description generated with very high confidence">
             <a:extLst>
               <a:ext uri="{FF2B5EF4-FFF2-40B4-BE49-F238E27FC236}">
-                <a16:creationId xmlns="" xmlns:a16="http://schemas.microsoft.com/office/drawing/2014/main" id="{37451824-955B-48FC-A9FB-296A676691EB}"/>
+                <a16:creationId xmlns:a16="http://schemas.microsoft.com/office/drawing/2014/main" xmlns="" id="{37451824-955B-48FC-A9FB-296A676691EB}"/>
               </a:ext>
             </a:extLst>
           </p:cNvPr>
@@ -21205,7 +21205,7 @@
           <p:cNvPr id="30" name="TextBox 29">
             <a:extLst>
               <a:ext uri="{FF2B5EF4-FFF2-40B4-BE49-F238E27FC236}">
-                <a16:creationId xmlns="" xmlns:a16="http://schemas.microsoft.com/office/drawing/2014/main" id="{BE57CFEE-F67A-4F41-9B77-19FF3D26D989}"/>
+                <a16:creationId xmlns:a16="http://schemas.microsoft.com/office/drawing/2014/main" xmlns="" id="{BE57CFEE-F67A-4F41-9B77-19FF3D26D989}"/>
               </a:ext>
             </a:extLst>
           </p:cNvPr>
@@ -21244,7 +21244,7 @@
           <p:cNvPr id="32" name="Picture 16" descr="A close up of a logo&#10;&#10;Description generated with very high confidence">
             <a:extLst>
               <a:ext uri="{FF2B5EF4-FFF2-40B4-BE49-F238E27FC236}">
-                <a16:creationId xmlns="" xmlns:a16="http://schemas.microsoft.com/office/drawing/2014/main" id="{B6710F19-314C-4D01-AF28-99CAA07A72BD}"/>
+                <a16:creationId xmlns:a16="http://schemas.microsoft.com/office/drawing/2014/main" xmlns="" id="{B6710F19-314C-4D01-AF28-99CAA07A72BD}"/>
               </a:ext>
             </a:extLst>
           </p:cNvPr>
@@ -21279,7 +21279,7 @@
           <p:cNvPr id="39" name="Picture 48">
             <a:extLst>
               <a:ext uri="{FF2B5EF4-FFF2-40B4-BE49-F238E27FC236}">
-                <a16:creationId xmlns="" xmlns:a16="http://schemas.microsoft.com/office/drawing/2014/main" id="{A41ED3DF-A72D-4512-BA28-3C8620D02B18}"/>
+                <a16:creationId xmlns:a16="http://schemas.microsoft.com/office/drawing/2014/main" xmlns="" id="{A41ED3DF-A72D-4512-BA28-3C8620D02B18}"/>
               </a:ext>
             </a:extLst>
           </p:cNvPr>
@@ -21320,7 +21320,7 @@
           <p:cNvPr id="50" name="Left Brace 49">
             <a:extLst>
               <a:ext uri="{FF2B5EF4-FFF2-40B4-BE49-F238E27FC236}">
-                <a16:creationId xmlns="" xmlns:a16="http://schemas.microsoft.com/office/drawing/2014/main" id="{B724A079-B0F7-4EA5-BD89-9E8660E7138E}"/>
+                <a16:creationId xmlns:a16="http://schemas.microsoft.com/office/drawing/2014/main" xmlns="" id="{B724A079-B0F7-4EA5-BD89-9E8660E7138E}"/>
               </a:ext>
             </a:extLst>
           </p:cNvPr>
@@ -21372,7 +21372,7 @@
           <p:cNvPr id="51" name="Left Brace 50">
             <a:extLst>
               <a:ext uri="{FF2B5EF4-FFF2-40B4-BE49-F238E27FC236}">
-                <a16:creationId xmlns="" xmlns:a16="http://schemas.microsoft.com/office/drawing/2014/main" id="{5CC00877-2B2F-4FF7-9F4E-CADACF95078F}"/>
+                <a16:creationId xmlns:a16="http://schemas.microsoft.com/office/drawing/2014/main" xmlns="" id="{5CC00877-2B2F-4FF7-9F4E-CADACF95078F}"/>
               </a:ext>
             </a:extLst>
           </p:cNvPr>
@@ -21424,7 +21424,7 @@
           <p:cNvPr id="52" name="Left Brace 51">
             <a:extLst>
               <a:ext uri="{FF2B5EF4-FFF2-40B4-BE49-F238E27FC236}">
-                <a16:creationId xmlns="" xmlns:a16="http://schemas.microsoft.com/office/drawing/2014/main" id="{13618B25-73AF-47A7-BEAF-393C5782156E}"/>
+                <a16:creationId xmlns:a16="http://schemas.microsoft.com/office/drawing/2014/main" xmlns="" id="{13618B25-73AF-47A7-BEAF-393C5782156E}"/>
               </a:ext>
             </a:extLst>
           </p:cNvPr>
@@ -21476,7 +21476,7 @@
           <p:cNvPr id="53" name="Left Brace 52">
             <a:extLst>
               <a:ext uri="{FF2B5EF4-FFF2-40B4-BE49-F238E27FC236}">
-                <a16:creationId xmlns="" xmlns:a16="http://schemas.microsoft.com/office/drawing/2014/main" id="{B0FCB8FB-0BF8-4D3B-A796-DF6C215E4800}"/>
+                <a16:creationId xmlns:a16="http://schemas.microsoft.com/office/drawing/2014/main" xmlns="" id="{B0FCB8FB-0BF8-4D3B-A796-DF6C215E4800}"/>
               </a:ext>
             </a:extLst>
           </p:cNvPr>
@@ -21528,7 +21528,7 @@
           <p:cNvPr id="54" name="Left Brace 53">
             <a:extLst>
               <a:ext uri="{FF2B5EF4-FFF2-40B4-BE49-F238E27FC236}">
-                <a16:creationId xmlns="" xmlns:a16="http://schemas.microsoft.com/office/drawing/2014/main" id="{878D048C-4583-4231-86E3-AD69D44F351C}"/>
+                <a16:creationId xmlns:a16="http://schemas.microsoft.com/office/drawing/2014/main" xmlns="" id="{878D048C-4583-4231-86E3-AD69D44F351C}"/>
               </a:ext>
             </a:extLst>
           </p:cNvPr>
@@ -21580,7 +21580,7 @@
           <p:cNvPr id="56" name="Left Brace 55">
             <a:extLst>
               <a:ext uri="{FF2B5EF4-FFF2-40B4-BE49-F238E27FC236}">
-                <a16:creationId xmlns="" xmlns:a16="http://schemas.microsoft.com/office/drawing/2014/main" id="{AC0A0AA7-85B9-4F8B-8302-7F14B47D63C8}"/>
+                <a16:creationId xmlns:a16="http://schemas.microsoft.com/office/drawing/2014/main" xmlns="" id="{AC0A0AA7-85B9-4F8B-8302-7F14B47D63C8}"/>
               </a:ext>
             </a:extLst>
           </p:cNvPr>
@@ -21632,7 +21632,7 @@
           <p:cNvPr id="57" name="TextBox 56">
             <a:extLst>
               <a:ext uri="{FF2B5EF4-FFF2-40B4-BE49-F238E27FC236}">
-                <a16:creationId xmlns="" xmlns:a16="http://schemas.microsoft.com/office/drawing/2014/main" id="{B9237312-2A37-4DA7-80C8-DD6DE0CA3F10}"/>
+                <a16:creationId xmlns:a16="http://schemas.microsoft.com/office/drawing/2014/main" xmlns="" id="{B9237312-2A37-4DA7-80C8-DD6DE0CA3F10}"/>
               </a:ext>
             </a:extLst>
           </p:cNvPr>
@@ -21671,7 +21671,7 @@
           <p:cNvPr id="58" name="Picture 58" descr="A close up of a logo&#10;&#10;Description generated with very high confidence">
             <a:extLst>
               <a:ext uri="{FF2B5EF4-FFF2-40B4-BE49-F238E27FC236}">
-                <a16:creationId xmlns="" xmlns:a16="http://schemas.microsoft.com/office/drawing/2014/main" id="{3B49DE5A-D97D-4BC4-A2BD-FA203356C5E4}"/>
+                <a16:creationId xmlns:a16="http://schemas.microsoft.com/office/drawing/2014/main" xmlns="" id="{3B49DE5A-D97D-4BC4-A2BD-FA203356C5E4}"/>
               </a:ext>
             </a:extLst>
           </p:cNvPr>
@@ -21701,7 +21701,7 @@
           <p:cNvPr id="60" name="Picture 60" descr="A picture containing object, clock&#10;&#10;Description generated with very high confidence">
             <a:extLst>
               <a:ext uri="{FF2B5EF4-FFF2-40B4-BE49-F238E27FC236}">
-                <a16:creationId xmlns="" xmlns:a16="http://schemas.microsoft.com/office/drawing/2014/main" id="{8DE5578F-2C71-4470-805B-58B6F36E89D7}"/>
+                <a16:creationId xmlns:a16="http://schemas.microsoft.com/office/drawing/2014/main" xmlns="" id="{8DE5578F-2C71-4470-805B-58B6F36E89D7}"/>
               </a:ext>
             </a:extLst>
           </p:cNvPr>
@@ -21731,7 +21731,7 @@
           <p:cNvPr id="62" name="Picture 62" descr="A picture containing drawing&#10;&#10;Description generated with very high confidence">
             <a:extLst>
               <a:ext uri="{FF2B5EF4-FFF2-40B4-BE49-F238E27FC236}">
-                <a16:creationId xmlns="" xmlns:a16="http://schemas.microsoft.com/office/drawing/2014/main" id="{E4E6676D-610B-47E8-8C2C-B0A327A4AC8D}"/>
+                <a16:creationId xmlns:a16="http://schemas.microsoft.com/office/drawing/2014/main" xmlns="" id="{E4E6676D-610B-47E8-8C2C-B0A327A4AC8D}"/>
               </a:ext>
             </a:extLst>
           </p:cNvPr>
@@ -21761,7 +21761,7 @@
           <p:cNvPr id="65" name="Picture 19" descr="A close up of a logo&#10;&#10;Description generated with very high confidence">
             <a:extLst>
               <a:ext uri="{FF2B5EF4-FFF2-40B4-BE49-F238E27FC236}">
-                <a16:creationId xmlns="" xmlns:a16="http://schemas.microsoft.com/office/drawing/2014/main" id="{7C31043C-B453-4648-893A-8B3CC0ADF1DB}"/>
+                <a16:creationId xmlns:a16="http://schemas.microsoft.com/office/drawing/2014/main" xmlns="" id="{7C31043C-B453-4648-893A-8B3CC0ADF1DB}"/>
               </a:ext>
             </a:extLst>
           </p:cNvPr>
@@ -21791,7 +21791,7 @@
           <p:cNvPr id="26" name="Arrow: Right 47">
             <a:extLst>
               <a:ext uri="{FF2B5EF4-FFF2-40B4-BE49-F238E27FC236}">
-                <a16:creationId xmlns="" xmlns:a16="http://schemas.microsoft.com/office/drawing/2014/main" id="{2D05F327-8A08-41D8-93AF-95C1FFD2CEA2}"/>
+                <a16:creationId xmlns:a16="http://schemas.microsoft.com/office/drawing/2014/main" xmlns="" id="{2D05F327-8A08-41D8-93AF-95C1FFD2CEA2}"/>
               </a:ext>
             </a:extLst>
           </p:cNvPr>
@@ -22031,7 +22031,7 @@
           <p:cNvPr id="34" name="Arrow: Right 48">
             <a:extLst>
               <a:ext uri="{FF2B5EF4-FFF2-40B4-BE49-F238E27FC236}">
-                <a16:creationId xmlns="" xmlns:a16="http://schemas.microsoft.com/office/drawing/2014/main" id="{12342E48-7442-40ED-B882-627321DA0B53}"/>
+                <a16:creationId xmlns:a16="http://schemas.microsoft.com/office/drawing/2014/main" xmlns="" id="{12342E48-7442-40ED-B882-627321DA0B53}"/>
               </a:ext>
             </a:extLst>
           </p:cNvPr>
@@ -22091,7 +22091,7 @@
           <p:cNvPr id="35" name="Arrow: Right 48">
             <a:extLst>
               <a:ext uri="{FF2B5EF4-FFF2-40B4-BE49-F238E27FC236}">
-                <a16:creationId xmlns="" xmlns:a16="http://schemas.microsoft.com/office/drawing/2014/main" id="{12342E48-7442-40ED-B882-627321DA0B53}"/>
+                <a16:creationId xmlns:a16="http://schemas.microsoft.com/office/drawing/2014/main" xmlns="" id="{12342E48-7442-40ED-B882-627321DA0B53}"/>
               </a:ext>
             </a:extLst>
           </p:cNvPr>
@@ -22151,7 +22151,7 @@
           <p:cNvPr id="37" name="Right Brace 36">
             <a:extLst>
               <a:ext uri="{FF2B5EF4-FFF2-40B4-BE49-F238E27FC236}">
-                <a16:creationId xmlns="" xmlns:a16="http://schemas.microsoft.com/office/drawing/2014/main" id="{B123DDFB-BA27-413F-8F72-48EF2FDDE207}"/>
+                <a16:creationId xmlns:a16="http://schemas.microsoft.com/office/drawing/2014/main" xmlns="" id="{B123DDFB-BA27-413F-8F72-48EF2FDDE207}"/>
               </a:ext>
             </a:extLst>
           </p:cNvPr>
@@ -22203,7 +22203,7 @@
           <p:cNvPr id="38" name="Right Brace 37">
             <a:extLst>
               <a:ext uri="{FF2B5EF4-FFF2-40B4-BE49-F238E27FC236}">
-                <a16:creationId xmlns="" xmlns:a16="http://schemas.microsoft.com/office/drawing/2014/main" id="{8D8C0313-13A4-4FAA-9612-4D1FC8C80DFF}"/>
+                <a16:creationId xmlns:a16="http://schemas.microsoft.com/office/drawing/2014/main" xmlns="" id="{8D8C0313-13A4-4FAA-9612-4D1FC8C80DFF}"/>
               </a:ext>
             </a:extLst>
           </p:cNvPr>
@@ -22255,7 +22255,7 @@
           <p:cNvPr id="40" name="Picture 28" descr="A close up of a sign&#10;&#10;Description generated with high confidence">
             <a:extLst>
               <a:ext uri="{FF2B5EF4-FFF2-40B4-BE49-F238E27FC236}">
-                <a16:creationId xmlns="" xmlns:a16="http://schemas.microsoft.com/office/drawing/2014/main" id="{A9F7282D-9E32-4A50-84EA-BE35636CF009}"/>
+                <a16:creationId xmlns:a16="http://schemas.microsoft.com/office/drawing/2014/main" xmlns="" id="{A9F7282D-9E32-4A50-84EA-BE35636CF009}"/>
               </a:ext>
             </a:extLst>
           </p:cNvPr>
@@ -22285,7 +22285,7 @@
           <p:cNvPr id="41" name="Picture 32" descr="A close up of a logo&#10;&#10;Description generated with very high confidence">
             <a:extLst>
               <a:ext uri="{FF2B5EF4-FFF2-40B4-BE49-F238E27FC236}">
-                <a16:creationId xmlns="" xmlns:a16="http://schemas.microsoft.com/office/drawing/2014/main" id="{7D7F121C-1B9A-47CF-A882-FA34E6A6E361}"/>
+                <a16:creationId xmlns:a16="http://schemas.microsoft.com/office/drawing/2014/main" xmlns="" id="{7D7F121C-1B9A-47CF-A882-FA34E6A6E361}"/>
               </a:ext>
             </a:extLst>
           </p:cNvPr>
@@ -23466,7 +23466,7 @@
           <p:cNvPr id="4" name="Picture 3" descr="A close up of a logo&#10;&#10;Description generated with very high confidence">
             <a:extLst>
               <a:ext uri="{FF2B5EF4-FFF2-40B4-BE49-F238E27FC236}">
-                <a16:creationId xmlns="" xmlns:a16="http://schemas.microsoft.com/office/drawing/2014/main" id="{6E87F861-F9AC-4F21-B0C8-58EB55E95B97}"/>
+                <a16:creationId xmlns:a16="http://schemas.microsoft.com/office/drawing/2014/main" xmlns="" id="{6E87F861-F9AC-4F21-B0C8-58EB55E95B97}"/>
               </a:ext>
             </a:extLst>
           </p:cNvPr>
@@ -23496,7 +23496,7 @@
           <p:cNvPr id="6" name="Arrow: Down 7">
             <a:extLst>
               <a:ext uri="{FF2B5EF4-FFF2-40B4-BE49-F238E27FC236}">
-                <a16:creationId xmlns="" xmlns:a16="http://schemas.microsoft.com/office/drawing/2014/main" id="{82AB09DD-DB63-4806-A980-AE0CB9781D42}"/>
+                <a16:creationId xmlns:a16="http://schemas.microsoft.com/office/drawing/2014/main" xmlns="" id="{82AB09DD-DB63-4806-A980-AE0CB9781D42}"/>
               </a:ext>
             </a:extLst>
           </p:cNvPr>
@@ -23550,7 +23550,7 @@
           <p:cNvPr id="12" name="TextBox 11">
             <a:extLst>
               <a:ext uri="{FF2B5EF4-FFF2-40B4-BE49-F238E27FC236}">
-                <a16:creationId xmlns="" xmlns:a16="http://schemas.microsoft.com/office/drawing/2014/main" id="{02939EE3-25E8-4AA1-A0EF-AEA68207BAAD}"/>
+                <a16:creationId xmlns:a16="http://schemas.microsoft.com/office/drawing/2014/main" xmlns="" id="{02939EE3-25E8-4AA1-A0EF-AEA68207BAAD}"/>
               </a:ext>
             </a:extLst>
           </p:cNvPr>
@@ -23673,7 +23673,7 @@
           <p:cNvPr id="21" name="Arrow: Down 7">
             <a:extLst>
               <a:ext uri="{FF2B5EF4-FFF2-40B4-BE49-F238E27FC236}">
-                <a16:creationId xmlns="" xmlns:a16="http://schemas.microsoft.com/office/drawing/2014/main" id="{82AB09DD-DB63-4806-A980-AE0CB9781D42}"/>
+                <a16:creationId xmlns:a16="http://schemas.microsoft.com/office/drawing/2014/main" xmlns="" id="{82AB09DD-DB63-4806-A980-AE0CB9781D42}"/>
               </a:ext>
             </a:extLst>
           </p:cNvPr>
@@ -23727,7 +23727,7 @@
           <p:cNvPr id="27" name="Arrow: Down 7">
             <a:extLst>
               <a:ext uri="{FF2B5EF4-FFF2-40B4-BE49-F238E27FC236}">
-                <a16:creationId xmlns="" xmlns:a16="http://schemas.microsoft.com/office/drawing/2014/main" id="{82AB09DD-DB63-4806-A980-AE0CB9781D42}"/>
+                <a16:creationId xmlns:a16="http://schemas.microsoft.com/office/drawing/2014/main" xmlns="" id="{82AB09DD-DB63-4806-A980-AE0CB9781D42}"/>
               </a:ext>
             </a:extLst>
           </p:cNvPr>
@@ -23915,7 +23915,7 @@
           <p:cNvPr id="34" name="TextBox 33">
             <a:extLst>
               <a:ext uri="{FF2B5EF4-FFF2-40B4-BE49-F238E27FC236}">
-                <a16:creationId xmlns="" xmlns:a16="http://schemas.microsoft.com/office/drawing/2014/main" id="{E8C512F0-66D0-4B8A-B0A7-993EEF9E5139}"/>
+                <a16:creationId xmlns:a16="http://schemas.microsoft.com/office/drawing/2014/main" xmlns="" id="{E8C512F0-66D0-4B8A-B0A7-993EEF9E5139}"/>
               </a:ext>
             </a:extLst>
           </p:cNvPr>
@@ -23974,7 +23974,7 @@
           <p:cNvPr id="35" name="TextBox 34">
             <a:extLst>
               <a:ext uri="{FF2B5EF4-FFF2-40B4-BE49-F238E27FC236}">
-                <a16:creationId xmlns="" xmlns:a16="http://schemas.microsoft.com/office/drawing/2014/main" id="{7E86E019-DB97-4D67-8777-EE3CB4990CA9}"/>
+                <a16:creationId xmlns:a16="http://schemas.microsoft.com/office/drawing/2014/main" xmlns="" id="{7E86E019-DB97-4D67-8777-EE3CB4990CA9}"/>
               </a:ext>
             </a:extLst>
           </p:cNvPr>
@@ -24033,7 +24033,7 @@
           <p:cNvPr id="38" name="Arrow: Right 13">
             <a:extLst>
               <a:ext uri="{FF2B5EF4-FFF2-40B4-BE49-F238E27FC236}">
-                <a16:creationId xmlns="" xmlns:a16="http://schemas.microsoft.com/office/drawing/2014/main" id="{169BB430-EBE9-48D3-BBC7-66B17AF3C24B}"/>
+                <a16:creationId xmlns:a16="http://schemas.microsoft.com/office/drawing/2014/main" xmlns="" id="{169BB430-EBE9-48D3-BBC7-66B17AF3C24B}"/>
               </a:ext>
             </a:extLst>
           </p:cNvPr>
@@ -24077,7 +24077,7 @@
           <p:cNvPr id="39" name="Arrow: Right 13">
             <a:extLst>
               <a:ext uri="{FF2B5EF4-FFF2-40B4-BE49-F238E27FC236}">
-                <a16:creationId xmlns="" xmlns:a16="http://schemas.microsoft.com/office/drawing/2014/main" id="{169BB430-EBE9-48D3-BBC7-66B17AF3C24B}"/>
+                <a16:creationId xmlns:a16="http://schemas.microsoft.com/office/drawing/2014/main" xmlns="" id="{169BB430-EBE9-48D3-BBC7-66B17AF3C24B}"/>
               </a:ext>
             </a:extLst>
           </p:cNvPr>
@@ -24121,7 +24121,7 @@
           <p:cNvPr id="17" name="Picture 13" descr="A close up of a logo&#10;&#10;Description generated with very high confidence">
             <a:extLst>
               <a:ext uri="{FF2B5EF4-FFF2-40B4-BE49-F238E27FC236}">
-                <a16:creationId xmlns="" xmlns:a16="http://schemas.microsoft.com/office/drawing/2014/main" id="{ECAD198D-1469-41D2-8E92-807888FE870D}"/>
+                <a16:creationId xmlns:a16="http://schemas.microsoft.com/office/drawing/2014/main" xmlns="" id="{ECAD198D-1469-41D2-8E92-807888FE870D}"/>
               </a:ext>
             </a:extLst>
           </p:cNvPr>
@@ -24649,7 +24649,7 @@
           <p:cNvPr id="4" name="Picture 3" descr="A close up of a logo&#10;&#10;Description generated with very high confidence">
             <a:extLst>
               <a:ext uri="{FF2B5EF4-FFF2-40B4-BE49-F238E27FC236}">
-                <a16:creationId xmlns="" xmlns:a16="http://schemas.microsoft.com/office/drawing/2014/main" id="{6E87F861-F9AC-4F21-B0C8-58EB55E95B97}"/>
+                <a16:creationId xmlns:a16="http://schemas.microsoft.com/office/drawing/2014/main" xmlns="" id="{6E87F861-F9AC-4F21-B0C8-58EB55E95B97}"/>
               </a:ext>
             </a:extLst>
           </p:cNvPr>
@@ -24679,7 +24679,7 @@
           <p:cNvPr id="6" name="Arrow: Down 7">
             <a:extLst>
               <a:ext uri="{FF2B5EF4-FFF2-40B4-BE49-F238E27FC236}">
-                <a16:creationId xmlns="" xmlns:a16="http://schemas.microsoft.com/office/drawing/2014/main" id="{82AB09DD-DB63-4806-A980-AE0CB9781D42}"/>
+                <a16:creationId xmlns:a16="http://schemas.microsoft.com/office/drawing/2014/main" xmlns="" id="{82AB09DD-DB63-4806-A980-AE0CB9781D42}"/>
               </a:ext>
             </a:extLst>
           </p:cNvPr>
@@ -24763,7 +24763,7 @@
           <p:cNvPr id="15" name="Picture 7" descr="A close up of a logo&#10;&#10;Description generated with very high confidence">
             <a:extLst>
               <a:ext uri="{FF2B5EF4-FFF2-40B4-BE49-F238E27FC236}">
-                <a16:creationId xmlns="" xmlns:a16="http://schemas.microsoft.com/office/drawing/2014/main" id="{CCA1FA7B-C942-4986-AB3B-54E0615F8F08}"/>
+                <a16:creationId xmlns:a16="http://schemas.microsoft.com/office/drawing/2014/main" xmlns="" id="{CCA1FA7B-C942-4986-AB3B-54E0615F8F08}"/>
               </a:ext>
             </a:extLst>
           </p:cNvPr>
@@ -24793,7 +24793,7 @@
           <p:cNvPr id="16" name="Arrow: Down 9">
             <a:extLst>
               <a:ext uri="{FF2B5EF4-FFF2-40B4-BE49-F238E27FC236}">
-                <a16:creationId xmlns="" xmlns:a16="http://schemas.microsoft.com/office/drawing/2014/main" id="{74C91D1A-CCF6-4DE0-B080-D77210A893FD}"/>
+                <a16:creationId xmlns:a16="http://schemas.microsoft.com/office/drawing/2014/main" xmlns="" id="{74C91D1A-CCF6-4DE0-B080-D77210A893FD}"/>
               </a:ext>
             </a:extLst>
           </p:cNvPr>
@@ -24847,7 +24847,7 @@
           <p:cNvPr id="17" name="TextBox 16">
             <a:extLst>
               <a:ext uri="{FF2B5EF4-FFF2-40B4-BE49-F238E27FC236}">
-                <a16:creationId xmlns="" xmlns:a16="http://schemas.microsoft.com/office/drawing/2014/main" id="{EBD1E537-F5C7-43D5-8C6F-6CFA11A95BD2}"/>
+                <a16:creationId xmlns:a16="http://schemas.microsoft.com/office/drawing/2014/main" xmlns="" id="{EBD1E537-F5C7-43D5-8C6F-6CFA11A95BD2}"/>
               </a:ext>
             </a:extLst>
           </p:cNvPr>
@@ -25181,7 +25181,7 @@
           <p:cNvPr id="15" name="Picture 7" descr="A close up of a logo&#10;&#10;Description generated with very high confidence">
             <a:extLst>
               <a:ext uri="{FF2B5EF4-FFF2-40B4-BE49-F238E27FC236}">
-                <a16:creationId xmlns="" xmlns:a16="http://schemas.microsoft.com/office/drawing/2014/main" id="{CCA1FA7B-C942-4986-AB3B-54E0615F8F08}"/>
+                <a16:creationId xmlns:a16="http://schemas.microsoft.com/office/drawing/2014/main" xmlns="" id="{CCA1FA7B-C942-4986-AB3B-54E0615F8F08}"/>
               </a:ext>
             </a:extLst>
           </p:cNvPr>
@@ -25426,7 +25426,7 @@
           <p:cNvPr id="15" name="Picture 7" descr="A close up of a logo&#10;&#10;Description generated with very high confidence">
             <a:extLst>
               <a:ext uri="{FF2B5EF4-FFF2-40B4-BE49-F238E27FC236}">
-                <a16:creationId xmlns="" xmlns:a16="http://schemas.microsoft.com/office/drawing/2014/main" id="{CCA1FA7B-C942-4986-AB3B-54E0615F8F08}"/>
+                <a16:creationId xmlns:a16="http://schemas.microsoft.com/office/drawing/2014/main" xmlns="" id="{CCA1FA7B-C942-4986-AB3B-54E0615F8F08}"/>
               </a:ext>
             </a:extLst>
           </p:cNvPr>
@@ -25666,7 +25666,7 @@
           <p:cNvPr id="18" name="Picture 7" descr="A close up of a logo&#10;&#10;Description generated with very high confidence">
             <a:extLst>
               <a:ext uri="{FF2B5EF4-FFF2-40B4-BE49-F238E27FC236}">
-                <a16:creationId xmlns="" xmlns:a16="http://schemas.microsoft.com/office/drawing/2014/main" id="{CCA1FA7B-C942-4986-AB3B-54E0615F8F08}"/>
+                <a16:creationId xmlns:a16="http://schemas.microsoft.com/office/drawing/2014/main" xmlns="" id="{CCA1FA7B-C942-4986-AB3B-54E0615F8F08}"/>
               </a:ext>
             </a:extLst>
           </p:cNvPr>
@@ -25756,7 +25756,7 @@
           <p:cNvPr id="24" name="Arrow: Down 7">
             <a:extLst>
               <a:ext uri="{FF2B5EF4-FFF2-40B4-BE49-F238E27FC236}">
-                <a16:creationId xmlns="" xmlns:a16="http://schemas.microsoft.com/office/drawing/2014/main" id="{82AB09DD-DB63-4806-A980-AE0CB9781D42}"/>
+                <a16:creationId xmlns:a16="http://schemas.microsoft.com/office/drawing/2014/main" xmlns="" id="{82AB09DD-DB63-4806-A980-AE0CB9781D42}"/>
               </a:ext>
             </a:extLst>
           </p:cNvPr>
@@ -25810,7 +25810,7 @@
           <p:cNvPr id="25" name="Arrow: Down 7">
             <a:extLst>
               <a:ext uri="{FF2B5EF4-FFF2-40B4-BE49-F238E27FC236}">
-                <a16:creationId xmlns="" xmlns:a16="http://schemas.microsoft.com/office/drawing/2014/main" id="{82AB09DD-DB63-4806-A980-AE0CB9781D42}"/>
+                <a16:creationId xmlns:a16="http://schemas.microsoft.com/office/drawing/2014/main" xmlns="" id="{82AB09DD-DB63-4806-A980-AE0CB9781D42}"/>
               </a:ext>
             </a:extLst>
           </p:cNvPr>
@@ -26009,7 +26009,7 @@
           <p:cNvPr id="2" name="Title 1">
             <a:extLst>
               <a:ext uri="{FF2B5EF4-FFF2-40B4-BE49-F238E27FC236}">
-                <a16:creationId xmlns="" xmlns:a16="http://schemas.microsoft.com/office/drawing/2014/main" id="{9B3E31B1-1524-4917-9285-17E913845064}"/>
+                <a16:creationId xmlns:a16="http://schemas.microsoft.com/office/drawing/2014/main" xmlns="" id="{9B3E31B1-1524-4917-9285-17E913845064}"/>
               </a:ext>
             </a:extLst>
           </p:cNvPr>
@@ -26040,7 +26040,7 @@
           <p:cNvPr id="7" name="TextBox 6">
             <a:extLst>
               <a:ext uri="{FF2B5EF4-FFF2-40B4-BE49-F238E27FC236}">
-                <a16:creationId xmlns="" xmlns:a16="http://schemas.microsoft.com/office/drawing/2014/main" id="{3C8D1A93-8E34-461B-AE33-3F2AF8EDEDE3}"/>
+                <a16:creationId xmlns:a16="http://schemas.microsoft.com/office/drawing/2014/main" xmlns="" id="{3C8D1A93-8E34-461B-AE33-3F2AF8EDEDE3}"/>
               </a:ext>
             </a:extLst>
           </p:cNvPr>
@@ -26081,7 +26081,7 @@
           <p:cNvPr id="12" name="Picture 12" descr="A close up of a logo&#10;&#10;Description generated with very high confidence">
             <a:extLst>
               <a:ext uri="{FF2B5EF4-FFF2-40B4-BE49-F238E27FC236}">
-                <a16:creationId xmlns="" xmlns:a16="http://schemas.microsoft.com/office/drawing/2014/main" id="{BCB28C98-A97C-401C-8299-EB6FC4F8EC07}"/>
+                <a16:creationId xmlns:a16="http://schemas.microsoft.com/office/drawing/2014/main" xmlns="" id="{BCB28C98-A97C-401C-8299-EB6FC4F8EC07}"/>
               </a:ext>
             </a:extLst>
           </p:cNvPr>
@@ -26111,7 +26111,7 @@
           <p:cNvPr id="15" name="TextBox 14">
             <a:extLst>
               <a:ext uri="{FF2B5EF4-FFF2-40B4-BE49-F238E27FC236}">
-                <a16:creationId xmlns="" xmlns:a16="http://schemas.microsoft.com/office/drawing/2014/main" id="{1AAE7903-DA0C-486B-BDC7-ADB80C60CE39}"/>
+                <a16:creationId xmlns:a16="http://schemas.microsoft.com/office/drawing/2014/main" xmlns="" id="{1AAE7903-DA0C-486B-BDC7-ADB80C60CE39}"/>
               </a:ext>
             </a:extLst>
           </p:cNvPr>
@@ -26150,7 +26150,7 @@
           <p:cNvPr id="16" name="Picture 16" descr="A close up of a logo&#10;&#10;Description generated with very high confidence">
             <a:extLst>
               <a:ext uri="{FF2B5EF4-FFF2-40B4-BE49-F238E27FC236}">
-                <a16:creationId xmlns="" xmlns:a16="http://schemas.microsoft.com/office/drawing/2014/main" id="{C7C82433-1251-4B07-9C0F-DB83878FB6CB}"/>
+                <a16:creationId xmlns:a16="http://schemas.microsoft.com/office/drawing/2014/main" xmlns="" id="{C7C82433-1251-4B07-9C0F-DB83878FB6CB}"/>
               </a:ext>
             </a:extLst>
           </p:cNvPr>
@@ -28327,7 +28327,7 @@
           <p:cNvPr id="2" name="Title 1">
             <a:extLst>
               <a:ext uri="{FF2B5EF4-FFF2-40B4-BE49-F238E27FC236}">
-                <a16:creationId xmlns="" xmlns:a16="http://schemas.microsoft.com/office/drawing/2014/main" id="{9B3E31B1-1524-4917-9285-17E913845064}"/>
+                <a16:creationId xmlns:a16="http://schemas.microsoft.com/office/drawing/2014/main" xmlns="" id="{9B3E31B1-1524-4917-9285-17E913845064}"/>
               </a:ext>
             </a:extLst>
           </p:cNvPr>
@@ -28358,7 +28358,7 @@
           <p:cNvPr id="7" name="TextBox 6">
             <a:extLst>
               <a:ext uri="{FF2B5EF4-FFF2-40B4-BE49-F238E27FC236}">
-                <a16:creationId xmlns="" xmlns:a16="http://schemas.microsoft.com/office/drawing/2014/main" id="{3C8D1A93-8E34-461B-AE33-3F2AF8EDEDE3}"/>
+                <a16:creationId xmlns:a16="http://schemas.microsoft.com/office/drawing/2014/main" xmlns="" id="{3C8D1A93-8E34-461B-AE33-3F2AF8EDEDE3}"/>
               </a:ext>
             </a:extLst>
           </p:cNvPr>
@@ -28399,7 +28399,7 @@
           <p:cNvPr id="12" name="Picture 12" descr="A close up of a logo&#10;&#10;Description generated with very high confidence">
             <a:extLst>
               <a:ext uri="{FF2B5EF4-FFF2-40B4-BE49-F238E27FC236}">
-                <a16:creationId xmlns="" xmlns:a16="http://schemas.microsoft.com/office/drawing/2014/main" id="{BCB28C98-A97C-401C-8299-EB6FC4F8EC07}"/>
+                <a16:creationId xmlns:a16="http://schemas.microsoft.com/office/drawing/2014/main" xmlns="" id="{BCB28C98-A97C-401C-8299-EB6FC4F8EC07}"/>
               </a:ext>
             </a:extLst>
           </p:cNvPr>
@@ -28429,7 +28429,7 @@
           <p:cNvPr id="15" name="TextBox 14">
             <a:extLst>
               <a:ext uri="{FF2B5EF4-FFF2-40B4-BE49-F238E27FC236}">
-                <a16:creationId xmlns="" xmlns:a16="http://schemas.microsoft.com/office/drawing/2014/main" id="{1AAE7903-DA0C-486B-BDC7-ADB80C60CE39}"/>
+                <a16:creationId xmlns:a16="http://schemas.microsoft.com/office/drawing/2014/main" xmlns="" id="{1AAE7903-DA0C-486B-BDC7-ADB80C60CE39}"/>
               </a:ext>
             </a:extLst>
           </p:cNvPr>
@@ -28468,7 +28468,7 @@
           <p:cNvPr id="16" name="Picture 16" descr="A close up of a logo&#10;&#10;Description generated with very high confidence">
             <a:extLst>
               <a:ext uri="{FF2B5EF4-FFF2-40B4-BE49-F238E27FC236}">
-                <a16:creationId xmlns="" xmlns:a16="http://schemas.microsoft.com/office/drawing/2014/main" id="{C7C82433-1251-4B07-9C0F-DB83878FB6CB}"/>
+                <a16:creationId xmlns:a16="http://schemas.microsoft.com/office/drawing/2014/main" xmlns="" id="{C7C82433-1251-4B07-9C0F-DB83878FB6CB}"/>
               </a:ext>
             </a:extLst>
           </p:cNvPr>
@@ -28498,7 +28498,7 @@
           <p:cNvPr id="32" name="TextBox 31">
             <a:extLst>
               <a:ext uri="{FF2B5EF4-FFF2-40B4-BE49-F238E27FC236}">
-                <a16:creationId xmlns="" xmlns:a16="http://schemas.microsoft.com/office/drawing/2014/main" id="{95FFBCCC-62A7-4B35-95D9-9DDDAD7F90FD}"/>
+                <a16:creationId xmlns:a16="http://schemas.microsoft.com/office/drawing/2014/main" xmlns="" id="{95FFBCCC-62A7-4B35-95D9-9DDDAD7F90FD}"/>
               </a:ext>
             </a:extLst>
           </p:cNvPr>
@@ -28537,7 +28537,7 @@
           <p:cNvPr id="33" name="Picture 33" descr="A close up of a logo&#10;&#10;Description generated with very high confidence">
             <a:extLst>
               <a:ext uri="{FF2B5EF4-FFF2-40B4-BE49-F238E27FC236}">
-                <a16:creationId xmlns="" xmlns:a16="http://schemas.microsoft.com/office/drawing/2014/main" id="{38088EDE-D1BD-4D90-BC05-DB9DB49BBAAD}"/>
+                <a16:creationId xmlns:a16="http://schemas.microsoft.com/office/drawing/2014/main" xmlns="" id="{38088EDE-D1BD-4D90-BC05-DB9DB49BBAAD}"/>
               </a:ext>
             </a:extLst>
           </p:cNvPr>
@@ -28572,7 +28572,7 @@
           <p:cNvPr id="3" name="Arrow: Right 2">
             <a:extLst>
               <a:ext uri="{FF2B5EF4-FFF2-40B4-BE49-F238E27FC236}">
-                <a16:creationId xmlns="" xmlns:a16="http://schemas.microsoft.com/office/drawing/2014/main" id="{A386E034-963A-452A-BA56-7A5B5FF1099E}"/>
+                <a16:creationId xmlns:a16="http://schemas.microsoft.com/office/drawing/2014/main" xmlns="" id="{A386E034-963A-452A-BA56-7A5B5FF1099E}"/>
               </a:ext>
             </a:extLst>
           </p:cNvPr>
@@ -28618,7 +28618,7 @@
           <p:cNvPr id="10" name="Arrow: Right 9">
             <a:extLst>
               <a:ext uri="{FF2B5EF4-FFF2-40B4-BE49-F238E27FC236}">
-                <a16:creationId xmlns="" xmlns:a16="http://schemas.microsoft.com/office/drawing/2014/main" id="{FC53BB6D-D8F9-4631-B0DB-C5D30F0A1ADE}"/>
+                <a16:creationId xmlns:a16="http://schemas.microsoft.com/office/drawing/2014/main" xmlns="" id="{FC53BB6D-D8F9-4631-B0DB-C5D30F0A1ADE}"/>
               </a:ext>
             </a:extLst>
           </p:cNvPr>
@@ -28701,7 +28701,7 @@
           <p:cNvPr id="2" name="Title 1">
             <a:extLst>
               <a:ext uri="{FF2B5EF4-FFF2-40B4-BE49-F238E27FC236}">
-                <a16:creationId xmlns="" xmlns:a16="http://schemas.microsoft.com/office/drawing/2014/main" id="{0F79825B-3723-4872-BC1F-C4E6A23AD3AC}"/>
+                <a16:creationId xmlns:a16="http://schemas.microsoft.com/office/drawing/2014/main" xmlns="" id="{0F79825B-3723-4872-BC1F-C4E6A23AD3AC}"/>
               </a:ext>
             </a:extLst>
           </p:cNvPr>
@@ -28732,7 +28732,7 @@
           <p:cNvPr id="7" name="Picture 7" descr="A close up of a logo&#10;&#10;Description generated with very high confidence">
             <a:extLst>
               <a:ext uri="{FF2B5EF4-FFF2-40B4-BE49-F238E27FC236}">
-                <a16:creationId xmlns="" xmlns:a16="http://schemas.microsoft.com/office/drawing/2014/main" id="{80B0312D-5F8E-47B4-92BF-FA66F656751D}"/>
+                <a16:creationId xmlns:a16="http://schemas.microsoft.com/office/drawing/2014/main" xmlns="" id="{80B0312D-5F8E-47B4-92BF-FA66F656751D}"/>
               </a:ext>
             </a:extLst>
           </p:cNvPr>
@@ -28767,7 +28767,7 @@
           <p:cNvPr id="13" name="TextBox 12">
             <a:extLst>
               <a:ext uri="{FF2B5EF4-FFF2-40B4-BE49-F238E27FC236}">
-                <a16:creationId xmlns="" xmlns:a16="http://schemas.microsoft.com/office/drawing/2014/main" id="{92238BA9-76D0-4E8E-B5FA-9F7DB40CA3C5}"/>
+                <a16:creationId xmlns:a16="http://schemas.microsoft.com/office/drawing/2014/main" xmlns="" id="{92238BA9-76D0-4E8E-B5FA-9F7DB40CA3C5}"/>
               </a:ext>
             </a:extLst>
           </p:cNvPr>
@@ -28810,7 +28810,7 @@
           <p:cNvPr id="19" name="Picture 19">
             <a:extLst>
               <a:ext uri="{FF2B5EF4-FFF2-40B4-BE49-F238E27FC236}">
-                <a16:creationId xmlns="" xmlns:a16="http://schemas.microsoft.com/office/drawing/2014/main" id="{F5FA65D8-C04D-46E6-9FC6-23843A758732}"/>
+                <a16:creationId xmlns:a16="http://schemas.microsoft.com/office/drawing/2014/main" xmlns="" id="{F5FA65D8-C04D-46E6-9FC6-23843A758732}"/>
               </a:ext>
             </a:extLst>
           </p:cNvPr>
@@ -28840,7 +28840,7 @@
           <p:cNvPr id="24" name="Picture 24" descr="A close up of a logo&#10;&#10;Description generated with very high confidence">
             <a:extLst>
               <a:ext uri="{FF2B5EF4-FFF2-40B4-BE49-F238E27FC236}">
-                <a16:creationId xmlns="" xmlns:a16="http://schemas.microsoft.com/office/drawing/2014/main" id="{E75973BA-2F48-4595-8A40-76F9628582C1}"/>
+                <a16:creationId xmlns:a16="http://schemas.microsoft.com/office/drawing/2014/main" xmlns="" id="{E75973BA-2F48-4595-8A40-76F9628582C1}"/>
               </a:ext>
             </a:extLst>
           </p:cNvPr>
@@ -28870,7 +28870,7 @@
           <p:cNvPr id="41" name="Picture 41" descr="A picture containing drawing&#10;&#10;Description generated with very high confidence">
             <a:extLst>
               <a:ext uri="{FF2B5EF4-FFF2-40B4-BE49-F238E27FC236}">
-                <a16:creationId xmlns="" xmlns:a16="http://schemas.microsoft.com/office/drawing/2014/main" id="{31E1483B-7194-4F70-B546-9D57F1B81B91}"/>
+                <a16:creationId xmlns:a16="http://schemas.microsoft.com/office/drawing/2014/main" xmlns="" id="{31E1483B-7194-4F70-B546-9D57F1B81B91}"/>
               </a:ext>
             </a:extLst>
           </p:cNvPr>
@@ -28900,7 +28900,7 @@
           <p:cNvPr id="49" name="Picture 49" descr="A picture containing clock, drawing, flower&#10;&#10;Description generated with very high confidence">
             <a:extLst>
               <a:ext uri="{FF2B5EF4-FFF2-40B4-BE49-F238E27FC236}">
-                <a16:creationId xmlns="" xmlns:a16="http://schemas.microsoft.com/office/drawing/2014/main" id="{E47A10BC-72DE-41B7-9EBD-B24B82C7CB84}"/>
+                <a16:creationId xmlns:a16="http://schemas.microsoft.com/office/drawing/2014/main" xmlns="" id="{E47A10BC-72DE-41B7-9EBD-B24B82C7CB84}"/>
               </a:ext>
             </a:extLst>
           </p:cNvPr>
@@ -28930,7 +28930,7 @@
           <p:cNvPr id="51" name="Picture 51" descr="A picture containing food, drawing&#10;&#10;Description generated with very high confidence">
             <a:extLst>
               <a:ext uri="{FF2B5EF4-FFF2-40B4-BE49-F238E27FC236}">
-                <a16:creationId xmlns="" xmlns:a16="http://schemas.microsoft.com/office/drawing/2014/main" id="{6971AD3C-9B53-470A-8695-765A33542705}"/>
+                <a16:creationId xmlns:a16="http://schemas.microsoft.com/office/drawing/2014/main" xmlns="" id="{6971AD3C-9B53-470A-8695-765A33542705}"/>
               </a:ext>
             </a:extLst>
           </p:cNvPr>
@@ -28960,7 +28960,7 @@
           <p:cNvPr id="58" name="Picture 58" descr="A picture containing traffic&#10;&#10;Description generated with very high confidence">
             <a:extLst>
               <a:ext uri="{FF2B5EF4-FFF2-40B4-BE49-F238E27FC236}">
-                <a16:creationId xmlns="" xmlns:a16="http://schemas.microsoft.com/office/drawing/2014/main" id="{561102FE-26B9-45F1-9736-025A946AD7B5}"/>
+                <a16:creationId xmlns:a16="http://schemas.microsoft.com/office/drawing/2014/main" xmlns="" id="{561102FE-26B9-45F1-9736-025A946AD7B5}"/>
               </a:ext>
             </a:extLst>
           </p:cNvPr>
@@ -29048,7 +29048,7 @@
           <p:cNvPr id="61" name="Picture 61">
             <a:extLst>
               <a:ext uri="{FF2B5EF4-FFF2-40B4-BE49-F238E27FC236}">
-                <a16:creationId xmlns="" xmlns:a16="http://schemas.microsoft.com/office/drawing/2014/main" id="{395E44A0-5BF1-4541-8A51-BFC69EE47E4F}"/>
+                <a16:creationId xmlns:a16="http://schemas.microsoft.com/office/drawing/2014/main" xmlns="" id="{395E44A0-5BF1-4541-8A51-BFC69EE47E4F}"/>
               </a:ext>
             </a:extLst>
           </p:cNvPr>
@@ -29078,7 +29078,7 @@
           <p:cNvPr id="28" name="Picture 28" descr="A close up of a logo&#10;&#10;Description generated with very high confidence">
             <a:extLst>
               <a:ext uri="{FF2B5EF4-FFF2-40B4-BE49-F238E27FC236}">
-                <a16:creationId xmlns="" xmlns:a16="http://schemas.microsoft.com/office/drawing/2014/main" id="{84736375-8BEC-4102-BBD3-CD5BA93BE13D}"/>
+                <a16:creationId xmlns:a16="http://schemas.microsoft.com/office/drawing/2014/main" xmlns="" id="{84736375-8BEC-4102-BBD3-CD5BA93BE13D}"/>
               </a:ext>
             </a:extLst>
           </p:cNvPr>
@@ -29108,7 +29108,7 @@
           <p:cNvPr id="18" name="Straight Arrow Connector 17">
             <a:extLst>
               <a:ext uri="{FF2B5EF4-FFF2-40B4-BE49-F238E27FC236}">
-                <a16:creationId xmlns="" xmlns:a16="http://schemas.microsoft.com/office/drawing/2014/main" id="{1A9D56D8-0796-41CA-BDAE-A54AEFA6AB4A}"/>
+                <a16:creationId xmlns:a16="http://schemas.microsoft.com/office/drawing/2014/main" xmlns="" id="{1A9D56D8-0796-41CA-BDAE-A54AEFA6AB4A}"/>
               </a:ext>
             </a:extLst>
           </p:cNvPr>
@@ -29150,7 +29150,7 @@
           <p:cNvPr id="21" name="Oval 20">
             <a:extLst>
               <a:ext uri="{FF2B5EF4-FFF2-40B4-BE49-F238E27FC236}">
-                <a16:creationId xmlns="" xmlns:a16="http://schemas.microsoft.com/office/drawing/2014/main" id="{4DC6CE08-D971-4012-9665-4D26EF0B351E}"/>
+                <a16:creationId xmlns:a16="http://schemas.microsoft.com/office/drawing/2014/main" xmlns="" id="{4DC6CE08-D971-4012-9665-4D26EF0B351E}"/>
               </a:ext>
             </a:extLst>
           </p:cNvPr>
@@ -29204,7 +29204,7 @@
           <p:cNvPr id="22" name="Oval 21">
             <a:extLst>
               <a:ext uri="{FF2B5EF4-FFF2-40B4-BE49-F238E27FC236}">
-                <a16:creationId xmlns="" xmlns:a16="http://schemas.microsoft.com/office/drawing/2014/main" id="{34D78DA4-4F5A-479F-8EF7-090D7E100DF8}"/>
+                <a16:creationId xmlns:a16="http://schemas.microsoft.com/office/drawing/2014/main" xmlns="" id="{34D78DA4-4F5A-479F-8EF7-090D7E100DF8}"/>
               </a:ext>
             </a:extLst>
           </p:cNvPr>
@@ -29258,7 +29258,7 @@
           <p:cNvPr id="32" name="Oval 31">
             <a:extLst>
               <a:ext uri="{FF2B5EF4-FFF2-40B4-BE49-F238E27FC236}">
-                <a16:creationId xmlns="" xmlns:a16="http://schemas.microsoft.com/office/drawing/2014/main" id="{087D8941-8777-474C-A035-46A42D21194B}"/>
+                <a16:creationId xmlns:a16="http://schemas.microsoft.com/office/drawing/2014/main" xmlns="" id="{087D8941-8777-474C-A035-46A42D21194B}"/>
               </a:ext>
             </a:extLst>
           </p:cNvPr>
@@ -29847,7 +29847,7 @@
           <p:cNvPr id="3" name="Picture 3" descr="A screenshot of a cell phone&#10;&#10;Description generated with high confidence">
             <a:extLst>
               <a:ext uri="{FF2B5EF4-FFF2-40B4-BE49-F238E27FC236}">
-                <a16:creationId xmlns="" xmlns:a16="http://schemas.microsoft.com/office/drawing/2014/main" id="{F8414E6B-2443-4E39-8C88-1D6EF2C433DD}"/>
+                <a16:creationId xmlns:a16="http://schemas.microsoft.com/office/drawing/2014/main" xmlns="" id="{F8414E6B-2443-4E39-8C88-1D6EF2C433DD}"/>
               </a:ext>
             </a:extLst>
           </p:cNvPr>
@@ -29877,7 +29877,7 @@
           <p:cNvPr id="5" name="Picture 5" descr="A screenshot of a cell phone&#10;&#10;Description generated with high confidence">
             <a:extLst>
               <a:ext uri="{FF2B5EF4-FFF2-40B4-BE49-F238E27FC236}">
-                <a16:creationId xmlns="" xmlns:a16="http://schemas.microsoft.com/office/drawing/2014/main" id="{141DEEF9-3327-4771-AA7C-A61F22A1003B}"/>
+                <a16:creationId xmlns:a16="http://schemas.microsoft.com/office/drawing/2014/main" xmlns="" id="{141DEEF9-3327-4771-AA7C-A61F22A1003B}"/>
               </a:ext>
             </a:extLst>
           </p:cNvPr>
@@ -29907,7 +29907,7 @@
           <p:cNvPr id="9" name="Picture 9">
             <a:extLst>
               <a:ext uri="{FF2B5EF4-FFF2-40B4-BE49-F238E27FC236}">
-                <a16:creationId xmlns="" xmlns:a16="http://schemas.microsoft.com/office/drawing/2014/main" id="{9030CC14-41AA-4F14-9CF8-9294BB72EC97}"/>
+                <a16:creationId xmlns:a16="http://schemas.microsoft.com/office/drawing/2014/main" xmlns="" id="{9030CC14-41AA-4F14-9CF8-9294BB72EC97}"/>
               </a:ext>
             </a:extLst>
           </p:cNvPr>
@@ -29937,7 +29937,7 @@
           <p:cNvPr id="13" name="Picture 13">
             <a:extLst>
               <a:ext uri="{FF2B5EF4-FFF2-40B4-BE49-F238E27FC236}">
-                <a16:creationId xmlns="" xmlns:a16="http://schemas.microsoft.com/office/drawing/2014/main" id="{DA1A5E4F-3A85-4D7B-8CF0-95B63A5C4851}"/>
+                <a16:creationId xmlns:a16="http://schemas.microsoft.com/office/drawing/2014/main" xmlns="" id="{DA1A5E4F-3A85-4D7B-8CF0-95B63A5C4851}"/>
               </a:ext>
             </a:extLst>
           </p:cNvPr>
@@ -29967,7 +29967,7 @@
           <p:cNvPr id="15" name="Picture 15">
             <a:extLst>
               <a:ext uri="{FF2B5EF4-FFF2-40B4-BE49-F238E27FC236}">
-                <a16:creationId xmlns="" xmlns:a16="http://schemas.microsoft.com/office/drawing/2014/main" id="{D6EA385D-793B-495B-B262-A517A508F172}"/>
+                <a16:creationId xmlns:a16="http://schemas.microsoft.com/office/drawing/2014/main" xmlns="" id="{D6EA385D-793B-495B-B262-A517A508F172}"/>
               </a:ext>
             </a:extLst>
           </p:cNvPr>
@@ -29997,7 +29997,7 @@
           <p:cNvPr id="17" name="Picture 17">
             <a:extLst>
               <a:ext uri="{FF2B5EF4-FFF2-40B4-BE49-F238E27FC236}">
-                <a16:creationId xmlns="" xmlns:a16="http://schemas.microsoft.com/office/drawing/2014/main" id="{A016E024-287F-44DB-AD73-696C65001B48}"/>
+                <a16:creationId xmlns:a16="http://schemas.microsoft.com/office/drawing/2014/main" xmlns="" id="{A016E024-287F-44DB-AD73-696C65001B48}"/>
               </a:ext>
             </a:extLst>
           </p:cNvPr>
@@ -30027,7 +30027,7 @@
           <p:cNvPr id="21" name="Picture 21">
             <a:extLst>
               <a:ext uri="{FF2B5EF4-FFF2-40B4-BE49-F238E27FC236}">
-                <a16:creationId xmlns="" xmlns:a16="http://schemas.microsoft.com/office/drawing/2014/main" id="{A0ECE790-E592-4680-BDA3-D5CECC5E35F5}"/>
+                <a16:creationId xmlns:a16="http://schemas.microsoft.com/office/drawing/2014/main" xmlns="" id="{A0ECE790-E592-4680-BDA3-D5CECC5E35F5}"/>
               </a:ext>
             </a:extLst>
           </p:cNvPr>
@@ -30057,7 +30057,7 @@
           <p:cNvPr id="23" name="Picture 23">
             <a:extLst>
               <a:ext uri="{FF2B5EF4-FFF2-40B4-BE49-F238E27FC236}">
-                <a16:creationId xmlns="" xmlns:a16="http://schemas.microsoft.com/office/drawing/2014/main" id="{604B44D1-CA16-473F-905A-FD7EDF44C561}"/>
+                <a16:creationId xmlns:a16="http://schemas.microsoft.com/office/drawing/2014/main" xmlns="" id="{604B44D1-CA16-473F-905A-FD7EDF44C561}"/>
               </a:ext>
             </a:extLst>
           </p:cNvPr>
@@ -30087,7 +30087,7 @@
           <p:cNvPr id="25" name="Picture 25">
             <a:extLst>
               <a:ext uri="{FF2B5EF4-FFF2-40B4-BE49-F238E27FC236}">
-                <a16:creationId xmlns="" xmlns:a16="http://schemas.microsoft.com/office/drawing/2014/main" id="{DC42FEE6-2F1D-4826-B249-5A31BA693CC0}"/>
+                <a16:creationId xmlns:a16="http://schemas.microsoft.com/office/drawing/2014/main" xmlns="" id="{DC42FEE6-2F1D-4826-B249-5A31BA693CC0}"/>
               </a:ext>
             </a:extLst>
           </p:cNvPr>
@@ -30117,7 +30117,7 @@
           <p:cNvPr id="27" name="Picture 27">
             <a:extLst>
               <a:ext uri="{FF2B5EF4-FFF2-40B4-BE49-F238E27FC236}">
-                <a16:creationId xmlns="" xmlns:a16="http://schemas.microsoft.com/office/drawing/2014/main" id="{638891BB-BA96-4E4F-B8CE-CF4323CB75A4}"/>
+                <a16:creationId xmlns:a16="http://schemas.microsoft.com/office/drawing/2014/main" xmlns="" id="{638891BB-BA96-4E4F-B8CE-CF4323CB75A4}"/>
               </a:ext>
             </a:extLst>
           </p:cNvPr>
@@ -30147,7 +30147,7 @@
           <p:cNvPr id="31" name="Picture 31" descr="A close up of a logo&#10;&#10;Description generated with very high confidence">
             <a:extLst>
               <a:ext uri="{FF2B5EF4-FFF2-40B4-BE49-F238E27FC236}">
-                <a16:creationId xmlns="" xmlns:a16="http://schemas.microsoft.com/office/drawing/2014/main" id="{1D2FEFB3-F612-49EC-9C5A-6C49223C299B}"/>
+                <a16:creationId xmlns:a16="http://schemas.microsoft.com/office/drawing/2014/main" xmlns="" id="{1D2FEFB3-F612-49EC-9C5A-6C49223C299B}"/>
               </a:ext>
             </a:extLst>
           </p:cNvPr>
@@ -30177,7 +30177,7 @@
           <p:cNvPr id="33" name="Picture 33" descr="A close up of a logo&#10;&#10;Description generated with very high confidence">
             <a:extLst>
               <a:ext uri="{FF2B5EF4-FFF2-40B4-BE49-F238E27FC236}">
-                <a16:creationId xmlns="" xmlns:a16="http://schemas.microsoft.com/office/drawing/2014/main" id="{45805758-60E6-408F-AE18-4BF571D58215}"/>
+                <a16:creationId xmlns:a16="http://schemas.microsoft.com/office/drawing/2014/main" xmlns="" id="{45805758-60E6-408F-AE18-4BF571D58215}"/>
               </a:ext>
             </a:extLst>
           </p:cNvPr>
@@ -30207,7 +30207,7 @@
           <p:cNvPr id="35" name="Picture 35" descr="A clock in the dark&#10;&#10;Description generated with high confidence">
             <a:extLst>
               <a:ext uri="{FF2B5EF4-FFF2-40B4-BE49-F238E27FC236}">
-                <a16:creationId xmlns="" xmlns:a16="http://schemas.microsoft.com/office/drawing/2014/main" id="{C21B3B7F-7772-4C24-86CE-377F26867F83}"/>
+                <a16:creationId xmlns:a16="http://schemas.microsoft.com/office/drawing/2014/main" xmlns="" id="{C21B3B7F-7772-4C24-86CE-377F26867F83}"/>
               </a:ext>
             </a:extLst>
           </p:cNvPr>
@@ -30237,7 +30237,7 @@
           <p:cNvPr id="37" name="Picture 37" descr="A clock sitting in the dark&#10;&#10;Description generated with high confidence">
             <a:extLst>
               <a:ext uri="{FF2B5EF4-FFF2-40B4-BE49-F238E27FC236}">
-                <a16:creationId xmlns="" xmlns:a16="http://schemas.microsoft.com/office/drawing/2014/main" id="{81EB908A-9066-4231-A575-CF0C6DFDC80A}"/>
+                <a16:creationId xmlns:a16="http://schemas.microsoft.com/office/drawing/2014/main" xmlns="" id="{81EB908A-9066-4231-A575-CF0C6DFDC80A}"/>
               </a:ext>
             </a:extLst>
           </p:cNvPr>
@@ -30267,7 +30267,7 @@
           <p:cNvPr id="42" name="TextBox 41">
             <a:extLst>
               <a:ext uri="{FF2B5EF4-FFF2-40B4-BE49-F238E27FC236}">
-                <a16:creationId xmlns="" xmlns:a16="http://schemas.microsoft.com/office/drawing/2014/main" id="{609F857E-3EAC-4901-B569-0DBD589577A4}"/>
+                <a16:creationId xmlns:a16="http://schemas.microsoft.com/office/drawing/2014/main" xmlns="" id="{609F857E-3EAC-4901-B569-0DBD589577A4}"/>
               </a:ext>
             </a:extLst>
           </p:cNvPr>
@@ -30308,7 +30308,7 @@
           <p:cNvPr id="44" name="TextBox 43">
             <a:extLst>
               <a:ext uri="{FF2B5EF4-FFF2-40B4-BE49-F238E27FC236}">
-                <a16:creationId xmlns="" xmlns:a16="http://schemas.microsoft.com/office/drawing/2014/main" id="{89A462EF-7DE6-41C9-875A-AAC89906E8A3}"/>
+                <a16:creationId xmlns:a16="http://schemas.microsoft.com/office/drawing/2014/main" xmlns="" id="{89A462EF-7DE6-41C9-875A-AAC89906E8A3}"/>
               </a:ext>
             </a:extLst>
           </p:cNvPr>
@@ -30347,7 +30347,7 @@
           <p:cNvPr id="45" name="Straight Arrow Connector 44">
             <a:extLst>
               <a:ext uri="{FF2B5EF4-FFF2-40B4-BE49-F238E27FC236}">
-                <a16:creationId xmlns="" xmlns:a16="http://schemas.microsoft.com/office/drawing/2014/main" id="{FAB80D67-F59C-4B06-834D-F3F3A9EC5522}"/>
+                <a16:creationId xmlns:a16="http://schemas.microsoft.com/office/drawing/2014/main" xmlns="" id="{FAB80D67-F59C-4B06-834D-F3F3A9EC5522}"/>
               </a:ext>
             </a:extLst>
           </p:cNvPr>
@@ -30389,7 +30389,7 @@
           <p:cNvPr id="47" name="Straight Arrow Connector 46">
             <a:extLst>
               <a:ext uri="{FF2B5EF4-FFF2-40B4-BE49-F238E27FC236}">
-                <a16:creationId xmlns="" xmlns:a16="http://schemas.microsoft.com/office/drawing/2014/main" id="{EBE041AA-BC24-4A0B-8BE1-8AA71FA1D9EE}"/>
+                <a16:creationId xmlns:a16="http://schemas.microsoft.com/office/drawing/2014/main" xmlns="" id="{EBE041AA-BC24-4A0B-8BE1-8AA71FA1D9EE}"/>
               </a:ext>
             </a:extLst>
           </p:cNvPr>
@@ -30433,7 +30433,7 @@
           <p:cNvPr id="2" name="Picture 3" descr="A close up of a logo&#10;&#10;Description generated with very high confidence">
             <a:extLst>
               <a:ext uri="{FF2B5EF4-FFF2-40B4-BE49-F238E27FC236}">
-                <a16:creationId xmlns="" xmlns:a16="http://schemas.microsoft.com/office/drawing/2014/main" id="{BCB4413D-CF3A-44E8-ACAD-26265ED98CFC}"/>
+                <a16:creationId xmlns:a16="http://schemas.microsoft.com/office/drawing/2014/main" xmlns="" id="{BCB4413D-CF3A-44E8-ACAD-26265ED98CFC}"/>
               </a:ext>
             </a:extLst>
           </p:cNvPr>
@@ -30463,7 +30463,7 @@
           <p:cNvPr id="6" name="Picture 6" descr="A close up of a logo&#10;&#10;Description generated with very high confidence">
             <a:extLst>
               <a:ext uri="{FF2B5EF4-FFF2-40B4-BE49-F238E27FC236}">
-                <a16:creationId xmlns="" xmlns:a16="http://schemas.microsoft.com/office/drawing/2014/main" id="{10224506-3EA4-41AC-B2F3-502E07BF19D3}"/>
+                <a16:creationId xmlns:a16="http://schemas.microsoft.com/office/drawing/2014/main" xmlns="" id="{10224506-3EA4-41AC-B2F3-502E07BF19D3}"/>
               </a:ext>
             </a:extLst>
           </p:cNvPr>
@@ -30493,7 +30493,7 @@
           <p:cNvPr id="18" name="Picture 18" descr="A close up of a logo&#10;&#10;Description generated with very high confidence">
             <a:extLst>
               <a:ext uri="{FF2B5EF4-FFF2-40B4-BE49-F238E27FC236}">
-                <a16:creationId xmlns="" xmlns:a16="http://schemas.microsoft.com/office/drawing/2014/main" id="{7D02541C-0C39-4204-A698-2888678BC31E}"/>
+                <a16:creationId xmlns:a16="http://schemas.microsoft.com/office/drawing/2014/main" xmlns="" id="{7D02541C-0C39-4204-A698-2888678BC31E}"/>
               </a:ext>
             </a:extLst>
           </p:cNvPr>
@@ -30523,7 +30523,7 @@
           <p:cNvPr id="20" name="Picture 21" descr="A close up of a logo&#10;&#10;Description generated with very high confidence">
             <a:extLst>
               <a:ext uri="{FF2B5EF4-FFF2-40B4-BE49-F238E27FC236}">
-                <a16:creationId xmlns="" xmlns:a16="http://schemas.microsoft.com/office/drawing/2014/main" id="{0C9735ED-B5CE-4501-BB0B-F94DAF67438F}"/>
+                <a16:creationId xmlns:a16="http://schemas.microsoft.com/office/drawing/2014/main" xmlns="" id="{0C9735ED-B5CE-4501-BB0B-F94DAF67438F}"/>
               </a:ext>
             </a:extLst>
           </p:cNvPr>
@@ -30553,7 +30553,7 @@
           <p:cNvPr id="24" name="TextBox 23">
             <a:extLst>
               <a:ext uri="{FF2B5EF4-FFF2-40B4-BE49-F238E27FC236}">
-                <a16:creationId xmlns="" xmlns:a16="http://schemas.microsoft.com/office/drawing/2014/main" id="{FD7791DA-B6E9-447C-B562-16C63C68485F}"/>
+                <a16:creationId xmlns:a16="http://schemas.microsoft.com/office/drawing/2014/main" xmlns="" id="{FD7791DA-B6E9-447C-B562-16C63C68485F}"/>
               </a:ext>
             </a:extLst>
           </p:cNvPr>
@@ -30608,7 +30608,7 @@
           <p:cNvPr id="26" name="TextBox 25">
             <a:extLst>
               <a:ext uri="{FF2B5EF4-FFF2-40B4-BE49-F238E27FC236}">
-                <a16:creationId xmlns="" xmlns:a16="http://schemas.microsoft.com/office/drawing/2014/main" id="{20C434AC-340F-4D02-802E-9088BE20D090}"/>
+                <a16:creationId xmlns:a16="http://schemas.microsoft.com/office/drawing/2014/main" xmlns="" id="{20C434AC-340F-4D02-802E-9088BE20D090}"/>
               </a:ext>
             </a:extLst>
           </p:cNvPr>
@@ -30933,7 +30933,7 @@
           <p:cNvPr id="2" name="Title 1">
             <a:extLst>
               <a:ext uri="{FF2B5EF4-FFF2-40B4-BE49-F238E27FC236}">
-                <a16:creationId xmlns="" xmlns:a16="http://schemas.microsoft.com/office/drawing/2014/main" id="{8026EC4C-6E25-4172-BE37-528F585CEF1B}"/>
+                <a16:creationId xmlns:a16="http://schemas.microsoft.com/office/drawing/2014/main" xmlns="" id="{8026EC4C-6E25-4172-BE37-528F585CEF1B}"/>
               </a:ext>
             </a:extLst>
           </p:cNvPr>
@@ -30964,7 +30964,7 @@
           <p:cNvPr id="3" name="Picture 3" descr="A close up of a logo&#10;&#10;Description generated with very high confidence">
             <a:extLst>
               <a:ext uri="{FF2B5EF4-FFF2-40B4-BE49-F238E27FC236}">
-                <a16:creationId xmlns="" xmlns:a16="http://schemas.microsoft.com/office/drawing/2014/main" id="{DA6334C1-3239-46DA-A32D-FDD4442F1795}"/>
+                <a16:creationId xmlns:a16="http://schemas.microsoft.com/office/drawing/2014/main" xmlns="" id="{DA6334C1-3239-46DA-A32D-FDD4442F1795}"/>
               </a:ext>
             </a:extLst>
           </p:cNvPr>
@@ -30994,7 +30994,7 @@
           <p:cNvPr id="5" name="Picture 5" descr="A picture containing clock&#10;&#10;Description generated with very high confidence">
             <a:extLst>
               <a:ext uri="{FF2B5EF4-FFF2-40B4-BE49-F238E27FC236}">
-                <a16:creationId xmlns="" xmlns:a16="http://schemas.microsoft.com/office/drawing/2014/main" id="{93A331CE-46F7-4243-83C4-BE9E3F1825B0}"/>
+                <a16:creationId xmlns:a16="http://schemas.microsoft.com/office/drawing/2014/main" xmlns="" id="{93A331CE-46F7-4243-83C4-BE9E3F1825B0}"/>
               </a:ext>
             </a:extLst>
           </p:cNvPr>
@@ -31024,7 +31024,7 @@
           <p:cNvPr id="7" name="Picture 7" descr="A close up of a logo&#10;&#10;Description generated with very high confidence">
             <a:extLst>
               <a:ext uri="{FF2B5EF4-FFF2-40B4-BE49-F238E27FC236}">
-                <a16:creationId xmlns="" xmlns:a16="http://schemas.microsoft.com/office/drawing/2014/main" id="{CCA1FA7B-C942-4986-AB3B-54E0615F8F08}"/>
+                <a16:creationId xmlns:a16="http://schemas.microsoft.com/office/drawing/2014/main" xmlns="" id="{CCA1FA7B-C942-4986-AB3B-54E0615F8F08}"/>
               </a:ext>
             </a:extLst>
           </p:cNvPr>
@@ -31054,7 +31054,7 @@
           <p:cNvPr id="9" name="Arrow: Down 8">
             <a:extLst>
               <a:ext uri="{FF2B5EF4-FFF2-40B4-BE49-F238E27FC236}">
-                <a16:creationId xmlns="" xmlns:a16="http://schemas.microsoft.com/office/drawing/2014/main" id="{D88FA45F-BC7E-4719-9194-7E0AE71F0C1D}"/>
+                <a16:creationId xmlns:a16="http://schemas.microsoft.com/office/drawing/2014/main" xmlns="" id="{D88FA45F-BC7E-4719-9194-7E0AE71F0C1D}"/>
               </a:ext>
             </a:extLst>
           </p:cNvPr>
@@ -31108,7 +31108,7 @@
           <p:cNvPr id="10" name="Arrow: Down 9">
             <a:extLst>
               <a:ext uri="{FF2B5EF4-FFF2-40B4-BE49-F238E27FC236}">
-                <a16:creationId xmlns="" xmlns:a16="http://schemas.microsoft.com/office/drawing/2014/main" id="{74C91D1A-CCF6-4DE0-B080-D77210A893FD}"/>
+                <a16:creationId xmlns:a16="http://schemas.microsoft.com/office/drawing/2014/main" xmlns="" id="{74C91D1A-CCF6-4DE0-B080-D77210A893FD}"/>
               </a:ext>
             </a:extLst>
           </p:cNvPr>
@@ -31162,7 +31162,7 @@
           <p:cNvPr id="11" name="TextBox 10">
             <a:extLst>
               <a:ext uri="{FF2B5EF4-FFF2-40B4-BE49-F238E27FC236}">
-                <a16:creationId xmlns="" xmlns:a16="http://schemas.microsoft.com/office/drawing/2014/main" id="{EBD1E537-F5C7-43D5-8C6F-6CFA11A95BD2}"/>
+                <a16:creationId xmlns:a16="http://schemas.microsoft.com/office/drawing/2014/main" xmlns="" id="{EBD1E537-F5C7-43D5-8C6F-6CFA11A95BD2}"/>
               </a:ext>
             </a:extLst>
           </p:cNvPr>
@@ -31210,7 +31210,7 @@
           <p:cNvPr id="12" name="Picture 12" descr="A picture containing flower&#10;&#10;Description generated with very high confidence">
             <a:extLst>
               <a:ext uri="{FF2B5EF4-FFF2-40B4-BE49-F238E27FC236}">
-                <a16:creationId xmlns="" xmlns:a16="http://schemas.microsoft.com/office/drawing/2014/main" id="{A3F53263-2B7C-4937-AC64-FBA05A97C1D8}"/>
+                <a16:creationId xmlns:a16="http://schemas.microsoft.com/office/drawing/2014/main" xmlns="" id="{A3F53263-2B7C-4937-AC64-FBA05A97C1D8}"/>
               </a:ext>
             </a:extLst>
           </p:cNvPr>
@@ -31240,7 +31240,7 @@
           <p:cNvPr id="14" name="Picture 14" descr="A close up of a logo&#10;&#10;Description generated with very high confidence">
             <a:extLst>
               <a:ext uri="{FF2B5EF4-FFF2-40B4-BE49-F238E27FC236}">
-                <a16:creationId xmlns="" xmlns:a16="http://schemas.microsoft.com/office/drawing/2014/main" id="{8AE7F551-0647-4AF3-B9D9-4EBA16AD7CEA}"/>
+                <a16:creationId xmlns:a16="http://schemas.microsoft.com/office/drawing/2014/main" xmlns="" id="{8AE7F551-0647-4AF3-B9D9-4EBA16AD7CEA}"/>
               </a:ext>
             </a:extLst>
           </p:cNvPr>
@@ -31270,7 +31270,7 @@
           <p:cNvPr id="16" name="Arrow: Down 15">
             <a:extLst>
               <a:ext uri="{FF2B5EF4-FFF2-40B4-BE49-F238E27FC236}">
-                <a16:creationId xmlns="" xmlns:a16="http://schemas.microsoft.com/office/drawing/2014/main" id="{1BA7CD1C-8F04-405F-8C24-56C054B8567A}"/>
+                <a16:creationId xmlns:a16="http://schemas.microsoft.com/office/drawing/2014/main" xmlns="" id="{1BA7CD1C-8F04-405F-8C24-56C054B8567A}"/>
               </a:ext>
             </a:extLst>
           </p:cNvPr>
@@ -31324,7 +31324,7 @@
           <p:cNvPr id="17" name="Picture 17" descr="A close up of a logo&#10;&#10;Description generated with very high confidence">
             <a:extLst>
               <a:ext uri="{FF2B5EF4-FFF2-40B4-BE49-F238E27FC236}">
-                <a16:creationId xmlns="" xmlns:a16="http://schemas.microsoft.com/office/drawing/2014/main" id="{21EE91BF-B774-456B-B010-99066ADB15B8}"/>
+                <a16:creationId xmlns:a16="http://schemas.microsoft.com/office/drawing/2014/main" xmlns="" id="{21EE91BF-B774-456B-B010-99066ADB15B8}"/>
               </a:ext>
             </a:extLst>
           </p:cNvPr>
@@ -31354,7 +31354,7 @@
           <p:cNvPr id="19" name="Arrow: Down 18">
             <a:extLst>
               <a:ext uri="{FF2B5EF4-FFF2-40B4-BE49-F238E27FC236}">
-                <a16:creationId xmlns="" xmlns:a16="http://schemas.microsoft.com/office/drawing/2014/main" id="{ACBABBB2-7A08-4A20-AD31-44F3B08A5363}"/>
+                <a16:creationId xmlns:a16="http://schemas.microsoft.com/office/drawing/2014/main" xmlns="" id="{ACBABBB2-7A08-4A20-AD31-44F3B08A5363}"/>
               </a:ext>
             </a:extLst>
           </p:cNvPr>
@@ -31408,7 +31408,7 @@
           <p:cNvPr id="20" name="TextBox 19">
             <a:extLst>
               <a:ext uri="{FF2B5EF4-FFF2-40B4-BE49-F238E27FC236}">
-                <a16:creationId xmlns="" xmlns:a16="http://schemas.microsoft.com/office/drawing/2014/main" id="{C6F99357-B5AE-419B-B827-3D66E8EEE6E4}"/>
+                <a16:creationId xmlns:a16="http://schemas.microsoft.com/office/drawing/2014/main" xmlns="" id="{C6F99357-B5AE-419B-B827-3D66E8EEE6E4}"/>
               </a:ext>
             </a:extLst>
           </p:cNvPr>
@@ -31456,7 +31456,7 @@
           <p:cNvPr id="21" name="TextBox 20">
             <a:extLst>
               <a:ext uri="{FF2B5EF4-FFF2-40B4-BE49-F238E27FC236}">
-                <a16:creationId xmlns="" xmlns:a16="http://schemas.microsoft.com/office/drawing/2014/main" id="{628CFEC0-1408-43A1-9AD3-72018D2BD8ED}"/>
+                <a16:creationId xmlns:a16="http://schemas.microsoft.com/office/drawing/2014/main" xmlns="" id="{628CFEC0-1408-43A1-9AD3-72018D2BD8ED}"/>
               </a:ext>
             </a:extLst>
           </p:cNvPr>
@@ -31514,7 +31514,7 @@
           <p:cNvPr id="22" name="Rectangle 21">
             <a:extLst>
               <a:ext uri="{FF2B5EF4-FFF2-40B4-BE49-F238E27FC236}">
-                <a16:creationId xmlns="" xmlns:a16="http://schemas.microsoft.com/office/drawing/2014/main" id="{6247A618-C733-4F7E-898A-3F618CE68229}"/>
+                <a16:creationId xmlns:a16="http://schemas.microsoft.com/office/drawing/2014/main" xmlns="" id="{6247A618-C733-4F7E-898A-3F618CE68229}"/>
               </a:ext>
             </a:extLst>
           </p:cNvPr>
@@ -31566,7 +31566,7 @@
           <p:cNvPr id="23" name="TextBox 22">
             <a:extLst>
               <a:ext uri="{FF2B5EF4-FFF2-40B4-BE49-F238E27FC236}">
-                <a16:creationId xmlns="" xmlns:a16="http://schemas.microsoft.com/office/drawing/2014/main" id="{E447A0F9-F033-4FD7-8BCE-0F79A029878A}"/>
+                <a16:creationId xmlns:a16="http://schemas.microsoft.com/office/drawing/2014/main" xmlns="" id="{E447A0F9-F033-4FD7-8BCE-0F79A029878A}"/>
               </a:ext>
             </a:extLst>
           </p:cNvPr>
@@ -32196,7 +32196,7 @@
           <p:cNvPr id="2" name="Title 1">
             <a:extLst>
               <a:ext uri="{FF2B5EF4-FFF2-40B4-BE49-F238E27FC236}">
-                <a16:creationId xmlns="" xmlns:a16="http://schemas.microsoft.com/office/drawing/2014/main" id="{99760F66-ED22-4D99-83D9-AF132B641E2C}"/>
+                <a16:creationId xmlns:a16="http://schemas.microsoft.com/office/drawing/2014/main" xmlns="" id="{99760F66-ED22-4D99-83D9-AF132B641E2C}"/>
               </a:ext>
             </a:extLst>
           </p:cNvPr>
@@ -32227,7 +32227,7 @@
           <p:cNvPr id="4" name="Picture 3" descr="A close up of a logo&#10;&#10;Description generated with very high confidence">
             <a:extLst>
               <a:ext uri="{FF2B5EF4-FFF2-40B4-BE49-F238E27FC236}">
-                <a16:creationId xmlns="" xmlns:a16="http://schemas.microsoft.com/office/drawing/2014/main" id="{6E87F861-F9AC-4F21-B0C8-58EB55E95B97}"/>
+                <a16:creationId xmlns:a16="http://schemas.microsoft.com/office/drawing/2014/main" xmlns="" id="{6E87F861-F9AC-4F21-B0C8-58EB55E95B97}"/>
               </a:ext>
             </a:extLst>
           </p:cNvPr>
@@ -32257,7 +32257,7 @@
           <p:cNvPr id="6" name="Picture 5" descr="A picture containing clock&#10;&#10;Description generated with very high confidence">
             <a:extLst>
               <a:ext uri="{FF2B5EF4-FFF2-40B4-BE49-F238E27FC236}">
-                <a16:creationId xmlns="" xmlns:a16="http://schemas.microsoft.com/office/drawing/2014/main" id="{4616AC99-6BB6-4ADE-BDE8-48395933FE5F}"/>
+                <a16:creationId xmlns:a16="http://schemas.microsoft.com/office/drawing/2014/main" xmlns="" id="{4616AC99-6BB6-4ADE-BDE8-48395933FE5F}"/>
               </a:ext>
             </a:extLst>
           </p:cNvPr>
@@ -32287,7 +32287,7 @@
           <p:cNvPr id="8" name="Arrow: Down 7">
             <a:extLst>
               <a:ext uri="{FF2B5EF4-FFF2-40B4-BE49-F238E27FC236}">
-                <a16:creationId xmlns="" xmlns:a16="http://schemas.microsoft.com/office/drawing/2014/main" id="{82AB09DD-DB63-4806-A980-AE0CB9781D42}"/>
+                <a16:creationId xmlns:a16="http://schemas.microsoft.com/office/drawing/2014/main" xmlns="" id="{82AB09DD-DB63-4806-A980-AE0CB9781D42}"/>
               </a:ext>
             </a:extLst>
           </p:cNvPr>

</xml_diff>

<commit_message>
Add some plots for write-up
</commit_message>
<xml_diff>
--- a/ppt/Duality.pptx
+++ b/ppt/Duality.pptx
@@ -4,6 +4,9 @@
   <p:sldMasterIdLst>
     <p:sldMasterId id="2147483660" r:id="rId1"/>
   </p:sldMasterIdLst>
+  <p:notesMasterIdLst>
+    <p:notesMasterId r:id="rId34"/>
+  </p:notesMasterIdLst>
   <p:sldIdLst>
     <p:sldId id="280" r:id="rId2"/>
     <p:sldId id="284" r:id="rId3"/>
@@ -3531,6 +3534,353 @@
 </pc:chgInfo>
 </file>
 
+<file path=ppt/notesMasters/notesMaster1.xml><?xml version="1.0" encoding="utf-8"?>
+<p:notesMaster xmlns:a="http://schemas.openxmlformats.org/drawingml/2006/main" xmlns:r="http://schemas.openxmlformats.org/officeDocument/2006/relationships" xmlns:p="http://schemas.openxmlformats.org/presentationml/2006/main">
+  <p:cSld>
+    <p:bg>
+      <p:bgRef idx="1001">
+        <a:schemeClr val="bg1"/>
+      </p:bgRef>
+    </p:bg>
+    <p:spTree>
+      <p:nvGrpSpPr>
+        <p:cNvPr id="1" name=""/>
+        <p:cNvGrpSpPr/>
+        <p:nvPr/>
+      </p:nvGrpSpPr>
+      <p:grpSpPr>
+        <a:xfrm>
+          <a:off x="0" y="0"/>
+          <a:ext cx="0" cy="0"/>
+          <a:chOff x="0" y="0"/>
+          <a:chExt cx="0" cy="0"/>
+        </a:xfrm>
+      </p:grpSpPr>
+      <p:sp>
+        <p:nvSpPr>
+          <p:cNvPr id="2" name="Header Placeholder 1"/>
+          <p:cNvSpPr>
+            <a:spLocks noGrp="1"/>
+          </p:cNvSpPr>
+          <p:nvPr>
+            <p:ph type="hdr" sz="quarter"/>
+          </p:nvPr>
+        </p:nvSpPr>
+        <p:spPr>
+          <a:xfrm>
+            <a:off x="0" y="0"/>
+            <a:ext cx="2971800" cy="458788"/>
+          </a:xfrm>
+          <a:prstGeom prst="rect">
+            <a:avLst/>
+          </a:prstGeom>
+        </p:spPr>
+        <p:txBody>
+          <a:bodyPr vert="horz" lIns="91440" tIns="45720" rIns="91440" bIns="45720" rtlCol="0"/>
+          <a:lstStyle>
+            <a:lvl1pPr algn="l">
+              <a:defRPr sz="1200"/>
+            </a:lvl1pPr>
+          </a:lstStyle>
+          <a:p>
+            <a:endParaRPr lang="en-US"/>
+          </a:p>
+        </p:txBody>
+      </p:sp>
+      <p:sp>
+        <p:nvSpPr>
+          <p:cNvPr id="3" name="Date Placeholder 2"/>
+          <p:cNvSpPr>
+            <a:spLocks noGrp="1"/>
+          </p:cNvSpPr>
+          <p:nvPr>
+            <p:ph type="dt" idx="1"/>
+          </p:nvPr>
+        </p:nvSpPr>
+        <p:spPr>
+          <a:xfrm>
+            <a:off x="3884613" y="0"/>
+            <a:ext cx="2971800" cy="458788"/>
+          </a:xfrm>
+          <a:prstGeom prst="rect">
+            <a:avLst/>
+          </a:prstGeom>
+        </p:spPr>
+        <p:txBody>
+          <a:bodyPr vert="horz" lIns="91440" tIns="45720" rIns="91440" bIns="45720" rtlCol="0"/>
+          <a:lstStyle>
+            <a:lvl1pPr algn="r">
+              <a:defRPr sz="1200"/>
+            </a:lvl1pPr>
+          </a:lstStyle>
+          <a:p>
+            <a:fld id="{4ECA7AEB-E827-8649-82D4-2C358B4AC551}" type="datetimeFigureOut">
+              <a:t>7/14/20</a:t>
+            </a:fld>
+            <a:endParaRPr lang="en-US"/>
+          </a:p>
+        </p:txBody>
+      </p:sp>
+      <p:sp>
+        <p:nvSpPr>
+          <p:cNvPr id="4" name="Slide Image Placeholder 3"/>
+          <p:cNvSpPr>
+            <a:spLocks noGrp="1" noRot="1" noChangeAspect="1"/>
+          </p:cNvSpPr>
+          <p:nvPr>
+            <p:ph type="sldImg" idx="2"/>
+          </p:nvPr>
+        </p:nvSpPr>
+        <p:spPr>
+          <a:xfrm>
+            <a:off x="685800" y="1143000"/>
+            <a:ext cx="5486400" cy="3086100"/>
+          </a:xfrm>
+          <a:prstGeom prst="rect">
+            <a:avLst/>
+          </a:prstGeom>
+          <a:noFill/>
+          <a:ln w="12700">
+            <a:solidFill>
+              <a:prstClr val="black"/>
+            </a:solidFill>
+          </a:ln>
+        </p:spPr>
+        <p:txBody>
+          <a:bodyPr vert="horz" lIns="91440" tIns="45720" rIns="91440" bIns="45720" rtlCol="0" anchor="ctr"/>
+          <a:lstStyle/>
+          <a:p>
+            <a:endParaRPr lang="en-US"/>
+          </a:p>
+        </p:txBody>
+      </p:sp>
+      <p:sp>
+        <p:nvSpPr>
+          <p:cNvPr id="5" name="Notes Placeholder 4"/>
+          <p:cNvSpPr>
+            <a:spLocks noGrp="1"/>
+          </p:cNvSpPr>
+          <p:nvPr>
+            <p:ph type="body" sz="quarter" idx="3"/>
+          </p:nvPr>
+        </p:nvSpPr>
+        <p:spPr>
+          <a:xfrm>
+            <a:off x="685800" y="4400550"/>
+            <a:ext cx="5486400" cy="3600450"/>
+          </a:xfrm>
+          <a:prstGeom prst="rect">
+            <a:avLst/>
+          </a:prstGeom>
+        </p:spPr>
+        <p:txBody>
+          <a:bodyPr vert="horz" lIns="91440" tIns="45720" rIns="91440" bIns="45720" rtlCol="0"/>
+          <a:lstStyle/>
+          <a:p>
+            <a:pPr lvl="0"/>
+            <a:r>
+              <a:rPr lang="en-US"/>
+              <a:t>Click to edit Master text styles</a:t>
+            </a:r>
+          </a:p>
+          <a:p>
+            <a:pPr lvl="1"/>
+            <a:r>
+              <a:rPr lang="en-US"/>
+              <a:t>Second level</a:t>
+            </a:r>
+          </a:p>
+          <a:p>
+            <a:pPr lvl="2"/>
+            <a:r>
+              <a:rPr lang="en-US"/>
+              <a:t>Third level</a:t>
+            </a:r>
+          </a:p>
+          <a:p>
+            <a:pPr lvl="3"/>
+            <a:r>
+              <a:rPr lang="en-US"/>
+              <a:t>Fourth level</a:t>
+            </a:r>
+          </a:p>
+          <a:p>
+            <a:pPr lvl="4"/>
+            <a:r>
+              <a:rPr lang="en-US"/>
+              <a:t>Fifth level</a:t>
+            </a:r>
+          </a:p>
+        </p:txBody>
+      </p:sp>
+      <p:sp>
+        <p:nvSpPr>
+          <p:cNvPr id="6" name="Footer Placeholder 5"/>
+          <p:cNvSpPr>
+            <a:spLocks noGrp="1"/>
+          </p:cNvSpPr>
+          <p:nvPr>
+            <p:ph type="ftr" sz="quarter" idx="4"/>
+          </p:nvPr>
+        </p:nvSpPr>
+        <p:spPr>
+          <a:xfrm>
+            <a:off x="0" y="8685213"/>
+            <a:ext cx="2971800" cy="458787"/>
+          </a:xfrm>
+          <a:prstGeom prst="rect">
+            <a:avLst/>
+          </a:prstGeom>
+        </p:spPr>
+        <p:txBody>
+          <a:bodyPr vert="horz" lIns="91440" tIns="45720" rIns="91440" bIns="45720" rtlCol="0" anchor="b"/>
+          <a:lstStyle>
+            <a:lvl1pPr algn="l">
+              <a:defRPr sz="1200"/>
+            </a:lvl1pPr>
+          </a:lstStyle>
+          <a:p>
+            <a:endParaRPr lang="en-US"/>
+          </a:p>
+        </p:txBody>
+      </p:sp>
+      <p:sp>
+        <p:nvSpPr>
+          <p:cNvPr id="7" name="Slide Number Placeholder 6"/>
+          <p:cNvSpPr>
+            <a:spLocks noGrp="1"/>
+          </p:cNvSpPr>
+          <p:nvPr>
+            <p:ph type="sldNum" sz="quarter" idx="5"/>
+          </p:nvPr>
+        </p:nvSpPr>
+        <p:spPr>
+          <a:xfrm>
+            <a:off x="3884613" y="8685213"/>
+            <a:ext cx="2971800" cy="458787"/>
+          </a:xfrm>
+          <a:prstGeom prst="rect">
+            <a:avLst/>
+          </a:prstGeom>
+        </p:spPr>
+        <p:txBody>
+          <a:bodyPr vert="horz" lIns="91440" tIns="45720" rIns="91440" bIns="45720" rtlCol="0" anchor="b"/>
+          <a:lstStyle>
+            <a:lvl1pPr algn="r">
+              <a:defRPr sz="1200"/>
+            </a:lvl1pPr>
+          </a:lstStyle>
+          <a:p>
+            <a:fld id="{24D41E5E-3965-8744-BE82-B5E340FD3AC4}" type="slidenum">
+              <a:t>‹#›</a:t>
+            </a:fld>
+            <a:endParaRPr lang="en-US"/>
+          </a:p>
+        </p:txBody>
+      </p:sp>
+    </p:spTree>
+    <p:extLst>
+      <p:ext uri="{BB962C8B-B14F-4D97-AF65-F5344CB8AC3E}">
+        <p14:creationId xmlns:p14="http://schemas.microsoft.com/office/powerpoint/2010/main" val="1839986876"/>
+      </p:ext>
+    </p:extLst>
+  </p:cSld>
+  <p:clrMap bg1="lt1" tx1="dk1" bg2="lt2" tx2="dk2" accent1="accent1" accent2="accent2" accent3="accent3" accent4="accent4" accent5="accent5" accent6="accent6" hlink="hlink" folHlink="folHlink"/>
+  <p:notesStyle>
+    <a:lvl1pPr marL="0" algn="l" defTabSz="914400" rtl="0" eaLnBrk="1" latinLnBrk="0" hangingPunct="1">
+      <a:defRPr sz="1200" kern="1200">
+        <a:solidFill>
+          <a:schemeClr val="tx1"/>
+        </a:solidFill>
+        <a:latin typeface="+mn-lt"/>
+        <a:ea typeface="+mn-ea"/>
+        <a:cs typeface="+mn-cs"/>
+      </a:defRPr>
+    </a:lvl1pPr>
+    <a:lvl2pPr marL="457200" algn="l" defTabSz="914400" rtl="0" eaLnBrk="1" latinLnBrk="0" hangingPunct="1">
+      <a:defRPr sz="1200" kern="1200">
+        <a:solidFill>
+          <a:schemeClr val="tx1"/>
+        </a:solidFill>
+        <a:latin typeface="+mn-lt"/>
+        <a:ea typeface="+mn-ea"/>
+        <a:cs typeface="+mn-cs"/>
+      </a:defRPr>
+    </a:lvl2pPr>
+    <a:lvl3pPr marL="914400" algn="l" defTabSz="914400" rtl="0" eaLnBrk="1" latinLnBrk="0" hangingPunct="1">
+      <a:defRPr sz="1200" kern="1200">
+        <a:solidFill>
+          <a:schemeClr val="tx1"/>
+        </a:solidFill>
+        <a:latin typeface="+mn-lt"/>
+        <a:ea typeface="+mn-ea"/>
+        <a:cs typeface="+mn-cs"/>
+      </a:defRPr>
+    </a:lvl3pPr>
+    <a:lvl4pPr marL="1371600" algn="l" defTabSz="914400" rtl="0" eaLnBrk="1" latinLnBrk="0" hangingPunct="1">
+      <a:defRPr sz="1200" kern="1200">
+        <a:solidFill>
+          <a:schemeClr val="tx1"/>
+        </a:solidFill>
+        <a:latin typeface="+mn-lt"/>
+        <a:ea typeface="+mn-ea"/>
+        <a:cs typeface="+mn-cs"/>
+      </a:defRPr>
+    </a:lvl4pPr>
+    <a:lvl5pPr marL="1828800" algn="l" defTabSz="914400" rtl="0" eaLnBrk="1" latinLnBrk="0" hangingPunct="1">
+      <a:defRPr sz="1200" kern="1200">
+        <a:solidFill>
+          <a:schemeClr val="tx1"/>
+        </a:solidFill>
+        <a:latin typeface="+mn-lt"/>
+        <a:ea typeface="+mn-ea"/>
+        <a:cs typeface="+mn-cs"/>
+      </a:defRPr>
+    </a:lvl5pPr>
+    <a:lvl6pPr marL="2286000" algn="l" defTabSz="914400" rtl="0" eaLnBrk="1" latinLnBrk="0" hangingPunct="1">
+      <a:defRPr sz="1200" kern="1200">
+        <a:solidFill>
+          <a:schemeClr val="tx1"/>
+        </a:solidFill>
+        <a:latin typeface="+mn-lt"/>
+        <a:ea typeface="+mn-ea"/>
+        <a:cs typeface="+mn-cs"/>
+      </a:defRPr>
+    </a:lvl6pPr>
+    <a:lvl7pPr marL="2743200" algn="l" defTabSz="914400" rtl="0" eaLnBrk="1" latinLnBrk="0" hangingPunct="1">
+      <a:defRPr sz="1200" kern="1200">
+        <a:solidFill>
+          <a:schemeClr val="tx1"/>
+        </a:solidFill>
+        <a:latin typeface="+mn-lt"/>
+        <a:ea typeface="+mn-ea"/>
+        <a:cs typeface="+mn-cs"/>
+      </a:defRPr>
+    </a:lvl7pPr>
+    <a:lvl8pPr marL="3200400" algn="l" defTabSz="914400" rtl="0" eaLnBrk="1" latinLnBrk="0" hangingPunct="1">
+      <a:defRPr sz="1200" kern="1200">
+        <a:solidFill>
+          <a:schemeClr val="tx1"/>
+        </a:solidFill>
+        <a:latin typeface="+mn-lt"/>
+        <a:ea typeface="+mn-ea"/>
+        <a:cs typeface="+mn-cs"/>
+      </a:defRPr>
+    </a:lvl8pPr>
+    <a:lvl9pPr marL="3657600" algn="l" defTabSz="914400" rtl="0" eaLnBrk="1" latinLnBrk="0" hangingPunct="1">
+      <a:defRPr sz="1200" kern="1200">
+        <a:solidFill>
+          <a:schemeClr val="tx1"/>
+        </a:solidFill>
+        <a:latin typeface="+mn-lt"/>
+        <a:ea typeface="+mn-ea"/>
+        <a:cs typeface="+mn-cs"/>
+      </a:defRPr>
+    </a:lvl9pPr>
+  </p:notesStyle>
+</p:notesMaster>
+</file>
+
 <file path=ppt/slideLayouts/slideLayout1.xml><?xml version="1.0" encoding="utf-8"?>
 <p:sldLayout xmlns:a="http://schemas.openxmlformats.org/drawingml/2006/main" xmlns:r="http://schemas.openxmlformats.org/officeDocument/2006/relationships" xmlns:p="http://schemas.openxmlformats.org/presentationml/2006/main" type="title" preserve="1">
   <p:cSld name="Title Slide">
@@ -3662,7 +4012,7 @@
           <a:p>
             <a:fld id="{846CE7D5-CF57-46EF-B807-FDD0502418D4}" type="datetimeFigureOut">
               <a:rPr lang="en-US" smtClean="0"/>
-              <a:t>7/8/20</a:t>
+              <a:t>7/14/20</a:t>
             </a:fld>
             <a:endParaRPr lang="en-US"/>
           </a:p>
@@ -3832,7 +4182,7 @@
           <a:p>
             <a:fld id="{846CE7D5-CF57-46EF-B807-FDD0502418D4}" type="datetimeFigureOut">
               <a:rPr lang="en-US" smtClean="0"/>
-              <a:t>7/8/20</a:t>
+              <a:t>7/14/20</a:t>
             </a:fld>
             <a:endParaRPr lang="en-US"/>
           </a:p>
@@ -4012,7 +4362,7 @@
           <a:p>
             <a:fld id="{846CE7D5-CF57-46EF-B807-FDD0502418D4}" type="datetimeFigureOut">
               <a:rPr lang="en-US" smtClean="0"/>
-              <a:t>7/8/20</a:t>
+              <a:t>7/14/20</a:t>
             </a:fld>
             <a:endParaRPr lang="en-US"/>
           </a:p>
@@ -4182,7 +4532,7 @@
           <a:p>
             <a:fld id="{846CE7D5-CF57-46EF-B807-FDD0502418D4}" type="datetimeFigureOut">
               <a:rPr lang="en-US" smtClean="0"/>
-              <a:t>7/8/20</a:t>
+              <a:t>7/14/20</a:t>
             </a:fld>
             <a:endParaRPr lang="en-US"/>
           </a:p>
@@ -4428,7 +4778,7 @@
           <a:p>
             <a:fld id="{846CE7D5-CF57-46EF-B807-FDD0502418D4}" type="datetimeFigureOut">
               <a:rPr lang="en-US" smtClean="0"/>
-              <a:t>7/8/20</a:t>
+              <a:t>7/14/20</a:t>
             </a:fld>
             <a:endParaRPr lang="en-US"/>
           </a:p>
@@ -4660,7 +5010,7 @@
           <a:p>
             <a:fld id="{846CE7D5-CF57-46EF-B807-FDD0502418D4}" type="datetimeFigureOut">
               <a:rPr lang="en-US" smtClean="0"/>
-              <a:t>7/8/20</a:t>
+              <a:t>7/14/20</a:t>
             </a:fld>
             <a:endParaRPr lang="en-US"/>
           </a:p>
@@ -5027,7 +5377,7 @@
           <a:p>
             <a:fld id="{846CE7D5-CF57-46EF-B807-FDD0502418D4}" type="datetimeFigureOut">
               <a:rPr lang="en-US" smtClean="0"/>
-              <a:t>7/8/20</a:t>
+              <a:t>7/14/20</a:t>
             </a:fld>
             <a:endParaRPr lang="en-US"/>
           </a:p>
@@ -5145,7 +5495,7 @@
           <a:p>
             <a:fld id="{846CE7D5-CF57-46EF-B807-FDD0502418D4}" type="datetimeFigureOut">
               <a:rPr lang="en-US" smtClean="0"/>
-              <a:t>7/8/20</a:t>
+              <a:t>7/14/20</a:t>
             </a:fld>
             <a:endParaRPr lang="en-US"/>
           </a:p>
@@ -5240,7 +5590,7 @@
           <a:p>
             <a:fld id="{846CE7D5-CF57-46EF-B807-FDD0502418D4}" type="datetimeFigureOut">
               <a:rPr lang="en-US" smtClean="0"/>
-              <a:t>7/8/20</a:t>
+              <a:t>7/14/20</a:t>
             </a:fld>
             <a:endParaRPr lang="en-US"/>
           </a:p>
@@ -5517,7 +5867,7 @@
           <a:p>
             <a:fld id="{846CE7D5-CF57-46EF-B807-FDD0502418D4}" type="datetimeFigureOut">
               <a:rPr lang="en-US" smtClean="0"/>
-              <a:t>7/8/20</a:t>
+              <a:t>7/14/20</a:t>
             </a:fld>
             <a:endParaRPr lang="en-US"/>
           </a:p>
@@ -5774,7 +6124,7 @@
           <a:p>
             <a:fld id="{846CE7D5-CF57-46EF-B807-FDD0502418D4}" type="datetimeFigureOut">
               <a:rPr lang="en-US" smtClean="0"/>
-              <a:t>7/8/20</a:t>
+              <a:t>7/14/20</a:t>
             </a:fld>
             <a:endParaRPr lang="en-US"/>
           </a:p>
@@ -5987,7 +6337,7 @@
           <a:p>
             <a:fld id="{846CE7D5-CF57-46EF-B807-FDD0502418D4}" type="datetimeFigureOut">
               <a:rPr lang="en-US" smtClean="0"/>
-              <a:t>7/8/20</a:t>
+              <a:t>7/14/20</a:t>
             </a:fld>
             <a:endParaRPr lang="en-US"/>
           </a:p>
@@ -6478,7 +6828,7 @@
           <p:cNvPr id="2" name="Title 1">
             <a:extLst>
               <a:ext uri="{FF2B5EF4-FFF2-40B4-BE49-F238E27FC236}">
-                <a16:creationId xmlns:a16="http://schemas.microsoft.com/office/drawing/2014/main" xmlns="" id="{99760F66-ED22-4D99-83D9-AF132B641E2C}"/>
+                <a16:creationId xmlns="" xmlns:a16="http://schemas.microsoft.com/office/drawing/2014/main" id="{99760F66-ED22-4D99-83D9-AF132B641E2C}"/>
               </a:ext>
             </a:extLst>
           </p:cNvPr>
@@ -6509,7 +6859,7 @@
           <p:cNvPr id="4" name="Picture 3" descr="A close up of a logo&#10;&#10;Description generated with very high confidence">
             <a:extLst>
               <a:ext uri="{FF2B5EF4-FFF2-40B4-BE49-F238E27FC236}">
-                <a16:creationId xmlns:a16="http://schemas.microsoft.com/office/drawing/2014/main" xmlns="" id="{6E87F861-F9AC-4F21-B0C8-58EB55E95B97}"/>
+                <a16:creationId xmlns="" xmlns:a16="http://schemas.microsoft.com/office/drawing/2014/main" id="{6E87F861-F9AC-4F21-B0C8-58EB55E95B97}"/>
               </a:ext>
             </a:extLst>
           </p:cNvPr>
@@ -6539,7 +6889,7 @@
           <p:cNvPr id="8" name="Arrow: Down 7">
             <a:extLst>
               <a:ext uri="{FF2B5EF4-FFF2-40B4-BE49-F238E27FC236}">
-                <a16:creationId xmlns:a16="http://schemas.microsoft.com/office/drawing/2014/main" xmlns="" id="{82AB09DD-DB63-4806-A980-AE0CB9781D42}"/>
+                <a16:creationId xmlns="" xmlns:a16="http://schemas.microsoft.com/office/drawing/2014/main" id="{82AB09DD-DB63-4806-A980-AE0CB9781D42}"/>
               </a:ext>
             </a:extLst>
           </p:cNvPr>
@@ -6593,7 +6943,7 @@
           <p:cNvPr id="7" name="Picture 8" descr="A picture containing object, clock, meter&#10;&#10;Description generated with very high confidence">
             <a:extLst>
               <a:ext uri="{FF2B5EF4-FFF2-40B4-BE49-F238E27FC236}">
-                <a16:creationId xmlns:a16="http://schemas.microsoft.com/office/drawing/2014/main" xmlns="" id="{24E34536-1F12-4496-ADBF-5DDFD8BD27B0}"/>
+                <a16:creationId xmlns="" xmlns:a16="http://schemas.microsoft.com/office/drawing/2014/main" id="{24E34536-1F12-4496-ADBF-5DDFD8BD27B0}"/>
               </a:ext>
             </a:extLst>
           </p:cNvPr>
@@ -6623,7 +6973,7 @@
           <p:cNvPr id="10" name="Arrow: Down 9">
             <a:extLst>
               <a:ext uri="{FF2B5EF4-FFF2-40B4-BE49-F238E27FC236}">
-                <a16:creationId xmlns:a16="http://schemas.microsoft.com/office/drawing/2014/main" xmlns="" id="{C0BCF31F-630B-4B9F-8929-EFCB1E78F4C9}"/>
+                <a16:creationId xmlns="" xmlns:a16="http://schemas.microsoft.com/office/drawing/2014/main" id="{C0BCF31F-630B-4B9F-8929-EFCB1E78F4C9}"/>
               </a:ext>
             </a:extLst>
           </p:cNvPr>
@@ -6677,7 +7027,7 @@
           <p:cNvPr id="11" name="TextBox 10">
             <a:extLst>
               <a:ext uri="{FF2B5EF4-FFF2-40B4-BE49-F238E27FC236}">
-                <a16:creationId xmlns:a16="http://schemas.microsoft.com/office/drawing/2014/main" xmlns="" id="{02939EE3-25E8-4AA1-A0EF-AEA68207BAAD}"/>
+                <a16:creationId xmlns="" xmlns:a16="http://schemas.microsoft.com/office/drawing/2014/main" id="{02939EE3-25E8-4AA1-A0EF-AEA68207BAAD}"/>
               </a:ext>
             </a:extLst>
           </p:cNvPr>
@@ -6740,7 +7090,7 @@
           <p:cNvPr id="12" name="TextBox 11">
             <a:extLst>
               <a:ext uri="{FF2B5EF4-FFF2-40B4-BE49-F238E27FC236}">
-                <a16:creationId xmlns:a16="http://schemas.microsoft.com/office/drawing/2014/main" xmlns="" id="{E8C512F0-66D0-4B8A-B0A7-993EEF9E5139}"/>
+                <a16:creationId xmlns="" xmlns:a16="http://schemas.microsoft.com/office/drawing/2014/main" id="{E8C512F0-66D0-4B8A-B0A7-993EEF9E5139}"/>
               </a:ext>
             </a:extLst>
           </p:cNvPr>
@@ -6799,7 +7149,7 @@
           <p:cNvPr id="13" name="TextBox 12">
             <a:extLst>
               <a:ext uri="{FF2B5EF4-FFF2-40B4-BE49-F238E27FC236}">
-                <a16:creationId xmlns:a16="http://schemas.microsoft.com/office/drawing/2014/main" xmlns="" id="{7E86E019-DB97-4D67-8777-EE3CB4990CA9}"/>
+                <a16:creationId xmlns="" xmlns:a16="http://schemas.microsoft.com/office/drawing/2014/main" id="{7E86E019-DB97-4D67-8777-EE3CB4990CA9}"/>
               </a:ext>
             </a:extLst>
           </p:cNvPr>
@@ -6858,7 +7208,7 @@
           <p:cNvPr id="14" name="Arrow: Right 13">
             <a:extLst>
               <a:ext uri="{FF2B5EF4-FFF2-40B4-BE49-F238E27FC236}">
-                <a16:creationId xmlns:a16="http://schemas.microsoft.com/office/drawing/2014/main" xmlns="" id="{169BB430-EBE9-48D3-BBC7-66B17AF3C24B}"/>
+                <a16:creationId xmlns="" xmlns:a16="http://schemas.microsoft.com/office/drawing/2014/main" id="{169BB430-EBE9-48D3-BBC7-66B17AF3C24B}"/>
               </a:ext>
             </a:extLst>
           </p:cNvPr>
@@ -6902,7 +7252,7 @@
           <p:cNvPr id="15" name="Arrow: Right 14">
             <a:extLst>
               <a:ext uri="{FF2B5EF4-FFF2-40B4-BE49-F238E27FC236}">
-                <a16:creationId xmlns:a16="http://schemas.microsoft.com/office/drawing/2014/main" xmlns="" id="{6E7FAE65-47EA-4920-B326-5A67AA7A8459}"/>
+                <a16:creationId xmlns="" xmlns:a16="http://schemas.microsoft.com/office/drawing/2014/main" id="{6E7FAE65-47EA-4920-B326-5A67AA7A8459}"/>
               </a:ext>
             </a:extLst>
           </p:cNvPr>
@@ -7435,7 +7785,7 @@
           <p:cNvPr id="2" name="Title 1">
             <a:extLst>
               <a:ext uri="{FF2B5EF4-FFF2-40B4-BE49-F238E27FC236}">
-                <a16:creationId xmlns:a16="http://schemas.microsoft.com/office/drawing/2014/main" xmlns="" id="{049D73AB-69AC-4C26-8CC0-8588A649B93D}"/>
+                <a16:creationId xmlns="" xmlns:a16="http://schemas.microsoft.com/office/drawing/2014/main" id="{049D73AB-69AC-4C26-8CC0-8588A649B93D}"/>
               </a:ext>
             </a:extLst>
           </p:cNvPr>
@@ -7466,7 +7816,7 @@
           <p:cNvPr id="3" name="Picture 3" descr="A close up of a logo&#10;&#10;Description generated with very high confidence">
             <a:extLst>
               <a:ext uri="{FF2B5EF4-FFF2-40B4-BE49-F238E27FC236}">
-                <a16:creationId xmlns:a16="http://schemas.microsoft.com/office/drawing/2014/main" xmlns="" id="{F02ACA80-2AC2-480A-B525-77E55A69968C}"/>
+                <a16:creationId xmlns="" xmlns:a16="http://schemas.microsoft.com/office/drawing/2014/main" id="{F02ACA80-2AC2-480A-B525-77E55A69968C}"/>
               </a:ext>
             </a:extLst>
           </p:cNvPr>
@@ -7496,7 +7846,7 @@
           <p:cNvPr id="8" name="TextBox 7">
             <a:extLst>
               <a:ext uri="{FF2B5EF4-FFF2-40B4-BE49-F238E27FC236}">
-                <a16:creationId xmlns:a16="http://schemas.microsoft.com/office/drawing/2014/main" xmlns="" id="{835FC702-9D17-4D93-ADB1-41187423B13D}"/>
+                <a16:creationId xmlns="" xmlns:a16="http://schemas.microsoft.com/office/drawing/2014/main" id="{835FC702-9D17-4D93-ADB1-41187423B13D}"/>
               </a:ext>
             </a:extLst>
           </p:cNvPr>
@@ -7550,7 +7900,7 @@
           <p:cNvPr id="9" name="TextBox 8">
             <a:extLst>
               <a:ext uri="{FF2B5EF4-FFF2-40B4-BE49-F238E27FC236}">
-                <a16:creationId xmlns:a16="http://schemas.microsoft.com/office/drawing/2014/main" xmlns="" id="{37F40EBB-2055-4760-B908-EBF1D946DEBB}"/>
+                <a16:creationId xmlns="" xmlns:a16="http://schemas.microsoft.com/office/drawing/2014/main" id="{37F40EBB-2055-4760-B908-EBF1D946DEBB}"/>
               </a:ext>
             </a:extLst>
           </p:cNvPr>
@@ -7700,7 +8050,7 @@
           <p:cNvPr id="2" name="Title 1">
             <a:extLst>
               <a:ext uri="{FF2B5EF4-FFF2-40B4-BE49-F238E27FC236}">
-                <a16:creationId xmlns:a16="http://schemas.microsoft.com/office/drawing/2014/main" xmlns="" id="{087C7EC8-1E92-40CF-90E0-1A53D90D6843}"/>
+                <a16:creationId xmlns="" xmlns:a16="http://schemas.microsoft.com/office/drawing/2014/main" id="{087C7EC8-1E92-40CF-90E0-1A53D90D6843}"/>
               </a:ext>
             </a:extLst>
           </p:cNvPr>
@@ -7796,7 +8146,7 @@
           <p:cNvPr id="6" name="TextBox 5">
             <a:extLst>
               <a:ext uri="{FF2B5EF4-FFF2-40B4-BE49-F238E27FC236}">
-                <a16:creationId xmlns:a16="http://schemas.microsoft.com/office/drawing/2014/main" xmlns="" id="{835FC702-9D17-4D93-ADB1-41187423B13D}"/>
+                <a16:creationId xmlns="" xmlns:a16="http://schemas.microsoft.com/office/drawing/2014/main" id="{835FC702-9D17-4D93-ADB1-41187423B13D}"/>
               </a:ext>
             </a:extLst>
           </p:cNvPr>
@@ -7970,7 +8320,7 @@
           <p:cNvPr id="14" name="Left Brace 13">
             <a:extLst>
               <a:ext uri="{FF2B5EF4-FFF2-40B4-BE49-F238E27FC236}">
-                <a16:creationId xmlns:a16="http://schemas.microsoft.com/office/drawing/2014/main" xmlns="" id="{B0FCB8FB-0BF8-4D3B-A796-DF6C215E4800}"/>
+                <a16:creationId xmlns="" xmlns:a16="http://schemas.microsoft.com/office/drawing/2014/main" id="{B0FCB8FB-0BF8-4D3B-A796-DF6C215E4800}"/>
               </a:ext>
             </a:extLst>
           </p:cNvPr>
@@ -8022,7 +8372,7 @@
           <p:cNvPr id="15" name="Left Brace 14">
             <a:extLst>
               <a:ext uri="{FF2B5EF4-FFF2-40B4-BE49-F238E27FC236}">
-                <a16:creationId xmlns:a16="http://schemas.microsoft.com/office/drawing/2014/main" xmlns="" id="{B0FCB8FB-0BF8-4D3B-A796-DF6C215E4800}"/>
+                <a16:creationId xmlns="" xmlns:a16="http://schemas.microsoft.com/office/drawing/2014/main" id="{B0FCB8FB-0BF8-4D3B-A796-DF6C215E4800}"/>
               </a:ext>
             </a:extLst>
           </p:cNvPr>
@@ -8377,7 +8727,7 @@
           <p:cNvPr id="2" name="Title 1">
             <a:extLst>
               <a:ext uri="{FF2B5EF4-FFF2-40B4-BE49-F238E27FC236}">
-                <a16:creationId xmlns:a16="http://schemas.microsoft.com/office/drawing/2014/main" xmlns="" id="{087C7EC8-1E92-40CF-90E0-1A53D90D6843}"/>
+                <a16:creationId xmlns="" xmlns:a16="http://schemas.microsoft.com/office/drawing/2014/main" id="{087C7EC8-1E92-40CF-90E0-1A53D90D6843}"/>
               </a:ext>
             </a:extLst>
           </p:cNvPr>
@@ -8443,7 +8793,7 @@
           <p:cNvPr id="8" name="TextBox 7">
             <a:extLst>
               <a:ext uri="{FF2B5EF4-FFF2-40B4-BE49-F238E27FC236}">
-                <a16:creationId xmlns:a16="http://schemas.microsoft.com/office/drawing/2014/main" xmlns="" id="{37F40EBB-2055-4760-B908-EBF1D946DEBB}"/>
+                <a16:creationId xmlns="" xmlns:a16="http://schemas.microsoft.com/office/drawing/2014/main" id="{37F40EBB-2055-4760-B908-EBF1D946DEBB}"/>
               </a:ext>
             </a:extLst>
           </p:cNvPr>
@@ -8587,7 +8937,7 @@
           <p:cNvPr id="18" name="Arrow: Right 47">
             <a:extLst>
               <a:ext uri="{FF2B5EF4-FFF2-40B4-BE49-F238E27FC236}">
-                <a16:creationId xmlns:a16="http://schemas.microsoft.com/office/drawing/2014/main" xmlns="" id="{2D05F327-8A08-41D8-93AF-95C1FFD2CEA2}"/>
+                <a16:creationId xmlns="" xmlns:a16="http://schemas.microsoft.com/office/drawing/2014/main" id="{2D05F327-8A08-41D8-93AF-95C1FFD2CEA2}"/>
               </a:ext>
             </a:extLst>
           </p:cNvPr>
@@ -9016,7 +9366,7 @@
           <p:cNvPr id="2" name="Title 1">
             <a:extLst>
               <a:ext uri="{FF2B5EF4-FFF2-40B4-BE49-F238E27FC236}">
-                <a16:creationId xmlns:a16="http://schemas.microsoft.com/office/drawing/2014/main" xmlns="" id="{087C7EC8-1E92-40CF-90E0-1A53D90D6843}"/>
+                <a16:creationId xmlns="" xmlns:a16="http://schemas.microsoft.com/office/drawing/2014/main" id="{087C7EC8-1E92-40CF-90E0-1A53D90D6843}"/>
               </a:ext>
             </a:extLst>
           </p:cNvPr>
@@ -9082,7 +9432,7 @@
           <p:cNvPr id="8" name="TextBox 7">
             <a:extLst>
               <a:ext uri="{FF2B5EF4-FFF2-40B4-BE49-F238E27FC236}">
-                <a16:creationId xmlns:a16="http://schemas.microsoft.com/office/drawing/2014/main" xmlns="" id="{37F40EBB-2055-4760-B908-EBF1D946DEBB}"/>
+                <a16:creationId xmlns="" xmlns:a16="http://schemas.microsoft.com/office/drawing/2014/main" id="{37F40EBB-2055-4760-B908-EBF1D946DEBB}"/>
               </a:ext>
             </a:extLst>
           </p:cNvPr>
@@ -9226,7 +9576,7 @@
           <p:cNvPr id="24" name="TextBox 23">
             <a:extLst>
               <a:ext uri="{FF2B5EF4-FFF2-40B4-BE49-F238E27FC236}">
-                <a16:creationId xmlns:a16="http://schemas.microsoft.com/office/drawing/2014/main" xmlns="" id="{02939EE3-25E8-4AA1-A0EF-AEA68207BAAD}"/>
+                <a16:creationId xmlns="" xmlns:a16="http://schemas.microsoft.com/office/drawing/2014/main" id="{02939EE3-25E8-4AA1-A0EF-AEA68207BAAD}"/>
               </a:ext>
             </a:extLst>
           </p:cNvPr>
@@ -9638,7 +9988,7 @@
           <p:cNvPr id="2" name="Title 1">
             <a:extLst>
               <a:ext uri="{FF2B5EF4-FFF2-40B4-BE49-F238E27FC236}">
-                <a16:creationId xmlns:a16="http://schemas.microsoft.com/office/drawing/2014/main" xmlns="" id="{087C7EC8-1E92-40CF-90E0-1A53D90D6843}"/>
+                <a16:creationId xmlns="" xmlns:a16="http://schemas.microsoft.com/office/drawing/2014/main" id="{087C7EC8-1E92-40CF-90E0-1A53D90D6843}"/>
               </a:ext>
             </a:extLst>
           </p:cNvPr>
@@ -9902,7 +10252,7 @@
           <p:cNvPr id="14" name="TextBox 13">
             <a:extLst>
               <a:ext uri="{FF2B5EF4-FFF2-40B4-BE49-F238E27FC236}">
-                <a16:creationId xmlns:a16="http://schemas.microsoft.com/office/drawing/2014/main" xmlns="" id="{37F40EBB-2055-4760-B908-EBF1D946DEBB}"/>
+                <a16:creationId xmlns="" xmlns:a16="http://schemas.microsoft.com/office/drawing/2014/main" id="{37F40EBB-2055-4760-B908-EBF1D946DEBB}"/>
               </a:ext>
             </a:extLst>
           </p:cNvPr>
@@ -9956,7 +10306,7 @@
           <p:cNvPr id="15" name="TextBox 14">
             <a:extLst>
               <a:ext uri="{FF2B5EF4-FFF2-40B4-BE49-F238E27FC236}">
-                <a16:creationId xmlns:a16="http://schemas.microsoft.com/office/drawing/2014/main" xmlns="" id="{835FC702-9D17-4D93-ADB1-41187423B13D}"/>
+                <a16:creationId xmlns="" xmlns:a16="http://schemas.microsoft.com/office/drawing/2014/main" id="{835FC702-9D17-4D93-ADB1-41187423B13D}"/>
               </a:ext>
             </a:extLst>
           </p:cNvPr>
@@ -10328,7 +10678,7 @@
           <p:cNvPr id="2" name="Title 1">
             <a:extLst>
               <a:ext uri="{FF2B5EF4-FFF2-40B4-BE49-F238E27FC236}">
-                <a16:creationId xmlns:a16="http://schemas.microsoft.com/office/drawing/2014/main" xmlns="" id="{9D61FA45-C005-4B51-BCE8-53CB92897839}"/>
+                <a16:creationId xmlns="" xmlns:a16="http://schemas.microsoft.com/office/drawing/2014/main" id="{9D61FA45-C005-4B51-BCE8-53CB92897839}"/>
               </a:ext>
             </a:extLst>
           </p:cNvPr>
@@ -10359,7 +10709,7 @@
           <p:cNvPr id="5" name="Picture 5" descr="A close up of a sign&#10;&#10;Description generated with very high confidence">
             <a:extLst>
               <a:ext uri="{FF2B5EF4-FFF2-40B4-BE49-F238E27FC236}">
-                <a16:creationId xmlns:a16="http://schemas.microsoft.com/office/drawing/2014/main" xmlns="" id="{974CF11A-D544-4A6E-BD08-1F17C99FC2DA}"/>
+                <a16:creationId xmlns="" xmlns:a16="http://schemas.microsoft.com/office/drawing/2014/main" id="{974CF11A-D544-4A6E-BD08-1F17C99FC2DA}"/>
               </a:ext>
             </a:extLst>
           </p:cNvPr>
@@ -10389,7 +10739,7 @@
           <p:cNvPr id="7" name="Picture 7" descr="A close up of a logo&#10;&#10;Description generated with very high confidence">
             <a:extLst>
               <a:ext uri="{FF2B5EF4-FFF2-40B4-BE49-F238E27FC236}">
-                <a16:creationId xmlns:a16="http://schemas.microsoft.com/office/drawing/2014/main" xmlns="" id="{0D9DF479-3D2A-4F0E-B4D7-A7FD23103304}"/>
+                <a16:creationId xmlns="" xmlns:a16="http://schemas.microsoft.com/office/drawing/2014/main" id="{0D9DF479-3D2A-4F0E-B4D7-A7FD23103304}"/>
               </a:ext>
             </a:extLst>
           </p:cNvPr>
@@ -10419,7 +10769,7 @@
           <p:cNvPr id="10" name="TextBox 9">
             <a:extLst>
               <a:ext uri="{FF2B5EF4-FFF2-40B4-BE49-F238E27FC236}">
-                <a16:creationId xmlns:a16="http://schemas.microsoft.com/office/drawing/2014/main" xmlns="" id="{22CD767A-B4EC-4BF1-9ED3-D71A5E3C700F}"/>
+                <a16:creationId xmlns="" xmlns:a16="http://schemas.microsoft.com/office/drawing/2014/main" id="{22CD767A-B4EC-4BF1-9ED3-D71A5E3C700F}"/>
               </a:ext>
             </a:extLst>
           </p:cNvPr>
@@ -10460,7 +10810,7 @@
           <p:cNvPr id="6" name="TextBox 5">
             <a:extLst>
               <a:ext uri="{FF2B5EF4-FFF2-40B4-BE49-F238E27FC236}">
-                <a16:creationId xmlns:a16="http://schemas.microsoft.com/office/drawing/2014/main" xmlns="" id="{16A576E4-CB05-410A-A7B7-E1D5082BB440}"/>
+                <a16:creationId xmlns="" xmlns:a16="http://schemas.microsoft.com/office/drawing/2014/main" id="{16A576E4-CB05-410A-A7B7-E1D5082BB440}"/>
               </a:ext>
             </a:extLst>
           </p:cNvPr>
@@ -10501,7 +10851,7 @@
           <p:cNvPr id="4" name="TextBox 3">
             <a:extLst>
               <a:ext uri="{FF2B5EF4-FFF2-40B4-BE49-F238E27FC236}">
-                <a16:creationId xmlns:a16="http://schemas.microsoft.com/office/drawing/2014/main" xmlns="" id="{250592F7-BF1B-4D15-B7BE-568378A0093B}"/>
+                <a16:creationId xmlns="" xmlns:a16="http://schemas.microsoft.com/office/drawing/2014/main" id="{250592F7-BF1B-4D15-B7BE-568378A0093B}"/>
               </a:ext>
             </a:extLst>
           </p:cNvPr>
@@ -10555,7 +10905,7 @@
           <p:cNvPr id="14" name="TextBox 13">
             <a:extLst>
               <a:ext uri="{FF2B5EF4-FFF2-40B4-BE49-F238E27FC236}">
-                <a16:creationId xmlns:a16="http://schemas.microsoft.com/office/drawing/2014/main" xmlns="" id="{686536B4-EF0B-4FEC-B9A4-01510F6556F2}"/>
+                <a16:creationId xmlns="" xmlns:a16="http://schemas.microsoft.com/office/drawing/2014/main" id="{686536B4-EF0B-4FEC-B9A4-01510F6556F2}"/>
               </a:ext>
             </a:extLst>
           </p:cNvPr>
@@ -10609,7 +10959,7 @@
           <p:cNvPr id="11" name="TextBox 10">
             <a:extLst>
               <a:ext uri="{FF2B5EF4-FFF2-40B4-BE49-F238E27FC236}">
-                <a16:creationId xmlns:a16="http://schemas.microsoft.com/office/drawing/2014/main" xmlns="" id="{250592F7-BF1B-4D15-B7BE-568378A0093B}"/>
+                <a16:creationId xmlns="" xmlns:a16="http://schemas.microsoft.com/office/drawing/2014/main" id="{250592F7-BF1B-4D15-B7BE-568378A0093B}"/>
               </a:ext>
             </a:extLst>
           </p:cNvPr>
@@ -10663,7 +11013,7 @@
           <p:cNvPr id="15" name="TextBox 14">
             <a:extLst>
               <a:ext uri="{FF2B5EF4-FFF2-40B4-BE49-F238E27FC236}">
-                <a16:creationId xmlns:a16="http://schemas.microsoft.com/office/drawing/2014/main" xmlns="" id="{250592F7-BF1B-4D15-B7BE-568378A0093B}"/>
+                <a16:creationId xmlns="" xmlns:a16="http://schemas.microsoft.com/office/drawing/2014/main" id="{250592F7-BF1B-4D15-B7BE-568378A0093B}"/>
               </a:ext>
             </a:extLst>
           </p:cNvPr>
@@ -10908,7 +11258,7 @@
           <p:cNvPr id="2" name="Title 1">
             <a:extLst>
               <a:ext uri="{FF2B5EF4-FFF2-40B4-BE49-F238E27FC236}">
-                <a16:creationId xmlns:a16="http://schemas.microsoft.com/office/drawing/2014/main" xmlns="" id="{D1E7EFF5-11B8-4F32-8476-49E84585F05A}"/>
+                <a16:creationId xmlns="" xmlns:a16="http://schemas.microsoft.com/office/drawing/2014/main" id="{D1E7EFF5-11B8-4F32-8476-49E84585F05A}"/>
               </a:ext>
             </a:extLst>
           </p:cNvPr>
@@ -10939,7 +11289,7 @@
           <p:cNvPr id="5" name="Picture 5" descr="A close up of a logo&#10;&#10;Description generated with very high confidence">
             <a:extLst>
               <a:ext uri="{FF2B5EF4-FFF2-40B4-BE49-F238E27FC236}">
-                <a16:creationId xmlns:a16="http://schemas.microsoft.com/office/drawing/2014/main" xmlns="" id="{FE49CDEE-6D69-4779-8171-6088CFE5B861}"/>
+                <a16:creationId xmlns="" xmlns:a16="http://schemas.microsoft.com/office/drawing/2014/main" id="{FE49CDEE-6D69-4779-8171-6088CFE5B861}"/>
               </a:ext>
             </a:extLst>
           </p:cNvPr>
@@ -10969,7 +11319,7 @@
           <p:cNvPr id="19" name="Picture 19" descr="A close up of a logo&#10;&#10;Description generated with very high confidence">
             <a:extLst>
               <a:ext uri="{FF2B5EF4-FFF2-40B4-BE49-F238E27FC236}">
-                <a16:creationId xmlns:a16="http://schemas.microsoft.com/office/drawing/2014/main" xmlns="" id="{373E1E67-9DC9-45A9-ABF4-E4C962A52693}"/>
+                <a16:creationId xmlns="" xmlns:a16="http://schemas.microsoft.com/office/drawing/2014/main" id="{373E1E67-9DC9-45A9-ABF4-E4C962A52693}"/>
               </a:ext>
             </a:extLst>
           </p:cNvPr>
@@ -10999,7 +11349,7 @@
           <p:cNvPr id="21" name="Picture 21" descr="A picture containing clock&#10;&#10;Description generated with very high confidence">
             <a:extLst>
               <a:ext uri="{FF2B5EF4-FFF2-40B4-BE49-F238E27FC236}">
-                <a16:creationId xmlns:a16="http://schemas.microsoft.com/office/drawing/2014/main" xmlns="" id="{FF232AEA-FD06-4CA8-8824-5AC34E209566}"/>
+                <a16:creationId xmlns="" xmlns:a16="http://schemas.microsoft.com/office/drawing/2014/main" id="{FF232AEA-FD06-4CA8-8824-5AC34E209566}"/>
               </a:ext>
             </a:extLst>
           </p:cNvPr>
@@ -11029,7 +11379,7 @@
           <p:cNvPr id="23" name="Picture 23">
             <a:extLst>
               <a:ext uri="{FF2B5EF4-FFF2-40B4-BE49-F238E27FC236}">
-                <a16:creationId xmlns:a16="http://schemas.microsoft.com/office/drawing/2014/main" xmlns="" id="{2B879844-8BE1-4CCE-88B8-10531FB57445}"/>
+                <a16:creationId xmlns="" xmlns:a16="http://schemas.microsoft.com/office/drawing/2014/main" id="{2B879844-8BE1-4CCE-88B8-10531FB57445}"/>
               </a:ext>
             </a:extLst>
           </p:cNvPr>
@@ -11059,7 +11409,7 @@
           <p:cNvPr id="25" name="Picture 25" descr="A picture containing clock, traffic, street&#10;&#10;Description generated with very high confidence">
             <a:extLst>
               <a:ext uri="{FF2B5EF4-FFF2-40B4-BE49-F238E27FC236}">
-                <a16:creationId xmlns:a16="http://schemas.microsoft.com/office/drawing/2014/main" xmlns="" id="{31C4CA6E-64D5-4644-A0B0-E7F77CB31720}"/>
+                <a16:creationId xmlns="" xmlns:a16="http://schemas.microsoft.com/office/drawing/2014/main" id="{31C4CA6E-64D5-4644-A0B0-E7F77CB31720}"/>
               </a:ext>
             </a:extLst>
           </p:cNvPr>
@@ -11089,7 +11439,7 @@
           <p:cNvPr id="27" name="Picture 27" descr="A picture containing clock&#10;&#10;Description generated with very high confidence">
             <a:extLst>
               <a:ext uri="{FF2B5EF4-FFF2-40B4-BE49-F238E27FC236}">
-                <a16:creationId xmlns:a16="http://schemas.microsoft.com/office/drawing/2014/main" xmlns="" id="{47AD4336-E823-420A-8B46-C5DF09A594FB}"/>
+                <a16:creationId xmlns="" xmlns:a16="http://schemas.microsoft.com/office/drawing/2014/main" id="{47AD4336-E823-420A-8B46-C5DF09A594FB}"/>
               </a:ext>
             </a:extLst>
           </p:cNvPr>
@@ -11119,7 +11469,7 @@
           <p:cNvPr id="31" name="Picture 31">
             <a:extLst>
               <a:ext uri="{FF2B5EF4-FFF2-40B4-BE49-F238E27FC236}">
-                <a16:creationId xmlns:a16="http://schemas.microsoft.com/office/drawing/2014/main" xmlns="" id="{CF195AAB-5B37-4012-A55E-F21CB6F4AE21}"/>
+                <a16:creationId xmlns="" xmlns:a16="http://schemas.microsoft.com/office/drawing/2014/main" id="{CF195AAB-5B37-4012-A55E-F21CB6F4AE21}"/>
               </a:ext>
             </a:extLst>
           </p:cNvPr>
@@ -11149,7 +11499,7 @@
           <p:cNvPr id="33" name="Picture 33">
             <a:extLst>
               <a:ext uri="{FF2B5EF4-FFF2-40B4-BE49-F238E27FC236}">
-                <a16:creationId xmlns:a16="http://schemas.microsoft.com/office/drawing/2014/main" xmlns="" id="{A42BFE66-B805-45F0-AC9C-33C7A041FC28}"/>
+                <a16:creationId xmlns="" xmlns:a16="http://schemas.microsoft.com/office/drawing/2014/main" id="{A42BFE66-B805-45F0-AC9C-33C7A041FC28}"/>
               </a:ext>
             </a:extLst>
           </p:cNvPr>
@@ -11179,7 +11529,7 @@
           <p:cNvPr id="38" name="Arrow: Up-Down 37">
             <a:extLst>
               <a:ext uri="{FF2B5EF4-FFF2-40B4-BE49-F238E27FC236}">
-                <a16:creationId xmlns:a16="http://schemas.microsoft.com/office/drawing/2014/main" xmlns="" id="{E9C791D2-D3ED-4C76-A4FB-9E49E9BC2A8C}"/>
+                <a16:creationId xmlns="" xmlns:a16="http://schemas.microsoft.com/office/drawing/2014/main" id="{E9C791D2-D3ED-4C76-A4FB-9E49E9BC2A8C}"/>
               </a:ext>
             </a:extLst>
           </p:cNvPr>
@@ -11239,7 +11589,7 @@
           <p:cNvPr id="39" name="Arrow: Up-Down 38">
             <a:extLst>
               <a:ext uri="{FF2B5EF4-FFF2-40B4-BE49-F238E27FC236}">
-                <a16:creationId xmlns:a16="http://schemas.microsoft.com/office/drawing/2014/main" xmlns="" id="{3CA03F87-6632-40D2-B199-A96D1396CA2E}"/>
+                <a16:creationId xmlns="" xmlns:a16="http://schemas.microsoft.com/office/drawing/2014/main" id="{3CA03F87-6632-40D2-B199-A96D1396CA2E}"/>
               </a:ext>
             </a:extLst>
           </p:cNvPr>
@@ -11299,7 +11649,7 @@
           <p:cNvPr id="40" name="Arrow: Up-Down 39">
             <a:extLst>
               <a:ext uri="{FF2B5EF4-FFF2-40B4-BE49-F238E27FC236}">
-                <a16:creationId xmlns:a16="http://schemas.microsoft.com/office/drawing/2014/main" xmlns="" id="{B1C9AD59-4552-405C-A60E-18BD55E874C3}"/>
+                <a16:creationId xmlns="" xmlns:a16="http://schemas.microsoft.com/office/drawing/2014/main" id="{B1C9AD59-4552-405C-A60E-18BD55E874C3}"/>
               </a:ext>
             </a:extLst>
           </p:cNvPr>
@@ -11359,7 +11709,7 @@
           <p:cNvPr id="41" name="Arrow: Up-Down 40">
             <a:extLst>
               <a:ext uri="{FF2B5EF4-FFF2-40B4-BE49-F238E27FC236}">
-                <a16:creationId xmlns:a16="http://schemas.microsoft.com/office/drawing/2014/main" xmlns="" id="{C9EC8E87-D8C8-4D1C-9357-BBC1276FAB13}"/>
+                <a16:creationId xmlns="" xmlns:a16="http://schemas.microsoft.com/office/drawing/2014/main" id="{C9EC8E87-D8C8-4D1C-9357-BBC1276FAB13}"/>
               </a:ext>
             </a:extLst>
           </p:cNvPr>
@@ -11419,7 +11769,7 @@
           <p:cNvPr id="42" name="TextBox 41">
             <a:extLst>
               <a:ext uri="{FF2B5EF4-FFF2-40B4-BE49-F238E27FC236}">
-                <a16:creationId xmlns:a16="http://schemas.microsoft.com/office/drawing/2014/main" xmlns="" id="{32A4F61E-5D45-4050-9E11-874E0112D5BC}"/>
+                <a16:creationId xmlns="" xmlns:a16="http://schemas.microsoft.com/office/drawing/2014/main" id="{32A4F61E-5D45-4050-9E11-874E0112D5BC}"/>
               </a:ext>
             </a:extLst>
           </p:cNvPr>
@@ -11467,7 +11817,7 @@
           <p:cNvPr id="44" name="Picture 44" descr="A close up of a logo&#10;&#10;Description generated with very high confidence">
             <a:extLst>
               <a:ext uri="{FF2B5EF4-FFF2-40B4-BE49-F238E27FC236}">
-                <a16:creationId xmlns:a16="http://schemas.microsoft.com/office/drawing/2014/main" xmlns="" id="{C6EEF647-02C4-4AB2-8E03-C31475DC8075}"/>
+                <a16:creationId xmlns="" xmlns:a16="http://schemas.microsoft.com/office/drawing/2014/main" id="{C6EEF647-02C4-4AB2-8E03-C31475DC8075}"/>
               </a:ext>
             </a:extLst>
           </p:cNvPr>
@@ -11497,7 +11847,7 @@
           <p:cNvPr id="48" name="Arrow: Left-Right 47">
             <a:extLst>
               <a:ext uri="{FF2B5EF4-FFF2-40B4-BE49-F238E27FC236}">
-                <a16:creationId xmlns:a16="http://schemas.microsoft.com/office/drawing/2014/main" xmlns="" id="{7C21C0E3-9C9C-4326-9824-2DC17174A4D2}"/>
+                <a16:creationId xmlns="" xmlns:a16="http://schemas.microsoft.com/office/drawing/2014/main" id="{7C21C0E3-9C9C-4326-9824-2DC17174A4D2}"/>
               </a:ext>
             </a:extLst>
           </p:cNvPr>
@@ -11551,7 +11901,7 @@
           <p:cNvPr id="49" name="TextBox 48">
             <a:extLst>
               <a:ext uri="{FF2B5EF4-FFF2-40B4-BE49-F238E27FC236}">
-                <a16:creationId xmlns:a16="http://schemas.microsoft.com/office/drawing/2014/main" xmlns="" id="{8592CD3C-3310-4584-80B6-52CFA75970D9}"/>
+                <a16:creationId xmlns="" xmlns:a16="http://schemas.microsoft.com/office/drawing/2014/main" id="{8592CD3C-3310-4584-80B6-52CFA75970D9}"/>
               </a:ext>
             </a:extLst>
           </p:cNvPr>
@@ -11593,7 +11943,7 @@
           <p:cNvPr id="53" name="TextBox 52">
             <a:extLst>
               <a:ext uri="{FF2B5EF4-FFF2-40B4-BE49-F238E27FC236}">
-                <a16:creationId xmlns:a16="http://schemas.microsoft.com/office/drawing/2014/main" xmlns="" id="{721FC622-66BA-4ABB-8445-B59337E8241B}"/>
+                <a16:creationId xmlns="" xmlns:a16="http://schemas.microsoft.com/office/drawing/2014/main" id="{721FC622-66BA-4ABB-8445-B59337E8241B}"/>
               </a:ext>
             </a:extLst>
           </p:cNvPr>
@@ -11641,7 +11991,7 @@
           <p:cNvPr id="54" name="Picture 54" descr="A picture containing flower&#10;&#10;Description generated with very high confidence">
             <a:extLst>
               <a:ext uri="{FF2B5EF4-FFF2-40B4-BE49-F238E27FC236}">
-                <a16:creationId xmlns:a16="http://schemas.microsoft.com/office/drawing/2014/main" xmlns="" id="{1D0A2DA2-D53F-4BBC-94F9-9BF85BC8CF6E}"/>
+                <a16:creationId xmlns="" xmlns:a16="http://schemas.microsoft.com/office/drawing/2014/main" id="{1D0A2DA2-D53F-4BBC-94F9-9BF85BC8CF6E}"/>
               </a:ext>
             </a:extLst>
           </p:cNvPr>
@@ -11671,7 +12021,7 @@
           <p:cNvPr id="56" name="Picture 56">
             <a:extLst>
               <a:ext uri="{FF2B5EF4-FFF2-40B4-BE49-F238E27FC236}">
-                <a16:creationId xmlns:a16="http://schemas.microsoft.com/office/drawing/2014/main" xmlns="" id="{FFE612E4-785B-43FB-8986-D173D313736D}"/>
+                <a16:creationId xmlns="" xmlns:a16="http://schemas.microsoft.com/office/drawing/2014/main" id="{FFE612E4-785B-43FB-8986-D173D313736D}"/>
               </a:ext>
             </a:extLst>
           </p:cNvPr>
@@ -11701,7 +12051,7 @@
           <p:cNvPr id="58" name="Picture 58">
             <a:extLst>
               <a:ext uri="{FF2B5EF4-FFF2-40B4-BE49-F238E27FC236}">
-                <a16:creationId xmlns:a16="http://schemas.microsoft.com/office/drawing/2014/main" xmlns="" id="{A1894F98-FBC1-4EA9-AE3E-E924B620D6B5}"/>
+                <a16:creationId xmlns="" xmlns:a16="http://schemas.microsoft.com/office/drawing/2014/main" id="{A1894F98-FBC1-4EA9-AE3E-E924B620D6B5}"/>
               </a:ext>
             </a:extLst>
           </p:cNvPr>
@@ -11731,7 +12081,7 @@
           <p:cNvPr id="60" name="Straight Arrow Connector 59">
             <a:extLst>
               <a:ext uri="{FF2B5EF4-FFF2-40B4-BE49-F238E27FC236}">
-                <a16:creationId xmlns:a16="http://schemas.microsoft.com/office/drawing/2014/main" xmlns="" id="{81909CDE-C273-43DE-B727-BB2E4824E638}"/>
+                <a16:creationId xmlns="" xmlns:a16="http://schemas.microsoft.com/office/drawing/2014/main" id="{81909CDE-C273-43DE-B727-BB2E4824E638}"/>
               </a:ext>
             </a:extLst>
           </p:cNvPr>
@@ -11776,7 +12126,7 @@
           <p:cNvPr id="63" name="Straight Arrow Connector 62">
             <a:extLst>
               <a:ext uri="{FF2B5EF4-FFF2-40B4-BE49-F238E27FC236}">
-                <a16:creationId xmlns:a16="http://schemas.microsoft.com/office/drawing/2014/main" xmlns="" id="{5B14458C-B165-430E-9B2E-624426981001}"/>
+                <a16:creationId xmlns="" xmlns:a16="http://schemas.microsoft.com/office/drawing/2014/main" id="{5B14458C-B165-430E-9B2E-624426981001}"/>
               </a:ext>
             </a:extLst>
           </p:cNvPr>
@@ -11823,7 +12173,7 @@
           <p:cNvPr id="65" name="Arrow: Up-Down 64">
             <a:extLst>
               <a:ext uri="{FF2B5EF4-FFF2-40B4-BE49-F238E27FC236}">
-                <a16:creationId xmlns:a16="http://schemas.microsoft.com/office/drawing/2014/main" xmlns="" id="{CEEDAC1F-3995-48A3-95AC-4360D2B63AA4}"/>
+                <a16:creationId xmlns="" xmlns:a16="http://schemas.microsoft.com/office/drawing/2014/main" id="{CEEDAC1F-3995-48A3-95AC-4360D2B63AA4}"/>
               </a:ext>
             </a:extLst>
           </p:cNvPr>
@@ -11883,7 +12233,7 @@
           <p:cNvPr id="66" name="Arrow: Up-Down 65">
             <a:extLst>
               <a:ext uri="{FF2B5EF4-FFF2-40B4-BE49-F238E27FC236}">
-                <a16:creationId xmlns:a16="http://schemas.microsoft.com/office/drawing/2014/main" xmlns="" id="{C0DDF17E-1D11-4EE6-AAA2-86EDEBC92981}"/>
+                <a16:creationId xmlns="" xmlns:a16="http://schemas.microsoft.com/office/drawing/2014/main" id="{C0DDF17E-1D11-4EE6-AAA2-86EDEBC92981}"/>
               </a:ext>
             </a:extLst>
           </p:cNvPr>
@@ -11943,7 +12293,7 @@
           <p:cNvPr id="67" name="Arrow: Up-Down 66">
             <a:extLst>
               <a:ext uri="{FF2B5EF4-FFF2-40B4-BE49-F238E27FC236}">
-                <a16:creationId xmlns:a16="http://schemas.microsoft.com/office/drawing/2014/main" xmlns="" id="{1CD6044B-BF46-4164-9D61-B6CF8CEA9E9A}"/>
+                <a16:creationId xmlns="" xmlns:a16="http://schemas.microsoft.com/office/drawing/2014/main" id="{1CD6044B-BF46-4164-9D61-B6CF8CEA9E9A}"/>
               </a:ext>
             </a:extLst>
           </p:cNvPr>
@@ -12003,7 +12353,7 @@
           <p:cNvPr id="68" name="Arrow: Up-Down 67">
             <a:extLst>
               <a:ext uri="{FF2B5EF4-FFF2-40B4-BE49-F238E27FC236}">
-                <a16:creationId xmlns:a16="http://schemas.microsoft.com/office/drawing/2014/main" xmlns="" id="{652AF93C-C14E-450E-886F-105BC03FBA27}"/>
+                <a16:creationId xmlns="" xmlns:a16="http://schemas.microsoft.com/office/drawing/2014/main" id="{652AF93C-C14E-450E-886F-105BC03FBA27}"/>
               </a:ext>
             </a:extLst>
           </p:cNvPr>
@@ -12063,7 +12413,7 @@
           <p:cNvPr id="69" name="Arrow: Left-Right 68">
             <a:extLst>
               <a:ext uri="{FF2B5EF4-FFF2-40B4-BE49-F238E27FC236}">
-                <a16:creationId xmlns:a16="http://schemas.microsoft.com/office/drawing/2014/main" xmlns="" id="{5B885F2F-626B-4C7D-813E-0BE30A16C361}"/>
+                <a16:creationId xmlns="" xmlns:a16="http://schemas.microsoft.com/office/drawing/2014/main" id="{5B885F2F-626B-4C7D-813E-0BE30A16C361}"/>
               </a:ext>
             </a:extLst>
           </p:cNvPr>
@@ -12117,7 +12467,7 @@
           <p:cNvPr id="70" name="TextBox 69">
             <a:extLst>
               <a:ext uri="{FF2B5EF4-FFF2-40B4-BE49-F238E27FC236}">
-                <a16:creationId xmlns:a16="http://schemas.microsoft.com/office/drawing/2014/main" xmlns="" id="{584DD32C-0352-48F3-AC91-52FBC0A26400}"/>
+                <a16:creationId xmlns="" xmlns:a16="http://schemas.microsoft.com/office/drawing/2014/main" id="{584DD32C-0352-48F3-AC91-52FBC0A26400}"/>
               </a:ext>
             </a:extLst>
           </p:cNvPr>
@@ -12166,7 +12516,7 @@
           <p:cNvPr id="71" name="Picture 71">
             <a:extLst>
               <a:ext uri="{FF2B5EF4-FFF2-40B4-BE49-F238E27FC236}">
-                <a16:creationId xmlns:a16="http://schemas.microsoft.com/office/drawing/2014/main" xmlns="" id="{47FF408E-084C-4485-999E-140D8DD401F5}"/>
+                <a16:creationId xmlns="" xmlns:a16="http://schemas.microsoft.com/office/drawing/2014/main" id="{47FF408E-084C-4485-999E-140D8DD401F5}"/>
               </a:ext>
             </a:extLst>
           </p:cNvPr>
@@ -12196,7 +12546,7 @@
           <p:cNvPr id="35" name="TextBox 34">
             <a:extLst>
               <a:ext uri="{FF2B5EF4-FFF2-40B4-BE49-F238E27FC236}">
-                <a16:creationId xmlns:a16="http://schemas.microsoft.com/office/drawing/2014/main" xmlns="" id="{32A4F61E-5D45-4050-9E11-874E0112D5BC}"/>
+                <a16:creationId xmlns="" xmlns:a16="http://schemas.microsoft.com/office/drawing/2014/main" id="{32A4F61E-5D45-4050-9E11-874E0112D5BC}"/>
               </a:ext>
             </a:extLst>
           </p:cNvPr>
@@ -12244,7 +12594,7 @@
           <p:cNvPr id="36" name="TextBox 35">
             <a:extLst>
               <a:ext uri="{FF2B5EF4-FFF2-40B4-BE49-F238E27FC236}">
-                <a16:creationId xmlns:a16="http://schemas.microsoft.com/office/drawing/2014/main" xmlns="" id="{721FC622-66BA-4ABB-8445-B59337E8241B}"/>
+                <a16:creationId xmlns="" xmlns:a16="http://schemas.microsoft.com/office/drawing/2014/main" id="{721FC622-66BA-4ABB-8445-B59337E8241B}"/>
               </a:ext>
             </a:extLst>
           </p:cNvPr>
@@ -12292,7 +12642,7 @@
           <p:cNvPr id="37" name="Picture 33">
             <a:extLst>
               <a:ext uri="{FF2B5EF4-FFF2-40B4-BE49-F238E27FC236}">
-                <a16:creationId xmlns:a16="http://schemas.microsoft.com/office/drawing/2014/main" xmlns="" id="{A42BFE66-B805-45F0-AC9C-33C7A041FC28}"/>
+                <a16:creationId xmlns="" xmlns:a16="http://schemas.microsoft.com/office/drawing/2014/main" id="{A42BFE66-B805-45F0-AC9C-33C7A041FC28}"/>
               </a:ext>
             </a:extLst>
           </p:cNvPr>
@@ -12322,7 +12672,7 @@
           <p:cNvPr id="45" name="Left Brace 44">
             <a:extLst>
               <a:ext uri="{FF2B5EF4-FFF2-40B4-BE49-F238E27FC236}">
-                <a16:creationId xmlns:a16="http://schemas.microsoft.com/office/drawing/2014/main" xmlns="" id="{878D048C-4583-4231-86E3-AD69D44F351C}"/>
+                <a16:creationId xmlns="" xmlns:a16="http://schemas.microsoft.com/office/drawing/2014/main" id="{878D048C-4583-4231-86E3-AD69D44F351C}"/>
               </a:ext>
             </a:extLst>
           </p:cNvPr>
@@ -12374,7 +12724,7 @@
           <p:cNvPr id="47" name="Left Brace 46">
             <a:extLst>
               <a:ext uri="{FF2B5EF4-FFF2-40B4-BE49-F238E27FC236}">
-                <a16:creationId xmlns:a16="http://schemas.microsoft.com/office/drawing/2014/main" xmlns="" id="{878D048C-4583-4231-86E3-AD69D44F351C}"/>
+                <a16:creationId xmlns="" xmlns:a16="http://schemas.microsoft.com/office/drawing/2014/main" id="{878D048C-4583-4231-86E3-AD69D44F351C}"/>
               </a:ext>
             </a:extLst>
           </p:cNvPr>
@@ -12426,7 +12776,7 @@
           <p:cNvPr id="51" name="Left Brace 50">
             <a:extLst>
               <a:ext uri="{FF2B5EF4-FFF2-40B4-BE49-F238E27FC236}">
-                <a16:creationId xmlns:a16="http://schemas.microsoft.com/office/drawing/2014/main" xmlns="" id="{878D048C-4583-4231-86E3-AD69D44F351C}"/>
+                <a16:creationId xmlns="" xmlns:a16="http://schemas.microsoft.com/office/drawing/2014/main" id="{878D048C-4583-4231-86E3-AD69D44F351C}"/>
               </a:ext>
             </a:extLst>
           </p:cNvPr>
@@ -12478,7 +12828,7 @@
           <p:cNvPr id="52" name="Left Brace 51">
             <a:extLst>
               <a:ext uri="{FF2B5EF4-FFF2-40B4-BE49-F238E27FC236}">
-                <a16:creationId xmlns:a16="http://schemas.microsoft.com/office/drawing/2014/main" xmlns="" id="{878D048C-4583-4231-86E3-AD69D44F351C}"/>
+                <a16:creationId xmlns="" xmlns:a16="http://schemas.microsoft.com/office/drawing/2014/main" id="{878D048C-4583-4231-86E3-AD69D44F351C}"/>
               </a:ext>
             </a:extLst>
           </p:cNvPr>
@@ -13737,7 +14087,7 @@
           <p:cNvPr id="2" name="Title 1">
             <a:extLst>
               <a:ext uri="{FF2B5EF4-FFF2-40B4-BE49-F238E27FC236}">
-                <a16:creationId xmlns:a16="http://schemas.microsoft.com/office/drawing/2014/main" xmlns="" id="{99760F66-ED22-4D99-83D9-AF132B641E2C}"/>
+                <a16:creationId xmlns="" xmlns:a16="http://schemas.microsoft.com/office/drawing/2014/main" id="{99760F66-ED22-4D99-83D9-AF132B641E2C}"/>
               </a:ext>
             </a:extLst>
           </p:cNvPr>
@@ -13768,7 +14118,7 @@
           <p:cNvPr id="4" name="Picture 3" descr="A close up of a logo&#10;&#10;Description generated with very high confidence">
             <a:extLst>
               <a:ext uri="{FF2B5EF4-FFF2-40B4-BE49-F238E27FC236}">
-                <a16:creationId xmlns:a16="http://schemas.microsoft.com/office/drawing/2014/main" xmlns="" id="{6E87F861-F9AC-4F21-B0C8-58EB55E95B97}"/>
+                <a16:creationId xmlns="" xmlns:a16="http://schemas.microsoft.com/office/drawing/2014/main" id="{6E87F861-F9AC-4F21-B0C8-58EB55E95B97}"/>
               </a:ext>
             </a:extLst>
           </p:cNvPr>
@@ -13798,7 +14148,7 @@
           <p:cNvPr id="6" name="Picture 5" descr="A picture containing clock&#10;&#10;Description generated with very high confidence">
             <a:extLst>
               <a:ext uri="{FF2B5EF4-FFF2-40B4-BE49-F238E27FC236}">
-                <a16:creationId xmlns:a16="http://schemas.microsoft.com/office/drawing/2014/main" xmlns="" id="{4616AC99-6BB6-4ADE-BDE8-48395933FE5F}"/>
+                <a16:creationId xmlns="" xmlns:a16="http://schemas.microsoft.com/office/drawing/2014/main" id="{4616AC99-6BB6-4ADE-BDE8-48395933FE5F}"/>
               </a:ext>
             </a:extLst>
           </p:cNvPr>
@@ -13828,7 +14178,7 @@
           <p:cNvPr id="8" name="Arrow: Down 7">
             <a:extLst>
               <a:ext uri="{FF2B5EF4-FFF2-40B4-BE49-F238E27FC236}">
-                <a16:creationId xmlns:a16="http://schemas.microsoft.com/office/drawing/2014/main" xmlns="" id="{82AB09DD-DB63-4806-A980-AE0CB9781D42}"/>
+                <a16:creationId xmlns="" xmlns:a16="http://schemas.microsoft.com/office/drawing/2014/main" id="{82AB09DD-DB63-4806-A980-AE0CB9781D42}"/>
               </a:ext>
             </a:extLst>
           </p:cNvPr>
@@ -13919,7 +14269,7 @@
           <p:cNvPr id="2" name="Title 1">
             <a:extLst>
               <a:ext uri="{FF2B5EF4-FFF2-40B4-BE49-F238E27FC236}">
-                <a16:creationId xmlns:a16="http://schemas.microsoft.com/office/drawing/2014/main" xmlns="" id="{BC492351-3FD5-428F-9D50-3BB66AA31E82}"/>
+                <a16:creationId xmlns="" xmlns:a16="http://schemas.microsoft.com/office/drawing/2014/main" id="{BC492351-3FD5-428F-9D50-3BB66AA31E82}"/>
               </a:ext>
             </a:extLst>
           </p:cNvPr>
@@ -13950,7 +14300,7 @@
           <p:cNvPr id="4" name="Picture 3" descr="A picture containing clock&#10;&#10;Description generated with very high confidence">
             <a:extLst>
               <a:ext uri="{FF2B5EF4-FFF2-40B4-BE49-F238E27FC236}">
-                <a16:creationId xmlns:a16="http://schemas.microsoft.com/office/drawing/2014/main" xmlns="" id="{9AFDBF59-0CA0-43E9-B7BB-7722E9982C54}"/>
+                <a16:creationId xmlns="" xmlns:a16="http://schemas.microsoft.com/office/drawing/2014/main" id="{9AFDBF59-0CA0-43E9-B7BB-7722E9982C54}"/>
               </a:ext>
             </a:extLst>
           </p:cNvPr>
@@ -13985,7 +14335,7 @@
           <p:cNvPr id="28" name="TextBox 27">
             <a:extLst>
               <a:ext uri="{FF2B5EF4-FFF2-40B4-BE49-F238E27FC236}">
-                <a16:creationId xmlns:a16="http://schemas.microsoft.com/office/drawing/2014/main" xmlns="" id="{850ED155-9FB4-40E6-9358-599378ED01A9}"/>
+                <a16:creationId xmlns="" xmlns:a16="http://schemas.microsoft.com/office/drawing/2014/main" id="{850ED155-9FB4-40E6-9358-599378ED01A9}"/>
               </a:ext>
             </a:extLst>
           </p:cNvPr>
@@ -14026,7 +14376,7 @@
           <p:cNvPr id="30" name="Picture 12" descr="A close up of a logo&#10;&#10;Description generated with very high confidence">
             <a:extLst>
               <a:ext uri="{FF2B5EF4-FFF2-40B4-BE49-F238E27FC236}">
-                <a16:creationId xmlns:a16="http://schemas.microsoft.com/office/drawing/2014/main" xmlns="" id="{B22845EF-5901-4C71-934D-3685139CD83C}"/>
+                <a16:creationId xmlns="" xmlns:a16="http://schemas.microsoft.com/office/drawing/2014/main" id="{B22845EF-5901-4C71-934D-3685139CD83C}"/>
               </a:ext>
             </a:extLst>
           </p:cNvPr>
@@ -14061,7 +14411,7 @@
           <p:cNvPr id="33" name="Picture 33" descr="A close up of a logo&#10;&#10;Description generated with very high confidence">
             <a:extLst>
               <a:ext uri="{FF2B5EF4-FFF2-40B4-BE49-F238E27FC236}">
-                <a16:creationId xmlns:a16="http://schemas.microsoft.com/office/drawing/2014/main" xmlns="" id="{6B441168-8849-4DBC-B89C-F689BC14F6E9}"/>
+                <a16:creationId xmlns="" xmlns:a16="http://schemas.microsoft.com/office/drawing/2014/main" id="{6B441168-8849-4DBC-B89C-F689BC14F6E9}"/>
               </a:ext>
             </a:extLst>
           </p:cNvPr>
@@ -14091,7 +14441,7 @@
           <p:cNvPr id="35" name="Picture 35" descr="A picture containing flower&#10;&#10;Description generated with very high confidence">
             <a:extLst>
               <a:ext uri="{FF2B5EF4-FFF2-40B4-BE49-F238E27FC236}">
-                <a16:creationId xmlns:a16="http://schemas.microsoft.com/office/drawing/2014/main" xmlns="" id="{733960A3-062E-4857-9276-DEDCEE0ADF8E}"/>
+                <a16:creationId xmlns="" xmlns:a16="http://schemas.microsoft.com/office/drawing/2014/main" id="{733960A3-062E-4857-9276-DEDCEE0ADF8E}"/>
               </a:ext>
             </a:extLst>
           </p:cNvPr>
@@ -14121,7 +14471,7 @@
           <p:cNvPr id="37" name="Picture 37" descr="A picture containing flower&#10;&#10;Description generated with very high confidence">
             <a:extLst>
               <a:ext uri="{FF2B5EF4-FFF2-40B4-BE49-F238E27FC236}">
-                <a16:creationId xmlns:a16="http://schemas.microsoft.com/office/drawing/2014/main" xmlns="" id="{A7E0387A-69EF-47BE-BD30-07750F005C2E}"/>
+                <a16:creationId xmlns="" xmlns:a16="http://schemas.microsoft.com/office/drawing/2014/main" id="{A7E0387A-69EF-47BE-BD30-07750F005C2E}"/>
               </a:ext>
             </a:extLst>
           </p:cNvPr>
@@ -14151,7 +14501,7 @@
           <p:cNvPr id="39" name="Picture 39" descr="A picture containing flower&#10;&#10;Description generated with very high confidence">
             <a:extLst>
               <a:ext uri="{FF2B5EF4-FFF2-40B4-BE49-F238E27FC236}">
-                <a16:creationId xmlns:a16="http://schemas.microsoft.com/office/drawing/2014/main" xmlns="" id="{43241D24-F842-41E7-ADEB-074666405ED0}"/>
+                <a16:creationId xmlns="" xmlns:a16="http://schemas.microsoft.com/office/drawing/2014/main" id="{43241D24-F842-41E7-ADEB-074666405ED0}"/>
               </a:ext>
             </a:extLst>
           </p:cNvPr>
@@ -14181,7 +14531,7 @@
           <p:cNvPr id="41" name="Picture 41" descr="A close up of a logo&#10;&#10;Description generated with very high confidence">
             <a:extLst>
               <a:ext uri="{FF2B5EF4-FFF2-40B4-BE49-F238E27FC236}">
-                <a16:creationId xmlns:a16="http://schemas.microsoft.com/office/drawing/2014/main" xmlns="" id="{3339BAC3-8264-4532-BCC5-AA61AE38A9E3}"/>
+                <a16:creationId xmlns="" xmlns:a16="http://schemas.microsoft.com/office/drawing/2014/main" id="{3339BAC3-8264-4532-BCC5-AA61AE38A9E3}"/>
               </a:ext>
             </a:extLst>
           </p:cNvPr>
@@ -14211,7 +14561,7 @@
           <p:cNvPr id="43" name="Picture 43" descr="A close up of a logo&#10;&#10;Description generated with very high confidence">
             <a:extLst>
               <a:ext uri="{FF2B5EF4-FFF2-40B4-BE49-F238E27FC236}">
-                <a16:creationId xmlns:a16="http://schemas.microsoft.com/office/drawing/2014/main" xmlns="" id="{148CD550-325D-4286-BCEF-CEC14506D799}"/>
+                <a16:creationId xmlns="" xmlns:a16="http://schemas.microsoft.com/office/drawing/2014/main" id="{148CD550-325D-4286-BCEF-CEC14506D799}"/>
               </a:ext>
             </a:extLst>
           </p:cNvPr>
@@ -14271,7 +14621,7 @@
           <p:cNvPr id="18" name="Left Brace 17">
             <a:extLst>
               <a:ext uri="{FF2B5EF4-FFF2-40B4-BE49-F238E27FC236}">
-                <a16:creationId xmlns:a16="http://schemas.microsoft.com/office/drawing/2014/main" xmlns="" id="{878D048C-4583-4231-86E3-AD69D44F351C}"/>
+                <a16:creationId xmlns="" xmlns:a16="http://schemas.microsoft.com/office/drawing/2014/main" id="{878D048C-4583-4231-86E3-AD69D44F351C}"/>
               </a:ext>
             </a:extLst>
           </p:cNvPr>
@@ -14323,7 +14673,7 @@
           <p:cNvPr id="19" name="Left Brace 18">
             <a:extLst>
               <a:ext uri="{FF2B5EF4-FFF2-40B4-BE49-F238E27FC236}">
-                <a16:creationId xmlns:a16="http://schemas.microsoft.com/office/drawing/2014/main" xmlns="" id="{878D048C-4583-4231-86E3-AD69D44F351C}"/>
+                <a16:creationId xmlns="" xmlns:a16="http://schemas.microsoft.com/office/drawing/2014/main" id="{878D048C-4583-4231-86E3-AD69D44F351C}"/>
               </a:ext>
             </a:extLst>
           </p:cNvPr>
@@ -14435,7 +14785,7 @@
           <p:cNvPr id="25" name="Picture 9" descr="A picture containing drawing&#10;&#10;Description generated with very high confidence">
             <a:extLst>
               <a:ext uri="{FF2B5EF4-FFF2-40B4-BE49-F238E27FC236}">
-                <a16:creationId xmlns:a16="http://schemas.microsoft.com/office/drawing/2014/main" xmlns="" id="{02B44993-3D5D-4B1E-B348-A8AA765D22E8}"/>
+                <a16:creationId xmlns="" xmlns:a16="http://schemas.microsoft.com/office/drawing/2014/main" id="{02B44993-3D5D-4B1E-B348-A8AA765D22E8}"/>
               </a:ext>
             </a:extLst>
           </p:cNvPr>
@@ -14465,7 +14815,7 @@
           <p:cNvPr id="26" name="Picture 11" descr="A picture containing object, clock, meter&#10;&#10;Description generated with very high confidence">
             <a:extLst>
               <a:ext uri="{FF2B5EF4-FFF2-40B4-BE49-F238E27FC236}">
-                <a16:creationId xmlns:a16="http://schemas.microsoft.com/office/drawing/2014/main" xmlns="" id="{50B5677A-E1FB-4742-A2BB-B165C8289492}"/>
+                <a16:creationId xmlns="" xmlns:a16="http://schemas.microsoft.com/office/drawing/2014/main" id="{50B5677A-E1FB-4742-A2BB-B165C8289492}"/>
               </a:ext>
             </a:extLst>
           </p:cNvPr>
@@ -15511,41 +15861,10 @@
       </p:grpSpPr>
       <p:sp>
         <p:nvSpPr>
-          <p:cNvPr id="2" name="Title 1">
+          <p:cNvPr id="7" name="TextBox 6">
             <a:extLst>
               <a:ext uri="{FF2B5EF4-FFF2-40B4-BE49-F238E27FC236}">
-                <a16:creationId xmlns:a16="http://schemas.microsoft.com/office/drawing/2014/main" xmlns="" id="{9B3E31B1-1524-4917-9285-17E913845064}"/>
-              </a:ext>
-            </a:extLst>
-          </p:cNvPr>
-          <p:cNvSpPr>
-            <a:spLocks noGrp="1"/>
-          </p:cNvSpPr>
-          <p:nvPr>
-            <p:ph type="title"/>
-          </p:nvPr>
-        </p:nvSpPr>
-        <p:spPr/>
-        <p:txBody>
-          <a:bodyPr/>
-          <a:lstStyle/>
-          <a:p>
-            <a:r>
-              <a:rPr lang="en-US" dirty="0">
-                <a:cs typeface="Calibri Light"/>
-              </a:rPr>
-              <a:t>Weak duality</a:t>
-            </a:r>
-            <a:endParaRPr lang="en-US" dirty="0"/>
-          </a:p>
-        </p:txBody>
-      </p:sp>
-      <p:sp>
-        <p:nvSpPr>
-          <p:cNvPr id="7" name="TextBox 6">
-            <a:extLst>
-              <a:ext uri="{FF2B5EF4-FFF2-40B4-BE49-F238E27FC236}">
-                <a16:creationId xmlns:a16="http://schemas.microsoft.com/office/drawing/2014/main" xmlns="" id="{3C8D1A93-8E34-461B-AE33-3F2AF8EDEDE3}"/>
+                <a16:creationId xmlns="" xmlns:a16="http://schemas.microsoft.com/office/drawing/2014/main" id="{3C8D1A93-8E34-461B-AE33-3F2AF8EDEDE3}"/>
               </a:ext>
             </a:extLst>
           </p:cNvPr>
@@ -15554,7 +15873,7 @@
         </p:nvSpPr>
         <p:spPr>
           <a:xfrm>
-            <a:off x="1863969" y="1810238"/>
+            <a:off x="2355061" y="528953"/>
             <a:ext cx="1883508" cy="461665"/>
           </a:xfrm>
           <a:prstGeom prst="rect">
@@ -15571,6 +15890,7 @@
           </a:bodyPr>
           <a:lstStyle/>
           <a:p>
+            <a:pPr algn="ctr"/>
             <a:r>
               <a:rPr lang="en-US" sz="2400" b="1" dirty="0"/>
               <a:t>Primal form</a:t>
@@ -15583,10 +15903,10 @@
       </p:sp>
       <p:pic>
         <p:nvPicPr>
-          <p:cNvPr id="12" name="Picture 12" descr="A close up of a logo&#10;&#10;Description generated with very high confidence">
+          <p:cNvPr id="12" name="Picture 12">
             <a:extLst>
               <a:ext uri="{FF2B5EF4-FFF2-40B4-BE49-F238E27FC236}">
-                <a16:creationId xmlns:a16="http://schemas.microsoft.com/office/drawing/2014/main" xmlns="" id="{BCB28C98-A97C-401C-8299-EB6FC4F8EC07}"/>
+                <a16:creationId xmlns="" xmlns:a16="http://schemas.microsoft.com/office/drawing/2014/main" id="{BCB28C98-A97C-401C-8299-EB6FC4F8EC07}"/>
               </a:ext>
             </a:extLst>
           </p:cNvPr>
@@ -15596,15 +15916,21 @@
           <p:nvPr/>
         </p:nvPicPr>
         <p:blipFill>
-          <a:blip r:embed="rId2"/>
+          <a:blip r:embed="rId2">
+            <a:extLst>
+              <a:ext uri="{28A0092B-C50C-407E-A947-70E740481C1C}">
+                <a14:useLocalDpi xmlns:a14="http://schemas.microsoft.com/office/drawing/2010/main" val="0"/>
+              </a:ext>
+            </a:extLst>
+          </a:blip>
           <a:stretch>
             <a:fillRect/>
           </a:stretch>
         </p:blipFill>
         <p:spPr>
           <a:xfrm>
-            <a:off x="1081049" y="2124205"/>
-            <a:ext cx="2672180" cy="1977241"/>
+            <a:off x="1960725" y="936338"/>
+            <a:ext cx="2672180" cy="1806544"/>
           </a:xfrm>
           <a:prstGeom prst="rect">
             <a:avLst/>
@@ -15616,7 +15942,7 @@
           <p:cNvPr id="15" name="TextBox 14">
             <a:extLst>
               <a:ext uri="{FF2B5EF4-FFF2-40B4-BE49-F238E27FC236}">
-                <a16:creationId xmlns:a16="http://schemas.microsoft.com/office/drawing/2014/main" xmlns="" id="{1AAE7903-DA0C-486B-BDC7-ADB80C60CE39}"/>
+                <a16:creationId xmlns="" xmlns:a16="http://schemas.microsoft.com/office/drawing/2014/main" id="{1AAE7903-DA0C-486B-BDC7-ADB80C60CE39}"/>
               </a:ext>
             </a:extLst>
           </p:cNvPr>
@@ -15625,7 +15951,7 @@
         </p:nvSpPr>
         <p:spPr>
           <a:xfrm>
-            <a:off x="6807199" y="1810237"/>
+            <a:off x="7353981" y="528953"/>
             <a:ext cx="1883508" cy="461665"/>
           </a:xfrm>
           <a:prstGeom prst="rect">
@@ -15642,6 +15968,7 @@
           </a:bodyPr>
           <a:lstStyle/>
           <a:p>
+            <a:pPr algn="ctr"/>
             <a:r>
               <a:rPr lang="en-US" sz="2400" b="1" dirty="0"/>
               <a:t>Dual form</a:t>
@@ -15652,10 +15979,10 @@
       </p:sp>
       <p:pic>
         <p:nvPicPr>
-          <p:cNvPr id="16" name="Picture 16" descr="A close up of a logo&#10;&#10;Description generated with very high confidence">
+          <p:cNvPr id="16" name="Picture 16">
             <a:extLst>
               <a:ext uri="{FF2B5EF4-FFF2-40B4-BE49-F238E27FC236}">
-                <a16:creationId xmlns:a16="http://schemas.microsoft.com/office/drawing/2014/main" xmlns="" id="{C7C82433-1251-4B07-9C0F-DB83878FB6CB}"/>
+                <a16:creationId xmlns="" xmlns:a16="http://schemas.microsoft.com/office/drawing/2014/main" id="{C7C82433-1251-4B07-9C0F-DB83878FB6CB}"/>
               </a:ext>
             </a:extLst>
           </p:cNvPr>
@@ -15665,15 +15992,21 @@
           <p:nvPr/>
         </p:nvPicPr>
         <p:blipFill>
-          <a:blip r:embed="rId3"/>
+          <a:blip r:embed="rId3">
+            <a:extLst>
+              <a:ext uri="{28A0092B-C50C-407E-A947-70E740481C1C}">
+                <a14:useLocalDpi xmlns:a14="http://schemas.microsoft.com/office/drawing/2010/main" val="0"/>
+              </a:ext>
+            </a:extLst>
+          </a:blip>
           <a:stretch>
             <a:fillRect/>
           </a:stretch>
         </p:blipFill>
         <p:spPr>
           <a:xfrm>
-            <a:off x="6103622" y="2198426"/>
-            <a:ext cx="2676525" cy="1828800"/>
+            <a:off x="6984079" y="866888"/>
+            <a:ext cx="2676525" cy="1784350"/>
           </a:xfrm>
           <a:prstGeom prst="rect">
             <a:avLst/>
@@ -15685,7 +16018,7 @@
           <p:cNvPr id="32" name="TextBox 31">
             <a:extLst>
               <a:ext uri="{FF2B5EF4-FFF2-40B4-BE49-F238E27FC236}">
-                <a16:creationId xmlns:a16="http://schemas.microsoft.com/office/drawing/2014/main" xmlns="" id="{95FFBCCC-62A7-4B35-95D9-9DDDAD7F90FD}"/>
+                <a16:creationId xmlns="" xmlns:a16="http://schemas.microsoft.com/office/drawing/2014/main" id="{95FFBCCC-62A7-4B35-95D9-9DDDAD7F90FD}"/>
               </a:ext>
             </a:extLst>
           </p:cNvPr>
@@ -15694,8 +16027,8 @@
         </p:nvSpPr>
         <p:spPr>
           <a:xfrm>
-            <a:off x="4417820" y="4252418"/>
-            <a:ext cx="1883508" cy="461665"/>
+            <a:off x="4588269" y="2979203"/>
+            <a:ext cx="3302494" cy="461665"/>
           </a:xfrm>
           <a:prstGeom prst="rect">
             <a:avLst/>
@@ -15711,9 +16044,10 @@
           </a:bodyPr>
           <a:lstStyle/>
           <a:p>
+            <a:pPr algn="ctr"/>
             <a:r>
               <a:rPr lang="en-US" sz="2400" b="1" dirty="0"/>
-              <a:t>Weak duality</a:t>
+              <a:t>Weak duality theorem</a:t>
             </a:r>
             <a:endParaRPr lang="en-US" dirty="0"/>
           </a:p>
@@ -15721,10 +16055,10 @@
       </p:sp>
       <p:pic>
         <p:nvPicPr>
-          <p:cNvPr id="33" name="Picture 33" descr="A close up of a logo&#10;&#10;Description generated with very high confidence">
+          <p:cNvPr id="33" name="Picture 33">
             <a:extLst>
               <a:ext uri="{FF2B5EF4-FFF2-40B4-BE49-F238E27FC236}">
-                <a16:creationId xmlns:a16="http://schemas.microsoft.com/office/drawing/2014/main" xmlns="" id="{38088EDE-D1BD-4D90-BC05-DB9DB49BBAAD}"/>
+                <a16:creationId xmlns="" xmlns:a16="http://schemas.microsoft.com/office/drawing/2014/main" id="{38088EDE-D1BD-4D90-BC05-DB9DB49BBAAD}"/>
               </a:ext>
             </a:extLst>
           </p:cNvPr>
@@ -15734,46 +16068,58 @@
           <p:nvPr/>
         </p:nvPicPr>
         <p:blipFill>
-          <a:blip r:embed="rId4"/>
+          <a:blip r:embed="rId4">
+            <a:extLst>
+              <a:ext uri="{28A0092B-C50C-407E-A947-70E740481C1C}">
+                <a14:useLocalDpi xmlns:a14="http://schemas.microsoft.com/office/drawing/2010/main" val="0"/>
+              </a:ext>
+            </a:extLst>
+          </a:blip>
           <a:stretch>
             <a:fillRect/>
           </a:stretch>
         </p:blipFill>
         <p:spPr>
           <a:xfrm>
-            <a:off x="3446048" y="4717478"/>
-            <a:ext cx="3827584" cy="1203481"/>
+            <a:off x="4801314" y="3444263"/>
+            <a:ext cx="2876404" cy="1203481"/>
           </a:xfrm>
           <a:prstGeom prst="rect">
             <a:avLst/>
           </a:prstGeom>
+          <a:ln>
+            <a:noFill/>
+          </a:ln>
+        </p:spPr>
+      </p:pic>
+      <p:sp>
+        <p:nvSpPr>
+          <p:cNvPr id="3" name="Arrow: Right 2">
+            <a:extLst>
+              <a:ext uri="{FF2B5EF4-FFF2-40B4-BE49-F238E27FC236}">
+                <a16:creationId xmlns="" xmlns:a16="http://schemas.microsoft.com/office/drawing/2014/main" id="{A386E034-963A-452A-BA56-7A5B5FF1099E}"/>
+              </a:ext>
+            </a:extLst>
+          </p:cNvPr>
+          <p:cNvSpPr/>
+          <p:nvPr/>
+        </p:nvSpPr>
+        <p:spPr>
+          <a:xfrm rot="2820000">
+            <a:off x="3850618" y="2925963"/>
+            <a:ext cx="643247" cy="316676"/>
+          </a:xfrm>
+          <a:prstGeom prst="rightArrow">
+            <a:avLst/>
+          </a:prstGeom>
+          <a:solidFill>
+            <a:schemeClr val="bg2"/>
+          </a:solidFill>
           <a:ln>
             <a:solidFill>
               <a:schemeClr val="tx1"/>
             </a:solidFill>
           </a:ln>
-        </p:spPr>
-      </p:pic>
-      <p:sp>
-        <p:nvSpPr>
-          <p:cNvPr id="3" name="Arrow: Right 2">
-            <a:extLst>
-              <a:ext uri="{FF2B5EF4-FFF2-40B4-BE49-F238E27FC236}">
-                <a16:creationId xmlns:a16="http://schemas.microsoft.com/office/drawing/2014/main" xmlns="" id="{A386E034-963A-452A-BA56-7A5B5FF1099E}"/>
-              </a:ext>
-            </a:extLst>
-          </p:cNvPr>
-          <p:cNvSpPr/>
-          <p:nvPr/>
-        </p:nvSpPr>
-        <p:spPr>
-          <a:xfrm rot="2820000">
-            <a:off x="2994092" y="4199178"/>
-            <a:ext cx="643247" cy="316676"/>
-          </a:xfrm>
-          <a:prstGeom prst="rightArrow">
-            <a:avLst/>
-          </a:prstGeom>
         </p:spPr>
         <p:style>
           <a:lnRef idx="2">
@@ -15805,7 +16151,7 @@
           <p:cNvPr id="10" name="Arrow: Right 9">
             <a:extLst>
               <a:ext uri="{FF2B5EF4-FFF2-40B4-BE49-F238E27FC236}">
-                <a16:creationId xmlns:a16="http://schemas.microsoft.com/office/drawing/2014/main" xmlns="" id="{FC53BB6D-D8F9-4631-B0DB-C5D30F0A1ADE}"/>
+                <a16:creationId xmlns="" xmlns:a16="http://schemas.microsoft.com/office/drawing/2014/main" id="{FC53BB6D-D8F9-4631-B0DB-C5D30F0A1ADE}"/>
               </a:ext>
             </a:extLst>
           </p:cNvPr>
@@ -15814,12 +16160,20 @@
         </p:nvSpPr>
         <p:spPr>
           <a:xfrm rot="18780000" flipH="1">
-            <a:off x="7071286" y="4199178"/>
+            <a:off x="7974112" y="2925963"/>
             <a:ext cx="643247" cy="316676"/>
           </a:xfrm>
           <a:prstGeom prst="rightArrow">
             <a:avLst/>
           </a:prstGeom>
+          <a:solidFill>
+            <a:schemeClr val="bg2"/>
+          </a:solidFill>
+          <a:ln>
+            <a:solidFill>
+              <a:schemeClr val="tx1"/>
+            </a:solidFill>
+          </a:ln>
         </p:spPr>
         <p:style>
           <a:lnRef idx="2">
@@ -15835,6 +16189,292 @@
           </a:effectRef>
           <a:fontRef idx="minor">
             <a:schemeClr val="lt1"/>
+          </a:fontRef>
+        </p:style>
+        <p:txBody>
+          <a:bodyPr rtlCol="0" anchor="ctr"/>
+          <a:lstStyle/>
+          <a:p>
+            <a:pPr algn="ctr"/>
+            <a:endParaRPr lang="en-US"/>
+          </a:p>
+        </p:txBody>
+      </p:sp>
+      <p:sp>
+        <p:nvSpPr>
+          <p:cNvPr id="4" name="Rectangle 3"/>
+          <p:cNvSpPr/>
+          <p:nvPr/>
+        </p:nvSpPr>
+        <p:spPr>
+          <a:xfrm>
+            <a:off x="4734046" y="3440868"/>
+            <a:ext cx="2952829" cy="1362626"/>
+          </a:xfrm>
+          <a:prstGeom prst="rect">
+            <a:avLst/>
+          </a:prstGeom>
+          <a:noFill/>
+          <a:ln>
+            <a:solidFill>
+              <a:schemeClr val="tx1"/>
+            </a:solidFill>
+          </a:ln>
+        </p:spPr>
+        <p:style>
+          <a:lnRef idx="2">
+            <a:schemeClr val="accent1">
+              <a:shade val="50000"/>
+            </a:schemeClr>
+          </a:lnRef>
+          <a:fillRef idx="1">
+            <a:schemeClr val="accent1"/>
+          </a:fillRef>
+          <a:effectRef idx="0">
+            <a:schemeClr val="accent1"/>
+          </a:effectRef>
+          <a:fontRef idx="minor">
+            <a:schemeClr val="lt1"/>
+          </a:fontRef>
+        </p:style>
+        <p:txBody>
+          <a:bodyPr rtlCol="0" anchor="ctr"/>
+          <a:lstStyle/>
+          <a:p>
+            <a:pPr algn="ctr"/>
+            <a:endParaRPr lang="en-US"/>
+          </a:p>
+        </p:txBody>
+      </p:sp>
+      <p:sp>
+        <p:nvSpPr>
+          <p:cNvPr id="13" name="TextBox 12"/>
+          <p:cNvSpPr txBox="1"/>
+          <p:nvPr/>
+        </p:nvSpPr>
+        <p:spPr>
+          <a:xfrm>
+            <a:off x="4419156" y="4962740"/>
+            <a:ext cx="1916559" cy="923330"/>
+          </a:xfrm>
+          <a:prstGeom prst="rect">
+            <a:avLst/>
+          </a:prstGeom>
+          <a:noFill/>
+        </p:spPr>
+        <p:txBody>
+          <a:bodyPr wrap="square" rtlCol="0">
+            <a:spAutoFit/>
+          </a:bodyPr>
+          <a:lstStyle/>
+          <a:p>
+            <a:pPr algn="ctr"/>
+            <a:r>
+              <a:rPr lang="en-US" b="1">
+                <a:solidFill>
+                  <a:srgbClr val="8A8C8F"/>
+                </a:solidFill>
+              </a:rPr>
+              <a:t>primal</a:t>
+            </a:r>
+            <a:r>
+              <a:rPr lang="en-US">
+                <a:solidFill>
+                  <a:srgbClr val="8A8C8F"/>
+                </a:solidFill>
+              </a:rPr>
+              <a:t/>
+            </a:r>
+            <a:br>
+              <a:rPr lang="en-US">
+                <a:solidFill>
+                  <a:srgbClr val="8A8C8F"/>
+                </a:solidFill>
+              </a:rPr>
+            </a:br>
+            <a:r>
+              <a:rPr lang="en-US">
+                <a:solidFill>
+                  <a:srgbClr val="8A8C8F"/>
+                </a:solidFill>
+              </a:rPr>
+              <a:t>objective</a:t>
+            </a:r>
+            <a:br>
+              <a:rPr lang="en-US">
+                <a:solidFill>
+                  <a:srgbClr val="8A8C8F"/>
+                </a:solidFill>
+              </a:rPr>
+            </a:br>
+            <a:r>
+              <a:rPr lang="en-US">
+                <a:solidFill>
+                  <a:srgbClr val="8A8C8F"/>
+                </a:solidFill>
+              </a:rPr>
+              <a:t>function</a:t>
+            </a:r>
+            <a:endParaRPr lang="en-US" b="1">
+              <a:solidFill>
+                <a:srgbClr val="8A8C8F"/>
+              </a:solidFill>
+            </a:endParaRPr>
+          </a:p>
+        </p:txBody>
+      </p:sp>
+      <p:sp>
+        <p:nvSpPr>
+          <p:cNvPr id="14" name="Left Brace 13"/>
+          <p:cNvSpPr/>
+          <p:nvPr/>
+        </p:nvSpPr>
+        <p:spPr>
+          <a:xfrm rot="16200000">
+            <a:off x="5287630" y="4512122"/>
+            <a:ext cx="172879" cy="826550"/>
+          </a:xfrm>
+          <a:prstGeom prst="leftBrace">
+            <a:avLst/>
+          </a:prstGeom>
+          <a:ln>
+            <a:solidFill>
+              <a:srgbClr val="8A8C8F"/>
+            </a:solidFill>
+          </a:ln>
+        </p:spPr>
+        <p:style>
+          <a:lnRef idx="1">
+            <a:schemeClr val="accent1"/>
+          </a:lnRef>
+          <a:fillRef idx="0">
+            <a:schemeClr val="accent1"/>
+          </a:fillRef>
+          <a:effectRef idx="0">
+            <a:schemeClr val="accent1"/>
+          </a:effectRef>
+          <a:fontRef idx="minor">
+            <a:schemeClr val="tx1"/>
+          </a:fontRef>
+        </p:style>
+        <p:txBody>
+          <a:bodyPr rtlCol="0" anchor="ctr"/>
+          <a:lstStyle/>
+          <a:p>
+            <a:pPr algn="ctr"/>
+            <a:endParaRPr lang="en-US"/>
+          </a:p>
+        </p:txBody>
+      </p:sp>
+      <p:sp>
+        <p:nvSpPr>
+          <p:cNvPr id="17" name="TextBox 16"/>
+          <p:cNvSpPr txBox="1"/>
+          <p:nvPr/>
+        </p:nvSpPr>
+        <p:spPr>
+          <a:xfrm>
+            <a:off x="5978248" y="4962740"/>
+            <a:ext cx="1916559" cy="923330"/>
+          </a:xfrm>
+          <a:prstGeom prst="rect">
+            <a:avLst/>
+          </a:prstGeom>
+          <a:noFill/>
+        </p:spPr>
+        <p:txBody>
+          <a:bodyPr wrap="square" rtlCol="0">
+            <a:spAutoFit/>
+          </a:bodyPr>
+          <a:lstStyle/>
+          <a:p>
+            <a:pPr algn="ctr"/>
+            <a:r>
+              <a:rPr lang="en-US" b="1">
+                <a:solidFill>
+                  <a:srgbClr val="8A8C8F"/>
+                </a:solidFill>
+              </a:rPr>
+              <a:t>dual</a:t>
+            </a:r>
+            <a:r>
+              <a:rPr lang="en-US">
+                <a:solidFill>
+                  <a:srgbClr val="8A8C8F"/>
+                </a:solidFill>
+              </a:rPr>
+              <a:t/>
+            </a:r>
+            <a:br>
+              <a:rPr lang="en-US">
+                <a:solidFill>
+                  <a:srgbClr val="8A8C8F"/>
+                </a:solidFill>
+              </a:rPr>
+            </a:br>
+            <a:r>
+              <a:rPr lang="en-US">
+                <a:solidFill>
+                  <a:srgbClr val="8A8C8F"/>
+                </a:solidFill>
+              </a:rPr>
+              <a:t>objective</a:t>
+            </a:r>
+            <a:br>
+              <a:rPr lang="en-US">
+                <a:solidFill>
+                  <a:srgbClr val="8A8C8F"/>
+                </a:solidFill>
+              </a:rPr>
+            </a:br>
+            <a:r>
+              <a:rPr lang="en-US">
+                <a:solidFill>
+                  <a:srgbClr val="8A8C8F"/>
+                </a:solidFill>
+              </a:rPr>
+              <a:t>function</a:t>
+            </a:r>
+            <a:endParaRPr lang="en-US" b="1">
+              <a:solidFill>
+                <a:srgbClr val="8A8C8F"/>
+              </a:solidFill>
+            </a:endParaRPr>
+          </a:p>
+        </p:txBody>
+      </p:sp>
+      <p:sp>
+        <p:nvSpPr>
+          <p:cNvPr id="18" name="Left Brace 17"/>
+          <p:cNvSpPr/>
+          <p:nvPr/>
+        </p:nvSpPr>
+        <p:spPr>
+          <a:xfrm rot="16200000">
+            <a:off x="6854266" y="4512122"/>
+            <a:ext cx="172879" cy="826550"/>
+          </a:xfrm>
+          <a:prstGeom prst="leftBrace">
+            <a:avLst/>
+          </a:prstGeom>
+          <a:ln>
+            <a:solidFill>
+              <a:srgbClr val="8A8C8F"/>
+            </a:solidFill>
+          </a:ln>
+        </p:spPr>
+        <p:style>
+          <a:lnRef idx="1">
+            <a:schemeClr val="accent1"/>
+          </a:lnRef>
+          <a:fillRef idx="0">
+            <a:schemeClr val="accent1"/>
+          </a:fillRef>
+          <a:effectRef idx="0">
+            <a:schemeClr val="accent1"/>
+          </a:effectRef>
+          <a:fontRef idx="minor">
+            <a:schemeClr val="tx1"/>
           </a:fontRef>
         </p:style>
         <p:txBody>
@@ -15888,7 +16528,7 @@
           <p:cNvPr id="2" name="Title 1">
             <a:extLst>
               <a:ext uri="{FF2B5EF4-FFF2-40B4-BE49-F238E27FC236}">
-                <a16:creationId xmlns:a16="http://schemas.microsoft.com/office/drawing/2014/main" xmlns="" id="{99760F66-ED22-4D99-83D9-AF132B641E2C}"/>
+                <a16:creationId xmlns="" xmlns:a16="http://schemas.microsoft.com/office/drawing/2014/main" id="{99760F66-ED22-4D99-83D9-AF132B641E2C}"/>
               </a:ext>
             </a:extLst>
           </p:cNvPr>
@@ -15919,7 +16559,7 @@
           <p:cNvPr id="4" name="Picture 3" descr="A close up of a logo&#10;&#10;Description generated with very high confidence">
             <a:extLst>
               <a:ext uri="{FF2B5EF4-FFF2-40B4-BE49-F238E27FC236}">
-                <a16:creationId xmlns:a16="http://schemas.microsoft.com/office/drawing/2014/main" xmlns="" id="{6E87F861-F9AC-4F21-B0C8-58EB55E95B97}"/>
+                <a16:creationId xmlns="" xmlns:a16="http://schemas.microsoft.com/office/drawing/2014/main" id="{6E87F861-F9AC-4F21-B0C8-58EB55E95B97}"/>
               </a:ext>
             </a:extLst>
           </p:cNvPr>
@@ -15949,7 +16589,7 @@
           <p:cNvPr id="6" name="Picture 5" descr="A picture containing clock&#10;&#10;Description generated with very high confidence">
             <a:extLst>
               <a:ext uri="{FF2B5EF4-FFF2-40B4-BE49-F238E27FC236}">
-                <a16:creationId xmlns:a16="http://schemas.microsoft.com/office/drawing/2014/main" xmlns="" id="{4616AC99-6BB6-4ADE-BDE8-48395933FE5F}"/>
+                <a16:creationId xmlns="" xmlns:a16="http://schemas.microsoft.com/office/drawing/2014/main" id="{4616AC99-6BB6-4ADE-BDE8-48395933FE5F}"/>
               </a:ext>
             </a:extLst>
           </p:cNvPr>
@@ -15979,7 +16619,7 @@
           <p:cNvPr id="8" name="Arrow: Down 7">
             <a:extLst>
               <a:ext uri="{FF2B5EF4-FFF2-40B4-BE49-F238E27FC236}">
-                <a16:creationId xmlns:a16="http://schemas.microsoft.com/office/drawing/2014/main" xmlns="" id="{82AB09DD-DB63-4806-A980-AE0CB9781D42}"/>
+                <a16:creationId xmlns="" xmlns:a16="http://schemas.microsoft.com/office/drawing/2014/main" id="{82AB09DD-DB63-4806-A980-AE0CB9781D42}"/>
               </a:ext>
             </a:extLst>
           </p:cNvPr>
@@ -16033,7 +16673,7 @@
           <p:cNvPr id="3" name="Picture 43" descr="A close up of a logo&#10;&#10;Description generated with very high confidence">
             <a:extLst>
               <a:ext uri="{FF2B5EF4-FFF2-40B4-BE49-F238E27FC236}">
-                <a16:creationId xmlns:a16="http://schemas.microsoft.com/office/drawing/2014/main" xmlns="" id="{1CFBEB4B-4C2C-468C-AD74-3B403A169AA1}"/>
+                <a16:creationId xmlns="" xmlns:a16="http://schemas.microsoft.com/office/drawing/2014/main" id="{1CFBEB4B-4C2C-468C-AD74-3B403A169AA1}"/>
               </a:ext>
             </a:extLst>
           </p:cNvPr>
@@ -16063,7 +16703,7 @@
           <p:cNvPr id="9" name="Picture 9" descr="A picture containing drawing&#10;&#10;Description generated with very high confidence">
             <a:extLst>
               <a:ext uri="{FF2B5EF4-FFF2-40B4-BE49-F238E27FC236}">
-                <a16:creationId xmlns:a16="http://schemas.microsoft.com/office/drawing/2014/main" xmlns="" id="{02B44993-3D5D-4B1E-B348-A8AA765D22E8}"/>
+                <a16:creationId xmlns="" xmlns:a16="http://schemas.microsoft.com/office/drawing/2014/main" id="{02B44993-3D5D-4B1E-B348-A8AA765D22E8}"/>
               </a:ext>
             </a:extLst>
           </p:cNvPr>
@@ -16093,7 +16733,7 @@
           <p:cNvPr id="11" name="Picture 11" descr="A picture containing object, clock, meter&#10;&#10;Description generated with very high confidence">
             <a:extLst>
               <a:ext uri="{FF2B5EF4-FFF2-40B4-BE49-F238E27FC236}">
-                <a16:creationId xmlns:a16="http://schemas.microsoft.com/office/drawing/2014/main" xmlns="" id="{50B5677A-E1FB-4742-A2BB-B165C8289492}"/>
+                <a16:creationId xmlns="" xmlns:a16="http://schemas.microsoft.com/office/drawing/2014/main" id="{50B5677A-E1FB-4742-A2BB-B165C8289492}"/>
               </a:ext>
             </a:extLst>
           </p:cNvPr>
@@ -16354,7 +16994,7 @@
           <p:cNvPr id="2" name="Title 1">
             <a:extLst>
               <a:ext uri="{FF2B5EF4-FFF2-40B4-BE49-F238E27FC236}">
-                <a16:creationId xmlns:a16="http://schemas.microsoft.com/office/drawing/2014/main" xmlns="" id="{99760F66-ED22-4D99-83D9-AF132B641E2C}"/>
+                <a16:creationId xmlns="" xmlns:a16="http://schemas.microsoft.com/office/drawing/2014/main" id="{99760F66-ED22-4D99-83D9-AF132B641E2C}"/>
               </a:ext>
             </a:extLst>
           </p:cNvPr>
@@ -16385,7 +17025,7 @@
           <p:cNvPr id="4" name="Picture 3" descr="A close up of a logo&#10;&#10;Description generated with very high confidence">
             <a:extLst>
               <a:ext uri="{FF2B5EF4-FFF2-40B4-BE49-F238E27FC236}">
-                <a16:creationId xmlns:a16="http://schemas.microsoft.com/office/drawing/2014/main" xmlns="" id="{6E87F861-F9AC-4F21-B0C8-58EB55E95B97}"/>
+                <a16:creationId xmlns="" xmlns:a16="http://schemas.microsoft.com/office/drawing/2014/main" id="{6E87F861-F9AC-4F21-B0C8-58EB55E95B97}"/>
               </a:ext>
             </a:extLst>
           </p:cNvPr>
@@ -16415,7 +17055,7 @@
           <p:cNvPr id="8" name="Arrow: Down 7">
             <a:extLst>
               <a:ext uri="{FF2B5EF4-FFF2-40B4-BE49-F238E27FC236}">
-                <a16:creationId xmlns:a16="http://schemas.microsoft.com/office/drawing/2014/main" xmlns="" id="{82AB09DD-DB63-4806-A980-AE0CB9781D42}"/>
+                <a16:creationId xmlns="" xmlns:a16="http://schemas.microsoft.com/office/drawing/2014/main" id="{82AB09DD-DB63-4806-A980-AE0CB9781D42}"/>
               </a:ext>
             </a:extLst>
           </p:cNvPr>
@@ -16469,7 +17109,7 @@
           <p:cNvPr id="13" name="Picture 13" descr="A close up of a logo&#10;&#10;Description generated with very high confidence">
             <a:extLst>
               <a:ext uri="{FF2B5EF4-FFF2-40B4-BE49-F238E27FC236}">
-                <a16:creationId xmlns:a16="http://schemas.microsoft.com/office/drawing/2014/main" xmlns="" id="{ECAD198D-1469-41D2-8E92-807888FE870D}"/>
+                <a16:creationId xmlns="" xmlns:a16="http://schemas.microsoft.com/office/drawing/2014/main" id="{ECAD198D-1469-41D2-8E92-807888FE870D}"/>
               </a:ext>
             </a:extLst>
           </p:cNvPr>
@@ -16499,7 +17139,7 @@
           <p:cNvPr id="5" name="Picture 6" descr="A close up of a logo&#10;&#10;Description generated with very high confidence">
             <a:extLst>
               <a:ext uri="{FF2B5EF4-FFF2-40B4-BE49-F238E27FC236}">
-                <a16:creationId xmlns:a16="http://schemas.microsoft.com/office/drawing/2014/main" xmlns="" id="{EB8556EE-68CC-40A7-B949-39599FC85FC9}"/>
+                <a16:creationId xmlns="" xmlns:a16="http://schemas.microsoft.com/office/drawing/2014/main" id="{EB8556EE-68CC-40A7-B949-39599FC85FC9}"/>
               </a:ext>
             </a:extLst>
           </p:cNvPr>
@@ -16529,7 +17169,7 @@
           <p:cNvPr id="10" name="Arrow: Up-Down 9">
             <a:extLst>
               <a:ext uri="{FF2B5EF4-FFF2-40B4-BE49-F238E27FC236}">
-                <a16:creationId xmlns:a16="http://schemas.microsoft.com/office/drawing/2014/main" xmlns="" id="{B955B9A0-C9CB-469D-A0ED-46BACD4AF8A9}"/>
+                <a16:creationId xmlns="" xmlns:a16="http://schemas.microsoft.com/office/drawing/2014/main" id="{B955B9A0-C9CB-469D-A0ED-46BACD4AF8A9}"/>
               </a:ext>
             </a:extLst>
           </p:cNvPr>
@@ -16575,7 +17215,7 @@
           <p:cNvPr id="12" name="Picture 5" descr="A close up of a sign&#10;&#10;Description generated with very high confidence">
             <a:extLst>
               <a:ext uri="{FF2B5EF4-FFF2-40B4-BE49-F238E27FC236}">
-                <a16:creationId xmlns:a16="http://schemas.microsoft.com/office/drawing/2014/main" xmlns="" id="{D150EFB3-437B-49AB-B6EA-481CED6C7865}"/>
+                <a16:creationId xmlns="" xmlns:a16="http://schemas.microsoft.com/office/drawing/2014/main" id="{D150EFB3-437B-49AB-B6EA-481CED6C7865}"/>
               </a:ext>
             </a:extLst>
           </p:cNvPr>
@@ -16605,7 +17245,7 @@
           <p:cNvPr id="19" name="TextBox 18">
             <a:extLst>
               <a:ext uri="{FF2B5EF4-FFF2-40B4-BE49-F238E27FC236}">
-                <a16:creationId xmlns:a16="http://schemas.microsoft.com/office/drawing/2014/main" xmlns="" id="{20B2480F-8E9E-46F5-8DB2-C398D4668F0A}"/>
+                <a16:creationId xmlns="" xmlns:a16="http://schemas.microsoft.com/office/drawing/2014/main" id="{20B2480F-8E9E-46F5-8DB2-C398D4668F0A}"/>
               </a:ext>
             </a:extLst>
           </p:cNvPr>
@@ -16653,7 +17293,7 @@
           <p:cNvPr id="20" name="TextBox 19">
             <a:extLst>
               <a:ext uri="{FF2B5EF4-FFF2-40B4-BE49-F238E27FC236}">
-                <a16:creationId xmlns:a16="http://schemas.microsoft.com/office/drawing/2014/main" xmlns="" id="{1F5BE492-E3B4-48FA-9694-8F82B920DAEB}"/>
+                <a16:creationId xmlns="" xmlns:a16="http://schemas.microsoft.com/office/drawing/2014/main" id="{1F5BE492-E3B4-48FA-9694-8F82B920DAEB}"/>
               </a:ext>
             </a:extLst>
           </p:cNvPr>
@@ -16701,7 +17341,7 @@
           <p:cNvPr id="22" name="TextBox 21">
             <a:extLst>
               <a:ext uri="{FF2B5EF4-FFF2-40B4-BE49-F238E27FC236}">
-                <a16:creationId xmlns:a16="http://schemas.microsoft.com/office/drawing/2014/main" xmlns="" id="{DCB07139-45CB-4B60-98DD-E2CBA1E8B558}"/>
+                <a16:creationId xmlns="" xmlns:a16="http://schemas.microsoft.com/office/drawing/2014/main" id="{DCB07139-45CB-4B60-98DD-E2CBA1E8B558}"/>
               </a:ext>
             </a:extLst>
           </p:cNvPr>
@@ -16750,7 +17390,7 @@
           <p:cNvPr id="16" name="Picture 9" descr="A picture containing drawing&#10;&#10;Description generated with very high confidence">
             <a:extLst>
               <a:ext uri="{FF2B5EF4-FFF2-40B4-BE49-F238E27FC236}">
-                <a16:creationId xmlns:a16="http://schemas.microsoft.com/office/drawing/2014/main" xmlns="" id="{02B44993-3D5D-4B1E-B348-A8AA765D22E8}"/>
+                <a16:creationId xmlns="" xmlns:a16="http://schemas.microsoft.com/office/drawing/2014/main" id="{02B44993-3D5D-4B1E-B348-A8AA765D22E8}"/>
               </a:ext>
             </a:extLst>
           </p:cNvPr>
@@ -16780,7 +17420,7 @@
           <p:cNvPr id="17" name="Picture 11" descr="A picture containing object, clock, meter&#10;&#10;Description generated with very high confidence">
             <a:extLst>
               <a:ext uri="{FF2B5EF4-FFF2-40B4-BE49-F238E27FC236}">
-                <a16:creationId xmlns:a16="http://schemas.microsoft.com/office/drawing/2014/main" xmlns="" id="{50B5677A-E1FB-4742-A2BB-B165C8289492}"/>
+                <a16:creationId xmlns="" xmlns:a16="http://schemas.microsoft.com/office/drawing/2014/main" id="{50B5677A-E1FB-4742-A2BB-B165C8289492}"/>
               </a:ext>
             </a:extLst>
           </p:cNvPr>
@@ -17074,7 +17714,7 @@
           <p:cNvPr id="2" name="Title 1">
             <a:extLst>
               <a:ext uri="{FF2B5EF4-FFF2-40B4-BE49-F238E27FC236}">
-                <a16:creationId xmlns:a16="http://schemas.microsoft.com/office/drawing/2014/main" xmlns="" id="{22DAD01F-DC17-4CB9-A59E-3B88FC10ACC0}"/>
+                <a16:creationId xmlns="" xmlns:a16="http://schemas.microsoft.com/office/drawing/2014/main" id="{22DAD01F-DC17-4CB9-A59E-3B88FC10ACC0}"/>
               </a:ext>
             </a:extLst>
           </p:cNvPr>
@@ -17105,7 +17745,7 @@
           <p:cNvPr id="4" name="Picture 6" descr="A close up of a logo&#10;&#10;Description generated with very high confidence">
             <a:extLst>
               <a:ext uri="{FF2B5EF4-FFF2-40B4-BE49-F238E27FC236}">
-                <a16:creationId xmlns:a16="http://schemas.microsoft.com/office/drawing/2014/main" xmlns="" id="{C0330C5C-C655-42A8-BF9C-90E788CC6A92}"/>
+                <a16:creationId xmlns="" xmlns:a16="http://schemas.microsoft.com/office/drawing/2014/main" id="{C0330C5C-C655-42A8-BF9C-90E788CC6A92}"/>
               </a:ext>
             </a:extLst>
           </p:cNvPr>
@@ -17140,7 +17780,7 @@
           <p:cNvPr id="6" name="Picture 9" descr="A picture containing drawing&#10;&#10;Description generated with very high confidence">
             <a:extLst>
               <a:ext uri="{FF2B5EF4-FFF2-40B4-BE49-F238E27FC236}">
-                <a16:creationId xmlns:a16="http://schemas.microsoft.com/office/drawing/2014/main" xmlns="" id="{69BBBA96-ED0F-4961-8C6B-6543A7A55BAE}"/>
+                <a16:creationId xmlns="" xmlns:a16="http://schemas.microsoft.com/office/drawing/2014/main" id="{69BBBA96-ED0F-4961-8C6B-6543A7A55BAE}"/>
               </a:ext>
             </a:extLst>
           </p:cNvPr>
@@ -17173,7 +17813,7 @@
           <p:cNvPr id="8" name="Picture 11" descr="A picture containing object, clock, meter&#10;&#10;Description generated with very high confidence">
             <a:extLst>
               <a:ext uri="{FF2B5EF4-FFF2-40B4-BE49-F238E27FC236}">
-                <a16:creationId xmlns:a16="http://schemas.microsoft.com/office/drawing/2014/main" xmlns="" id="{FF7323CE-66D1-43A5-B3E1-17A59B7D36B4}"/>
+                <a16:creationId xmlns="" xmlns:a16="http://schemas.microsoft.com/office/drawing/2014/main" id="{FF7323CE-66D1-43A5-B3E1-17A59B7D36B4}"/>
               </a:ext>
             </a:extLst>
           </p:cNvPr>
@@ -17206,7 +17846,7 @@
           <p:cNvPr id="9" name="Picture 9" descr="A close up of a logo&#10;&#10;Description generated with very high confidence">
             <a:extLst>
               <a:ext uri="{FF2B5EF4-FFF2-40B4-BE49-F238E27FC236}">
-                <a16:creationId xmlns:a16="http://schemas.microsoft.com/office/drawing/2014/main" xmlns="" id="{FE7DD4F2-A92E-4806-B792-8484FE70F8E3}"/>
+                <a16:creationId xmlns="" xmlns:a16="http://schemas.microsoft.com/office/drawing/2014/main" id="{FE7DD4F2-A92E-4806-B792-8484FE70F8E3}"/>
               </a:ext>
             </a:extLst>
           </p:cNvPr>
@@ -17236,7 +17876,7 @@
           <p:cNvPr id="18" name="Picture 18" descr="A picture containing clock&#10;&#10;Description generated with very high confidence">
             <a:extLst>
               <a:ext uri="{FF2B5EF4-FFF2-40B4-BE49-F238E27FC236}">
-                <a16:creationId xmlns:a16="http://schemas.microsoft.com/office/drawing/2014/main" xmlns="" id="{0554376B-EDEF-4D1D-9EAE-F4D103F6E769}"/>
+                <a16:creationId xmlns="" xmlns:a16="http://schemas.microsoft.com/office/drawing/2014/main" id="{0554376B-EDEF-4D1D-9EAE-F4D103F6E769}"/>
               </a:ext>
             </a:extLst>
           </p:cNvPr>
@@ -17266,7 +17906,7 @@
           <p:cNvPr id="24" name="Picture 24" descr="A picture containing clock, flower&#10;&#10;Description generated with very high confidence">
             <a:extLst>
               <a:ext uri="{FF2B5EF4-FFF2-40B4-BE49-F238E27FC236}">
-                <a16:creationId xmlns:a16="http://schemas.microsoft.com/office/drawing/2014/main" xmlns="" id="{A539457C-5E7D-4840-803E-FB9943A9E863}"/>
+                <a16:creationId xmlns="" xmlns:a16="http://schemas.microsoft.com/office/drawing/2014/main" id="{A539457C-5E7D-4840-803E-FB9943A9E863}"/>
               </a:ext>
             </a:extLst>
           </p:cNvPr>
@@ -17296,7 +17936,7 @@
           <p:cNvPr id="26" name="Picture 26" descr="A picture containing drawing&#10;&#10;Description generated with very high confidence">
             <a:extLst>
               <a:ext uri="{FF2B5EF4-FFF2-40B4-BE49-F238E27FC236}">
-                <a16:creationId xmlns:a16="http://schemas.microsoft.com/office/drawing/2014/main" xmlns="" id="{E9BBDA87-9334-48F6-B549-DF8332853EB8}"/>
+                <a16:creationId xmlns="" xmlns:a16="http://schemas.microsoft.com/office/drawing/2014/main" id="{E9BBDA87-9334-48F6-B549-DF8332853EB8}"/>
               </a:ext>
             </a:extLst>
           </p:cNvPr>
@@ -17326,7 +17966,7 @@
           <p:cNvPr id="28" name="Picture 28" descr="A close up of a logo&#10;&#10;Description generated with high confidence">
             <a:extLst>
               <a:ext uri="{FF2B5EF4-FFF2-40B4-BE49-F238E27FC236}">
-                <a16:creationId xmlns:a16="http://schemas.microsoft.com/office/drawing/2014/main" xmlns="" id="{81E243AB-F66C-4DE2-8AF3-5DB68711DB44}"/>
+                <a16:creationId xmlns="" xmlns:a16="http://schemas.microsoft.com/office/drawing/2014/main" id="{81E243AB-F66C-4DE2-8AF3-5DB68711DB44}"/>
               </a:ext>
             </a:extLst>
           </p:cNvPr>
@@ -17356,7 +17996,7 @@
           <p:cNvPr id="30" name="Picture 30" descr="A picture containing clock, meter&#10;&#10;Description generated with very high confidence">
             <a:extLst>
               <a:ext uri="{FF2B5EF4-FFF2-40B4-BE49-F238E27FC236}">
-                <a16:creationId xmlns:a16="http://schemas.microsoft.com/office/drawing/2014/main" xmlns="" id="{869F45C0-BEFD-4D0A-A30C-E3DE4CED26A1}"/>
+                <a16:creationId xmlns="" xmlns:a16="http://schemas.microsoft.com/office/drawing/2014/main" id="{869F45C0-BEFD-4D0A-A30C-E3DE4CED26A1}"/>
               </a:ext>
             </a:extLst>
           </p:cNvPr>
@@ -17386,7 +18026,7 @@
           <p:cNvPr id="32" name="Picture 32" descr="A close up of a logo&#10;&#10;Description generated with very high confidence">
             <a:extLst>
               <a:ext uri="{FF2B5EF4-FFF2-40B4-BE49-F238E27FC236}">
-                <a16:creationId xmlns:a16="http://schemas.microsoft.com/office/drawing/2014/main" xmlns="" id="{1ACF1988-3C5A-413A-B927-C4F08B32DC61}"/>
+                <a16:creationId xmlns="" xmlns:a16="http://schemas.microsoft.com/office/drawing/2014/main" id="{1ACF1988-3C5A-413A-B927-C4F08B32DC61}"/>
               </a:ext>
             </a:extLst>
           </p:cNvPr>
@@ -17416,7 +18056,7 @@
           <p:cNvPr id="34" name="Picture 34" descr="A close up of a logo&#10;&#10;Description generated with very high confidence">
             <a:extLst>
               <a:ext uri="{FF2B5EF4-FFF2-40B4-BE49-F238E27FC236}">
-                <a16:creationId xmlns:a16="http://schemas.microsoft.com/office/drawing/2014/main" xmlns="" id="{7923B112-21C2-45C5-A791-55128D24522B}"/>
+                <a16:creationId xmlns="" xmlns:a16="http://schemas.microsoft.com/office/drawing/2014/main" id="{7923B112-21C2-45C5-A791-55128D24522B}"/>
               </a:ext>
             </a:extLst>
           </p:cNvPr>
@@ -17446,7 +18086,7 @@
           <p:cNvPr id="38" name="Picture 38" descr="A picture containing clock&#10;&#10;Description generated with very high confidence">
             <a:extLst>
               <a:ext uri="{FF2B5EF4-FFF2-40B4-BE49-F238E27FC236}">
-                <a16:creationId xmlns:a16="http://schemas.microsoft.com/office/drawing/2014/main" xmlns="" id="{DDD232C9-6B70-4425-9087-619A72CFF32A}"/>
+                <a16:creationId xmlns="" xmlns:a16="http://schemas.microsoft.com/office/drawing/2014/main" id="{DDD232C9-6B70-4425-9087-619A72CFF32A}"/>
               </a:ext>
             </a:extLst>
           </p:cNvPr>
@@ -17476,7 +18116,7 @@
           <p:cNvPr id="40" name="Picture 40" descr="A close up of a logo&#10;&#10;Description generated with very high confidence">
             <a:extLst>
               <a:ext uri="{FF2B5EF4-FFF2-40B4-BE49-F238E27FC236}">
-                <a16:creationId xmlns:a16="http://schemas.microsoft.com/office/drawing/2014/main" xmlns="" id="{A85F4AA5-CF6F-417D-96A4-6AD1E292E6A5}"/>
+                <a16:creationId xmlns="" xmlns:a16="http://schemas.microsoft.com/office/drawing/2014/main" id="{A85F4AA5-CF6F-417D-96A4-6AD1E292E6A5}"/>
               </a:ext>
             </a:extLst>
           </p:cNvPr>
@@ -17506,7 +18146,7 @@
           <p:cNvPr id="43" name="Picture 43" descr="A close up of a logo&#10;&#10;Description generated with very high confidence">
             <a:extLst>
               <a:ext uri="{FF2B5EF4-FFF2-40B4-BE49-F238E27FC236}">
-                <a16:creationId xmlns:a16="http://schemas.microsoft.com/office/drawing/2014/main" xmlns="" id="{BAC78DDE-16D4-4F26-B28A-84F4415D8648}"/>
+                <a16:creationId xmlns="" xmlns:a16="http://schemas.microsoft.com/office/drawing/2014/main" id="{BAC78DDE-16D4-4F26-B28A-84F4415D8648}"/>
               </a:ext>
             </a:extLst>
           </p:cNvPr>
@@ -17536,7 +18176,7 @@
           <p:cNvPr id="45" name="Picture 45" descr="A picture containing clock&#10;&#10;Description generated with very high confidence">
             <a:extLst>
               <a:ext uri="{FF2B5EF4-FFF2-40B4-BE49-F238E27FC236}">
-                <a16:creationId xmlns:a16="http://schemas.microsoft.com/office/drawing/2014/main" xmlns="" id="{597ACDCF-1672-40B5-A8BF-D0F2FE28A71F}"/>
+                <a16:creationId xmlns="" xmlns:a16="http://schemas.microsoft.com/office/drawing/2014/main" id="{597ACDCF-1672-40B5-A8BF-D0F2FE28A71F}"/>
               </a:ext>
             </a:extLst>
           </p:cNvPr>
@@ -17566,7 +18206,7 @@
           <p:cNvPr id="47" name="Picture 40" descr="A close up of a logo&#10;&#10;Description generated with very high confidence">
             <a:extLst>
               <a:ext uri="{FF2B5EF4-FFF2-40B4-BE49-F238E27FC236}">
-                <a16:creationId xmlns:a16="http://schemas.microsoft.com/office/drawing/2014/main" xmlns="" id="{C45619DF-F101-4904-A04F-6621105A76DF}"/>
+                <a16:creationId xmlns="" xmlns:a16="http://schemas.microsoft.com/office/drawing/2014/main" id="{C45619DF-F101-4904-A04F-6621105A76DF}"/>
               </a:ext>
             </a:extLst>
           </p:cNvPr>
@@ -17596,7 +18236,7 @@
           <p:cNvPr id="48" name="Arrow: Right 47">
             <a:extLst>
               <a:ext uri="{FF2B5EF4-FFF2-40B4-BE49-F238E27FC236}">
-                <a16:creationId xmlns:a16="http://schemas.microsoft.com/office/drawing/2014/main" xmlns="" id="{2D05F327-8A08-41D8-93AF-95C1FFD2CEA2}"/>
+                <a16:creationId xmlns="" xmlns:a16="http://schemas.microsoft.com/office/drawing/2014/main" id="{2D05F327-8A08-41D8-93AF-95C1FFD2CEA2}"/>
               </a:ext>
             </a:extLst>
           </p:cNvPr>
@@ -17656,7 +18296,7 @@
           <p:cNvPr id="49" name="Arrow: Right 48">
             <a:extLst>
               <a:ext uri="{FF2B5EF4-FFF2-40B4-BE49-F238E27FC236}">
-                <a16:creationId xmlns:a16="http://schemas.microsoft.com/office/drawing/2014/main" xmlns="" id="{12342E48-7442-40ED-B882-627321DA0B53}"/>
+                <a16:creationId xmlns="" xmlns:a16="http://schemas.microsoft.com/office/drawing/2014/main" id="{12342E48-7442-40ED-B882-627321DA0B53}"/>
               </a:ext>
             </a:extLst>
           </p:cNvPr>
@@ -17716,7 +18356,7 @@
           <p:cNvPr id="50" name="Arrow: Right 49">
             <a:extLst>
               <a:ext uri="{FF2B5EF4-FFF2-40B4-BE49-F238E27FC236}">
-                <a16:creationId xmlns:a16="http://schemas.microsoft.com/office/drawing/2014/main" xmlns="" id="{67754761-3E3A-47A7-9447-7C60AA0E0358}"/>
+                <a16:creationId xmlns="" xmlns:a16="http://schemas.microsoft.com/office/drawing/2014/main" id="{67754761-3E3A-47A7-9447-7C60AA0E0358}"/>
               </a:ext>
             </a:extLst>
           </p:cNvPr>
@@ -18420,7 +19060,7 @@
           <p:cNvPr id="2" name="Title 1">
             <a:extLst>
               <a:ext uri="{FF2B5EF4-FFF2-40B4-BE49-F238E27FC236}">
-                <a16:creationId xmlns:a16="http://schemas.microsoft.com/office/drawing/2014/main" xmlns="" id="{22DAD01F-DC17-4CB9-A59E-3B88FC10ACC0}"/>
+                <a16:creationId xmlns="" xmlns:a16="http://schemas.microsoft.com/office/drawing/2014/main" id="{22DAD01F-DC17-4CB9-A59E-3B88FC10ACC0}"/>
               </a:ext>
             </a:extLst>
           </p:cNvPr>
@@ -18451,7 +19091,7 @@
           <p:cNvPr id="4" name="Picture 6" descr="A close up of a logo&#10;&#10;Description generated with very high confidence">
             <a:extLst>
               <a:ext uri="{FF2B5EF4-FFF2-40B4-BE49-F238E27FC236}">
-                <a16:creationId xmlns:a16="http://schemas.microsoft.com/office/drawing/2014/main" xmlns="" id="{C0330C5C-C655-42A8-BF9C-90E788CC6A92}"/>
+                <a16:creationId xmlns="" xmlns:a16="http://schemas.microsoft.com/office/drawing/2014/main" id="{C0330C5C-C655-42A8-BF9C-90E788CC6A92}"/>
               </a:ext>
             </a:extLst>
           </p:cNvPr>
@@ -18486,7 +19126,7 @@
           <p:cNvPr id="6" name="Picture 9" descr="A picture containing drawing&#10;&#10;Description generated with very high confidence">
             <a:extLst>
               <a:ext uri="{FF2B5EF4-FFF2-40B4-BE49-F238E27FC236}">
-                <a16:creationId xmlns:a16="http://schemas.microsoft.com/office/drawing/2014/main" xmlns="" id="{69BBBA96-ED0F-4961-8C6B-6543A7A55BAE}"/>
+                <a16:creationId xmlns="" xmlns:a16="http://schemas.microsoft.com/office/drawing/2014/main" id="{69BBBA96-ED0F-4961-8C6B-6543A7A55BAE}"/>
               </a:ext>
             </a:extLst>
           </p:cNvPr>
@@ -18519,7 +19159,7 @@
           <p:cNvPr id="8" name="Picture 11" descr="A picture containing object, clock, meter&#10;&#10;Description generated with very high confidence">
             <a:extLst>
               <a:ext uri="{FF2B5EF4-FFF2-40B4-BE49-F238E27FC236}">
-                <a16:creationId xmlns:a16="http://schemas.microsoft.com/office/drawing/2014/main" xmlns="" id="{FF7323CE-66D1-43A5-B3E1-17A59B7D36B4}"/>
+                <a16:creationId xmlns="" xmlns:a16="http://schemas.microsoft.com/office/drawing/2014/main" id="{FF7323CE-66D1-43A5-B3E1-17A59B7D36B4}"/>
               </a:ext>
             </a:extLst>
           </p:cNvPr>
@@ -18552,7 +19192,7 @@
           <p:cNvPr id="43" name="Picture 43" descr="A close up of a logo&#10;&#10;Description generated with very high confidence">
             <a:extLst>
               <a:ext uri="{FF2B5EF4-FFF2-40B4-BE49-F238E27FC236}">
-                <a16:creationId xmlns:a16="http://schemas.microsoft.com/office/drawing/2014/main" xmlns="" id="{BAC78DDE-16D4-4F26-B28A-84F4415D8648}"/>
+                <a16:creationId xmlns="" xmlns:a16="http://schemas.microsoft.com/office/drawing/2014/main" id="{BAC78DDE-16D4-4F26-B28A-84F4415D8648}"/>
               </a:ext>
             </a:extLst>
           </p:cNvPr>
@@ -18582,7 +19222,7 @@
           <p:cNvPr id="45" name="Picture 45" descr="A picture containing clock&#10;&#10;Description generated with very high confidence">
             <a:extLst>
               <a:ext uri="{FF2B5EF4-FFF2-40B4-BE49-F238E27FC236}">
-                <a16:creationId xmlns:a16="http://schemas.microsoft.com/office/drawing/2014/main" xmlns="" id="{597ACDCF-1672-40B5-A8BF-D0F2FE28A71F}"/>
+                <a16:creationId xmlns="" xmlns:a16="http://schemas.microsoft.com/office/drawing/2014/main" id="{597ACDCF-1672-40B5-A8BF-D0F2FE28A71F}"/>
               </a:ext>
             </a:extLst>
           </p:cNvPr>
@@ -18612,7 +19252,7 @@
           <p:cNvPr id="47" name="Picture 40" descr="A close up of a logo&#10;&#10;Description generated with very high confidence">
             <a:extLst>
               <a:ext uri="{FF2B5EF4-FFF2-40B4-BE49-F238E27FC236}">
-                <a16:creationId xmlns:a16="http://schemas.microsoft.com/office/drawing/2014/main" xmlns="" id="{C45619DF-F101-4904-A04F-6621105A76DF}"/>
+                <a16:creationId xmlns="" xmlns:a16="http://schemas.microsoft.com/office/drawing/2014/main" id="{C45619DF-F101-4904-A04F-6621105A76DF}"/>
               </a:ext>
             </a:extLst>
           </p:cNvPr>
@@ -18642,7 +19282,7 @@
           <p:cNvPr id="5" name="Picture 6" descr="A close up of a logo&#10;&#10;Description generated with very high confidence">
             <a:extLst>
               <a:ext uri="{FF2B5EF4-FFF2-40B4-BE49-F238E27FC236}">
-                <a16:creationId xmlns:a16="http://schemas.microsoft.com/office/drawing/2014/main" xmlns="" id="{BDB7C2E2-E916-4966-8640-B17B4BE28F3F}"/>
+                <a16:creationId xmlns="" xmlns:a16="http://schemas.microsoft.com/office/drawing/2014/main" id="{BDB7C2E2-E916-4966-8640-B17B4BE28F3F}"/>
               </a:ext>
             </a:extLst>
           </p:cNvPr>
@@ -18672,7 +19312,7 @@
           <p:cNvPr id="10" name="Picture 11" descr="A close up of a logo&#10;&#10;Description generated with very high confidence">
             <a:extLst>
               <a:ext uri="{FF2B5EF4-FFF2-40B4-BE49-F238E27FC236}">
-                <a16:creationId xmlns:a16="http://schemas.microsoft.com/office/drawing/2014/main" xmlns="" id="{775D7EFD-73DC-464B-8B91-4E49077509A6}"/>
+                <a16:creationId xmlns="" xmlns:a16="http://schemas.microsoft.com/office/drawing/2014/main" id="{775D7EFD-73DC-464B-8B91-4E49077509A6}"/>
               </a:ext>
             </a:extLst>
           </p:cNvPr>
@@ -18702,7 +19342,7 @@
           <p:cNvPr id="13" name="Picture 13" descr="A picture containing object, clock&#10;&#10;Description generated with very high confidence">
             <a:extLst>
               <a:ext uri="{FF2B5EF4-FFF2-40B4-BE49-F238E27FC236}">
-                <a16:creationId xmlns:a16="http://schemas.microsoft.com/office/drawing/2014/main" xmlns="" id="{5D923562-CC12-4447-985D-D04FC150126A}"/>
+                <a16:creationId xmlns="" xmlns:a16="http://schemas.microsoft.com/office/drawing/2014/main" id="{5D923562-CC12-4447-985D-D04FC150126A}"/>
               </a:ext>
             </a:extLst>
           </p:cNvPr>
@@ -18732,7 +19372,7 @@
           <p:cNvPr id="15" name="Picture 15" descr="A picture containing drawing&#10;&#10;Description generated with very high confidence">
             <a:extLst>
               <a:ext uri="{FF2B5EF4-FFF2-40B4-BE49-F238E27FC236}">
-                <a16:creationId xmlns:a16="http://schemas.microsoft.com/office/drawing/2014/main" xmlns="" id="{B93A8413-1715-41F4-9B7A-755CE9CFF50E}"/>
+                <a16:creationId xmlns="" xmlns:a16="http://schemas.microsoft.com/office/drawing/2014/main" id="{B93A8413-1715-41F4-9B7A-755CE9CFF50E}"/>
               </a:ext>
             </a:extLst>
           </p:cNvPr>
@@ -18762,7 +19402,7 @@
           <p:cNvPr id="19" name="Picture 19" descr="A close up of a logo&#10;&#10;Description generated with very high confidence">
             <a:extLst>
               <a:ext uri="{FF2B5EF4-FFF2-40B4-BE49-F238E27FC236}">
-                <a16:creationId xmlns:a16="http://schemas.microsoft.com/office/drawing/2014/main" xmlns="" id="{BF193353-5A74-4226-BBC8-CE1F5810E6E0}"/>
+                <a16:creationId xmlns="" xmlns:a16="http://schemas.microsoft.com/office/drawing/2014/main" id="{BF193353-5A74-4226-BBC8-CE1F5810E6E0}"/>
               </a:ext>
             </a:extLst>
           </p:cNvPr>
@@ -18792,7 +19432,7 @@
           <p:cNvPr id="21" name="TextBox 20">
             <a:extLst>
               <a:ext uri="{FF2B5EF4-FFF2-40B4-BE49-F238E27FC236}">
-                <a16:creationId xmlns:a16="http://schemas.microsoft.com/office/drawing/2014/main" xmlns="" id="{EB90B60B-55B1-438E-94CD-FD27D4371DD6}"/>
+                <a16:creationId xmlns="" xmlns:a16="http://schemas.microsoft.com/office/drawing/2014/main" id="{EB90B60B-55B1-438E-94CD-FD27D4371DD6}"/>
               </a:ext>
             </a:extLst>
           </p:cNvPr>
@@ -18831,7 +19471,7 @@
           <p:cNvPr id="22" name="Picture 16" descr="A close up of a logo&#10;&#10;Description generated with very high confidence">
             <a:extLst>
               <a:ext uri="{FF2B5EF4-FFF2-40B4-BE49-F238E27FC236}">
-                <a16:creationId xmlns:a16="http://schemas.microsoft.com/office/drawing/2014/main" xmlns="" id="{4B263D8A-1697-4233-B5A8-A0666187F79A}"/>
+                <a16:creationId xmlns="" xmlns:a16="http://schemas.microsoft.com/office/drawing/2014/main" id="{4B263D8A-1697-4233-B5A8-A0666187F79A}"/>
               </a:ext>
             </a:extLst>
           </p:cNvPr>
@@ -18866,7 +19506,7 @@
           <p:cNvPr id="25" name="Right Brace 24">
             <a:extLst>
               <a:ext uri="{FF2B5EF4-FFF2-40B4-BE49-F238E27FC236}">
-                <a16:creationId xmlns:a16="http://schemas.microsoft.com/office/drawing/2014/main" xmlns="" id="{B123DDFB-BA27-413F-8F72-48EF2FDDE207}"/>
+                <a16:creationId xmlns="" xmlns:a16="http://schemas.microsoft.com/office/drawing/2014/main" id="{B123DDFB-BA27-413F-8F72-48EF2FDDE207}"/>
               </a:ext>
             </a:extLst>
           </p:cNvPr>
@@ -18918,7 +19558,7 @@
           <p:cNvPr id="41" name="Right Brace 40">
             <a:extLst>
               <a:ext uri="{FF2B5EF4-FFF2-40B4-BE49-F238E27FC236}">
-                <a16:creationId xmlns:a16="http://schemas.microsoft.com/office/drawing/2014/main" xmlns="" id="{8D8C0313-13A4-4FAA-9612-4D1FC8C80DFF}"/>
+                <a16:creationId xmlns="" xmlns:a16="http://schemas.microsoft.com/office/drawing/2014/main" id="{8D8C0313-13A4-4FAA-9612-4D1FC8C80DFF}"/>
               </a:ext>
             </a:extLst>
           </p:cNvPr>
@@ -18970,7 +19610,7 @@
           <p:cNvPr id="27" name="Picture 28" descr="A close up of a sign&#10;&#10;Description generated with high confidence">
             <a:extLst>
               <a:ext uri="{FF2B5EF4-FFF2-40B4-BE49-F238E27FC236}">
-                <a16:creationId xmlns:a16="http://schemas.microsoft.com/office/drawing/2014/main" xmlns="" id="{A9F7282D-9E32-4A50-84EA-BE35636CF009}"/>
+                <a16:creationId xmlns="" xmlns:a16="http://schemas.microsoft.com/office/drawing/2014/main" id="{A9F7282D-9E32-4A50-84EA-BE35636CF009}"/>
               </a:ext>
             </a:extLst>
           </p:cNvPr>
@@ -19000,7 +19640,7 @@
           <p:cNvPr id="31" name="Picture 32" descr="A close up of a logo&#10;&#10;Description generated with very high confidence">
             <a:extLst>
               <a:ext uri="{FF2B5EF4-FFF2-40B4-BE49-F238E27FC236}">
-                <a16:creationId xmlns:a16="http://schemas.microsoft.com/office/drawing/2014/main" xmlns="" id="{7D7F121C-1B9A-47CF-A882-FA34E6A6E361}"/>
+                <a16:creationId xmlns="" xmlns:a16="http://schemas.microsoft.com/office/drawing/2014/main" id="{7D7F121C-1B9A-47CF-A882-FA34E6A6E361}"/>
               </a:ext>
             </a:extLst>
           </p:cNvPr>
@@ -19030,7 +19670,7 @@
           <p:cNvPr id="36" name="Picture 38" descr="A close up of a logo&#10;&#10;Description generated with very high confidence">
             <a:extLst>
               <a:ext uri="{FF2B5EF4-FFF2-40B4-BE49-F238E27FC236}">
-                <a16:creationId xmlns:a16="http://schemas.microsoft.com/office/drawing/2014/main" xmlns="" id="{420FFD42-44DD-44E8-A92B-9618CCA5334E}"/>
+                <a16:creationId xmlns="" xmlns:a16="http://schemas.microsoft.com/office/drawing/2014/main" id="{420FFD42-44DD-44E8-A92B-9618CCA5334E}"/>
               </a:ext>
             </a:extLst>
           </p:cNvPr>
@@ -19060,7 +19700,7 @@
           <p:cNvPr id="42" name="TextBox 41">
             <a:extLst>
               <a:ext uri="{FF2B5EF4-FFF2-40B4-BE49-F238E27FC236}">
-                <a16:creationId xmlns:a16="http://schemas.microsoft.com/office/drawing/2014/main" xmlns="" id="{4A1648FC-A785-47A2-972E-144548C6A37A}"/>
+                <a16:creationId xmlns="" xmlns:a16="http://schemas.microsoft.com/office/drawing/2014/main" id="{4A1648FC-A785-47A2-972E-144548C6A37A}"/>
               </a:ext>
             </a:extLst>
           </p:cNvPr>
@@ -19123,7 +19763,7 @@
           <p:cNvPr id="23" name="Arrow: Right 47">
             <a:extLst>
               <a:ext uri="{FF2B5EF4-FFF2-40B4-BE49-F238E27FC236}">
-                <a16:creationId xmlns:a16="http://schemas.microsoft.com/office/drawing/2014/main" xmlns="" id="{2D05F327-8A08-41D8-93AF-95C1FFD2CEA2}"/>
+                <a16:creationId xmlns="" xmlns:a16="http://schemas.microsoft.com/office/drawing/2014/main" id="{2D05F327-8A08-41D8-93AF-95C1FFD2CEA2}"/>
               </a:ext>
             </a:extLst>
           </p:cNvPr>
@@ -19183,7 +19823,7 @@
           <p:cNvPr id="24" name="Arrow: Right 47">
             <a:extLst>
               <a:ext uri="{FF2B5EF4-FFF2-40B4-BE49-F238E27FC236}">
-                <a16:creationId xmlns:a16="http://schemas.microsoft.com/office/drawing/2014/main" xmlns="" id="{2D05F327-8A08-41D8-93AF-95C1FFD2CEA2}"/>
+                <a16:creationId xmlns="" xmlns:a16="http://schemas.microsoft.com/office/drawing/2014/main" id="{2D05F327-8A08-41D8-93AF-95C1FFD2CEA2}"/>
               </a:ext>
             </a:extLst>
           </p:cNvPr>
@@ -19243,7 +19883,7 @@
           <p:cNvPr id="26" name="Arrow: Right 47">
             <a:extLst>
               <a:ext uri="{FF2B5EF4-FFF2-40B4-BE49-F238E27FC236}">
-                <a16:creationId xmlns:a16="http://schemas.microsoft.com/office/drawing/2014/main" xmlns="" id="{2D05F327-8A08-41D8-93AF-95C1FFD2CEA2}"/>
+                <a16:creationId xmlns="" xmlns:a16="http://schemas.microsoft.com/office/drawing/2014/main" id="{2D05F327-8A08-41D8-93AF-95C1FFD2CEA2}"/>
               </a:ext>
             </a:extLst>
           </p:cNvPr>
@@ -20086,7 +20726,7 @@
           <p:cNvPr id="4" name="Picture 6" descr="A close up of a logo&#10;&#10;Description generated with very high confidence">
             <a:extLst>
               <a:ext uri="{FF2B5EF4-FFF2-40B4-BE49-F238E27FC236}">
-                <a16:creationId xmlns:a16="http://schemas.microsoft.com/office/drawing/2014/main" xmlns="" id="{C0330C5C-C655-42A8-BF9C-90E788CC6A92}"/>
+                <a16:creationId xmlns="" xmlns:a16="http://schemas.microsoft.com/office/drawing/2014/main" id="{C0330C5C-C655-42A8-BF9C-90E788CC6A92}"/>
               </a:ext>
             </a:extLst>
           </p:cNvPr>
@@ -20121,7 +20761,7 @@
           <p:cNvPr id="6" name="Picture 9" descr="A picture containing drawing&#10;&#10;Description generated with very high confidence">
             <a:extLst>
               <a:ext uri="{FF2B5EF4-FFF2-40B4-BE49-F238E27FC236}">
-                <a16:creationId xmlns:a16="http://schemas.microsoft.com/office/drawing/2014/main" xmlns="" id="{69BBBA96-ED0F-4961-8C6B-6543A7A55BAE}"/>
+                <a16:creationId xmlns="" xmlns:a16="http://schemas.microsoft.com/office/drawing/2014/main" id="{69BBBA96-ED0F-4961-8C6B-6543A7A55BAE}"/>
               </a:ext>
             </a:extLst>
           </p:cNvPr>
@@ -20154,7 +20794,7 @@
           <p:cNvPr id="8" name="Picture 11" descr="A picture containing object, clock, meter&#10;&#10;Description generated with very high confidence">
             <a:extLst>
               <a:ext uri="{FF2B5EF4-FFF2-40B4-BE49-F238E27FC236}">
-                <a16:creationId xmlns:a16="http://schemas.microsoft.com/office/drawing/2014/main" xmlns="" id="{FF7323CE-66D1-43A5-B3E1-17A59B7D36B4}"/>
+                <a16:creationId xmlns="" xmlns:a16="http://schemas.microsoft.com/office/drawing/2014/main" id="{FF7323CE-66D1-43A5-B3E1-17A59B7D36B4}"/>
               </a:ext>
             </a:extLst>
           </p:cNvPr>
@@ -20187,7 +20827,7 @@
           <p:cNvPr id="9" name="Picture 9" descr="A close up of a logo&#10;&#10;Description generated with very high confidence">
             <a:extLst>
               <a:ext uri="{FF2B5EF4-FFF2-40B4-BE49-F238E27FC236}">
-                <a16:creationId xmlns:a16="http://schemas.microsoft.com/office/drawing/2014/main" xmlns="" id="{FE7DD4F2-A92E-4806-B792-8484FE70F8E3}"/>
+                <a16:creationId xmlns="" xmlns:a16="http://schemas.microsoft.com/office/drawing/2014/main" id="{FE7DD4F2-A92E-4806-B792-8484FE70F8E3}"/>
               </a:ext>
             </a:extLst>
           </p:cNvPr>
@@ -20217,7 +20857,7 @@
           <p:cNvPr id="18" name="Picture 18" descr="A picture containing clock&#10;&#10;Description generated with very high confidence">
             <a:extLst>
               <a:ext uri="{FF2B5EF4-FFF2-40B4-BE49-F238E27FC236}">
-                <a16:creationId xmlns:a16="http://schemas.microsoft.com/office/drawing/2014/main" xmlns="" id="{0554376B-EDEF-4D1D-9EAE-F4D103F6E769}"/>
+                <a16:creationId xmlns="" xmlns:a16="http://schemas.microsoft.com/office/drawing/2014/main" id="{0554376B-EDEF-4D1D-9EAE-F4D103F6E769}"/>
               </a:ext>
             </a:extLst>
           </p:cNvPr>
@@ -20247,7 +20887,7 @@
           <p:cNvPr id="24" name="Picture 24" descr="A picture containing clock, flower&#10;&#10;Description generated with very high confidence">
             <a:extLst>
               <a:ext uri="{FF2B5EF4-FFF2-40B4-BE49-F238E27FC236}">
-                <a16:creationId xmlns:a16="http://schemas.microsoft.com/office/drawing/2014/main" xmlns="" id="{A539457C-5E7D-4840-803E-FB9943A9E863}"/>
+                <a16:creationId xmlns="" xmlns:a16="http://schemas.microsoft.com/office/drawing/2014/main" id="{A539457C-5E7D-4840-803E-FB9943A9E863}"/>
               </a:ext>
             </a:extLst>
           </p:cNvPr>
@@ -20277,7 +20917,7 @@
           <p:cNvPr id="26" name="Picture 26" descr="A picture containing drawing&#10;&#10;Description generated with very high confidence">
             <a:extLst>
               <a:ext uri="{FF2B5EF4-FFF2-40B4-BE49-F238E27FC236}">
-                <a16:creationId xmlns:a16="http://schemas.microsoft.com/office/drawing/2014/main" xmlns="" id="{E9BBDA87-9334-48F6-B549-DF8332853EB8}"/>
+                <a16:creationId xmlns="" xmlns:a16="http://schemas.microsoft.com/office/drawing/2014/main" id="{E9BBDA87-9334-48F6-B549-DF8332853EB8}"/>
               </a:ext>
             </a:extLst>
           </p:cNvPr>
@@ -20307,7 +20947,7 @@
           <p:cNvPr id="30" name="Picture 30" descr="A picture containing clock, meter&#10;&#10;Description generated with very high confidence">
             <a:extLst>
               <a:ext uri="{FF2B5EF4-FFF2-40B4-BE49-F238E27FC236}">
-                <a16:creationId xmlns:a16="http://schemas.microsoft.com/office/drawing/2014/main" xmlns="" id="{869F45C0-BEFD-4D0A-A30C-E3DE4CED26A1}"/>
+                <a16:creationId xmlns="" xmlns:a16="http://schemas.microsoft.com/office/drawing/2014/main" id="{869F45C0-BEFD-4D0A-A30C-E3DE4CED26A1}"/>
               </a:ext>
             </a:extLst>
           </p:cNvPr>
@@ -20337,7 +20977,7 @@
           <p:cNvPr id="32" name="Picture 32" descr="A close up of a logo&#10;&#10;Description generated with very high confidence">
             <a:extLst>
               <a:ext uri="{FF2B5EF4-FFF2-40B4-BE49-F238E27FC236}">
-                <a16:creationId xmlns:a16="http://schemas.microsoft.com/office/drawing/2014/main" xmlns="" id="{1ACF1988-3C5A-413A-B927-C4F08B32DC61}"/>
+                <a16:creationId xmlns="" xmlns:a16="http://schemas.microsoft.com/office/drawing/2014/main" id="{1ACF1988-3C5A-413A-B927-C4F08B32DC61}"/>
               </a:ext>
             </a:extLst>
           </p:cNvPr>
@@ -20367,7 +21007,7 @@
           <p:cNvPr id="48" name="Arrow: Right 47">
             <a:extLst>
               <a:ext uri="{FF2B5EF4-FFF2-40B4-BE49-F238E27FC236}">
-                <a16:creationId xmlns:a16="http://schemas.microsoft.com/office/drawing/2014/main" xmlns="" id="{2D05F327-8A08-41D8-93AF-95C1FFD2CEA2}"/>
+                <a16:creationId xmlns="" xmlns:a16="http://schemas.microsoft.com/office/drawing/2014/main" id="{2D05F327-8A08-41D8-93AF-95C1FFD2CEA2}"/>
               </a:ext>
             </a:extLst>
           </p:cNvPr>
@@ -20427,7 +21067,7 @@
           <p:cNvPr id="49" name="Arrow: Right 48">
             <a:extLst>
               <a:ext uri="{FF2B5EF4-FFF2-40B4-BE49-F238E27FC236}">
-                <a16:creationId xmlns:a16="http://schemas.microsoft.com/office/drawing/2014/main" xmlns="" id="{12342E48-7442-40ED-B882-627321DA0B53}"/>
+                <a16:creationId xmlns="" xmlns:a16="http://schemas.microsoft.com/office/drawing/2014/main" id="{12342E48-7442-40ED-B882-627321DA0B53}"/>
               </a:ext>
             </a:extLst>
           </p:cNvPr>
@@ -20487,7 +21127,7 @@
           <p:cNvPr id="7" name="Picture 9" descr="A picture containing drawing, clock&#10;&#10;Description generated with very high confidence">
             <a:extLst>
               <a:ext uri="{FF2B5EF4-FFF2-40B4-BE49-F238E27FC236}">
-                <a16:creationId xmlns:a16="http://schemas.microsoft.com/office/drawing/2014/main" xmlns="" id="{E3BBF243-DE79-4A22-BEF9-948645E23353}"/>
+                <a16:creationId xmlns="" xmlns:a16="http://schemas.microsoft.com/office/drawing/2014/main" id="{E3BBF243-DE79-4A22-BEF9-948645E23353}"/>
               </a:ext>
             </a:extLst>
           </p:cNvPr>
@@ -20517,7 +21157,7 @@
           <p:cNvPr id="11" name="Picture 11" descr="A close up of a logo&#10;&#10;Description generated with very high confidence">
             <a:extLst>
               <a:ext uri="{FF2B5EF4-FFF2-40B4-BE49-F238E27FC236}">
-                <a16:creationId xmlns:a16="http://schemas.microsoft.com/office/drawing/2014/main" xmlns="" id="{D8A39830-8EDF-46BA-BE71-70D4C02DC930}"/>
+                <a16:creationId xmlns="" xmlns:a16="http://schemas.microsoft.com/office/drawing/2014/main" id="{D8A39830-8EDF-46BA-BE71-70D4C02DC930}"/>
               </a:ext>
             </a:extLst>
           </p:cNvPr>
@@ -20860,7 +21500,7 @@
           <p:cNvPr id="2" name="Title 1">
             <a:extLst>
               <a:ext uri="{FF2B5EF4-FFF2-40B4-BE49-F238E27FC236}">
-                <a16:creationId xmlns:a16="http://schemas.microsoft.com/office/drawing/2014/main" xmlns="" id="{22DAD01F-DC17-4CB9-A59E-3B88FC10ACC0}"/>
+                <a16:creationId xmlns="" xmlns:a16="http://schemas.microsoft.com/office/drawing/2014/main" id="{22DAD01F-DC17-4CB9-A59E-3B88FC10ACC0}"/>
               </a:ext>
             </a:extLst>
           </p:cNvPr>
@@ -20891,7 +21531,7 @@
           <p:cNvPr id="4" name="Picture 6" descr="A close up of a logo&#10;&#10;Description generated with very high confidence">
             <a:extLst>
               <a:ext uri="{FF2B5EF4-FFF2-40B4-BE49-F238E27FC236}">
-                <a16:creationId xmlns:a16="http://schemas.microsoft.com/office/drawing/2014/main" xmlns="" id="{C0330C5C-C655-42A8-BF9C-90E788CC6A92}"/>
+                <a16:creationId xmlns="" xmlns:a16="http://schemas.microsoft.com/office/drawing/2014/main" id="{C0330C5C-C655-42A8-BF9C-90E788CC6A92}"/>
               </a:ext>
             </a:extLst>
           </p:cNvPr>
@@ -20926,7 +21566,7 @@
           <p:cNvPr id="6" name="Picture 9" descr="A picture containing drawing&#10;&#10;Description generated with very high confidence">
             <a:extLst>
               <a:ext uri="{FF2B5EF4-FFF2-40B4-BE49-F238E27FC236}">
-                <a16:creationId xmlns:a16="http://schemas.microsoft.com/office/drawing/2014/main" xmlns="" id="{69BBBA96-ED0F-4961-8C6B-6543A7A55BAE}"/>
+                <a16:creationId xmlns="" xmlns:a16="http://schemas.microsoft.com/office/drawing/2014/main" id="{69BBBA96-ED0F-4961-8C6B-6543A7A55BAE}"/>
               </a:ext>
             </a:extLst>
           </p:cNvPr>
@@ -20959,7 +21599,7 @@
           <p:cNvPr id="8" name="Picture 11" descr="A picture containing object, clock, meter&#10;&#10;Description generated with very high confidence">
             <a:extLst>
               <a:ext uri="{FF2B5EF4-FFF2-40B4-BE49-F238E27FC236}">
-                <a16:creationId xmlns:a16="http://schemas.microsoft.com/office/drawing/2014/main" xmlns="" id="{FF7323CE-66D1-43A5-B3E1-17A59B7D36B4}"/>
+                <a16:creationId xmlns="" xmlns:a16="http://schemas.microsoft.com/office/drawing/2014/main" id="{FF7323CE-66D1-43A5-B3E1-17A59B7D36B4}"/>
               </a:ext>
             </a:extLst>
           </p:cNvPr>
@@ -20992,7 +21632,7 @@
           <p:cNvPr id="36" name="Picture 38" descr="A close up of a logo&#10;&#10;Description generated with very high confidence">
             <a:extLst>
               <a:ext uri="{FF2B5EF4-FFF2-40B4-BE49-F238E27FC236}">
-                <a16:creationId xmlns:a16="http://schemas.microsoft.com/office/drawing/2014/main" xmlns="" id="{420FFD42-44DD-44E8-A92B-9618CCA5334E}"/>
+                <a16:creationId xmlns="" xmlns:a16="http://schemas.microsoft.com/office/drawing/2014/main" id="{420FFD42-44DD-44E8-A92B-9618CCA5334E}"/>
               </a:ext>
             </a:extLst>
           </p:cNvPr>
@@ -21022,7 +21662,7 @@
           <p:cNvPr id="42" name="TextBox 41">
             <a:extLst>
               <a:ext uri="{FF2B5EF4-FFF2-40B4-BE49-F238E27FC236}">
-                <a16:creationId xmlns:a16="http://schemas.microsoft.com/office/drawing/2014/main" xmlns="" id="{4A1648FC-A785-47A2-972E-144548C6A37A}"/>
+                <a16:creationId xmlns="" xmlns:a16="http://schemas.microsoft.com/office/drawing/2014/main" id="{4A1648FC-A785-47A2-972E-144548C6A37A}"/>
               </a:ext>
             </a:extLst>
           </p:cNvPr>
@@ -21085,7 +21725,7 @@
           <p:cNvPr id="3" name="Picture 6" descr="A close up of a logo&#10;&#10;Description generated with very high confidence">
             <a:extLst>
               <a:ext uri="{FF2B5EF4-FFF2-40B4-BE49-F238E27FC236}">
-                <a16:creationId xmlns:a16="http://schemas.microsoft.com/office/drawing/2014/main" xmlns="" id="{EB0483D7-19D7-4ABE-BBD1-92C485E92A96}"/>
+                <a16:creationId xmlns="" xmlns:a16="http://schemas.microsoft.com/office/drawing/2014/main" id="{EB0483D7-19D7-4ABE-BBD1-92C485E92A96}"/>
               </a:ext>
             </a:extLst>
           </p:cNvPr>
@@ -21115,7 +21755,7 @@
           <p:cNvPr id="14" name="Picture 15" descr="A picture containing drawing&#10;&#10;Description generated with very high confidence">
             <a:extLst>
               <a:ext uri="{FF2B5EF4-FFF2-40B4-BE49-F238E27FC236}">
-                <a16:creationId xmlns:a16="http://schemas.microsoft.com/office/drawing/2014/main" xmlns="" id="{67173B02-00E6-431E-B1D9-2ED1D4D3BC15}"/>
+                <a16:creationId xmlns="" xmlns:a16="http://schemas.microsoft.com/office/drawing/2014/main" id="{67173B02-00E6-431E-B1D9-2ED1D4D3BC15}"/>
               </a:ext>
             </a:extLst>
           </p:cNvPr>
@@ -21145,7 +21785,7 @@
           <p:cNvPr id="17" name="Picture 17" descr="A close up of a sign&#10;&#10;Description generated with high confidence">
             <a:extLst>
               <a:ext uri="{FF2B5EF4-FFF2-40B4-BE49-F238E27FC236}">
-                <a16:creationId xmlns:a16="http://schemas.microsoft.com/office/drawing/2014/main" xmlns="" id="{0A8A96EA-BC25-47CB-9481-2730C59E39A6}"/>
+                <a16:creationId xmlns="" xmlns:a16="http://schemas.microsoft.com/office/drawing/2014/main" id="{0A8A96EA-BC25-47CB-9481-2730C59E39A6}"/>
               </a:ext>
             </a:extLst>
           </p:cNvPr>
@@ -21175,7 +21815,7 @@
           <p:cNvPr id="20" name="Picture 22" descr="A close up of a logo&#10;&#10;Description generated with very high confidence">
             <a:extLst>
               <a:ext uri="{FF2B5EF4-FFF2-40B4-BE49-F238E27FC236}">
-                <a16:creationId xmlns:a16="http://schemas.microsoft.com/office/drawing/2014/main" xmlns="" id="{37451824-955B-48FC-A9FB-296A676691EB}"/>
+                <a16:creationId xmlns="" xmlns:a16="http://schemas.microsoft.com/office/drawing/2014/main" id="{37451824-955B-48FC-A9FB-296A676691EB}"/>
               </a:ext>
             </a:extLst>
           </p:cNvPr>
@@ -21205,7 +21845,7 @@
           <p:cNvPr id="30" name="TextBox 29">
             <a:extLst>
               <a:ext uri="{FF2B5EF4-FFF2-40B4-BE49-F238E27FC236}">
-                <a16:creationId xmlns:a16="http://schemas.microsoft.com/office/drawing/2014/main" xmlns="" id="{BE57CFEE-F67A-4F41-9B77-19FF3D26D989}"/>
+                <a16:creationId xmlns="" xmlns:a16="http://schemas.microsoft.com/office/drawing/2014/main" id="{BE57CFEE-F67A-4F41-9B77-19FF3D26D989}"/>
               </a:ext>
             </a:extLst>
           </p:cNvPr>
@@ -21244,7 +21884,7 @@
           <p:cNvPr id="32" name="Picture 16" descr="A close up of a logo&#10;&#10;Description generated with very high confidence">
             <a:extLst>
               <a:ext uri="{FF2B5EF4-FFF2-40B4-BE49-F238E27FC236}">
-                <a16:creationId xmlns:a16="http://schemas.microsoft.com/office/drawing/2014/main" xmlns="" id="{B6710F19-314C-4D01-AF28-99CAA07A72BD}"/>
+                <a16:creationId xmlns="" xmlns:a16="http://schemas.microsoft.com/office/drawing/2014/main" id="{B6710F19-314C-4D01-AF28-99CAA07A72BD}"/>
               </a:ext>
             </a:extLst>
           </p:cNvPr>
@@ -21279,7 +21919,7 @@
           <p:cNvPr id="39" name="Picture 48">
             <a:extLst>
               <a:ext uri="{FF2B5EF4-FFF2-40B4-BE49-F238E27FC236}">
-                <a16:creationId xmlns:a16="http://schemas.microsoft.com/office/drawing/2014/main" xmlns="" id="{A41ED3DF-A72D-4512-BA28-3C8620D02B18}"/>
+                <a16:creationId xmlns="" xmlns:a16="http://schemas.microsoft.com/office/drawing/2014/main" id="{A41ED3DF-A72D-4512-BA28-3C8620D02B18}"/>
               </a:ext>
             </a:extLst>
           </p:cNvPr>
@@ -21320,7 +21960,7 @@
           <p:cNvPr id="50" name="Left Brace 49">
             <a:extLst>
               <a:ext uri="{FF2B5EF4-FFF2-40B4-BE49-F238E27FC236}">
-                <a16:creationId xmlns:a16="http://schemas.microsoft.com/office/drawing/2014/main" xmlns="" id="{B724A079-B0F7-4EA5-BD89-9E8660E7138E}"/>
+                <a16:creationId xmlns="" xmlns:a16="http://schemas.microsoft.com/office/drawing/2014/main" id="{B724A079-B0F7-4EA5-BD89-9E8660E7138E}"/>
               </a:ext>
             </a:extLst>
           </p:cNvPr>
@@ -21372,7 +22012,7 @@
           <p:cNvPr id="51" name="Left Brace 50">
             <a:extLst>
               <a:ext uri="{FF2B5EF4-FFF2-40B4-BE49-F238E27FC236}">
-                <a16:creationId xmlns:a16="http://schemas.microsoft.com/office/drawing/2014/main" xmlns="" id="{5CC00877-2B2F-4FF7-9F4E-CADACF95078F}"/>
+                <a16:creationId xmlns="" xmlns:a16="http://schemas.microsoft.com/office/drawing/2014/main" id="{5CC00877-2B2F-4FF7-9F4E-CADACF95078F}"/>
               </a:ext>
             </a:extLst>
           </p:cNvPr>
@@ -21424,7 +22064,7 @@
           <p:cNvPr id="52" name="Left Brace 51">
             <a:extLst>
               <a:ext uri="{FF2B5EF4-FFF2-40B4-BE49-F238E27FC236}">
-                <a16:creationId xmlns:a16="http://schemas.microsoft.com/office/drawing/2014/main" xmlns="" id="{13618B25-73AF-47A7-BEAF-393C5782156E}"/>
+                <a16:creationId xmlns="" xmlns:a16="http://schemas.microsoft.com/office/drawing/2014/main" id="{13618B25-73AF-47A7-BEAF-393C5782156E}"/>
               </a:ext>
             </a:extLst>
           </p:cNvPr>
@@ -21476,7 +22116,7 @@
           <p:cNvPr id="53" name="Left Brace 52">
             <a:extLst>
               <a:ext uri="{FF2B5EF4-FFF2-40B4-BE49-F238E27FC236}">
-                <a16:creationId xmlns:a16="http://schemas.microsoft.com/office/drawing/2014/main" xmlns="" id="{B0FCB8FB-0BF8-4D3B-A796-DF6C215E4800}"/>
+                <a16:creationId xmlns="" xmlns:a16="http://schemas.microsoft.com/office/drawing/2014/main" id="{B0FCB8FB-0BF8-4D3B-A796-DF6C215E4800}"/>
               </a:ext>
             </a:extLst>
           </p:cNvPr>
@@ -21528,7 +22168,7 @@
           <p:cNvPr id="54" name="Left Brace 53">
             <a:extLst>
               <a:ext uri="{FF2B5EF4-FFF2-40B4-BE49-F238E27FC236}">
-                <a16:creationId xmlns:a16="http://schemas.microsoft.com/office/drawing/2014/main" xmlns="" id="{878D048C-4583-4231-86E3-AD69D44F351C}"/>
+                <a16:creationId xmlns="" xmlns:a16="http://schemas.microsoft.com/office/drawing/2014/main" id="{878D048C-4583-4231-86E3-AD69D44F351C}"/>
               </a:ext>
             </a:extLst>
           </p:cNvPr>
@@ -21580,7 +22220,7 @@
           <p:cNvPr id="56" name="Left Brace 55">
             <a:extLst>
               <a:ext uri="{FF2B5EF4-FFF2-40B4-BE49-F238E27FC236}">
-                <a16:creationId xmlns:a16="http://schemas.microsoft.com/office/drawing/2014/main" xmlns="" id="{AC0A0AA7-85B9-4F8B-8302-7F14B47D63C8}"/>
+                <a16:creationId xmlns="" xmlns:a16="http://schemas.microsoft.com/office/drawing/2014/main" id="{AC0A0AA7-85B9-4F8B-8302-7F14B47D63C8}"/>
               </a:ext>
             </a:extLst>
           </p:cNvPr>
@@ -21632,7 +22272,7 @@
           <p:cNvPr id="57" name="TextBox 56">
             <a:extLst>
               <a:ext uri="{FF2B5EF4-FFF2-40B4-BE49-F238E27FC236}">
-                <a16:creationId xmlns:a16="http://schemas.microsoft.com/office/drawing/2014/main" xmlns="" id="{B9237312-2A37-4DA7-80C8-DD6DE0CA3F10}"/>
+                <a16:creationId xmlns="" xmlns:a16="http://schemas.microsoft.com/office/drawing/2014/main" id="{B9237312-2A37-4DA7-80C8-DD6DE0CA3F10}"/>
               </a:ext>
             </a:extLst>
           </p:cNvPr>
@@ -21671,7 +22311,7 @@
           <p:cNvPr id="58" name="Picture 58" descr="A close up of a logo&#10;&#10;Description generated with very high confidence">
             <a:extLst>
               <a:ext uri="{FF2B5EF4-FFF2-40B4-BE49-F238E27FC236}">
-                <a16:creationId xmlns:a16="http://schemas.microsoft.com/office/drawing/2014/main" xmlns="" id="{3B49DE5A-D97D-4BC4-A2BD-FA203356C5E4}"/>
+                <a16:creationId xmlns="" xmlns:a16="http://schemas.microsoft.com/office/drawing/2014/main" id="{3B49DE5A-D97D-4BC4-A2BD-FA203356C5E4}"/>
               </a:ext>
             </a:extLst>
           </p:cNvPr>
@@ -21701,7 +22341,7 @@
           <p:cNvPr id="60" name="Picture 60" descr="A picture containing object, clock&#10;&#10;Description generated with very high confidence">
             <a:extLst>
               <a:ext uri="{FF2B5EF4-FFF2-40B4-BE49-F238E27FC236}">
-                <a16:creationId xmlns:a16="http://schemas.microsoft.com/office/drawing/2014/main" xmlns="" id="{8DE5578F-2C71-4470-805B-58B6F36E89D7}"/>
+                <a16:creationId xmlns="" xmlns:a16="http://schemas.microsoft.com/office/drawing/2014/main" id="{8DE5578F-2C71-4470-805B-58B6F36E89D7}"/>
               </a:ext>
             </a:extLst>
           </p:cNvPr>
@@ -21731,7 +22371,7 @@
           <p:cNvPr id="62" name="Picture 62" descr="A picture containing drawing&#10;&#10;Description generated with very high confidence">
             <a:extLst>
               <a:ext uri="{FF2B5EF4-FFF2-40B4-BE49-F238E27FC236}">
-                <a16:creationId xmlns:a16="http://schemas.microsoft.com/office/drawing/2014/main" xmlns="" id="{E4E6676D-610B-47E8-8C2C-B0A327A4AC8D}"/>
+                <a16:creationId xmlns="" xmlns:a16="http://schemas.microsoft.com/office/drawing/2014/main" id="{E4E6676D-610B-47E8-8C2C-B0A327A4AC8D}"/>
               </a:ext>
             </a:extLst>
           </p:cNvPr>
@@ -21761,7 +22401,7 @@
           <p:cNvPr id="65" name="Picture 19" descr="A close up of a logo&#10;&#10;Description generated with very high confidence">
             <a:extLst>
               <a:ext uri="{FF2B5EF4-FFF2-40B4-BE49-F238E27FC236}">
-                <a16:creationId xmlns:a16="http://schemas.microsoft.com/office/drawing/2014/main" xmlns="" id="{7C31043C-B453-4648-893A-8B3CC0ADF1DB}"/>
+                <a16:creationId xmlns="" xmlns:a16="http://schemas.microsoft.com/office/drawing/2014/main" id="{7C31043C-B453-4648-893A-8B3CC0ADF1DB}"/>
               </a:ext>
             </a:extLst>
           </p:cNvPr>
@@ -21791,7 +22431,7 @@
           <p:cNvPr id="26" name="Arrow: Right 47">
             <a:extLst>
               <a:ext uri="{FF2B5EF4-FFF2-40B4-BE49-F238E27FC236}">
-                <a16:creationId xmlns:a16="http://schemas.microsoft.com/office/drawing/2014/main" xmlns="" id="{2D05F327-8A08-41D8-93AF-95C1FFD2CEA2}"/>
+                <a16:creationId xmlns="" xmlns:a16="http://schemas.microsoft.com/office/drawing/2014/main" id="{2D05F327-8A08-41D8-93AF-95C1FFD2CEA2}"/>
               </a:ext>
             </a:extLst>
           </p:cNvPr>
@@ -22031,7 +22671,7 @@
           <p:cNvPr id="34" name="Arrow: Right 48">
             <a:extLst>
               <a:ext uri="{FF2B5EF4-FFF2-40B4-BE49-F238E27FC236}">
-                <a16:creationId xmlns:a16="http://schemas.microsoft.com/office/drawing/2014/main" xmlns="" id="{12342E48-7442-40ED-B882-627321DA0B53}"/>
+                <a16:creationId xmlns="" xmlns:a16="http://schemas.microsoft.com/office/drawing/2014/main" id="{12342E48-7442-40ED-B882-627321DA0B53}"/>
               </a:ext>
             </a:extLst>
           </p:cNvPr>
@@ -22091,7 +22731,7 @@
           <p:cNvPr id="35" name="Arrow: Right 48">
             <a:extLst>
               <a:ext uri="{FF2B5EF4-FFF2-40B4-BE49-F238E27FC236}">
-                <a16:creationId xmlns:a16="http://schemas.microsoft.com/office/drawing/2014/main" xmlns="" id="{12342E48-7442-40ED-B882-627321DA0B53}"/>
+                <a16:creationId xmlns="" xmlns:a16="http://schemas.microsoft.com/office/drawing/2014/main" id="{12342E48-7442-40ED-B882-627321DA0B53}"/>
               </a:ext>
             </a:extLst>
           </p:cNvPr>
@@ -22151,7 +22791,7 @@
           <p:cNvPr id="37" name="Right Brace 36">
             <a:extLst>
               <a:ext uri="{FF2B5EF4-FFF2-40B4-BE49-F238E27FC236}">
-                <a16:creationId xmlns:a16="http://schemas.microsoft.com/office/drawing/2014/main" xmlns="" id="{B123DDFB-BA27-413F-8F72-48EF2FDDE207}"/>
+                <a16:creationId xmlns="" xmlns:a16="http://schemas.microsoft.com/office/drawing/2014/main" id="{B123DDFB-BA27-413F-8F72-48EF2FDDE207}"/>
               </a:ext>
             </a:extLst>
           </p:cNvPr>
@@ -22203,7 +22843,7 @@
           <p:cNvPr id="38" name="Right Brace 37">
             <a:extLst>
               <a:ext uri="{FF2B5EF4-FFF2-40B4-BE49-F238E27FC236}">
-                <a16:creationId xmlns:a16="http://schemas.microsoft.com/office/drawing/2014/main" xmlns="" id="{8D8C0313-13A4-4FAA-9612-4D1FC8C80DFF}"/>
+                <a16:creationId xmlns="" xmlns:a16="http://schemas.microsoft.com/office/drawing/2014/main" id="{8D8C0313-13A4-4FAA-9612-4D1FC8C80DFF}"/>
               </a:ext>
             </a:extLst>
           </p:cNvPr>
@@ -22255,7 +22895,7 @@
           <p:cNvPr id="40" name="Picture 28" descr="A close up of a sign&#10;&#10;Description generated with high confidence">
             <a:extLst>
               <a:ext uri="{FF2B5EF4-FFF2-40B4-BE49-F238E27FC236}">
-                <a16:creationId xmlns:a16="http://schemas.microsoft.com/office/drawing/2014/main" xmlns="" id="{A9F7282D-9E32-4A50-84EA-BE35636CF009}"/>
+                <a16:creationId xmlns="" xmlns:a16="http://schemas.microsoft.com/office/drawing/2014/main" id="{A9F7282D-9E32-4A50-84EA-BE35636CF009}"/>
               </a:ext>
             </a:extLst>
           </p:cNvPr>
@@ -22285,7 +22925,7 @@
           <p:cNvPr id="41" name="Picture 32" descr="A close up of a logo&#10;&#10;Description generated with very high confidence">
             <a:extLst>
               <a:ext uri="{FF2B5EF4-FFF2-40B4-BE49-F238E27FC236}">
-                <a16:creationId xmlns:a16="http://schemas.microsoft.com/office/drawing/2014/main" xmlns="" id="{7D7F121C-1B9A-47CF-A882-FA34E6A6E361}"/>
+                <a16:creationId xmlns="" xmlns:a16="http://schemas.microsoft.com/office/drawing/2014/main" id="{7D7F121C-1B9A-47CF-A882-FA34E6A6E361}"/>
               </a:ext>
             </a:extLst>
           </p:cNvPr>
@@ -23466,7 +24106,7 @@
           <p:cNvPr id="4" name="Picture 3" descr="A close up of a logo&#10;&#10;Description generated with very high confidence">
             <a:extLst>
               <a:ext uri="{FF2B5EF4-FFF2-40B4-BE49-F238E27FC236}">
-                <a16:creationId xmlns:a16="http://schemas.microsoft.com/office/drawing/2014/main" xmlns="" id="{6E87F861-F9AC-4F21-B0C8-58EB55E95B97}"/>
+                <a16:creationId xmlns="" xmlns:a16="http://schemas.microsoft.com/office/drawing/2014/main" id="{6E87F861-F9AC-4F21-B0C8-58EB55E95B97}"/>
               </a:ext>
             </a:extLst>
           </p:cNvPr>
@@ -23496,7 +24136,7 @@
           <p:cNvPr id="6" name="Arrow: Down 7">
             <a:extLst>
               <a:ext uri="{FF2B5EF4-FFF2-40B4-BE49-F238E27FC236}">
-                <a16:creationId xmlns:a16="http://schemas.microsoft.com/office/drawing/2014/main" xmlns="" id="{82AB09DD-DB63-4806-A980-AE0CB9781D42}"/>
+                <a16:creationId xmlns="" xmlns:a16="http://schemas.microsoft.com/office/drawing/2014/main" id="{82AB09DD-DB63-4806-A980-AE0CB9781D42}"/>
               </a:ext>
             </a:extLst>
           </p:cNvPr>
@@ -23550,7 +24190,7 @@
           <p:cNvPr id="12" name="TextBox 11">
             <a:extLst>
               <a:ext uri="{FF2B5EF4-FFF2-40B4-BE49-F238E27FC236}">
-                <a16:creationId xmlns:a16="http://schemas.microsoft.com/office/drawing/2014/main" xmlns="" id="{02939EE3-25E8-4AA1-A0EF-AEA68207BAAD}"/>
+                <a16:creationId xmlns="" xmlns:a16="http://schemas.microsoft.com/office/drawing/2014/main" id="{02939EE3-25E8-4AA1-A0EF-AEA68207BAAD}"/>
               </a:ext>
             </a:extLst>
           </p:cNvPr>
@@ -23673,7 +24313,7 @@
           <p:cNvPr id="21" name="Arrow: Down 7">
             <a:extLst>
               <a:ext uri="{FF2B5EF4-FFF2-40B4-BE49-F238E27FC236}">
-                <a16:creationId xmlns:a16="http://schemas.microsoft.com/office/drawing/2014/main" xmlns="" id="{82AB09DD-DB63-4806-A980-AE0CB9781D42}"/>
+                <a16:creationId xmlns="" xmlns:a16="http://schemas.microsoft.com/office/drawing/2014/main" id="{82AB09DD-DB63-4806-A980-AE0CB9781D42}"/>
               </a:ext>
             </a:extLst>
           </p:cNvPr>
@@ -23727,7 +24367,7 @@
           <p:cNvPr id="27" name="Arrow: Down 7">
             <a:extLst>
               <a:ext uri="{FF2B5EF4-FFF2-40B4-BE49-F238E27FC236}">
-                <a16:creationId xmlns:a16="http://schemas.microsoft.com/office/drawing/2014/main" xmlns="" id="{82AB09DD-DB63-4806-A980-AE0CB9781D42}"/>
+                <a16:creationId xmlns="" xmlns:a16="http://schemas.microsoft.com/office/drawing/2014/main" id="{82AB09DD-DB63-4806-A980-AE0CB9781D42}"/>
               </a:ext>
             </a:extLst>
           </p:cNvPr>
@@ -23915,7 +24555,7 @@
           <p:cNvPr id="34" name="TextBox 33">
             <a:extLst>
               <a:ext uri="{FF2B5EF4-FFF2-40B4-BE49-F238E27FC236}">
-                <a16:creationId xmlns:a16="http://schemas.microsoft.com/office/drawing/2014/main" xmlns="" id="{E8C512F0-66D0-4B8A-B0A7-993EEF9E5139}"/>
+                <a16:creationId xmlns="" xmlns:a16="http://schemas.microsoft.com/office/drawing/2014/main" id="{E8C512F0-66D0-4B8A-B0A7-993EEF9E5139}"/>
               </a:ext>
             </a:extLst>
           </p:cNvPr>
@@ -23974,7 +24614,7 @@
           <p:cNvPr id="35" name="TextBox 34">
             <a:extLst>
               <a:ext uri="{FF2B5EF4-FFF2-40B4-BE49-F238E27FC236}">
-                <a16:creationId xmlns:a16="http://schemas.microsoft.com/office/drawing/2014/main" xmlns="" id="{7E86E019-DB97-4D67-8777-EE3CB4990CA9}"/>
+                <a16:creationId xmlns="" xmlns:a16="http://schemas.microsoft.com/office/drawing/2014/main" id="{7E86E019-DB97-4D67-8777-EE3CB4990CA9}"/>
               </a:ext>
             </a:extLst>
           </p:cNvPr>
@@ -24033,7 +24673,7 @@
           <p:cNvPr id="38" name="Arrow: Right 13">
             <a:extLst>
               <a:ext uri="{FF2B5EF4-FFF2-40B4-BE49-F238E27FC236}">
-                <a16:creationId xmlns:a16="http://schemas.microsoft.com/office/drawing/2014/main" xmlns="" id="{169BB430-EBE9-48D3-BBC7-66B17AF3C24B}"/>
+                <a16:creationId xmlns="" xmlns:a16="http://schemas.microsoft.com/office/drawing/2014/main" id="{169BB430-EBE9-48D3-BBC7-66B17AF3C24B}"/>
               </a:ext>
             </a:extLst>
           </p:cNvPr>
@@ -24077,7 +24717,7 @@
           <p:cNvPr id="39" name="Arrow: Right 13">
             <a:extLst>
               <a:ext uri="{FF2B5EF4-FFF2-40B4-BE49-F238E27FC236}">
-                <a16:creationId xmlns:a16="http://schemas.microsoft.com/office/drawing/2014/main" xmlns="" id="{169BB430-EBE9-48D3-BBC7-66B17AF3C24B}"/>
+                <a16:creationId xmlns="" xmlns:a16="http://schemas.microsoft.com/office/drawing/2014/main" id="{169BB430-EBE9-48D3-BBC7-66B17AF3C24B}"/>
               </a:ext>
             </a:extLst>
           </p:cNvPr>
@@ -24121,7 +24761,7 @@
           <p:cNvPr id="17" name="Picture 13" descr="A close up of a logo&#10;&#10;Description generated with very high confidence">
             <a:extLst>
               <a:ext uri="{FF2B5EF4-FFF2-40B4-BE49-F238E27FC236}">
-                <a16:creationId xmlns:a16="http://schemas.microsoft.com/office/drawing/2014/main" xmlns="" id="{ECAD198D-1469-41D2-8E92-807888FE870D}"/>
+                <a16:creationId xmlns="" xmlns:a16="http://schemas.microsoft.com/office/drawing/2014/main" id="{ECAD198D-1469-41D2-8E92-807888FE870D}"/>
               </a:ext>
             </a:extLst>
           </p:cNvPr>
@@ -24649,7 +25289,7 @@
           <p:cNvPr id="4" name="Picture 3" descr="A close up of a logo&#10;&#10;Description generated with very high confidence">
             <a:extLst>
               <a:ext uri="{FF2B5EF4-FFF2-40B4-BE49-F238E27FC236}">
-                <a16:creationId xmlns:a16="http://schemas.microsoft.com/office/drawing/2014/main" xmlns="" id="{6E87F861-F9AC-4F21-B0C8-58EB55E95B97}"/>
+                <a16:creationId xmlns="" xmlns:a16="http://schemas.microsoft.com/office/drawing/2014/main" id="{6E87F861-F9AC-4F21-B0C8-58EB55E95B97}"/>
               </a:ext>
             </a:extLst>
           </p:cNvPr>
@@ -24679,7 +25319,7 @@
           <p:cNvPr id="6" name="Arrow: Down 7">
             <a:extLst>
               <a:ext uri="{FF2B5EF4-FFF2-40B4-BE49-F238E27FC236}">
-                <a16:creationId xmlns:a16="http://schemas.microsoft.com/office/drawing/2014/main" xmlns="" id="{82AB09DD-DB63-4806-A980-AE0CB9781D42}"/>
+                <a16:creationId xmlns="" xmlns:a16="http://schemas.microsoft.com/office/drawing/2014/main" id="{82AB09DD-DB63-4806-A980-AE0CB9781D42}"/>
               </a:ext>
             </a:extLst>
           </p:cNvPr>
@@ -24763,7 +25403,7 @@
           <p:cNvPr id="15" name="Picture 7" descr="A close up of a logo&#10;&#10;Description generated with very high confidence">
             <a:extLst>
               <a:ext uri="{FF2B5EF4-FFF2-40B4-BE49-F238E27FC236}">
-                <a16:creationId xmlns:a16="http://schemas.microsoft.com/office/drawing/2014/main" xmlns="" id="{CCA1FA7B-C942-4986-AB3B-54E0615F8F08}"/>
+                <a16:creationId xmlns="" xmlns:a16="http://schemas.microsoft.com/office/drawing/2014/main" id="{CCA1FA7B-C942-4986-AB3B-54E0615F8F08}"/>
               </a:ext>
             </a:extLst>
           </p:cNvPr>
@@ -24793,7 +25433,7 @@
           <p:cNvPr id="16" name="Arrow: Down 9">
             <a:extLst>
               <a:ext uri="{FF2B5EF4-FFF2-40B4-BE49-F238E27FC236}">
-                <a16:creationId xmlns:a16="http://schemas.microsoft.com/office/drawing/2014/main" xmlns="" id="{74C91D1A-CCF6-4DE0-B080-D77210A893FD}"/>
+                <a16:creationId xmlns="" xmlns:a16="http://schemas.microsoft.com/office/drawing/2014/main" id="{74C91D1A-CCF6-4DE0-B080-D77210A893FD}"/>
               </a:ext>
             </a:extLst>
           </p:cNvPr>
@@ -24847,7 +25487,7 @@
           <p:cNvPr id="17" name="TextBox 16">
             <a:extLst>
               <a:ext uri="{FF2B5EF4-FFF2-40B4-BE49-F238E27FC236}">
-                <a16:creationId xmlns:a16="http://schemas.microsoft.com/office/drawing/2014/main" xmlns="" id="{EBD1E537-F5C7-43D5-8C6F-6CFA11A95BD2}"/>
+                <a16:creationId xmlns="" xmlns:a16="http://schemas.microsoft.com/office/drawing/2014/main" id="{EBD1E537-F5C7-43D5-8C6F-6CFA11A95BD2}"/>
               </a:ext>
             </a:extLst>
           </p:cNvPr>
@@ -25181,7 +25821,7 @@
           <p:cNvPr id="15" name="Picture 7" descr="A close up of a logo&#10;&#10;Description generated with very high confidence">
             <a:extLst>
               <a:ext uri="{FF2B5EF4-FFF2-40B4-BE49-F238E27FC236}">
-                <a16:creationId xmlns:a16="http://schemas.microsoft.com/office/drawing/2014/main" xmlns="" id="{CCA1FA7B-C942-4986-AB3B-54E0615F8F08}"/>
+                <a16:creationId xmlns="" xmlns:a16="http://schemas.microsoft.com/office/drawing/2014/main" id="{CCA1FA7B-C942-4986-AB3B-54E0615F8F08}"/>
               </a:ext>
             </a:extLst>
           </p:cNvPr>
@@ -25426,7 +26066,7 @@
           <p:cNvPr id="15" name="Picture 7" descr="A close up of a logo&#10;&#10;Description generated with very high confidence">
             <a:extLst>
               <a:ext uri="{FF2B5EF4-FFF2-40B4-BE49-F238E27FC236}">
-                <a16:creationId xmlns:a16="http://schemas.microsoft.com/office/drawing/2014/main" xmlns="" id="{CCA1FA7B-C942-4986-AB3B-54E0615F8F08}"/>
+                <a16:creationId xmlns="" xmlns:a16="http://schemas.microsoft.com/office/drawing/2014/main" id="{CCA1FA7B-C942-4986-AB3B-54E0615F8F08}"/>
               </a:ext>
             </a:extLst>
           </p:cNvPr>
@@ -25666,7 +26306,7 @@
           <p:cNvPr id="18" name="Picture 7" descr="A close up of a logo&#10;&#10;Description generated with very high confidence">
             <a:extLst>
               <a:ext uri="{FF2B5EF4-FFF2-40B4-BE49-F238E27FC236}">
-                <a16:creationId xmlns:a16="http://schemas.microsoft.com/office/drawing/2014/main" xmlns="" id="{CCA1FA7B-C942-4986-AB3B-54E0615F8F08}"/>
+                <a16:creationId xmlns="" xmlns:a16="http://schemas.microsoft.com/office/drawing/2014/main" id="{CCA1FA7B-C942-4986-AB3B-54E0615F8F08}"/>
               </a:ext>
             </a:extLst>
           </p:cNvPr>
@@ -25756,7 +26396,7 @@
           <p:cNvPr id="24" name="Arrow: Down 7">
             <a:extLst>
               <a:ext uri="{FF2B5EF4-FFF2-40B4-BE49-F238E27FC236}">
-                <a16:creationId xmlns:a16="http://schemas.microsoft.com/office/drawing/2014/main" xmlns="" id="{82AB09DD-DB63-4806-A980-AE0CB9781D42}"/>
+                <a16:creationId xmlns="" xmlns:a16="http://schemas.microsoft.com/office/drawing/2014/main" id="{82AB09DD-DB63-4806-A980-AE0CB9781D42}"/>
               </a:ext>
             </a:extLst>
           </p:cNvPr>
@@ -25810,7 +26450,7 @@
           <p:cNvPr id="25" name="Arrow: Down 7">
             <a:extLst>
               <a:ext uri="{FF2B5EF4-FFF2-40B4-BE49-F238E27FC236}">
-                <a16:creationId xmlns:a16="http://schemas.microsoft.com/office/drawing/2014/main" xmlns="" id="{82AB09DD-DB63-4806-A980-AE0CB9781D42}"/>
+                <a16:creationId xmlns="" xmlns:a16="http://schemas.microsoft.com/office/drawing/2014/main" id="{82AB09DD-DB63-4806-A980-AE0CB9781D42}"/>
               </a:ext>
             </a:extLst>
           </p:cNvPr>
@@ -26009,7 +26649,7 @@
           <p:cNvPr id="2" name="Title 1">
             <a:extLst>
               <a:ext uri="{FF2B5EF4-FFF2-40B4-BE49-F238E27FC236}">
-                <a16:creationId xmlns:a16="http://schemas.microsoft.com/office/drawing/2014/main" xmlns="" id="{9B3E31B1-1524-4917-9285-17E913845064}"/>
+                <a16:creationId xmlns="" xmlns:a16="http://schemas.microsoft.com/office/drawing/2014/main" id="{9B3E31B1-1524-4917-9285-17E913845064}"/>
               </a:ext>
             </a:extLst>
           </p:cNvPr>
@@ -26040,7 +26680,7 @@
           <p:cNvPr id="7" name="TextBox 6">
             <a:extLst>
               <a:ext uri="{FF2B5EF4-FFF2-40B4-BE49-F238E27FC236}">
-                <a16:creationId xmlns:a16="http://schemas.microsoft.com/office/drawing/2014/main" xmlns="" id="{3C8D1A93-8E34-461B-AE33-3F2AF8EDEDE3}"/>
+                <a16:creationId xmlns="" xmlns:a16="http://schemas.microsoft.com/office/drawing/2014/main" id="{3C8D1A93-8E34-461B-AE33-3F2AF8EDEDE3}"/>
               </a:ext>
             </a:extLst>
           </p:cNvPr>
@@ -26081,7 +26721,7 @@
           <p:cNvPr id="12" name="Picture 12" descr="A close up of a logo&#10;&#10;Description generated with very high confidence">
             <a:extLst>
               <a:ext uri="{FF2B5EF4-FFF2-40B4-BE49-F238E27FC236}">
-                <a16:creationId xmlns:a16="http://schemas.microsoft.com/office/drawing/2014/main" xmlns="" id="{BCB28C98-A97C-401C-8299-EB6FC4F8EC07}"/>
+                <a16:creationId xmlns="" xmlns:a16="http://schemas.microsoft.com/office/drawing/2014/main" id="{BCB28C98-A97C-401C-8299-EB6FC4F8EC07}"/>
               </a:ext>
             </a:extLst>
           </p:cNvPr>
@@ -26111,7 +26751,7 @@
           <p:cNvPr id="15" name="TextBox 14">
             <a:extLst>
               <a:ext uri="{FF2B5EF4-FFF2-40B4-BE49-F238E27FC236}">
-                <a16:creationId xmlns:a16="http://schemas.microsoft.com/office/drawing/2014/main" xmlns="" id="{1AAE7903-DA0C-486B-BDC7-ADB80C60CE39}"/>
+                <a16:creationId xmlns="" xmlns:a16="http://schemas.microsoft.com/office/drawing/2014/main" id="{1AAE7903-DA0C-486B-BDC7-ADB80C60CE39}"/>
               </a:ext>
             </a:extLst>
           </p:cNvPr>
@@ -26150,7 +26790,7 @@
           <p:cNvPr id="16" name="Picture 16" descr="A close up of a logo&#10;&#10;Description generated with very high confidence">
             <a:extLst>
               <a:ext uri="{FF2B5EF4-FFF2-40B4-BE49-F238E27FC236}">
-                <a16:creationId xmlns:a16="http://schemas.microsoft.com/office/drawing/2014/main" xmlns="" id="{C7C82433-1251-4B07-9C0F-DB83878FB6CB}"/>
+                <a16:creationId xmlns="" xmlns:a16="http://schemas.microsoft.com/office/drawing/2014/main" id="{C7C82433-1251-4B07-9C0F-DB83878FB6CB}"/>
               </a:ext>
             </a:extLst>
           </p:cNvPr>
@@ -26257,7 +26897,7 @@
         </p:blipFill>
         <p:spPr>
           <a:xfrm>
-            <a:off x="5827370" y="5549594"/>
+            <a:off x="5827370" y="5514869"/>
             <a:ext cx="1473200" cy="939800"/>
           </a:xfrm>
           <a:prstGeom prst="rect">
@@ -26287,7 +26927,7 @@
         </p:blipFill>
         <p:spPr>
           <a:xfrm>
-            <a:off x="9223737" y="5596770"/>
+            <a:off x="9223737" y="5562045"/>
             <a:ext cx="2540000" cy="939800"/>
           </a:xfrm>
           <a:prstGeom prst="rect">
@@ -26295,52 +26935,6 @@
           </a:prstGeom>
         </p:spPr>
       </p:pic>
-      <p:sp>
-        <p:nvSpPr>
-          <p:cNvPr id="18" name="Rectangle 17"/>
-          <p:cNvSpPr/>
-          <p:nvPr/>
-        </p:nvSpPr>
-        <p:spPr>
-          <a:xfrm>
-            <a:off x="294511" y="4152856"/>
-            <a:ext cx="11604264" cy="2394833"/>
-          </a:xfrm>
-          <a:prstGeom prst="rect">
-            <a:avLst/>
-          </a:prstGeom>
-          <a:noFill/>
-          <a:ln>
-            <a:solidFill>
-              <a:schemeClr val="tx1"/>
-            </a:solidFill>
-          </a:ln>
-        </p:spPr>
-        <p:style>
-          <a:lnRef idx="2">
-            <a:schemeClr val="accent1">
-              <a:shade val="50000"/>
-            </a:schemeClr>
-          </a:lnRef>
-          <a:fillRef idx="1">
-            <a:schemeClr val="accent1"/>
-          </a:fillRef>
-          <a:effectRef idx="0">
-            <a:schemeClr val="accent1"/>
-          </a:effectRef>
-          <a:fontRef idx="minor">
-            <a:schemeClr val="lt1"/>
-          </a:fontRef>
-        </p:style>
-        <p:txBody>
-          <a:bodyPr rtlCol="0" anchor="ctr"/>
-          <a:lstStyle/>
-          <a:p>
-            <a:pPr algn="ctr"/>
-            <a:endParaRPr lang="en-US"/>
-          </a:p>
-        </p:txBody>
-      </p:sp>
       <p:pic>
         <p:nvPicPr>
           <p:cNvPr id="19" name="Picture 18"/>
@@ -26415,13 +27009,13 @@
               </a:ext>
             </a:extLst>
           </a:blip>
-          <a:srcRect r="7469"/>
+          <a:srcRect r="6031"/>
           <a:stretch/>
         </p:blipFill>
         <p:spPr>
           <a:xfrm>
-            <a:off x="368525" y="5733078"/>
-            <a:ext cx="3971981" cy="762000"/>
+            <a:off x="435590" y="5813501"/>
+            <a:ext cx="4222821" cy="616293"/>
           </a:xfrm>
           <a:prstGeom prst="rect">
             <a:avLst/>
@@ -26510,7 +27104,7 @@
         </p:blipFill>
         <p:spPr>
           <a:xfrm>
-            <a:off x="5560670" y="5758544"/>
+            <a:off x="5560670" y="5723819"/>
             <a:ext cx="533400" cy="762000"/>
           </a:xfrm>
           <a:prstGeom prst="rect">
@@ -28327,7 +28921,7 @@
           <p:cNvPr id="2" name="Title 1">
             <a:extLst>
               <a:ext uri="{FF2B5EF4-FFF2-40B4-BE49-F238E27FC236}">
-                <a16:creationId xmlns:a16="http://schemas.microsoft.com/office/drawing/2014/main" xmlns="" id="{9B3E31B1-1524-4917-9285-17E913845064}"/>
+                <a16:creationId xmlns="" xmlns:a16="http://schemas.microsoft.com/office/drawing/2014/main" id="{9B3E31B1-1524-4917-9285-17E913845064}"/>
               </a:ext>
             </a:extLst>
           </p:cNvPr>
@@ -28358,7 +28952,7 @@
           <p:cNvPr id="7" name="TextBox 6">
             <a:extLst>
               <a:ext uri="{FF2B5EF4-FFF2-40B4-BE49-F238E27FC236}">
-                <a16:creationId xmlns:a16="http://schemas.microsoft.com/office/drawing/2014/main" xmlns="" id="{3C8D1A93-8E34-461B-AE33-3F2AF8EDEDE3}"/>
+                <a16:creationId xmlns="" xmlns:a16="http://schemas.microsoft.com/office/drawing/2014/main" id="{3C8D1A93-8E34-461B-AE33-3F2AF8EDEDE3}"/>
               </a:ext>
             </a:extLst>
           </p:cNvPr>
@@ -28399,7 +28993,7 @@
           <p:cNvPr id="12" name="Picture 12" descr="A close up of a logo&#10;&#10;Description generated with very high confidence">
             <a:extLst>
               <a:ext uri="{FF2B5EF4-FFF2-40B4-BE49-F238E27FC236}">
-                <a16:creationId xmlns:a16="http://schemas.microsoft.com/office/drawing/2014/main" xmlns="" id="{BCB28C98-A97C-401C-8299-EB6FC4F8EC07}"/>
+                <a16:creationId xmlns="" xmlns:a16="http://schemas.microsoft.com/office/drawing/2014/main" id="{BCB28C98-A97C-401C-8299-EB6FC4F8EC07}"/>
               </a:ext>
             </a:extLst>
           </p:cNvPr>
@@ -28429,7 +29023,7 @@
           <p:cNvPr id="15" name="TextBox 14">
             <a:extLst>
               <a:ext uri="{FF2B5EF4-FFF2-40B4-BE49-F238E27FC236}">
-                <a16:creationId xmlns:a16="http://schemas.microsoft.com/office/drawing/2014/main" xmlns="" id="{1AAE7903-DA0C-486B-BDC7-ADB80C60CE39}"/>
+                <a16:creationId xmlns="" xmlns:a16="http://schemas.microsoft.com/office/drawing/2014/main" id="{1AAE7903-DA0C-486B-BDC7-ADB80C60CE39}"/>
               </a:ext>
             </a:extLst>
           </p:cNvPr>
@@ -28468,7 +29062,7 @@
           <p:cNvPr id="16" name="Picture 16" descr="A close up of a logo&#10;&#10;Description generated with very high confidence">
             <a:extLst>
               <a:ext uri="{FF2B5EF4-FFF2-40B4-BE49-F238E27FC236}">
-                <a16:creationId xmlns:a16="http://schemas.microsoft.com/office/drawing/2014/main" xmlns="" id="{C7C82433-1251-4B07-9C0F-DB83878FB6CB}"/>
+                <a16:creationId xmlns="" xmlns:a16="http://schemas.microsoft.com/office/drawing/2014/main" id="{C7C82433-1251-4B07-9C0F-DB83878FB6CB}"/>
               </a:ext>
             </a:extLst>
           </p:cNvPr>
@@ -28498,7 +29092,7 @@
           <p:cNvPr id="32" name="TextBox 31">
             <a:extLst>
               <a:ext uri="{FF2B5EF4-FFF2-40B4-BE49-F238E27FC236}">
-                <a16:creationId xmlns:a16="http://schemas.microsoft.com/office/drawing/2014/main" xmlns="" id="{95FFBCCC-62A7-4B35-95D9-9DDDAD7F90FD}"/>
+                <a16:creationId xmlns="" xmlns:a16="http://schemas.microsoft.com/office/drawing/2014/main" id="{95FFBCCC-62A7-4B35-95D9-9DDDAD7F90FD}"/>
               </a:ext>
             </a:extLst>
           </p:cNvPr>
@@ -28537,7 +29131,7 @@
           <p:cNvPr id="33" name="Picture 33" descr="A close up of a logo&#10;&#10;Description generated with very high confidence">
             <a:extLst>
               <a:ext uri="{FF2B5EF4-FFF2-40B4-BE49-F238E27FC236}">
-                <a16:creationId xmlns:a16="http://schemas.microsoft.com/office/drawing/2014/main" xmlns="" id="{38088EDE-D1BD-4D90-BC05-DB9DB49BBAAD}"/>
+                <a16:creationId xmlns="" xmlns:a16="http://schemas.microsoft.com/office/drawing/2014/main" id="{38088EDE-D1BD-4D90-BC05-DB9DB49BBAAD}"/>
               </a:ext>
             </a:extLst>
           </p:cNvPr>
@@ -28572,7 +29166,7 @@
           <p:cNvPr id="3" name="Arrow: Right 2">
             <a:extLst>
               <a:ext uri="{FF2B5EF4-FFF2-40B4-BE49-F238E27FC236}">
-                <a16:creationId xmlns:a16="http://schemas.microsoft.com/office/drawing/2014/main" xmlns="" id="{A386E034-963A-452A-BA56-7A5B5FF1099E}"/>
+                <a16:creationId xmlns="" xmlns:a16="http://schemas.microsoft.com/office/drawing/2014/main" id="{A386E034-963A-452A-BA56-7A5B5FF1099E}"/>
               </a:ext>
             </a:extLst>
           </p:cNvPr>
@@ -28618,7 +29212,7 @@
           <p:cNvPr id="10" name="Arrow: Right 9">
             <a:extLst>
               <a:ext uri="{FF2B5EF4-FFF2-40B4-BE49-F238E27FC236}">
-                <a16:creationId xmlns:a16="http://schemas.microsoft.com/office/drawing/2014/main" xmlns="" id="{FC53BB6D-D8F9-4631-B0DB-C5D30F0A1ADE}"/>
+                <a16:creationId xmlns="" xmlns:a16="http://schemas.microsoft.com/office/drawing/2014/main" id="{FC53BB6D-D8F9-4631-B0DB-C5D30F0A1ADE}"/>
               </a:ext>
             </a:extLst>
           </p:cNvPr>
@@ -28701,7 +29295,7 @@
           <p:cNvPr id="2" name="Title 1">
             <a:extLst>
               <a:ext uri="{FF2B5EF4-FFF2-40B4-BE49-F238E27FC236}">
-                <a16:creationId xmlns:a16="http://schemas.microsoft.com/office/drawing/2014/main" xmlns="" id="{0F79825B-3723-4872-BC1F-C4E6A23AD3AC}"/>
+                <a16:creationId xmlns="" xmlns:a16="http://schemas.microsoft.com/office/drawing/2014/main" id="{0F79825B-3723-4872-BC1F-C4E6A23AD3AC}"/>
               </a:ext>
             </a:extLst>
           </p:cNvPr>
@@ -28732,7 +29326,7 @@
           <p:cNvPr id="7" name="Picture 7" descr="A close up of a logo&#10;&#10;Description generated with very high confidence">
             <a:extLst>
               <a:ext uri="{FF2B5EF4-FFF2-40B4-BE49-F238E27FC236}">
-                <a16:creationId xmlns:a16="http://schemas.microsoft.com/office/drawing/2014/main" xmlns="" id="{80B0312D-5F8E-47B4-92BF-FA66F656751D}"/>
+                <a16:creationId xmlns="" xmlns:a16="http://schemas.microsoft.com/office/drawing/2014/main" id="{80B0312D-5F8E-47B4-92BF-FA66F656751D}"/>
               </a:ext>
             </a:extLst>
           </p:cNvPr>
@@ -28756,9 +29350,7 @@
             <a:avLst/>
           </a:prstGeom>
           <a:ln>
-            <a:solidFill>
-              <a:schemeClr val="tx1"/>
-            </a:solidFill>
+            <a:noFill/>
           </a:ln>
         </p:spPr>
       </p:pic>
@@ -28767,7 +29359,7 @@
           <p:cNvPr id="13" name="TextBox 12">
             <a:extLst>
               <a:ext uri="{FF2B5EF4-FFF2-40B4-BE49-F238E27FC236}">
-                <a16:creationId xmlns:a16="http://schemas.microsoft.com/office/drawing/2014/main" xmlns="" id="{92238BA9-76D0-4E8E-B5FA-9F7DB40CA3C5}"/>
+                <a16:creationId xmlns="" xmlns:a16="http://schemas.microsoft.com/office/drawing/2014/main" id="{92238BA9-76D0-4E8E-B5FA-9F7DB40CA3C5}"/>
               </a:ext>
             </a:extLst>
           </p:cNvPr>
@@ -28810,7 +29402,7 @@
           <p:cNvPr id="19" name="Picture 19">
             <a:extLst>
               <a:ext uri="{FF2B5EF4-FFF2-40B4-BE49-F238E27FC236}">
-                <a16:creationId xmlns:a16="http://schemas.microsoft.com/office/drawing/2014/main" xmlns="" id="{F5FA65D8-C04D-46E6-9FC6-23843A758732}"/>
+                <a16:creationId xmlns="" xmlns:a16="http://schemas.microsoft.com/office/drawing/2014/main" id="{F5FA65D8-C04D-46E6-9FC6-23843A758732}"/>
               </a:ext>
             </a:extLst>
           </p:cNvPr>
@@ -28840,7 +29432,7 @@
           <p:cNvPr id="24" name="Picture 24" descr="A close up of a logo&#10;&#10;Description generated with very high confidence">
             <a:extLst>
               <a:ext uri="{FF2B5EF4-FFF2-40B4-BE49-F238E27FC236}">
-                <a16:creationId xmlns:a16="http://schemas.microsoft.com/office/drawing/2014/main" xmlns="" id="{E75973BA-2F48-4595-8A40-76F9628582C1}"/>
+                <a16:creationId xmlns="" xmlns:a16="http://schemas.microsoft.com/office/drawing/2014/main" id="{E75973BA-2F48-4595-8A40-76F9628582C1}"/>
               </a:ext>
             </a:extLst>
           </p:cNvPr>
@@ -28870,7 +29462,7 @@
           <p:cNvPr id="41" name="Picture 41" descr="A picture containing drawing&#10;&#10;Description generated with very high confidence">
             <a:extLst>
               <a:ext uri="{FF2B5EF4-FFF2-40B4-BE49-F238E27FC236}">
-                <a16:creationId xmlns:a16="http://schemas.microsoft.com/office/drawing/2014/main" xmlns="" id="{31E1483B-7194-4F70-B546-9D57F1B81B91}"/>
+                <a16:creationId xmlns="" xmlns:a16="http://schemas.microsoft.com/office/drawing/2014/main" id="{31E1483B-7194-4F70-B546-9D57F1B81B91}"/>
               </a:ext>
             </a:extLst>
           </p:cNvPr>
@@ -28900,7 +29492,7 @@
           <p:cNvPr id="49" name="Picture 49" descr="A picture containing clock, drawing, flower&#10;&#10;Description generated with very high confidence">
             <a:extLst>
               <a:ext uri="{FF2B5EF4-FFF2-40B4-BE49-F238E27FC236}">
-                <a16:creationId xmlns:a16="http://schemas.microsoft.com/office/drawing/2014/main" xmlns="" id="{E47A10BC-72DE-41B7-9EBD-B24B82C7CB84}"/>
+                <a16:creationId xmlns="" xmlns:a16="http://schemas.microsoft.com/office/drawing/2014/main" id="{E47A10BC-72DE-41B7-9EBD-B24B82C7CB84}"/>
               </a:ext>
             </a:extLst>
           </p:cNvPr>
@@ -28930,7 +29522,7 @@
           <p:cNvPr id="51" name="Picture 51" descr="A picture containing food, drawing&#10;&#10;Description generated with very high confidence">
             <a:extLst>
               <a:ext uri="{FF2B5EF4-FFF2-40B4-BE49-F238E27FC236}">
-                <a16:creationId xmlns:a16="http://schemas.microsoft.com/office/drawing/2014/main" xmlns="" id="{6971AD3C-9B53-470A-8695-765A33542705}"/>
+                <a16:creationId xmlns="" xmlns:a16="http://schemas.microsoft.com/office/drawing/2014/main" id="{6971AD3C-9B53-470A-8695-765A33542705}"/>
               </a:ext>
             </a:extLst>
           </p:cNvPr>
@@ -28960,7 +29552,7 @@
           <p:cNvPr id="58" name="Picture 58" descr="A picture containing traffic&#10;&#10;Description generated with very high confidence">
             <a:extLst>
               <a:ext uri="{FF2B5EF4-FFF2-40B4-BE49-F238E27FC236}">
-                <a16:creationId xmlns:a16="http://schemas.microsoft.com/office/drawing/2014/main" xmlns="" id="{561102FE-26B9-45F1-9736-025A946AD7B5}"/>
+                <a16:creationId xmlns="" xmlns:a16="http://schemas.microsoft.com/office/drawing/2014/main" id="{561102FE-26B9-45F1-9736-025A946AD7B5}"/>
               </a:ext>
             </a:extLst>
           </p:cNvPr>
@@ -29048,7 +29640,7 @@
           <p:cNvPr id="61" name="Picture 61">
             <a:extLst>
               <a:ext uri="{FF2B5EF4-FFF2-40B4-BE49-F238E27FC236}">
-                <a16:creationId xmlns:a16="http://schemas.microsoft.com/office/drawing/2014/main" xmlns="" id="{395E44A0-5BF1-4541-8A51-BFC69EE47E4F}"/>
+                <a16:creationId xmlns="" xmlns:a16="http://schemas.microsoft.com/office/drawing/2014/main" id="{395E44A0-5BF1-4541-8A51-BFC69EE47E4F}"/>
               </a:ext>
             </a:extLst>
           </p:cNvPr>
@@ -29078,7 +29670,7 @@
           <p:cNvPr id="28" name="Picture 28" descr="A close up of a logo&#10;&#10;Description generated with very high confidence">
             <a:extLst>
               <a:ext uri="{FF2B5EF4-FFF2-40B4-BE49-F238E27FC236}">
-                <a16:creationId xmlns:a16="http://schemas.microsoft.com/office/drawing/2014/main" xmlns="" id="{84736375-8BEC-4102-BBD3-CD5BA93BE13D}"/>
+                <a16:creationId xmlns="" xmlns:a16="http://schemas.microsoft.com/office/drawing/2014/main" id="{84736375-8BEC-4102-BBD3-CD5BA93BE13D}"/>
               </a:ext>
             </a:extLst>
           </p:cNvPr>
@@ -29108,7 +29700,7 @@
           <p:cNvPr id="18" name="Straight Arrow Connector 17">
             <a:extLst>
               <a:ext uri="{FF2B5EF4-FFF2-40B4-BE49-F238E27FC236}">
-                <a16:creationId xmlns:a16="http://schemas.microsoft.com/office/drawing/2014/main" xmlns="" id="{1A9D56D8-0796-41CA-BDAE-A54AEFA6AB4A}"/>
+                <a16:creationId xmlns="" xmlns:a16="http://schemas.microsoft.com/office/drawing/2014/main" id="{1A9D56D8-0796-41CA-BDAE-A54AEFA6AB4A}"/>
               </a:ext>
             </a:extLst>
           </p:cNvPr>
@@ -29150,7 +29742,7 @@
           <p:cNvPr id="21" name="Oval 20">
             <a:extLst>
               <a:ext uri="{FF2B5EF4-FFF2-40B4-BE49-F238E27FC236}">
-                <a16:creationId xmlns:a16="http://schemas.microsoft.com/office/drawing/2014/main" xmlns="" id="{4DC6CE08-D971-4012-9665-4D26EF0B351E}"/>
+                <a16:creationId xmlns="" xmlns:a16="http://schemas.microsoft.com/office/drawing/2014/main" id="{4DC6CE08-D971-4012-9665-4D26EF0B351E}"/>
               </a:ext>
             </a:extLst>
           </p:cNvPr>
@@ -29204,7 +29796,7 @@
           <p:cNvPr id="22" name="Oval 21">
             <a:extLst>
               <a:ext uri="{FF2B5EF4-FFF2-40B4-BE49-F238E27FC236}">
-                <a16:creationId xmlns:a16="http://schemas.microsoft.com/office/drawing/2014/main" xmlns="" id="{34D78DA4-4F5A-479F-8EF7-090D7E100DF8}"/>
+                <a16:creationId xmlns="" xmlns:a16="http://schemas.microsoft.com/office/drawing/2014/main" id="{34D78DA4-4F5A-479F-8EF7-090D7E100DF8}"/>
               </a:ext>
             </a:extLst>
           </p:cNvPr>
@@ -29258,7 +29850,7 @@
           <p:cNvPr id="32" name="Oval 31">
             <a:extLst>
               <a:ext uri="{FF2B5EF4-FFF2-40B4-BE49-F238E27FC236}">
-                <a16:creationId xmlns:a16="http://schemas.microsoft.com/office/drawing/2014/main" xmlns="" id="{087D8941-8777-474C-A035-46A42D21194B}"/>
+                <a16:creationId xmlns="" xmlns:a16="http://schemas.microsoft.com/office/drawing/2014/main" id="{087D8941-8777-474C-A035-46A42D21194B}"/>
               </a:ext>
             </a:extLst>
           </p:cNvPr>
@@ -29847,7 +30439,7 @@
           <p:cNvPr id="3" name="Picture 3" descr="A screenshot of a cell phone&#10;&#10;Description generated with high confidence">
             <a:extLst>
               <a:ext uri="{FF2B5EF4-FFF2-40B4-BE49-F238E27FC236}">
-                <a16:creationId xmlns:a16="http://schemas.microsoft.com/office/drawing/2014/main" xmlns="" id="{F8414E6B-2443-4E39-8C88-1D6EF2C433DD}"/>
+                <a16:creationId xmlns="" xmlns:a16="http://schemas.microsoft.com/office/drawing/2014/main" id="{F8414E6B-2443-4E39-8C88-1D6EF2C433DD}"/>
               </a:ext>
             </a:extLst>
           </p:cNvPr>
@@ -29877,7 +30469,7 @@
           <p:cNvPr id="5" name="Picture 5" descr="A screenshot of a cell phone&#10;&#10;Description generated with high confidence">
             <a:extLst>
               <a:ext uri="{FF2B5EF4-FFF2-40B4-BE49-F238E27FC236}">
-                <a16:creationId xmlns:a16="http://schemas.microsoft.com/office/drawing/2014/main" xmlns="" id="{141DEEF9-3327-4771-AA7C-A61F22A1003B}"/>
+                <a16:creationId xmlns="" xmlns:a16="http://schemas.microsoft.com/office/drawing/2014/main" id="{141DEEF9-3327-4771-AA7C-A61F22A1003B}"/>
               </a:ext>
             </a:extLst>
           </p:cNvPr>
@@ -29907,7 +30499,7 @@
           <p:cNvPr id="9" name="Picture 9">
             <a:extLst>
               <a:ext uri="{FF2B5EF4-FFF2-40B4-BE49-F238E27FC236}">
-                <a16:creationId xmlns:a16="http://schemas.microsoft.com/office/drawing/2014/main" xmlns="" id="{9030CC14-41AA-4F14-9CF8-9294BB72EC97}"/>
+                <a16:creationId xmlns="" xmlns:a16="http://schemas.microsoft.com/office/drawing/2014/main" id="{9030CC14-41AA-4F14-9CF8-9294BB72EC97}"/>
               </a:ext>
             </a:extLst>
           </p:cNvPr>
@@ -29937,7 +30529,7 @@
           <p:cNvPr id="13" name="Picture 13">
             <a:extLst>
               <a:ext uri="{FF2B5EF4-FFF2-40B4-BE49-F238E27FC236}">
-                <a16:creationId xmlns:a16="http://schemas.microsoft.com/office/drawing/2014/main" xmlns="" id="{DA1A5E4F-3A85-4D7B-8CF0-95B63A5C4851}"/>
+                <a16:creationId xmlns="" xmlns:a16="http://schemas.microsoft.com/office/drawing/2014/main" id="{DA1A5E4F-3A85-4D7B-8CF0-95B63A5C4851}"/>
               </a:ext>
             </a:extLst>
           </p:cNvPr>
@@ -29967,7 +30559,7 @@
           <p:cNvPr id="15" name="Picture 15">
             <a:extLst>
               <a:ext uri="{FF2B5EF4-FFF2-40B4-BE49-F238E27FC236}">
-                <a16:creationId xmlns:a16="http://schemas.microsoft.com/office/drawing/2014/main" xmlns="" id="{D6EA385D-793B-495B-B262-A517A508F172}"/>
+                <a16:creationId xmlns="" xmlns:a16="http://schemas.microsoft.com/office/drawing/2014/main" id="{D6EA385D-793B-495B-B262-A517A508F172}"/>
               </a:ext>
             </a:extLst>
           </p:cNvPr>
@@ -29997,7 +30589,7 @@
           <p:cNvPr id="17" name="Picture 17">
             <a:extLst>
               <a:ext uri="{FF2B5EF4-FFF2-40B4-BE49-F238E27FC236}">
-                <a16:creationId xmlns:a16="http://schemas.microsoft.com/office/drawing/2014/main" xmlns="" id="{A016E024-287F-44DB-AD73-696C65001B48}"/>
+                <a16:creationId xmlns="" xmlns:a16="http://schemas.microsoft.com/office/drawing/2014/main" id="{A016E024-287F-44DB-AD73-696C65001B48}"/>
               </a:ext>
             </a:extLst>
           </p:cNvPr>
@@ -30027,7 +30619,7 @@
           <p:cNvPr id="21" name="Picture 21">
             <a:extLst>
               <a:ext uri="{FF2B5EF4-FFF2-40B4-BE49-F238E27FC236}">
-                <a16:creationId xmlns:a16="http://schemas.microsoft.com/office/drawing/2014/main" xmlns="" id="{A0ECE790-E592-4680-BDA3-D5CECC5E35F5}"/>
+                <a16:creationId xmlns="" xmlns:a16="http://schemas.microsoft.com/office/drawing/2014/main" id="{A0ECE790-E592-4680-BDA3-D5CECC5E35F5}"/>
               </a:ext>
             </a:extLst>
           </p:cNvPr>
@@ -30057,7 +30649,7 @@
           <p:cNvPr id="23" name="Picture 23">
             <a:extLst>
               <a:ext uri="{FF2B5EF4-FFF2-40B4-BE49-F238E27FC236}">
-                <a16:creationId xmlns:a16="http://schemas.microsoft.com/office/drawing/2014/main" xmlns="" id="{604B44D1-CA16-473F-905A-FD7EDF44C561}"/>
+                <a16:creationId xmlns="" xmlns:a16="http://schemas.microsoft.com/office/drawing/2014/main" id="{604B44D1-CA16-473F-905A-FD7EDF44C561}"/>
               </a:ext>
             </a:extLst>
           </p:cNvPr>
@@ -30087,7 +30679,7 @@
           <p:cNvPr id="25" name="Picture 25">
             <a:extLst>
               <a:ext uri="{FF2B5EF4-FFF2-40B4-BE49-F238E27FC236}">
-                <a16:creationId xmlns:a16="http://schemas.microsoft.com/office/drawing/2014/main" xmlns="" id="{DC42FEE6-2F1D-4826-B249-5A31BA693CC0}"/>
+                <a16:creationId xmlns="" xmlns:a16="http://schemas.microsoft.com/office/drawing/2014/main" id="{DC42FEE6-2F1D-4826-B249-5A31BA693CC0}"/>
               </a:ext>
             </a:extLst>
           </p:cNvPr>
@@ -30117,7 +30709,7 @@
           <p:cNvPr id="27" name="Picture 27">
             <a:extLst>
               <a:ext uri="{FF2B5EF4-FFF2-40B4-BE49-F238E27FC236}">
-                <a16:creationId xmlns:a16="http://schemas.microsoft.com/office/drawing/2014/main" xmlns="" id="{638891BB-BA96-4E4F-B8CE-CF4323CB75A4}"/>
+                <a16:creationId xmlns="" xmlns:a16="http://schemas.microsoft.com/office/drawing/2014/main" id="{638891BB-BA96-4E4F-B8CE-CF4323CB75A4}"/>
               </a:ext>
             </a:extLst>
           </p:cNvPr>
@@ -30147,7 +30739,7 @@
           <p:cNvPr id="31" name="Picture 31" descr="A close up of a logo&#10;&#10;Description generated with very high confidence">
             <a:extLst>
               <a:ext uri="{FF2B5EF4-FFF2-40B4-BE49-F238E27FC236}">
-                <a16:creationId xmlns:a16="http://schemas.microsoft.com/office/drawing/2014/main" xmlns="" id="{1D2FEFB3-F612-49EC-9C5A-6C49223C299B}"/>
+                <a16:creationId xmlns="" xmlns:a16="http://schemas.microsoft.com/office/drawing/2014/main" id="{1D2FEFB3-F612-49EC-9C5A-6C49223C299B}"/>
               </a:ext>
             </a:extLst>
           </p:cNvPr>
@@ -30177,7 +30769,7 @@
           <p:cNvPr id="33" name="Picture 33" descr="A close up of a logo&#10;&#10;Description generated with very high confidence">
             <a:extLst>
               <a:ext uri="{FF2B5EF4-FFF2-40B4-BE49-F238E27FC236}">
-                <a16:creationId xmlns:a16="http://schemas.microsoft.com/office/drawing/2014/main" xmlns="" id="{45805758-60E6-408F-AE18-4BF571D58215}"/>
+                <a16:creationId xmlns="" xmlns:a16="http://schemas.microsoft.com/office/drawing/2014/main" id="{45805758-60E6-408F-AE18-4BF571D58215}"/>
               </a:ext>
             </a:extLst>
           </p:cNvPr>
@@ -30207,7 +30799,7 @@
           <p:cNvPr id="35" name="Picture 35" descr="A clock in the dark&#10;&#10;Description generated with high confidence">
             <a:extLst>
               <a:ext uri="{FF2B5EF4-FFF2-40B4-BE49-F238E27FC236}">
-                <a16:creationId xmlns:a16="http://schemas.microsoft.com/office/drawing/2014/main" xmlns="" id="{C21B3B7F-7772-4C24-86CE-377F26867F83}"/>
+                <a16:creationId xmlns="" xmlns:a16="http://schemas.microsoft.com/office/drawing/2014/main" id="{C21B3B7F-7772-4C24-86CE-377F26867F83}"/>
               </a:ext>
             </a:extLst>
           </p:cNvPr>
@@ -30237,7 +30829,7 @@
           <p:cNvPr id="37" name="Picture 37" descr="A clock sitting in the dark&#10;&#10;Description generated with high confidence">
             <a:extLst>
               <a:ext uri="{FF2B5EF4-FFF2-40B4-BE49-F238E27FC236}">
-                <a16:creationId xmlns:a16="http://schemas.microsoft.com/office/drawing/2014/main" xmlns="" id="{81EB908A-9066-4231-A575-CF0C6DFDC80A}"/>
+                <a16:creationId xmlns="" xmlns:a16="http://schemas.microsoft.com/office/drawing/2014/main" id="{81EB908A-9066-4231-A575-CF0C6DFDC80A}"/>
               </a:ext>
             </a:extLst>
           </p:cNvPr>
@@ -30267,7 +30859,7 @@
           <p:cNvPr id="42" name="TextBox 41">
             <a:extLst>
               <a:ext uri="{FF2B5EF4-FFF2-40B4-BE49-F238E27FC236}">
-                <a16:creationId xmlns:a16="http://schemas.microsoft.com/office/drawing/2014/main" xmlns="" id="{609F857E-3EAC-4901-B569-0DBD589577A4}"/>
+                <a16:creationId xmlns="" xmlns:a16="http://schemas.microsoft.com/office/drawing/2014/main" id="{609F857E-3EAC-4901-B569-0DBD589577A4}"/>
               </a:ext>
             </a:extLst>
           </p:cNvPr>
@@ -30308,7 +30900,7 @@
           <p:cNvPr id="44" name="TextBox 43">
             <a:extLst>
               <a:ext uri="{FF2B5EF4-FFF2-40B4-BE49-F238E27FC236}">
-                <a16:creationId xmlns:a16="http://schemas.microsoft.com/office/drawing/2014/main" xmlns="" id="{89A462EF-7DE6-41C9-875A-AAC89906E8A3}"/>
+                <a16:creationId xmlns="" xmlns:a16="http://schemas.microsoft.com/office/drawing/2014/main" id="{89A462EF-7DE6-41C9-875A-AAC89906E8A3}"/>
               </a:ext>
             </a:extLst>
           </p:cNvPr>
@@ -30347,7 +30939,7 @@
           <p:cNvPr id="45" name="Straight Arrow Connector 44">
             <a:extLst>
               <a:ext uri="{FF2B5EF4-FFF2-40B4-BE49-F238E27FC236}">
-                <a16:creationId xmlns:a16="http://schemas.microsoft.com/office/drawing/2014/main" xmlns="" id="{FAB80D67-F59C-4B06-834D-F3F3A9EC5522}"/>
+                <a16:creationId xmlns="" xmlns:a16="http://schemas.microsoft.com/office/drawing/2014/main" id="{FAB80D67-F59C-4B06-834D-F3F3A9EC5522}"/>
               </a:ext>
             </a:extLst>
           </p:cNvPr>
@@ -30389,7 +30981,7 @@
           <p:cNvPr id="47" name="Straight Arrow Connector 46">
             <a:extLst>
               <a:ext uri="{FF2B5EF4-FFF2-40B4-BE49-F238E27FC236}">
-                <a16:creationId xmlns:a16="http://schemas.microsoft.com/office/drawing/2014/main" xmlns="" id="{EBE041AA-BC24-4A0B-8BE1-8AA71FA1D9EE}"/>
+                <a16:creationId xmlns="" xmlns:a16="http://schemas.microsoft.com/office/drawing/2014/main" id="{EBE041AA-BC24-4A0B-8BE1-8AA71FA1D9EE}"/>
               </a:ext>
             </a:extLst>
           </p:cNvPr>
@@ -30433,7 +31025,7 @@
           <p:cNvPr id="2" name="Picture 3" descr="A close up of a logo&#10;&#10;Description generated with very high confidence">
             <a:extLst>
               <a:ext uri="{FF2B5EF4-FFF2-40B4-BE49-F238E27FC236}">
-                <a16:creationId xmlns:a16="http://schemas.microsoft.com/office/drawing/2014/main" xmlns="" id="{BCB4413D-CF3A-44E8-ACAD-26265ED98CFC}"/>
+                <a16:creationId xmlns="" xmlns:a16="http://schemas.microsoft.com/office/drawing/2014/main" id="{BCB4413D-CF3A-44E8-ACAD-26265ED98CFC}"/>
               </a:ext>
             </a:extLst>
           </p:cNvPr>
@@ -30463,7 +31055,7 @@
           <p:cNvPr id="6" name="Picture 6" descr="A close up of a logo&#10;&#10;Description generated with very high confidence">
             <a:extLst>
               <a:ext uri="{FF2B5EF4-FFF2-40B4-BE49-F238E27FC236}">
-                <a16:creationId xmlns:a16="http://schemas.microsoft.com/office/drawing/2014/main" xmlns="" id="{10224506-3EA4-41AC-B2F3-502E07BF19D3}"/>
+                <a16:creationId xmlns="" xmlns:a16="http://schemas.microsoft.com/office/drawing/2014/main" id="{10224506-3EA4-41AC-B2F3-502E07BF19D3}"/>
               </a:ext>
             </a:extLst>
           </p:cNvPr>
@@ -30493,7 +31085,7 @@
           <p:cNvPr id="18" name="Picture 18" descr="A close up of a logo&#10;&#10;Description generated with very high confidence">
             <a:extLst>
               <a:ext uri="{FF2B5EF4-FFF2-40B4-BE49-F238E27FC236}">
-                <a16:creationId xmlns:a16="http://schemas.microsoft.com/office/drawing/2014/main" xmlns="" id="{7D02541C-0C39-4204-A698-2888678BC31E}"/>
+                <a16:creationId xmlns="" xmlns:a16="http://schemas.microsoft.com/office/drawing/2014/main" id="{7D02541C-0C39-4204-A698-2888678BC31E}"/>
               </a:ext>
             </a:extLst>
           </p:cNvPr>
@@ -30523,7 +31115,7 @@
           <p:cNvPr id="20" name="Picture 21" descr="A close up of a logo&#10;&#10;Description generated with very high confidence">
             <a:extLst>
               <a:ext uri="{FF2B5EF4-FFF2-40B4-BE49-F238E27FC236}">
-                <a16:creationId xmlns:a16="http://schemas.microsoft.com/office/drawing/2014/main" xmlns="" id="{0C9735ED-B5CE-4501-BB0B-F94DAF67438F}"/>
+                <a16:creationId xmlns="" xmlns:a16="http://schemas.microsoft.com/office/drawing/2014/main" id="{0C9735ED-B5CE-4501-BB0B-F94DAF67438F}"/>
               </a:ext>
             </a:extLst>
           </p:cNvPr>
@@ -30553,7 +31145,7 @@
           <p:cNvPr id="24" name="TextBox 23">
             <a:extLst>
               <a:ext uri="{FF2B5EF4-FFF2-40B4-BE49-F238E27FC236}">
-                <a16:creationId xmlns:a16="http://schemas.microsoft.com/office/drawing/2014/main" xmlns="" id="{FD7791DA-B6E9-447C-B562-16C63C68485F}"/>
+                <a16:creationId xmlns="" xmlns:a16="http://schemas.microsoft.com/office/drawing/2014/main" id="{FD7791DA-B6E9-447C-B562-16C63C68485F}"/>
               </a:ext>
             </a:extLst>
           </p:cNvPr>
@@ -30608,7 +31200,7 @@
           <p:cNvPr id="26" name="TextBox 25">
             <a:extLst>
               <a:ext uri="{FF2B5EF4-FFF2-40B4-BE49-F238E27FC236}">
-                <a16:creationId xmlns:a16="http://schemas.microsoft.com/office/drawing/2014/main" xmlns="" id="{20C434AC-340F-4D02-802E-9088BE20D090}"/>
+                <a16:creationId xmlns="" xmlns:a16="http://schemas.microsoft.com/office/drawing/2014/main" id="{20C434AC-340F-4D02-802E-9088BE20D090}"/>
               </a:ext>
             </a:extLst>
           </p:cNvPr>
@@ -30933,7 +31525,7 @@
           <p:cNvPr id="2" name="Title 1">
             <a:extLst>
               <a:ext uri="{FF2B5EF4-FFF2-40B4-BE49-F238E27FC236}">
-                <a16:creationId xmlns:a16="http://schemas.microsoft.com/office/drawing/2014/main" xmlns="" id="{8026EC4C-6E25-4172-BE37-528F585CEF1B}"/>
+                <a16:creationId xmlns="" xmlns:a16="http://schemas.microsoft.com/office/drawing/2014/main" id="{8026EC4C-6E25-4172-BE37-528F585CEF1B}"/>
               </a:ext>
             </a:extLst>
           </p:cNvPr>
@@ -30964,7 +31556,7 @@
           <p:cNvPr id="3" name="Picture 3" descr="A close up of a logo&#10;&#10;Description generated with very high confidence">
             <a:extLst>
               <a:ext uri="{FF2B5EF4-FFF2-40B4-BE49-F238E27FC236}">
-                <a16:creationId xmlns:a16="http://schemas.microsoft.com/office/drawing/2014/main" xmlns="" id="{DA6334C1-3239-46DA-A32D-FDD4442F1795}"/>
+                <a16:creationId xmlns="" xmlns:a16="http://schemas.microsoft.com/office/drawing/2014/main" id="{DA6334C1-3239-46DA-A32D-FDD4442F1795}"/>
               </a:ext>
             </a:extLst>
           </p:cNvPr>
@@ -30994,7 +31586,7 @@
           <p:cNvPr id="5" name="Picture 5" descr="A picture containing clock&#10;&#10;Description generated with very high confidence">
             <a:extLst>
               <a:ext uri="{FF2B5EF4-FFF2-40B4-BE49-F238E27FC236}">
-                <a16:creationId xmlns:a16="http://schemas.microsoft.com/office/drawing/2014/main" xmlns="" id="{93A331CE-46F7-4243-83C4-BE9E3F1825B0}"/>
+                <a16:creationId xmlns="" xmlns:a16="http://schemas.microsoft.com/office/drawing/2014/main" id="{93A331CE-46F7-4243-83C4-BE9E3F1825B0}"/>
               </a:ext>
             </a:extLst>
           </p:cNvPr>
@@ -31024,7 +31616,7 @@
           <p:cNvPr id="7" name="Picture 7" descr="A close up of a logo&#10;&#10;Description generated with very high confidence">
             <a:extLst>
               <a:ext uri="{FF2B5EF4-FFF2-40B4-BE49-F238E27FC236}">
-                <a16:creationId xmlns:a16="http://schemas.microsoft.com/office/drawing/2014/main" xmlns="" id="{CCA1FA7B-C942-4986-AB3B-54E0615F8F08}"/>
+                <a16:creationId xmlns="" xmlns:a16="http://schemas.microsoft.com/office/drawing/2014/main" id="{CCA1FA7B-C942-4986-AB3B-54E0615F8F08}"/>
               </a:ext>
             </a:extLst>
           </p:cNvPr>
@@ -31054,7 +31646,7 @@
           <p:cNvPr id="9" name="Arrow: Down 8">
             <a:extLst>
               <a:ext uri="{FF2B5EF4-FFF2-40B4-BE49-F238E27FC236}">
-                <a16:creationId xmlns:a16="http://schemas.microsoft.com/office/drawing/2014/main" xmlns="" id="{D88FA45F-BC7E-4719-9194-7E0AE71F0C1D}"/>
+                <a16:creationId xmlns="" xmlns:a16="http://schemas.microsoft.com/office/drawing/2014/main" id="{D88FA45F-BC7E-4719-9194-7E0AE71F0C1D}"/>
               </a:ext>
             </a:extLst>
           </p:cNvPr>
@@ -31108,7 +31700,7 @@
           <p:cNvPr id="10" name="Arrow: Down 9">
             <a:extLst>
               <a:ext uri="{FF2B5EF4-FFF2-40B4-BE49-F238E27FC236}">
-                <a16:creationId xmlns:a16="http://schemas.microsoft.com/office/drawing/2014/main" xmlns="" id="{74C91D1A-CCF6-4DE0-B080-D77210A893FD}"/>
+                <a16:creationId xmlns="" xmlns:a16="http://schemas.microsoft.com/office/drawing/2014/main" id="{74C91D1A-CCF6-4DE0-B080-D77210A893FD}"/>
               </a:ext>
             </a:extLst>
           </p:cNvPr>
@@ -31162,7 +31754,7 @@
           <p:cNvPr id="11" name="TextBox 10">
             <a:extLst>
               <a:ext uri="{FF2B5EF4-FFF2-40B4-BE49-F238E27FC236}">
-                <a16:creationId xmlns:a16="http://schemas.microsoft.com/office/drawing/2014/main" xmlns="" id="{EBD1E537-F5C7-43D5-8C6F-6CFA11A95BD2}"/>
+                <a16:creationId xmlns="" xmlns:a16="http://schemas.microsoft.com/office/drawing/2014/main" id="{EBD1E537-F5C7-43D5-8C6F-6CFA11A95BD2}"/>
               </a:ext>
             </a:extLst>
           </p:cNvPr>
@@ -31210,7 +31802,7 @@
           <p:cNvPr id="12" name="Picture 12" descr="A picture containing flower&#10;&#10;Description generated with very high confidence">
             <a:extLst>
               <a:ext uri="{FF2B5EF4-FFF2-40B4-BE49-F238E27FC236}">
-                <a16:creationId xmlns:a16="http://schemas.microsoft.com/office/drawing/2014/main" xmlns="" id="{A3F53263-2B7C-4937-AC64-FBA05A97C1D8}"/>
+                <a16:creationId xmlns="" xmlns:a16="http://schemas.microsoft.com/office/drawing/2014/main" id="{A3F53263-2B7C-4937-AC64-FBA05A97C1D8}"/>
               </a:ext>
             </a:extLst>
           </p:cNvPr>
@@ -31240,7 +31832,7 @@
           <p:cNvPr id="14" name="Picture 14" descr="A close up of a logo&#10;&#10;Description generated with very high confidence">
             <a:extLst>
               <a:ext uri="{FF2B5EF4-FFF2-40B4-BE49-F238E27FC236}">
-                <a16:creationId xmlns:a16="http://schemas.microsoft.com/office/drawing/2014/main" xmlns="" id="{8AE7F551-0647-4AF3-B9D9-4EBA16AD7CEA}"/>
+                <a16:creationId xmlns="" xmlns:a16="http://schemas.microsoft.com/office/drawing/2014/main" id="{8AE7F551-0647-4AF3-B9D9-4EBA16AD7CEA}"/>
               </a:ext>
             </a:extLst>
           </p:cNvPr>
@@ -31270,7 +31862,7 @@
           <p:cNvPr id="16" name="Arrow: Down 15">
             <a:extLst>
               <a:ext uri="{FF2B5EF4-FFF2-40B4-BE49-F238E27FC236}">
-                <a16:creationId xmlns:a16="http://schemas.microsoft.com/office/drawing/2014/main" xmlns="" id="{1BA7CD1C-8F04-405F-8C24-56C054B8567A}"/>
+                <a16:creationId xmlns="" xmlns:a16="http://schemas.microsoft.com/office/drawing/2014/main" id="{1BA7CD1C-8F04-405F-8C24-56C054B8567A}"/>
               </a:ext>
             </a:extLst>
           </p:cNvPr>
@@ -31324,7 +31916,7 @@
           <p:cNvPr id="17" name="Picture 17" descr="A close up of a logo&#10;&#10;Description generated with very high confidence">
             <a:extLst>
               <a:ext uri="{FF2B5EF4-FFF2-40B4-BE49-F238E27FC236}">
-                <a16:creationId xmlns:a16="http://schemas.microsoft.com/office/drawing/2014/main" xmlns="" id="{21EE91BF-B774-456B-B010-99066ADB15B8}"/>
+                <a16:creationId xmlns="" xmlns:a16="http://schemas.microsoft.com/office/drawing/2014/main" id="{21EE91BF-B774-456B-B010-99066ADB15B8}"/>
               </a:ext>
             </a:extLst>
           </p:cNvPr>
@@ -31354,7 +31946,7 @@
           <p:cNvPr id="19" name="Arrow: Down 18">
             <a:extLst>
               <a:ext uri="{FF2B5EF4-FFF2-40B4-BE49-F238E27FC236}">
-                <a16:creationId xmlns:a16="http://schemas.microsoft.com/office/drawing/2014/main" xmlns="" id="{ACBABBB2-7A08-4A20-AD31-44F3B08A5363}"/>
+                <a16:creationId xmlns="" xmlns:a16="http://schemas.microsoft.com/office/drawing/2014/main" id="{ACBABBB2-7A08-4A20-AD31-44F3B08A5363}"/>
               </a:ext>
             </a:extLst>
           </p:cNvPr>
@@ -31408,7 +32000,7 @@
           <p:cNvPr id="20" name="TextBox 19">
             <a:extLst>
               <a:ext uri="{FF2B5EF4-FFF2-40B4-BE49-F238E27FC236}">
-                <a16:creationId xmlns:a16="http://schemas.microsoft.com/office/drawing/2014/main" xmlns="" id="{C6F99357-B5AE-419B-B827-3D66E8EEE6E4}"/>
+                <a16:creationId xmlns="" xmlns:a16="http://schemas.microsoft.com/office/drawing/2014/main" id="{C6F99357-B5AE-419B-B827-3D66E8EEE6E4}"/>
               </a:ext>
             </a:extLst>
           </p:cNvPr>
@@ -31456,7 +32048,7 @@
           <p:cNvPr id="21" name="TextBox 20">
             <a:extLst>
               <a:ext uri="{FF2B5EF4-FFF2-40B4-BE49-F238E27FC236}">
-                <a16:creationId xmlns:a16="http://schemas.microsoft.com/office/drawing/2014/main" xmlns="" id="{628CFEC0-1408-43A1-9AD3-72018D2BD8ED}"/>
+                <a16:creationId xmlns="" xmlns:a16="http://schemas.microsoft.com/office/drawing/2014/main" id="{628CFEC0-1408-43A1-9AD3-72018D2BD8ED}"/>
               </a:ext>
             </a:extLst>
           </p:cNvPr>
@@ -31514,7 +32106,7 @@
           <p:cNvPr id="22" name="Rectangle 21">
             <a:extLst>
               <a:ext uri="{FF2B5EF4-FFF2-40B4-BE49-F238E27FC236}">
-                <a16:creationId xmlns:a16="http://schemas.microsoft.com/office/drawing/2014/main" xmlns="" id="{6247A618-C733-4F7E-898A-3F618CE68229}"/>
+                <a16:creationId xmlns="" xmlns:a16="http://schemas.microsoft.com/office/drawing/2014/main" id="{6247A618-C733-4F7E-898A-3F618CE68229}"/>
               </a:ext>
             </a:extLst>
           </p:cNvPr>
@@ -31566,7 +32158,7 @@
           <p:cNvPr id="23" name="TextBox 22">
             <a:extLst>
               <a:ext uri="{FF2B5EF4-FFF2-40B4-BE49-F238E27FC236}">
-                <a16:creationId xmlns:a16="http://schemas.microsoft.com/office/drawing/2014/main" xmlns="" id="{E447A0F9-F033-4FD7-8BCE-0F79A029878A}"/>
+                <a16:creationId xmlns="" xmlns:a16="http://schemas.microsoft.com/office/drawing/2014/main" id="{E447A0F9-F033-4FD7-8BCE-0F79A029878A}"/>
               </a:ext>
             </a:extLst>
           </p:cNvPr>
@@ -32196,7 +32788,7 @@
           <p:cNvPr id="2" name="Title 1">
             <a:extLst>
               <a:ext uri="{FF2B5EF4-FFF2-40B4-BE49-F238E27FC236}">
-                <a16:creationId xmlns:a16="http://schemas.microsoft.com/office/drawing/2014/main" xmlns="" id="{99760F66-ED22-4D99-83D9-AF132B641E2C}"/>
+                <a16:creationId xmlns="" xmlns:a16="http://schemas.microsoft.com/office/drawing/2014/main" id="{99760F66-ED22-4D99-83D9-AF132B641E2C}"/>
               </a:ext>
             </a:extLst>
           </p:cNvPr>
@@ -32227,7 +32819,7 @@
           <p:cNvPr id="4" name="Picture 3" descr="A close up of a logo&#10;&#10;Description generated with very high confidence">
             <a:extLst>
               <a:ext uri="{FF2B5EF4-FFF2-40B4-BE49-F238E27FC236}">
-                <a16:creationId xmlns:a16="http://schemas.microsoft.com/office/drawing/2014/main" xmlns="" id="{6E87F861-F9AC-4F21-B0C8-58EB55E95B97}"/>
+                <a16:creationId xmlns="" xmlns:a16="http://schemas.microsoft.com/office/drawing/2014/main" id="{6E87F861-F9AC-4F21-B0C8-58EB55E95B97}"/>
               </a:ext>
             </a:extLst>
           </p:cNvPr>
@@ -32257,7 +32849,7 @@
           <p:cNvPr id="6" name="Picture 5" descr="A picture containing clock&#10;&#10;Description generated with very high confidence">
             <a:extLst>
               <a:ext uri="{FF2B5EF4-FFF2-40B4-BE49-F238E27FC236}">
-                <a16:creationId xmlns:a16="http://schemas.microsoft.com/office/drawing/2014/main" xmlns="" id="{4616AC99-6BB6-4ADE-BDE8-48395933FE5F}"/>
+                <a16:creationId xmlns="" xmlns:a16="http://schemas.microsoft.com/office/drawing/2014/main" id="{4616AC99-6BB6-4ADE-BDE8-48395933FE5F}"/>
               </a:ext>
             </a:extLst>
           </p:cNvPr>
@@ -32287,7 +32879,7 @@
           <p:cNvPr id="8" name="Arrow: Down 7">
             <a:extLst>
               <a:ext uri="{FF2B5EF4-FFF2-40B4-BE49-F238E27FC236}">
-                <a16:creationId xmlns:a16="http://schemas.microsoft.com/office/drawing/2014/main" xmlns="" id="{82AB09DD-DB63-4806-A980-AE0CB9781D42}"/>
+                <a16:creationId xmlns="" xmlns:a16="http://schemas.microsoft.com/office/drawing/2014/main" id="{82AB09DD-DB63-4806-A980-AE0CB9781D42}"/>
               </a:ext>
             </a:extLst>
           </p:cNvPr>
@@ -32615,4 +33207,265 @@
     </a:ext>
   </a:extLst>
 </a:theme>
+</file>
+
+<file path=ppt/theme/theme2.xml><?xml version="1.0" encoding="utf-8"?>
+<a:theme xmlns:a="http://schemas.openxmlformats.org/drawingml/2006/main" name="Office Theme">
+  <a:themeElements>
+    <a:clrScheme name="Office">
+      <a:dk1>
+        <a:sysClr val="windowText" lastClr="000000"/>
+      </a:dk1>
+      <a:lt1>
+        <a:sysClr val="window" lastClr="FFFFFF"/>
+      </a:lt1>
+      <a:dk2>
+        <a:srgbClr val="44546A"/>
+      </a:dk2>
+      <a:lt2>
+        <a:srgbClr val="E7E6E6"/>
+      </a:lt2>
+      <a:accent1>
+        <a:srgbClr val="4472C4"/>
+      </a:accent1>
+      <a:accent2>
+        <a:srgbClr val="ED7D31"/>
+      </a:accent2>
+      <a:accent3>
+        <a:srgbClr val="A5A5A5"/>
+      </a:accent3>
+      <a:accent4>
+        <a:srgbClr val="FFC000"/>
+      </a:accent4>
+      <a:accent5>
+        <a:srgbClr val="5B9BD5"/>
+      </a:accent5>
+      <a:accent6>
+        <a:srgbClr val="70AD47"/>
+      </a:accent6>
+      <a:hlink>
+        <a:srgbClr val="0563C1"/>
+      </a:hlink>
+      <a:folHlink>
+        <a:srgbClr val="954F72"/>
+      </a:folHlink>
+    </a:clrScheme>
+    <a:fontScheme name="Office">
+      <a:majorFont>
+        <a:latin typeface="Calibri Light" panose="020F0302020204030204"/>
+        <a:ea typeface=""/>
+        <a:cs typeface=""/>
+        <a:font script="Jpan" typeface="Yu Gothic Light"/>
+        <a:font script="Hang" typeface="맑은 고딕"/>
+        <a:font script="Hans" typeface="DengXian Light"/>
+        <a:font script="Hant" typeface="新細明體"/>
+        <a:font script="Arab" typeface="Times New Roman"/>
+        <a:font script="Hebr" typeface="Times New Roman"/>
+        <a:font script="Thai" typeface="Angsana New"/>
+        <a:font script="Ethi" typeface="Nyala"/>
+        <a:font script="Beng" typeface="Vrinda"/>
+        <a:font script="Gujr" typeface="Shruti"/>
+        <a:font script="Khmr" typeface="MoolBoran"/>
+        <a:font script="Knda" typeface="Tunga"/>
+        <a:font script="Guru" typeface="Raavi"/>
+        <a:font script="Cans" typeface="Euphemia"/>
+        <a:font script="Cher" typeface="Plantagenet Cherokee"/>
+        <a:font script="Yiii" typeface="Microsoft Yi Baiti"/>
+        <a:font script="Tibt" typeface="Microsoft Himalaya"/>
+        <a:font script="Thaa" typeface="MV Boli"/>
+        <a:font script="Deva" typeface="Mangal"/>
+        <a:font script="Telu" typeface="Gautami"/>
+        <a:font script="Taml" typeface="Latha"/>
+        <a:font script="Syrc" typeface="Estrangelo Edessa"/>
+        <a:font script="Orya" typeface="Kalinga"/>
+        <a:font script="Mlym" typeface="Kartika"/>
+        <a:font script="Laoo" typeface="DokChampa"/>
+        <a:font script="Sinh" typeface="Iskoola Pota"/>
+        <a:font script="Mong" typeface="Mongolian Baiti"/>
+        <a:font script="Viet" typeface="Times New Roman"/>
+        <a:font script="Uigh" typeface="Microsoft Uighur"/>
+        <a:font script="Geor" typeface="Sylfaen"/>
+      </a:majorFont>
+      <a:minorFont>
+        <a:latin typeface="Calibri" panose="020F0502020204030204"/>
+        <a:ea typeface=""/>
+        <a:cs typeface=""/>
+        <a:font script="Jpan" typeface="Yu Gothic"/>
+        <a:font script="Hang" typeface="맑은 고딕"/>
+        <a:font script="Hans" typeface="DengXian"/>
+        <a:font script="Hant" typeface="新細明體"/>
+        <a:font script="Arab" typeface="Arial"/>
+        <a:font script="Hebr" typeface="Arial"/>
+        <a:font script="Thai" typeface="Cordia New"/>
+        <a:font script="Ethi" typeface="Nyala"/>
+        <a:font script="Beng" typeface="Vrinda"/>
+        <a:font script="Gujr" typeface="Shruti"/>
+        <a:font script="Khmr" typeface="DaunPenh"/>
+        <a:font script="Knda" typeface="Tunga"/>
+        <a:font script="Guru" typeface="Raavi"/>
+        <a:font script="Cans" typeface="Euphemia"/>
+        <a:font script="Cher" typeface="Plantagenet Cherokee"/>
+        <a:font script="Yiii" typeface="Microsoft Yi Baiti"/>
+        <a:font script="Tibt" typeface="Microsoft Himalaya"/>
+        <a:font script="Thaa" typeface="MV Boli"/>
+        <a:font script="Deva" typeface="Mangal"/>
+        <a:font script="Telu" typeface="Gautami"/>
+        <a:font script="Taml" typeface="Latha"/>
+        <a:font script="Syrc" typeface="Estrangelo Edessa"/>
+        <a:font script="Orya" typeface="Kalinga"/>
+        <a:font script="Mlym" typeface="Kartika"/>
+        <a:font script="Laoo" typeface="DokChampa"/>
+        <a:font script="Sinh" typeface="Iskoola Pota"/>
+        <a:font script="Mong" typeface="Mongolian Baiti"/>
+        <a:font script="Viet" typeface="Arial"/>
+        <a:font script="Uigh" typeface="Microsoft Uighur"/>
+        <a:font script="Geor" typeface="Sylfaen"/>
+      </a:minorFont>
+    </a:fontScheme>
+    <a:fmtScheme name="Office">
+      <a:fillStyleLst>
+        <a:solidFill>
+          <a:schemeClr val="phClr"/>
+        </a:solidFill>
+        <a:gradFill rotWithShape="1">
+          <a:gsLst>
+            <a:gs pos="0">
+              <a:schemeClr val="phClr">
+                <a:lumMod val="110000"/>
+                <a:satMod val="105000"/>
+                <a:tint val="67000"/>
+              </a:schemeClr>
+            </a:gs>
+            <a:gs pos="50000">
+              <a:schemeClr val="phClr">
+                <a:lumMod val="105000"/>
+                <a:satMod val="103000"/>
+                <a:tint val="73000"/>
+              </a:schemeClr>
+            </a:gs>
+            <a:gs pos="100000">
+              <a:schemeClr val="phClr">
+                <a:lumMod val="105000"/>
+                <a:satMod val="109000"/>
+                <a:tint val="81000"/>
+              </a:schemeClr>
+            </a:gs>
+          </a:gsLst>
+          <a:lin ang="5400000" scaled="0"/>
+        </a:gradFill>
+        <a:gradFill rotWithShape="1">
+          <a:gsLst>
+            <a:gs pos="0">
+              <a:schemeClr val="phClr">
+                <a:satMod val="103000"/>
+                <a:lumMod val="102000"/>
+                <a:tint val="94000"/>
+              </a:schemeClr>
+            </a:gs>
+            <a:gs pos="50000">
+              <a:schemeClr val="phClr">
+                <a:satMod val="110000"/>
+                <a:lumMod val="100000"/>
+                <a:shade val="100000"/>
+              </a:schemeClr>
+            </a:gs>
+            <a:gs pos="100000">
+              <a:schemeClr val="phClr">
+                <a:lumMod val="99000"/>
+                <a:satMod val="120000"/>
+                <a:shade val="78000"/>
+              </a:schemeClr>
+            </a:gs>
+          </a:gsLst>
+          <a:lin ang="5400000" scaled="0"/>
+        </a:gradFill>
+      </a:fillStyleLst>
+      <a:lnStyleLst>
+        <a:ln w="6350" cap="flat" cmpd="sng" algn="ctr">
+          <a:solidFill>
+            <a:schemeClr val="phClr"/>
+          </a:solidFill>
+          <a:prstDash val="solid"/>
+          <a:miter lim="800000"/>
+        </a:ln>
+        <a:ln w="12700" cap="flat" cmpd="sng" algn="ctr">
+          <a:solidFill>
+            <a:schemeClr val="phClr"/>
+          </a:solidFill>
+          <a:prstDash val="solid"/>
+          <a:miter lim="800000"/>
+        </a:ln>
+        <a:ln w="19050" cap="flat" cmpd="sng" algn="ctr">
+          <a:solidFill>
+            <a:schemeClr val="phClr"/>
+          </a:solidFill>
+          <a:prstDash val="solid"/>
+          <a:miter lim="800000"/>
+        </a:ln>
+      </a:lnStyleLst>
+      <a:effectStyleLst>
+        <a:effectStyle>
+          <a:effectLst/>
+        </a:effectStyle>
+        <a:effectStyle>
+          <a:effectLst/>
+        </a:effectStyle>
+        <a:effectStyle>
+          <a:effectLst>
+            <a:outerShdw blurRad="57150" dist="19050" dir="5400000" algn="ctr" rotWithShape="0">
+              <a:srgbClr val="000000">
+                <a:alpha val="63000"/>
+              </a:srgbClr>
+            </a:outerShdw>
+          </a:effectLst>
+        </a:effectStyle>
+      </a:effectStyleLst>
+      <a:bgFillStyleLst>
+        <a:solidFill>
+          <a:schemeClr val="phClr"/>
+        </a:solidFill>
+        <a:solidFill>
+          <a:schemeClr val="phClr">
+            <a:tint val="95000"/>
+            <a:satMod val="170000"/>
+          </a:schemeClr>
+        </a:solidFill>
+        <a:gradFill rotWithShape="1">
+          <a:gsLst>
+            <a:gs pos="0">
+              <a:schemeClr val="phClr">
+                <a:tint val="93000"/>
+                <a:satMod val="150000"/>
+                <a:shade val="98000"/>
+                <a:lumMod val="102000"/>
+              </a:schemeClr>
+            </a:gs>
+            <a:gs pos="50000">
+              <a:schemeClr val="phClr">
+                <a:tint val="98000"/>
+                <a:satMod val="130000"/>
+                <a:shade val="90000"/>
+                <a:lumMod val="103000"/>
+              </a:schemeClr>
+            </a:gs>
+            <a:gs pos="100000">
+              <a:schemeClr val="phClr">
+                <a:shade val="63000"/>
+                <a:satMod val="120000"/>
+              </a:schemeClr>
+            </a:gs>
+          </a:gsLst>
+          <a:lin ang="5400000" scaled="0"/>
+        </a:gradFill>
+      </a:bgFillStyleLst>
+    </a:fmtScheme>
+  </a:themeElements>
+  <a:objectDefaults/>
+  <a:extraClrSchemeLst/>
+  <a:extLst>
+    <a:ext uri="{05A4C25C-085E-4340-85A3-A5531E510DB2}">
+      <thm15:themeFamily xmlns:thm15="http://schemas.microsoft.com/office/thememl/2012/main" name="Office Theme" id="{62F939B6-93AF-4DB8-9C6B-D6C7DFDC589F}" vid="{4A3C46E8-61CC-4603-A589-7422A47A8E4A}"/>
+    </a:ext>
+  </a:extLst>
+</a:theme>
 </file>
</xml_diff>

<commit_message>
Final save before leaving MTI
</commit_message>
<xml_diff>
--- a/ppt/Duality.pptx
+++ b/ppt/Duality.pptx
@@ -3615,7 +3615,7 @@
           </a:lstStyle>
           <a:p>
             <a:fld id="{4ECA7AEB-E827-8649-82D4-2C358B4AC551}" type="datetimeFigureOut">
-              <a:t>7/14/20</a:t>
+              <a:t>7/16/20</a:t>
             </a:fld>
             <a:endParaRPr lang="en-US"/>
           </a:p>
@@ -4012,7 +4012,7 @@
           <a:p>
             <a:fld id="{846CE7D5-CF57-46EF-B807-FDD0502418D4}" type="datetimeFigureOut">
               <a:rPr lang="en-US" smtClean="0"/>
-              <a:t>7/14/20</a:t>
+              <a:t>7/16/20</a:t>
             </a:fld>
             <a:endParaRPr lang="en-US"/>
           </a:p>
@@ -4182,7 +4182,7 @@
           <a:p>
             <a:fld id="{846CE7D5-CF57-46EF-B807-FDD0502418D4}" type="datetimeFigureOut">
               <a:rPr lang="en-US" smtClean="0"/>
-              <a:t>7/14/20</a:t>
+              <a:t>7/16/20</a:t>
             </a:fld>
             <a:endParaRPr lang="en-US"/>
           </a:p>
@@ -4362,7 +4362,7 @@
           <a:p>
             <a:fld id="{846CE7D5-CF57-46EF-B807-FDD0502418D4}" type="datetimeFigureOut">
               <a:rPr lang="en-US" smtClean="0"/>
-              <a:t>7/14/20</a:t>
+              <a:t>7/16/20</a:t>
             </a:fld>
             <a:endParaRPr lang="en-US"/>
           </a:p>
@@ -4532,7 +4532,7 @@
           <a:p>
             <a:fld id="{846CE7D5-CF57-46EF-B807-FDD0502418D4}" type="datetimeFigureOut">
               <a:rPr lang="en-US" smtClean="0"/>
-              <a:t>7/14/20</a:t>
+              <a:t>7/16/20</a:t>
             </a:fld>
             <a:endParaRPr lang="en-US"/>
           </a:p>
@@ -4778,7 +4778,7 @@
           <a:p>
             <a:fld id="{846CE7D5-CF57-46EF-B807-FDD0502418D4}" type="datetimeFigureOut">
               <a:rPr lang="en-US" smtClean="0"/>
-              <a:t>7/14/20</a:t>
+              <a:t>7/16/20</a:t>
             </a:fld>
             <a:endParaRPr lang="en-US"/>
           </a:p>
@@ -5010,7 +5010,7 @@
           <a:p>
             <a:fld id="{846CE7D5-CF57-46EF-B807-FDD0502418D4}" type="datetimeFigureOut">
               <a:rPr lang="en-US" smtClean="0"/>
-              <a:t>7/14/20</a:t>
+              <a:t>7/16/20</a:t>
             </a:fld>
             <a:endParaRPr lang="en-US"/>
           </a:p>
@@ -5377,7 +5377,7 @@
           <a:p>
             <a:fld id="{846CE7D5-CF57-46EF-B807-FDD0502418D4}" type="datetimeFigureOut">
               <a:rPr lang="en-US" smtClean="0"/>
-              <a:t>7/14/20</a:t>
+              <a:t>7/16/20</a:t>
             </a:fld>
             <a:endParaRPr lang="en-US"/>
           </a:p>
@@ -5495,7 +5495,7 @@
           <a:p>
             <a:fld id="{846CE7D5-CF57-46EF-B807-FDD0502418D4}" type="datetimeFigureOut">
               <a:rPr lang="en-US" smtClean="0"/>
-              <a:t>7/14/20</a:t>
+              <a:t>7/16/20</a:t>
             </a:fld>
             <a:endParaRPr lang="en-US"/>
           </a:p>
@@ -5590,7 +5590,7 @@
           <a:p>
             <a:fld id="{846CE7D5-CF57-46EF-B807-FDD0502418D4}" type="datetimeFigureOut">
               <a:rPr lang="en-US" smtClean="0"/>
-              <a:t>7/14/20</a:t>
+              <a:t>7/16/20</a:t>
             </a:fld>
             <a:endParaRPr lang="en-US"/>
           </a:p>
@@ -5867,7 +5867,7 @@
           <a:p>
             <a:fld id="{846CE7D5-CF57-46EF-B807-FDD0502418D4}" type="datetimeFigureOut">
               <a:rPr lang="en-US" smtClean="0"/>
-              <a:t>7/14/20</a:t>
+              <a:t>7/16/20</a:t>
             </a:fld>
             <a:endParaRPr lang="en-US"/>
           </a:p>
@@ -6124,7 +6124,7 @@
           <a:p>
             <a:fld id="{846CE7D5-CF57-46EF-B807-FDD0502418D4}" type="datetimeFigureOut">
               <a:rPr lang="en-US" smtClean="0"/>
-              <a:t>7/14/20</a:t>
+              <a:t>7/16/20</a:t>
             </a:fld>
             <a:endParaRPr lang="en-US"/>
           </a:p>
@@ -6337,7 +6337,7 @@
           <a:p>
             <a:fld id="{846CE7D5-CF57-46EF-B807-FDD0502418D4}" type="datetimeFigureOut">
               <a:rPr lang="en-US" smtClean="0"/>
-              <a:t>7/14/20</a:t>
+              <a:t>7/16/20</a:t>
             </a:fld>
             <a:endParaRPr lang="en-US"/>
           </a:p>
@@ -6828,7 +6828,7 @@
           <p:cNvPr id="2" name="Title 1">
             <a:extLst>
               <a:ext uri="{FF2B5EF4-FFF2-40B4-BE49-F238E27FC236}">
-                <a16:creationId xmlns="" xmlns:a16="http://schemas.microsoft.com/office/drawing/2014/main" id="{99760F66-ED22-4D99-83D9-AF132B641E2C}"/>
+                <a16:creationId xmlns:a16="http://schemas.microsoft.com/office/drawing/2014/main" xmlns="" id="{99760F66-ED22-4D99-83D9-AF132B641E2C}"/>
               </a:ext>
             </a:extLst>
           </p:cNvPr>
@@ -6859,7 +6859,7 @@
           <p:cNvPr id="4" name="Picture 3" descr="A close up of a logo&#10;&#10;Description generated with very high confidence">
             <a:extLst>
               <a:ext uri="{FF2B5EF4-FFF2-40B4-BE49-F238E27FC236}">
-                <a16:creationId xmlns="" xmlns:a16="http://schemas.microsoft.com/office/drawing/2014/main" id="{6E87F861-F9AC-4F21-B0C8-58EB55E95B97}"/>
+                <a16:creationId xmlns:a16="http://schemas.microsoft.com/office/drawing/2014/main" xmlns="" id="{6E87F861-F9AC-4F21-B0C8-58EB55E95B97}"/>
               </a:ext>
             </a:extLst>
           </p:cNvPr>
@@ -6889,7 +6889,7 @@
           <p:cNvPr id="8" name="Arrow: Down 7">
             <a:extLst>
               <a:ext uri="{FF2B5EF4-FFF2-40B4-BE49-F238E27FC236}">
-                <a16:creationId xmlns="" xmlns:a16="http://schemas.microsoft.com/office/drawing/2014/main" id="{82AB09DD-DB63-4806-A980-AE0CB9781D42}"/>
+                <a16:creationId xmlns:a16="http://schemas.microsoft.com/office/drawing/2014/main" xmlns="" id="{82AB09DD-DB63-4806-A980-AE0CB9781D42}"/>
               </a:ext>
             </a:extLst>
           </p:cNvPr>
@@ -6943,7 +6943,7 @@
           <p:cNvPr id="7" name="Picture 8" descr="A picture containing object, clock, meter&#10;&#10;Description generated with very high confidence">
             <a:extLst>
               <a:ext uri="{FF2B5EF4-FFF2-40B4-BE49-F238E27FC236}">
-                <a16:creationId xmlns="" xmlns:a16="http://schemas.microsoft.com/office/drawing/2014/main" id="{24E34536-1F12-4496-ADBF-5DDFD8BD27B0}"/>
+                <a16:creationId xmlns:a16="http://schemas.microsoft.com/office/drawing/2014/main" xmlns="" id="{24E34536-1F12-4496-ADBF-5DDFD8BD27B0}"/>
               </a:ext>
             </a:extLst>
           </p:cNvPr>
@@ -6973,7 +6973,7 @@
           <p:cNvPr id="10" name="Arrow: Down 9">
             <a:extLst>
               <a:ext uri="{FF2B5EF4-FFF2-40B4-BE49-F238E27FC236}">
-                <a16:creationId xmlns="" xmlns:a16="http://schemas.microsoft.com/office/drawing/2014/main" id="{C0BCF31F-630B-4B9F-8929-EFCB1E78F4C9}"/>
+                <a16:creationId xmlns:a16="http://schemas.microsoft.com/office/drawing/2014/main" xmlns="" id="{C0BCF31F-630B-4B9F-8929-EFCB1E78F4C9}"/>
               </a:ext>
             </a:extLst>
           </p:cNvPr>
@@ -7027,7 +7027,7 @@
           <p:cNvPr id="11" name="TextBox 10">
             <a:extLst>
               <a:ext uri="{FF2B5EF4-FFF2-40B4-BE49-F238E27FC236}">
-                <a16:creationId xmlns="" xmlns:a16="http://schemas.microsoft.com/office/drawing/2014/main" id="{02939EE3-25E8-4AA1-A0EF-AEA68207BAAD}"/>
+                <a16:creationId xmlns:a16="http://schemas.microsoft.com/office/drawing/2014/main" xmlns="" id="{02939EE3-25E8-4AA1-A0EF-AEA68207BAAD}"/>
               </a:ext>
             </a:extLst>
           </p:cNvPr>
@@ -7090,7 +7090,7 @@
           <p:cNvPr id="12" name="TextBox 11">
             <a:extLst>
               <a:ext uri="{FF2B5EF4-FFF2-40B4-BE49-F238E27FC236}">
-                <a16:creationId xmlns="" xmlns:a16="http://schemas.microsoft.com/office/drawing/2014/main" id="{E8C512F0-66D0-4B8A-B0A7-993EEF9E5139}"/>
+                <a16:creationId xmlns:a16="http://schemas.microsoft.com/office/drawing/2014/main" xmlns="" id="{E8C512F0-66D0-4B8A-B0A7-993EEF9E5139}"/>
               </a:ext>
             </a:extLst>
           </p:cNvPr>
@@ -7149,7 +7149,7 @@
           <p:cNvPr id="13" name="TextBox 12">
             <a:extLst>
               <a:ext uri="{FF2B5EF4-FFF2-40B4-BE49-F238E27FC236}">
-                <a16:creationId xmlns="" xmlns:a16="http://schemas.microsoft.com/office/drawing/2014/main" id="{7E86E019-DB97-4D67-8777-EE3CB4990CA9}"/>
+                <a16:creationId xmlns:a16="http://schemas.microsoft.com/office/drawing/2014/main" xmlns="" id="{7E86E019-DB97-4D67-8777-EE3CB4990CA9}"/>
               </a:ext>
             </a:extLst>
           </p:cNvPr>
@@ -7208,7 +7208,7 @@
           <p:cNvPr id="14" name="Arrow: Right 13">
             <a:extLst>
               <a:ext uri="{FF2B5EF4-FFF2-40B4-BE49-F238E27FC236}">
-                <a16:creationId xmlns="" xmlns:a16="http://schemas.microsoft.com/office/drawing/2014/main" id="{169BB430-EBE9-48D3-BBC7-66B17AF3C24B}"/>
+                <a16:creationId xmlns:a16="http://schemas.microsoft.com/office/drawing/2014/main" xmlns="" id="{169BB430-EBE9-48D3-BBC7-66B17AF3C24B}"/>
               </a:ext>
             </a:extLst>
           </p:cNvPr>
@@ -7252,7 +7252,7 @@
           <p:cNvPr id="15" name="Arrow: Right 14">
             <a:extLst>
               <a:ext uri="{FF2B5EF4-FFF2-40B4-BE49-F238E27FC236}">
-                <a16:creationId xmlns="" xmlns:a16="http://schemas.microsoft.com/office/drawing/2014/main" id="{6E7FAE65-47EA-4920-B326-5A67AA7A8459}"/>
+                <a16:creationId xmlns:a16="http://schemas.microsoft.com/office/drawing/2014/main" xmlns="" id="{6E7FAE65-47EA-4920-B326-5A67AA7A8459}"/>
               </a:ext>
             </a:extLst>
           </p:cNvPr>
@@ -7785,7 +7785,7 @@
           <p:cNvPr id="2" name="Title 1">
             <a:extLst>
               <a:ext uri="{FF2B5EF4-FFF2-40B4-BE49-F238E27FC236}">
-                <a16:creationId xmlns="" xmlns:a16="http://schemas.microsoft.com/office/drawing/2014/main" id="{049D73AB-69AC-4C26-8CC0-8588A649B93D}"/>
+                <a16:creationId xmlns:a16="http://schemas.microsoft.com/office/drawing/2014/main" xmlns="" id="{049D73AB-69AC-4C26-8CC0-8588A649B93D}"/>
               </a:ext>
             </a:extLst>
           </p:cNvPr>
@@ -7816,7 +7816,7 @@
           <p:cNvPr id="3" name="Picture 3" descr="A close up of a logo&#10;&#10;Description generated with very high confidence">
             <a:extLst>
               <a:ext uri="{FF2B5EF4-FFF2-40B4-BE49-F238E27FC236}">
-                <a16:creationId xmlns="" xmlns:a16="http://schemas.microsoft.com/office/drawing/2014/main" id="{F02ACA80-2AC2-480A-B525-77E55A69968C}"/>
+                <a16:creationId xmlns:a16="http://schemas.microsoft.com/office/drawing/2014/main" xmlns="" id="{F02ACA80-2AC2-480A-B525-77E55A69968C}"/>
               </a:ext>
             </a:extLst>
           </p:cNvPr>
@@ -7846,7 +7846,7 @@
           <p:cNvPr id="8" name="TextBox 7">
             <a:extLst>
               <a:ext uri="{FF2B5EF4-FFF2-40B4-BE49-F238E27FC236}">
-                <a16:creationId xmlns="" xmlns:a16="http://schemas.microsoft.com/office/drawing/2014/main" id="{835FC702-9D17-4D93-ADB1-41187423B13D}"/>
+                <a16:creationId xmlns:a16="http://schemas.microsoft.com/office/drawing/2014/main" xmlns="" id="{835FC702-9D17-4D93-ADB1-41187423B13D}"/>
               </a:ext>
             </a:extLst>
           </p:cNvPr>
@@ -7900,7 +7900,7 @@
           <p:cNvPr id="9" name="TextBox 8">
             <a:extLst>
               <a:ext uri="{FF2B5EF4-FFF2-40B4-BE49-F238E27FC236}">
-                <a16:creationId xmlns="" xmlns:a16="http://schemas.microsoft.com/office/drawing/2014/main" id="{37F40EBB-2055-4760-B908-EBF1D946DEBB}"/>
+                <a16:creationId xmlns:a16="http://schemas.microsoft.com/office/drawing/2014/main" xmlns="" id="{37F40EBB-2055-4760-B908-EBF1D946DEBB}"/>
               </a:ext>
             </a:extLst>
           </p:cNvPr>
@@ -8050,7 +8050,7 @@
           <p:cNvPr id="2" name="Title 1">
             <a:extLst>
               <a:ext uri="{FF2B5EF4-FFF2-40B4-BE49-F238E27FC236}">
-                <a16:creationId xmlns="" xmlns:a16="http://schemas.microsoft.com/office/drawing/2014/main" id="{087C7EC8-1E92-40CF-90E0-1A53D90D6843}"/>
+                <a16:creationId xmlns:a16="http://schemas.microsoft.com/office/drawing/2014/main" xmlns="" id="{087C7EC8-1E92-40CF-90E0-1A53D90D6843}"/>
               </a:ext>
             </a:extLst>
           </p:cNvPr>
@@ -8146,7 +8146,7 @@
           <p:cNvPr id="6" name="TextBox 5">
             <a:extLst>
               <a:ext uri="{FF2B5EF4-FFF2-40B4-BE49-F238E27FC236}">
-                <a16:creationId xmlns="" xmlns:a16="http://schemas.microsoft.com/office/drawing/2014/main" id="{835FC702-9D17-4D93-ADB1-41187423B13D}"/>
+                <a16:creationId xmlns:a16="http://schemas.microsoft.com/office/drawing/2014/main" xmlns="" id="{835FC702-9D17-4D93-ADB1-41187423B13D}"/>
               </a:ext>
             </a:extLst>
           </p:cNvPr>
@@ -8320,7 +8320,7 @@
           <p:cNvPr id="14" name="Left Brace 13">
             <a:extLst>
               <a:ext uri="{FF2B5EF4-FFF2-40B4-BE49-F238E27FC236}">
-                <a16:creationId xmlns="" xmlns:a16="http://schemas.microsoft.com/office/drawing/2014/main" id="{B0FCB8FB-0BF8-4D3B-A796-DF6C215E4800}"/>
+                <a16:creationId xmlns:a16="http://schemas.microsoft.com/office/drawing/2014/main" xmlns="" id="{B0FCB8FB-0BF8-4D3B-A796-DF6C215E4800}"/>
               </a:ext>
             </a:extLst>
           </p:cNvPr>
@@ -8372,7 +8372,7 @@
           <p:cNvPr id="15" name="Left Brace 14">
             <a:extLst>
               <a:ext uri="{FF2B5EF4-FFF2-40B4-BE49-F238E27FC236}">
-                <a16:creationId xmlns="" xmlns:a16="http://schemas.microsoft.com/office/drawing/2014/main" id="{B0FCB8FB-0BF8-4D3B-A796-DF6C215E4800}"/>
+                <a16:creationId xmlns:a16="http://schemas.microsoft.com/office/drawing/2014/main" xmlns="" id="{B0FCB8FB-0BF8-4D3B-A796-DF6C215E4800}"/>
               </a:ext>
             </a:extLst>
           </p:cNvPr>
@@ -8727,7 +8727,7 @@
           <p:cNvPr id="2" name="Title 1">
             <a:extLst>
               <a:ext uri="{FF2B5EF4-FFF2-40B4-BE49-F238E27FC236}">
-                <a16:creationId xmlns="" xmlns:a16="http://schemas.microsoft.com/office/drawing/2014/main" id="{087C7EC8-1E92-40CF-90E0-1A53D90D6843}"/>
+                <a16:creationId xmlns:a16="http://schemas.microsoft.com/office/drawing/2014/main" xmlns="" id="{087C7EC8-1E92-40CF-90E0-1A53D90D6843}"/>
               </a:ext>
             </a:extLst>
           </p:cNvPr>
@@ -8793,7 +8793,7 @@
           <p:cNvPr id="8" name="TextBox 7">
             <a:extLst>
               <a:ext uri="{FF2B5EF4-FFF2-40B4-BE49-F238E27FC236}">
-                <a16:creationId xmlns="" xmlns:a16="http://schemas.microsoft.com/office/drawing/2014/main" id="{37F40EBB-2055-4760-B908-EBF1D946DEBB}"/>
+                <a16:creationId xmlns:a16="http://schemas.microsoft.com/office/drawing/2014/main" xmlns="" id="{37F40EBB-2055-4760-B908-EBF1D946DEBB}"/>
               </a:ext>
             </a:extLst>
           </p:cNvPr>
@@ -8937,7 +8937,7 @@
           <p:cNvPr id="18" name="Arrow: Right 47">
             <a:extLst>
               <a:ext uri="{FF2B5EF4-FFF2-40B4-BE49-F238E27FC236}">
-                <a16:creationId xmlns="" xmlns:a16="http://schemas.microsoft.com/office/drawing/2014/main" id="{2D05F327-8A08-41D8-93AF-95C1FFD2CEA2}"/>
+                <a16:creationId xmlns:a16="http://schemas.microsoft.com/office/drawing/2014/main" xmlns="" id="{2D05F327-8A08-41D8-93AF-95C1FFD2CEA2}"/>
               </a:ext>
             </a:extLst>
           </p:cNvPr>
@@ -9366,7 +9366,7 @@
           <p:cNvPr id="2" name="Title 1">
             <a:extLst>
               <a:ext uri="{FF2B5EF4-FFF2-40B4-BE49-F238E27FC236}">
-                <a16:creationId xmlns="" xmlns:a16="http://schemas.microsoft.com/office/drawing/2014/main" id="{087C7EC8-1E92-40CF-90E0-1A53D90D6843}"/>
+                <a16:creationId xmlns:a16="http://schemas.microsoft.com/office/drawing/2014/main" xmlns="" id="{087C7EC8-1E92-40CF-90E0-1A53D90D6843}"/>
               </a:ext>
             </a:extLst>
           </p:cNvPr>
@@ -9432,7 +9432,7 @@
           <p:cNvPr id="8" name="TextBox 7">
             <a:extLst>
               <a:ext uri="{FF2B5EF4-FFF2-40B4-BE49-F238E27FC236}">
-                <a16:creationId xmlns="" xmlns:a16="http://schemas.microsoft.com/office/drawing/2014/main" id="{37F40EBB-2055-4760-B908-EBF1D946DEBB}"/>
+                <a16:creationId xmlns:a16="http://schemas.microsoft.com/office/drawing/2014/main" xmlns="" id="{37F40EBB-2055-4760-B908-EBF1D946DEBB}"/>
               </a:ext>
             </a:extLst>
           </p:cNvPr>
@@ -9576,7 +9576,7 @@
           <p:cNvPr id="24" name="TextBox 23">
             <a:extLst>
               <a:ext uri="{FF2B5EF4-FFF2-40B4-BE49-F238E27FC236}">
-                <a16:creationId xmlns="" xmlns:a16="http://schemas.microsoft.com/office/drawing/2014/main" id="{02939EE3-25E8-4AA1-A0EF-AEA68207BAAD}"/>
+                <a16:creationId xmlns:a16="http://schemas.microsoft.com/office/drawing/2014/main" xmlns="" id="{02939EE3-25E8-4AA1-A0EF-AEA68207BAAD}"/>
               </a:ext>
             </a:extLst>
           </p:cNvPr>
@@ -9988,7 +9988,7 @@
           <p:cNvPr id="2" name="Title 1">
             <a:extLst>
               <a:ext uri="{FF2B5EF4-FFF2-40B4-BE49-F238E27FC236}">
-                <a16:creationId xmlns="" xmlns:a16="http://schemas.microsoft.com/office/drawing/2014/main" id="{087C7EC8-1E92-40CF-90E0-1A53D90D6843}"/>
+                <a16:creationId xmlns:a16="http://schemas.microsoft.com/office/drawing/2014/main" xmlns="" id="{087C7EC8-1E92-40CF-90E0-1A53D90D6843}"/>
               </a:ext>
             </a:extLst>
           </p:cNvPr>
@@ -10252,7 +10252,7 @@
           <p:cNvPr id="14" name="TextBox 13">
             <a:extLst>
               <a:ext uri="{FF2B5EF4-FFF2-40B4-BE49-F238E27FC236}">
-                <a16:creationId xmlns="" xmlns:a16="http://schemas.microsoft.com/office/drawing/2014/main" id="{37F40EBB-2055-4760-B908-EBF1D946DEBB}"/>
+                <a16:creationId xmlns:a16="http://schemas.microsoft.com/office/drawing/2014/main" xmlns="" id="{37F40EBB-2055-4760-B908-EBF1D946DEBB}"/>
               </a:ext>
             </a:extLst>
           </p:cNvPr>
@@ -10306,7 +10306,7 @@
           <p:cNvPr id="15" name="TextBox 14">
             <a:extLst>
               <a:ext uri="{FF2B5EF4-FFF2-40B4-BE49-F238E27FC236}">
-                <a16:creationId xmlns="" xmlns:a16="http://schemas.microsoft.com/office/drawing/2014/main" id="{835FC702-9D17-4D93-ADB1-41187423B13D}"/>
+                <a16:creationId xmlns:a16="http://schemas.microsoft.com/office/drawing/2014/main" xmlns="" id="{835FC702-9D17-4D93-ADB1-41187423B13D}"/>
               </a:ext>
             </a:extLst>
           </p:cNvPr>
@@ -10678,7 +10678,7 @@
           <p:cNvPr id="2" name="Title 1">
             <a:extLst>
               <a:ext uri="{FF2B5EF4-FFF2-40B4-BE49-F238E27FC236}">
-                <a16:creationId xmlns="" xmlns:a16="http://schemas.microsoft.com/office/drawing/2014/main" id="{9D61FA45-C005-4B51-BCE8-53CB92897839}"/>
+                <a16:creationId xmlns:a16="http://schemas.microsoft.com/office/drawing/2014/main" xmlns="" id="{9D61FA45-C005-4B51-BCE8-53CB92897839}"/>
               </a:ext>
             </a:extLst>
           </p:cNvPr>
@@ -10709,7 +10709,7 @@
           <p:cNvPr id="5" name="Picture 5" descr="A close up of a sign&#10;&#10;Description generated with very high confidence">
             <a:extLst>
               <a:ext uri="{FF2B5EF4-FFF2-40B4-BE49-F238E27FC236}">
-                <a16:creationId xmlns="" xmlns:a16="http://schemas.microsoft.com/office/drawing/2014/main" id="{974CF11A-D544-4A6E-BD08-1F17C99FC2DA}"/>
+                <a16:creationId xmlns:a16="http://schemas.microsoft.com/office/drawing/2014/main" xmlns="" id="{974CF11A-D544-4A6E-BD08-1F17C99FC2DA}"/>
               </a:ext>
             </a:extLst>
           </p:cNvPr>
@@ -10739,7 +10739,7 @@
           <p:cNvPr id="7" name="Picture 7" descr="A close up of a logo&#10;&#10;Description generated with very high confidence">
             <a:extLst>
               <a:ext uri="{FF2B5EF4-FFF2-40B4-BE49-F238E27FC236}">
-                <a16:creationId xmlns="" xmlns:a16="http://schemas.microsoft.com/office/drawing/2014/main" id="{0D9DF479-3D2A-4F0E-B4D7-A7FD23103304}"/>
+                <a16:creationId xmlns:a16="http://schemas.microsoft.com/office/drawing/2014/main" xmlns="" id="{0D9DF479-3D2A-4F0E-B4D7-A7FD23103304}"/>
               </a:ext>
             </a:extLst>
           </p:cNvPr>
@@ -10769,7 +10769,7 @@
           <p:cNvPr id="10" name="TextBox 9">
             <a:extLst>
               <a:ext uri="{FF2B5EF4-FFF2-40B4-BE49-F238E27FC236}">
-                <a16:creationId xmlns="" xmlns:a16="http://schemas.microsoft.com/office/drawing/2014/main" id="{22CD767A-B4EC-4BF1-9ED3-D71A5E3C700F}"/>
+                <a16:creationId xmlns:a16="http://schemas.microsoft.com/office/drawing/2014/main" xmlns="" id="{22CD767A-B4EC-4BF1-9ED3-D71A5E3C700F}"/>
               </a:ext>
             </a:extLst>
           </p:cNvPr>
@@ -10810,7 +10810,7 @@
           <p:cNvPr id="6" name="TextBox 5">
             <a:extLst>
               <a:ext uri="{FF2B5EF4-FFF2-40B4-BE49-F238E27FC236}">
-                <a16:creationId xmlns="" xmlns:a16="http://schemas.microsoft.com/office/drawing/2014/main" id="{16A576E4-CB05-410A-A7B7-E1D5082BB440}"/>
+                <a16:creationId xmlns:a16="http://schemas.microsoft.com/office/drawing/2014/main" xmlns="" id="{16A576E4-CB05-410A-A7B7-E1D5082BB440}"/>
               </a:ext>
             </a:extLst>
           </p:cNvPr>
@@ -10851,7 +10851,7 @@
           <p:cNvPr id="4" name="TextBox 3">
             <a:extLst>
               <a:ext uri="{FF2B5EF4-FFF2-40B4-BE49-F238E27FC236}">
-                <a16:creationId xmlns="" xmlns:a16="http://schemas.microsoft.com/office/drawing/2014/main" id="{250592F7-BF1B-4D15-B7BE-568378A0093B}"/>
+                <a16:creationId xmlns:a16="http://schemas.microsoft.com/office/drawing/2014/main" xmlns="" id="{250592F7-BF1B-4D15-B7BE-568378A0093B}"/>
               </a:ext>
             </a:extLst>
           </p:cNvPr>
@@ -10905,7 +10905,7 @@
           <p:cNvPr id="14" name="TextBox 13">
             <a:extLst>
               <a:ext uri="{FF2B5EF4-FFF2-40B4-BE49-F238E27FC236}">
-                <a16:creationId xmlns="" xmlns:a16="http://schemas.microsoft.com/office/drawing/2014/main" id="{686536B4-EF0B-4FEC-B9A4-01510F6556F2}"/>
+                <a16:creationId xmlns:a16="http://schemas.microsoft.com/office/drawing/2014/main" xmlns="" id="{686536B4-EF0B-4FEC-B9A4-01510F6556F2}"/>
               </a:ext>
             </a:extLst>
           </p:cNvPr>
@@ -10959,7 +10959,7 @@
           <p:cNvPr id="11" name="TextBox 10">
             <a:extLst>
               <a:ext uri="{FF2B5EF4-FFF2-40B4-BE49-F238E27FC236}">
-                <a16:creationId xmlns="" xmlns:a16="http://schemas.microsoft.com/office/drawing/2014/main" id="{250592F7-BF1B-4D15-B7BE-568378A0093B}"/>
+                <a16:creationId xmlns:a16="http://schemas.microsoft.com/office/drawing/2014/main" xmlns="" id="{250592F7-BF1B-4D15-B7BE-568378A0093B}"/>
               </a:ext>
             </a:extLst>
           </p:cNvPr>
@@ -11013,7 +11013,7 @@
           <p:cNvPr id="15" name="TextBox 14">
             <a:extLst>
               <a:ext uri="{FF2B5EF4-FFF2-40B4-BE49-F238E27FC236}">
-                <a16:creationId xmlns="" xmlns:a16="http://schemas.microsoft.com/office/drawing/2014/main" id="{250592F7-BF1B-4D15-B7BE-568378A0093B}"/>
+                <a16:creationId xmlns:a16="http://schemas.microsoft.com/office/drawing/2014/main" xmlns="" id="{250592F7-BF1B-4D15-B7BE-568378A0093B}"/>
               </a:ext>
             </a:extLst>
           </p:cNvPr>
@@ -11258,7 +11258,7 @@
           <p:cNvPr id="2" name="Title 1">
             <a:extLst>
               <a:ext uri="{FF2B5EF4-FFF2-40B4-BE49-F238E27FC236}">
-                <a16:creationId xmlns="" xmlns:a16="http://schemas.microsoft.com/office/drawing/2014/main" id="{D1E7EFF5-11B8-4F32-8476-49E84585F05A}"/>
+                <a16:creationId xmlns:a16="http://schemas.microsoft.com/office/drawing/2014/main" xmlns="" id="{D1E7EFF5-11B8-4F32-8476-49E84585F05A}"/>
               </a:ext>
             </a:extLst>
           </p:cNvPr>
@@ -11289,7 +11289,7 @@
           <p:cNvPr id="5" name="Picture 5" descr="A close up of a logo&#10;&#10;Description generated with very high confidence">
             <a:extLst>
               <a:ext uri="{FF2B5EF4-FFF2-40B4-BE49-F238E27FC236}">
-                <a16:creationId xmlns="" xmlns:a16="http://schemas.microsoft.com/office/drawing/2014/main" id="{FE49CDEE-6D69-4779-8171-6088CFE5B861}"/>
+                <a16:creationId xmlns:a16="http://schemas.microsoft.com/office/drawing/2014/main" xmlns="" id="{FE49CDEE-6D69-4779-8171-6088CFE5B861}"/>
               </a:ext>
             </a:extLst>
           </p:cNvPr>
@@ -11319,7 +11319,7 @@
           <p:cNvPr id="19" name="Picture 19" descr="A close up of a logo&#10;&#10;Description generated with very high confidence">
             <a:extLst>
               <a:ext uri="{FF2B5EF4-FFF2-40B4-BE49-F238E27FC236}">
-                <a16:creationId xmlns="" xmlns:a16="http://schemas.microsoft.com/office/drawing/2014/main" id="{373E1E67-9DC9-45A9-ABF4-E4C962A52693}"/>
+                <a16:creationId xmlns:a16="http://schemas.microsoft.com/office/drawing/2014/main" xmlns="" id="{373E1E67-9DC9-45A9-ABF4-E4C962A52693}"/>
               </a:ext>
             </a:extLst>
           </p:cNvPr>
@@ -11349,7 +11349,7 @@
           <p:cNvPr id="21" name="Picture 21" descr="A picture containing clock&#10;&#10;Description generated with very high confidence">
             <a:extLst>
               <a:ext uri="{FF2B5EF4-FFF2-40B4-BE49-F238E27FC236}">
-                <a16:creationId xmlns="" xmlns:a16="http://schemas.microsoft.com/office/drawing/2014/main" id="{FF232AEA-FD06-4CA8-8824-5AC34E209566}"/>
+                <a16:creationId xmlns:a16="http://schemas.microsoft.com/office/drawing/2014/main" xmlns="" id="{FF232AEA-FD06-4CA8-8824-5AC34E209566}"/>
               </a:ext>
             </a:extLst>
           </p:cNvPr>
@@ -11379,7 +11379,7 @@
           <p:cNvPr id="23" name="Picture 23">
             <a:extLst>
               <a:ext uri="{FF2B5EF4-FFF2-40B4-BE49-F238E27FC236}">
-                <a16:creationId xmlns="" xmlns:a16="http://schemas.microsoft.com/office/drawing/2014/main" id="{2B879844-8BE1-4CCE-88B8-10531FB57445}"/>
+                <a16:creationId xmlns:a16="http://schemas.microsoft.com/office/drawing/2014/main" xmlns="" id="{2B879844-8BE1-4CCE-88B8-10531FB57445}"/>
               </a:ext>
             </a:extLst>
           </p:cNvPr>
@@ -11409,7 +11409,7 @@
           <p:cNvPr id="25" name="Picture 25" descr="A picture containing clock, traffic, street&#10;&#10;Description generated with very high confidence">
             <a:extLst>
               <a:ext uri="{FF2B5EF4-FFF2-40B4-BE49-F238E27FC236}">
-                <a16:creationId xmlns="" xmlns:a16="http://schemas.microsoft.com/office/drawing/2014/main" id="{31C4CA6E-64D5-4644-A0B0-E7F77CB31720}"/>
+                <a16:creationId xmlns:a16="http://schemas.microsoft.com/office/drawing/2014/main" xmlns="" id="{31C4CA6E-64D5-4644-A0B0-E7F77CB31720}"/>
               </a:ext>
             </a:extLst>
           </p:cNvPr>
@@ -11439,7 +11439,7 @@
           <p:cNvPr id="27" name="Picture 27" descr="A picture containing clock&#10;&#10;Description generated with very high confidence">
             <a:extLst>
               <a:ext uri="{FF2B5EF4-FFF2-40B4-BE49-F238E27FC236}">
-                <a16:creationId xmlns="" xmlns:a16="http://schemas.microsoft.com/office/drawing/2014/main" id="{47AD4336-E823-420A-8B46-C5DF09A594FB}"/>
+                <a16:creationId xmlns:a16="http://schemas.microsoft.com/office/drawing/2014/main" xmlns="" id="{47AD4336-E823-420A-8B46-C5DF09A594FB}"/>
               </a:ext>
             </a:extLst>
           </p:cNvPr>
@@ -11469,7 +11469,7 @@
           <p:cNvPr id="31" name="Picture 31">
             <a:extLst>
               <a:ext uri="{FF2B5EF4-FFF2-40B4-BE49-F238E27FC236}">
-                <a16:creationId xmlns="" xmlns:a16="http://schemas.microsoft.com/office/drawing/2014/main" id="{CF195AAB-5B37-4012-A55E-F21CB6F4AE21}"/>
+                <a16:creationId xmlns:a16="http://schemas.microsoft.com/office/drawing/2014/main" xmlns="" id="{CF195AAB-5B37-4012-A55E-F21CB6F4AE21}"/>
               </a:ext>
             </a:extLst>
           </p:cNvPr>
@@ -11499,7 +11499,7 @@
           <p:cNvPr id="33" name="Picture 33">
             <a:extLst>
               <a:ext uri="{FF2B5EF4-FFF2-40B4-BE49-F238E27FC236}">
-                <a16:creationId xmlns="" xmlns:a16="http://schemas.microsoft.com/office/drawing/2014/main" id="{A42BFE66-B805-45F0-AC9C-33C7A041FC28}"/>
+                <a16:creationId xmlns:a16="http://schemas.microsoft.com/office/drawing/2014/main" xmlns="" id="{A42BFE66-B805-45F0-AC9C-33C7A041FC28}"/>
               </a:ext>
             </a:extLst>
           </p:cNvPr>
@@ -11529,7 +11529,7 @@
           <p:cNvPr id="38" name="Arrow: Up-Down 37">
             <a:extLst>
               <a:ext uri="{FF2B5EF4-FFF2-40B4-BE49-F238E27FC236}">
-                <a16:creationId xmlns="" xmlns:a16="http://schemas.microsoft.com/office/drawing/2014/main" id="{E9C791D2-D3ED-4C76-A4FB-9E49E9BC2A8C}"/>
+                <a16:creationId xmlns:a16="http://schemas.microsoft.com/office/drawing/2014/main" xmlns="" id="{E9C791D2-D3ED-4C76-A4FB-9E49E9BC2A8C}"/>
               </a:ext>
             </a:extLst>
           </p:cNvPr>
@@ -11589,7 +11589,7 @@
           <p:cNvPr id="39" name="Arrow: Up-Down 38">
             <a:extLst>
               <a:ext uri="{FF2B5EF4-FFF2-40B4-BE49-F238E27FC236}">
-                <a16:creationId xmlns="" xmlns:a16="http://schemas.microsoft.com/office/drawing/2014/main" id="{3CA03F87-6632-40D2-B199-A96D1396CA2E}"/>
+                <a16:creationId xmlns:a16="http://schemas.microsoft.com/office/drawing/2014/main" xmlns="" id="{3CA03F87-6632-40D2-B199-A96D1396CA2E}"/>
               </a:ext>
             </a:extLst>
           </p:cNvPr>
@@ -11649,7 +11649,7 @@
           <p:cNvPr id="40" name="Arrow: Up-Down 39">
             <a:extLst>
               <a:ext uri="{FF2B5EF4-FFF2-40B4-BE49-F238E27FC236}">
-                <a16:creationId xmlns="" xmlns:a16="http://schemas.microsoft.com/office/drawing/2014/main" id="{B1C9AD59-4552-405C-A60E-18BD55E874C3}"/>
+                <a16:creationId xmlns:a16="http://schemas.microsoft.com/office/drawing/2014/main" xmlns="" id="{B1C9AD59-4552-405C-A60E-18BD55E874C3}"/>
               </a:ext>
             </a:extLst>
           </p:cNvPr>
@@ -11709,7 +11709,7 @@
           <p:cNvPr id="41" name="Arrow: Up-Down 40">
             <a:extLst>
               <a:ext uri="{FF2B5EF4-FFF2-40B4-BE49-F238E27FC236}">
-                <a16:creationId xmlns="" xmlns:a16="http://schemas.microsoft.com/office/drawing/2014/main" id="{C9EC8E87-D8C8-4D1C-9357-BBC1276FAB13}"/>
+                <a16:creationId xmlns:a16="http://schemas.microsoft.com/office/drawing/2014/main" xmlns="" id="{C9EC8E87-D8C8-4D1C-9357-BBC1276FAB13}"/>
               </a:ext>
             </a:extLst>
           </p:cNvPr>
@@ -11769,7 +11769,7 @@
           <p:cNvPr id="42" name="TextBox 41">
             <a:extLst>
               <a:ext uri="{FF2B5EF4-FFF2-40B4-BE49-F238E27FC236}">
-                <a16:creationId xmlns="" xmlns:a16="http://schemas.microsoft.com/office/drawing/2014/main" id="{32A4F61E-5D45-4050-9E11-874E0112D5BC}"/>
+                <a16:creationId xmlns:a16="http://schemas.microsoft.com/office/drawing/2014/main" xmlns="" id="{32A4F61E-5D45-4050-9E11-874E0112D5BC}"/>
               </a:ext>
             </a:extLst>
           </p:cNvPr>
@@ -11817,7 +11817,7 @@
           <p:cNvPr id="44" name="Picture 44" descr="A close up of a logo&#10;&#10;Description generated with very high confidence">
             <a:extLst>
               <a:ext uri="{FF2B5EF4-FFF2-40B4-BE49-F238E27FC236}">
-                <a16:creationId xmlns="" xmlns:a16="http://schemas.microsoft.com/office/drawing/2014/main" id="{C6EEF647-02C4-4AB2-8E03-C31475DC8075}"/>
+                <a16:creationId xmlns:a16="http://schemas.microsoft.com/office/drawing/2014/main" xmlns="" id="{C6EEF647-02C4-4AB2-8E03-C31475DC8075}"/>
               </a:ext>
             </a:extLst>
           </p:cNvPr>
@@ -11847,7 +11847,7 @@
           <p:cNvPr id="48" name="Arrow: Left-Right 47">
             <a:extLst>
               <a:ext uri="{FF2B5EF4-FFF2-40B4-BE49-F238E27FC236}">
-                <a16:creationId xmlns="" xmlns:a16="http://schemas.microsoft.com/office/drawing/2014/main" id="{7C21C0E3-9C9C-4326-9824-2DC17174A4D2}"/>
+                <a16:creationId xmlns:a16="http://schemas.microsoft.com/office/drawing/2014/main" xmlns="" id="{7C21C0E3-9C9C-4326-9824-2DC17174A4D2}"/>
               </a:ext>
             </a:extLst>
           </p:cNvPr>
@@ -11901,7 +11901,7 @@
           <p:cNvPr id="49" name="TextBox 48">
             <a:extLst>
               <a:ext uri="{FF2B5EF4-FFF2-40B4-BE49-F238E27FC236}">
-                <a16:creationId xmlns="" xmlns:a16="http://schemas.microsoft.com/office/drawing/2014/main" id="{8592CD3C-3310-4584-80B6-52CFA75970D9}"/>
+                <a16:creationId xmlns:a16="http://schemas.microsoft.com/office/drawing/2014/main" xmlns="" id="{8592CD3C-3310-4584-80B6-52CFA75970D9}"/>
               </a:ext>
             </a:extLst>
           </p:cNvPr>
@@ -11943,7 +11943,7 @@
           <p:cNvPr id="53" name="TextBox 52">
             <a:extLst>
               <a:ext uri="{FF2B5EF4-FFF2-40B4-BE49-F238E27FC236}">
-                <a16:creationId xmlns="" xmlns:a16="http://schemas.microsoft.com/office/drawing/2014/main" id="{721FC622-66BA-4ABB-8445-B59337E8241B}"/>
+                <a16:creationId xmlns:a16="http://schemas.microsoft.com/office/drawing/2014/main" xmlns="" id="{721FC622-66BA-4ABB-8445-B59337E8241B}"/>
               </a:ext>
             </a:extLst>
           </p:cNvPr>
@@ -11991,7 +11991,7 @@
           <p:cNvPr id="54" name="Picture 54" descr="A picture containing flower&#10;&#10;Description generated with very high confidence">
             <a:extLst>
               <a:ext uri="{FF2B5EF4-FFF2-40B4-BE49-F238E27FC236}">
-                <a16:creationId xmlns="" xmlns:a16="http://schemas.microsoft.com/office/drawing/2014/main" id="{1D0A2DA2-D53F-4BBC-94F9-9BF85BC8CF6E}"/>
+                <a16:creationId xmlns:a16="http://schemas.microsoft.com/office/drawing/2014/main" xmlns="" id="{1D0A2DA2-D53F-4BBC-94F9-9BF85BC8CF6E}"/>
               </a:ext>
             </a:extLst>
           </p:cNvPr>
@@ -12021,7 +12021,7 @@
           <p:cNvPr id="56" name="Picture 56">
             <a:extLst>
               <a:ext uri="{FF2B5EF4-FFF2-40B4-BE49-F238E27FC236}">
-                <a16:creationId xmlns="" xmlns:a16="http://schemas.microsoft.com/office/drawing/2014/main" id="{FFE612E4-785B-43FB-8986-D173D313736D}"/>
+                <a16:creationId xmlns:a16="http://schemas.microsoft.com/office/drawing/2014/main" xmlns="" id="{FFE612E4-785B-43FB-8986-D173D313736D}"/>
               </a:ext>
             </a:extLst>
           </p:cNvPr>
@@ -12051,7 +12051,7 @@
           <p:cNvPr id="58" name="Picture 58">
             <a:extLst>
               <a:ext uri="{FF2B5EF4-FFF2-40B4-BE49-F238E27FC236}">
-                <a16:creationId xmlns="" xmlns:a16="http://schemas.microsoft.com/office/drawing/2014/main" id="{A1894F98-FBC1-4EA9-AE3E-E924B620D6B5}"/>
+                <a16:creationId xmlns:a16="http://schemas.microsoft.com/office/drawing/2014/main" xmlns="" id="{A1894F98-FBC1-4EA9-AE3E-E924B620D6B5}"/>
               </a:ext>
             </a:extLst>
           </p:cNvPr>
@@ -12081,7 +12081,7 @@
           <p:cNvPr id="60" name="Straight Arrow Connector 59">
             <a:extLst>
               <a:ext uri="{FF2B5EF4-FFF2-40B4-BE49-F238E27FC236}">
-                <a16:creationId xmlns="" xmlns:a16="http://schemas.microsoft.com/office/drawing/2014/main" id="{81909CDE-C273-43DE-B727-BB2E4824E638}"/>
+                <a16:creationId xmlns:a16="http://schemas.microsoft.com/office/drawing/2014/main" xmlns="" id="{81909CDE-C273-43DE-B727-BB2E4824E638}"/>
               </a:ext>
             </a:extLst>
           </p:cNvPr>
@@ -12126,7 +12126,7 @@
           <p:cNvPr id="63" name="Straight Arrow Connector 62">
             <a:extLst>
               <a:ext uri="{FF2B5EF4-FFF2-40B4-BE49-F238E27FC236}">
-                <a16:creationId xmlns="" xmlns:a16="http://schemas.microsoft.com/office/drawing/2014/main" id="{5B14458C-B165-430E-9B2E-624426981001}"/>
+                <a16:creationId xmlns:a16="http://schemas.microsoft.com/office/drawing/2014/main" xmlns="" id="{5B14458C-B165-430E-9B2E-624426981001}"/>
               </a:ext>
             </a:extLst>
           </p:cNvPr>
@@ -12173,7 +12173,7 @@
           <p:cNvPr id="65" name="Arrow: Up-Down 64">
             <a:extLst>
               <a:ext uri="{FF2B5EF4-FFF2-40B4-BE49-F238E27FC236}">
-                <a16:creationId xmlns="" xmlns:a16="http://schemas.microsoft.com/office/drawing/2014/main" id="{CEEDAC1F-3995-48A3-95AC-4360D2B63AA4}"/>
+                <a16:creationId xmlns:a16="http://schemas.microsoft.com/office/drawing/2014/main" xmlns="" id="{CEEDAC1F-3995-48A3-95AC-4360D2B63AA4}"/>
               </a:ext>
             </a:extLst>
           </p:cNvPr>
@@ -12233,7 +12233,7 @@
           <p:cNvPr id="66" name="Arrow: Up-Down 65">
             <a:extLst>
               <a:ext uri="{FF2B5EF4-FFF2-40B4-BE49-F238E27FC236}">
-                <a16:creationId xmlns="" xmlns:a16="http://schemas.microsoft.com/office/drawing/2014/main" id="{C0DDF17E-1D11-4EE6-AAA2-86EDEBC92981}"/>
+                <a16:creationId xmlns:a16="http://schemas.microsoft.com/office/drawing/2014/main" xmlns="" id="{C0DDF17E-1D11-4EE6-AAA2-86EDEBC92981}"/>
               </a:ext>
             </a:extLst>
           </p:cNvPr>
@@ -12293,7 +12293,7 @@
           <p:cNvPr id="67" name="Arrow: Up-Down 66">
             <a:extLst>
               <a:ext uri="{FF2B5EF4-FFF2-40B4-BE49-F238E27FC236}">
-                <a16:creationId xmlns="" xmlns:a16="http://schemas.microsoft.com/office/drawing/2014/main" id="{1CD6044B-BF46-4164-9D61-B6CF8CEA9E9A}"/>
+                <a16:creationId xmlns:a16="http://schemas.microsoft.com/office/drawing/2014/main" xmlns="" id="{1CD6044B-BF46-4164-9D61-B6CF8CEA9E9A}"/>
               </a:ext>
             </a:extLst>
           </p:cNvPr>
@@ -12353,7 +12353,7 @@
           <p:cNvPr id="68" name="Arrow: Up-Down 67">
             <a:extLst>
               <a:ext uri="{FF2B5EF4-FFF2-40B4-BE49-F238E27FC236}">
-                <a16:creationId xmlns="" xmlns:a16="http://schemas.microsoft.com/office/drawing/2014/main" id="{652AF93C-C14E-450E-886F-105BC03FBA27}"/>
+                <a16:creationId xmlns:a16="http://schemas.microsoft.com/office/drawing/2014/main" xmlns="" id="{652AF93C-C14E-450E-886F-105BC03FBA27}"/>
               </a:ext>
             </a:extLst>
           </p:cNvPr>
@@ -12413,7 +12413,7 @@
           <p:cNvPr id="69" name="Arrow: Left-Right 68">
             <a:extLst>
               <a:ext uri="{FF2B5EF4-FFF2-40B4-BE49-F238E27FC236}">
-                <a16:creationId xmlns="" xmlns:a16="http://schemas.microsoft.com/office/drawing/2014/main" id="{5B885F2F-626B-4C7D-813E-0BE30A16C361}"/>
+                <a16:creationId xmlns:a16="http://schemas.microsoft.com/office/drawing/2014/main" xmlns="" id="{5B885F2F-626B-4C7D-813E-0BE30A16C361}"/>
               </a:ext>
             </a:extLst>
           </p:cNvPr>
@@ -12467,7 +12467,7 @@
           <p:cNvPr id="70" name="TextBox 69">
             <a:extLst>
               <a:ext uri="{FF2B5EF4-FFF2-40B4-BE49-F238E27FC236}">
-                <a16:creationId xmlns="" xmlns:a16="http://schemas.microsoft.com/office/drawing/2014/main" id="{584DD32C-0352-48F3-AC91-52FBC0A26400}"/>
+                <a16:creationId xmlns:a16="http://schemas.microsoft.com/office/drawing/2014/main" xmlns="" id="{584DD32C-0352-48F3-AC91-52FBC0A26400}"/>
               </a:ext>
             </a:extLst>
           </p:cNvPr>
@@ -12516,7 +12516,7 @@
           <p:cNvPr id="71" name="Picture 71">
             <a:extLst>
               <a:ext uri="{FF2B5EF4-FFF2-40B4-BE49-F238E27FC236}">
-                <a16:creationId xmlns="" xmlns:a16="http://schemas.microsoft.com/office/drawing/2014/main" id="{47FF408E-084C-4485-999E-140D8DD401F5}"/>
+                <a16:creationId xmlns:a16="http://schemas.microsoft.com/office/drawing/2014/main" xmlns="" id="{47FF408E-084C-4485-999E-140D8DD401F5}"/>
               </a:ext>
             </a:extLst>
           </p:cNvPr>
@@ -12546,7 +12546,7 @@
           <p:cNvPr id="35" name="TextBox 34">
             <a:extLst>
               <a:ext uri="{FF2B5EF4-FFF2-40B4-BE49-F238E27FC236}">
-                <a16:creationId xmlns="" xmlns:a16="http://schemas.microsoft.com/office/drawing/2014/main" id="{32A4F61E-5D45-4050-9E11-874E0112D5BC}"/>
+                <a16:creationId xmlns:a16="http://schemas.microsoft.com/office/drawing/2014/main" xmlns="" id="{32A4F61E-5D45-4050-9E11-874E0112D5BC}"/>
               </a:ext>
             </a:extLst>
           </p:cNvPr>
@@ -12594,7 +12594,7 @@
           <p:cNvPr id="36" name="TextBox 35">
             <a:extLst>
               <a:ext uri="{FF2B5EF4-FFF2-40B4-BE49-F238E27FC236}">
-                <a16:creationId xmlns="" xmlns:a16="http://schemas.microsoft.com/office/drawing/2014/main" id="{721FC622-66BA-4ABB-8445-B59337E8241B}"/>
+                <a16:creationId xmlns:a16="http://schemas.microsoft.com/office/drawing/2014/main" xmlns="" id="{721FC622-66BA-4ABB-8445-B59337E8241B}"/>
               </a:ext>
             </a:extLst>
           </p:cNvPr>
@@ -12642,7 +12642,7 @@
           <p:cNvPr id="37" name="Picture 33">
             <a:extLst>
               <a:ext uri="{FF2B5EF4-FFF2-40B4-BE49-F238E27FC236}">
-                <a16:creationId xmlns="" xmlns:a16="http://schemas.microsoft.com/office/drawing/2014/main" id="{A42BFE66-B805-45F0-AC9C-33C7A041FC28}"/>
+                <a16:creationId xmlns:a16="http://schemas.microsoft.com/office/drawing/2014/main" xmlns="" id="{A42BFE66-B805-45F0-AC9C-33C7A041FC28}"/>
               </a:ext>
             </a:extLst>
           </p:cNvPr>
@@ -12672,7 +12672,7 @@
           <p:cNvPr id="45" name="Left Brace 44">
             <a:extLst>
               <a:ext uri="{FF2B5EF4-FFF2-40B4-BE49-F238E27FC236}">
-                <a16:creationId xmlns="" xmlns:a16="http://schemas.microsoft.com/office/drawing/2014/main" id="{878D048C-4583-4231-86E3-AD69D44F351C}"/>
+                <a16:creationId xmlns:a16="http://schemas.microsoft.com/office/drawing/2014/main" xmlns="" id="{878D048C-4583-4231-86E3-AD69D44F351C}"/>
               </a:ext>
             </a:extLst>
           </p:cNvPr>
@@ -12724,7 +12724,7 @@
           <p:cNvPr id="47" name="Left Brace 46">
             <a:extLst>
               <a:ext uri="{FF2B5EF4-FFF2-40B4-BE49-F238E27FC236}">
-                <a16:creationId xmlns="" xmlns:a16="http://schemas.microsoft.com/office/drawing/2014/main" id="{878D048C-4583-4231-86E3-AD69D44F351C}"/>
+                <a16:creationId xmlns:a16="http://schemas.microsoft.com/office/drawing/2014/main" xmlns="" id="{878D048C-4583-4231-86E3-AD69D44F351C}"/>
               </a:ext>
             </a:extLst>
           </p:cNvPr>
@@ -12776,7 +12776,7 @@
           <p:cNvPr id="51" name="Left Brace 50">
             <a:extLst>
               <a:ext uri="{FF2B5EF4-FFF2-40B4-BE49-F238E27FC236}">
-                <a16:creationId xmlns="" xmlns:a16="http://schemas.microsoft.com/office/drawing/2014/main" id="{878D048C-4583-4231-86E3-AD69D44F351C}"/>
+                <a16:creationId xmlns:a16="http://schemas.microsoft.com/office/drawing/2014/main" xmlns="" id="{878D048C-4583-4231-86E3-AD69D44F351C}"/>
               </a:ext>
             </a:extLst>
           </p:cNvPr>
@@ -12828,7 +12828,7 @@
           <p:cNvPr id="52" name="Left Brace 51">
             <a:extLst>
               <a:ext uri="{FF2B5EF4-FFF2-40B4-BE49-F238E27FC236}">
-                <a16:creationId xmlns="" xmlns:a16="http://schemas.microsoft.com/office/drawing/2014/main" id="{878D048C-4583-4231-86E3-AD69D44F351C}"/>
+                <a16:creationId xmlns:a16="http://schemas.microsoft.com/office/drawing/2014/main" xmlns="" id="{878D048C-4583-4231-86E3-AD69D44F351C}"/>
               </a:ext>
             </a:extLst>
           </p:cNvPr>
@@ -14087,7 +14087,7 @@
           <p:cNvPr id="2" name="Title 1">
             <a:extLst>
               <a:ext uri="{FF2B5EF4-FFF2-40B4-BE49-F238E27FC236}">
-                <a16:creationId xmlns="" xmlns:a16="http://schemas.microsoft.com/office/drawing/2014/main" id="{99760F66-ED22-4D99-83D9-AF132B641E2C}"/>
+                <a16:creationId xmlns:a16="http://schemas.microsoft.com/office/drawing/2014/main" xmlns="" id="{99760F66-ED22-4D99-83D9-AF132B641E2C}"/>
               </a:ext>
             </a:extLst>
           </p:cNvPr>
@@ -14118,7 +14118,7 @@
           <p:cNvPr id="4" name="Picture 3" descr="A close up of a logo&#10;&#10;Description generated with very high confidence">
             <a:extLst>
               <a:ext uri="{FF2B5EF4-FFF2-40B4-BE49-F238E27FC236}">
-                <a16:creationId xmlns="" xmlns:a16="http://schemas.microsoft.com/office/drawing/2014/main" id="{6E87F861-F9AC-4F21-B0C8-58EB55E95B97}"/>
+                <a16:creationId xmlns:a16="http://schemas.microsoft.com/office/drawing/2014/main" xmlns="" id="{6E87F861-F9AC-4F21-B0C8-58EB55E95B97}"/>
               </a:ext>
             </a:extLst>
           </p:cNvPr>
@@ -14148,7 +14148,7 @@
           <p:cNvPr id="6" name="Picture 5" descr="A picture containing clock&#10;&#10;Description generated with very high confidence">
             <a:extLst>
               <a:ext uri="{FF2B5EF4-FFF2-40B4-BE49-F238E27FC236}">
-                <a16:creationId xmlns="" xmlns:a16="http://schemas.microsoft.com/office/drawing/2014/main" id="{4616AC99-6BB6-4ADE-BDE8-48395933FE5F}"/>
+                <a16:creationId xmlns:a16="http://schemas.microsoft.com/office/drawing/2014/main" xmlns="" id="{4616AC99-6BB6-4ADE-BDE8-48395933FE5F}"/>
               </a:ext>
             </a:extLst>
           </p:cNvPr>
@@ -14178,7 +14178,7 @@
           <p:cNvPr id="8" name="Arrow: Down 7">
             <a:extLst>
               <a:ext uri="{FF2B5EF4-FFF2-40B4-BE49-F238E27FC236}">
-                <a16:creationId xmlns="" xmlns:a16="http://schemas.microsoft.com/office/drawing/2014/main" id="{82AB09DD-DB63-4806-A980-AE0CB9781D42}"/>
+                <a16:creationId xmlns:a16="http://schemas.microsoft.com/office/drawing/2014/main" xmlns="" id="{82AB09DD-DB63-4806-A980-AE0CB9781D42}"/>
               </a:ext>
             </a:extLst>
           </p:cNvPr>
@@ -14269,7 +14269,7 @@
           <p:cNvPr id="2" name="Title 1">
             <a:extLst>
               <a:ext uri="{FF2B5EF4-FFF2-40B4-BE49-F238E27FC236}">
-                <a16:creationId xmlns="" xmlns:a16="http://schemas.microsoft.com/office/drawing/2014/main" id="{BC492351-3FD5-428F-9D50-3BB66AA31E82}"/>
+                <a16:creationId xmlns:a16="http://schemas.microsoft.com/office/drawing/2014/main" xmlns="" id="{BC492351-3FD5-428F-9D50-3BB66AA31E82}"/>
               </a:ext>
             </a:extLst>
           </p:cNvPr>
@@ -14300,7 +14300,7 @@
           <p:cNvPr id="4" name="Picture 3" descr="A picture containing clock&#10;&#10;Description generated with very high confidence">
             <a:extLst>
               <a:ext uri="{FF2B5EF4-FFF2-40B4-BE49-F238E27FC236}">
-                <a16:creationId xmlns="" xmlns:a16="http://schemas.microsoft.com/office/drawing/2014/main" id="{9AFDBF59-0CA0-43E9-B7BB-7722E9982C54}"/>
+                <a16:creationId xmlns:a16="http://schemas.microsoft.com/office/drawing/2014/main" xmlns="" id="{9AFDBF59-0CA0-43E9-B7BB-7722E9982C54}"/>
               </a:ext>
             </a:extLst>
           </p:cNvPr>
@@ -14335,7 +14335,7 @@
           <p:cNvPr id="28" name="TextBox 27">
             <a:extLst>
               <a:ext uri="{FF2B5EF4-FFF2-40B4-BE49-F238E27FC236}">
-                <a16:creationId xmlns="" xmlns:a16="http://schemas.microsoft.com/office/drawing/2014/main" id="{850ED155-9FB4-40E6-9358-599378ED01A9}"/>
+                <a16:creationId xmlns:a16="http://schemas.microsoft.com/office/drawing/2014/main" xmlns="" id="{850ED155-9FB4-40E6-9358-599378ED01A9}"/>
               </a:ext>
             </a:extLst>
           </p:cNvPr>
@@ -14376,7 +14376,7 @@
           <p:cNvPr id="30" name="Picture 12" descr="A close up of a logo&#10;&#10;Description generated with very high confidence">
             <a:extLst>
               <a:ext uri="{FF2B5EF4-FFF2-40B4-BE49-F238E27FC236}">
-                <a16:creationId xmlns="" xmlns:a16="http://schemas.microsoft.com/office/drawing/2014/main" id="{B22845EF-5901-4C71-934D-3685139CD83C}"/>
+                <a16:creationId xmlns:a16="http://schemas.microsoft.com/office/drawing/2014/main" xmlns="" id="{B22845EF-5901-4C71-934D-3685139CD83C}"/>
               </a:ext>
             </a:extLst>
           </p:cNvPr>
@@ -14411,7 +14411,7 @@
           <p:cNvPr id="33" name="Picture 33" descr="A close up of a logo&#10;&#10;Description generated with very high confidence">
             <a:extLst>
               <a:ext uri="{FF2B5EF4-FFF2-40B4-BE49-F238E27FC236}">
-                <a16:creationId xmlns="" xmlns:a16="http://schemas.microsoft.com/office/drawing/2014/main" id="{6B441168-8849-4DBC-B89C-F689BC14F6E9}"/>
+                <a16:creationId xmlns:a16="http://schemas.microsoft.com/office/drawing/2014/main" xmlns="" id="{6B441168-8849-4DBC-B89C-F689BC14F6E9}"/>
               </a:ext>
             </a:extLst>
           </p:cNvPr>
@@ -14441,7 +14441,7 @@
           <p:cNvPr id="35" name="Picture 35" descr="A picture containing flower&#10;&#10;Description generated with very high confidence">
             <a:extLst>
               <a:ext uri="{FF2B5EF4-FFF2-40B4-BE49-F238E27FC236}">
-                <a16:creationId xmlns="" xmlns:a16="http://schemas.microsoft.com/office/drawing/2014/main" id="{733960A3-062E-4857-9276-DEDCEE0ADF8E}"/>
+                <a16:creationId xmlns:a16="http://schemas.microsoft.com/office/drawing/2014/main" xmlns="" id="{733960A3-062E-4857-9276-DEDCEE0ADF8E}"/>
               </a:ext>
             </a:extLst>
           </p:cNvPr>
@@ -14471,7 +14471,7 @@
           <p:cNvPr id="37" name="Picture 37" descr="A picture containing flower&#10;&#10;Description generated with very high confidence">
             <a:extLst>
               <a:ext uri="{FF2B5EF4-FFF2-40B4-BE49-F238E27FC236}">
-                <a16:creationId xmlns="" xmlns:a16="http://schemas.microsoft.com/office/drawing/2014/main" id="{A7E0387A-69EF-47BE-BD30-07750F005C2E}"/>
+                <a16:creationId xmlns:a16="http://schemas.microsoft.com/office/drawing/2014/main" xmlns="" id="{A7E0387A-69EF-47BE-BD30-07750F005C2E}"/>
               </a:ext>
             </a:extLst>
           </p:cNvPr>
@@ -14501,7 +14501,7 @@
           <p:cNvPr id="39" name="Picture 39" descr="A picture containing flower&#10;&#10;Description generated with very high confidence">
             <a:extLst>
               <a:ext uri="{FF2B5EF4-FFF2-40B4-BE49-F238E27FC236}">
-                <a16:creationId xmlns="" xmlns:a16="http://schemas.microsoft.com/office/drawing/2014/main" id="{43241D24-F842-41E7-ADEB-074666405ED0}"/>
+                <a16:creationId xmlns:a16="http://schemas.microsoft.com/office/drawing/2014/main" xmlns="" id="{43241D24-F842-41E7-ADEB-074666405ED0}"/>
               </a:ext>
             </a:extLst>
           </p:cNvPr>
@@ -14531,7 +14531,7 @@
           <p:cNvPr id="41" name="Picture 41" descr="A close up of a logo&#10;&#10;Description generated with very high confidence">
             <a:extLst>
               <a:ext uri="{FF2B5EF4-FFF2-40B4-BE49-F238E27FC236}">
-                <a16:creationId xmlns="" xmlns:a16="http://schemas.microsoft.com/office/drawing/2014/main" id="{3339BAC3-8264-4532-BCC5-AA61AE38A9E3}"/>
+                <a16:creationId xmlns:a16="http://schemas.microsoft.com/office/drawing/2014/main" xmlns="" id="{3339BAC3-8264-4532-BCC5-AA61AE38A9E3}"/>
               </a:ext>
             </a:extLst>
           </p:cNvPr>
@@ -14561,7 +14561,7 @@
           <p:cNvPr id="43" name="Picture 43" descr="A close up of a logo&#10;&#10;Description generated with very high confidence">
             <a:extLst>
               <a:ext uri="{FF2B5EF4-FFF2-40B4-BE49-F238E27FC236}">
-                <a16:creationId xmlns="" xmlns:a16="http://schemas.microsoft.com/office/drawing/2014/main" id="{148CD550-325D-4286-BCEF-CEC14506D799}"/>
+                <a16:creationId xmlns:a16="http://schemas.microsoft.com/office/drawing/2014/main" xmlns="" id="{148CD550-325D-4286-BCEF-CEC14506D799}"/>
               </a:ext>
             </a:extLst>
           </p:cNvPr>
@@ -14621,7 +14621,7 @@
           <p:cNvPr id="18" name="Left Brace 17">
             <a:extLst>
               <a:ext uri="{FF2B5EF4-FFF2-40B4-BE49-F238E27FC236}">
-                <a16:creationId xmlns="" xmlns:a16="http://schemas.microsoft.com/office/drawing/2014/main" id="{878D048C-4583-4231-86E3-AD69D44F351C}"/>
+                <a16:creationId xmlns:a16="http://schemas.microsoft.com/office/drawing/2014/main" xmlns="" id="{878D048C-4583-4231-86E3-AD69D44F351C}"/>
               </a:ext>
             </a:extLst>
           </p:cNvPr>
@@ -14673,7 +14673,7 @@
           <p:cNvPr id="19" name="Left Brace 18">
             <a:extLst>
               <a:ext uri="{FF2B5EF4-FFF2-40B4-BE49-F238E27FC236}">
-                <a16:creationId xmlns="" xmlns:a16="http://schemas.microsoft.com/office/drawing/2014/main" id="{878D048C-4583-4231-86E3-AD69D44F351C}"/>
+                <a16:creationId xmlns:a16="http://schemas.microsoft.com/office/drawing/2014/main" xmlns="" id="{878D048C-4583-4231-86E3-AD69D44F351C}"/>
               </a:ext>
             </a:extLst>
           </p:cNvPr>
@@ -14785,7 +14785,7 @@
           <p:cNvPr id="25" name="Picture 9" descr="A picture containing drawing&#10;&#10;Description generated with very high confidence">
             <a:extLst>
               <a:ext uri="{FF2B5EF4-FFF2-40B4-BE49-F238E27FC236}">
-                <a16:creationId xmlns="" xmlns:a16="http://schemas.microsoft.com/office/drawing/2014/main" id="{02B44993-3D5D-4B1E-B348-A8AA765D22E8}"/>
+                <a16:creationId xmlns:a16="http://schemas.microsoft.com/office/drawing/2014/main" xmlns="" id="{02B44993-3D5D-4B1E-B348-A8AA765D22E8}"/>
               </a:ext>
             </a:extLst>
           </p:cNvPr>
@@ -14815,7 +14815,7 @@
           <p:cNvPr id="26" name="Picture 11" descr="A picture containing object, clock, meter&#10;&#10;Description generated with very high confidence">
             <a:extLst>
               <a:ext uri="{FF2B5EF4-FFF2-40B4-BE49-F238E27FC236}">
-                <a16:creationId xmlns="" xmlns:a16="http://schemas.microsoft.com/office/drawing/2014/main" id="{50B5677A-E1FB-4742-A2BB-B165C8289492}"/>
+                <a16:creationId xmlns:a16="http://schemas.microsoft.com/office/drawing/2014/main" xmlns="" id="{50B5677A-E1FB-4742-A2BB-B165C8289492}"/>
               </a:ext>
             </a:extLst>
           </p:cNvPr>
@@ -15864,7 +15864,7 @@
           <p:cNvPr id="7" name="TextBox 6">
             <a:extLst>
               <a:ext uri="{FF2B5EF4-FFF2-40B4-BE49-F238E27FC236}">
-                <a16:creationId xmlns="" xmlns:a16="http://schemas.microsoft.com/office/drawing/2014/main" id="{3C8D1A93-8E34-461B-AE33-3F2AF8EDEDE3}"/>
+                <a16:creationId xmlns:a16="http://schemas.microsoft.com/office/drawing/2014/main" xmlns="" id="{3C8D1A93-8E34-461B-AE33-3F2AF8EDEDE3}"/>
               </a:ext>
             </a:extLst>
           </p:cNvPr>
@@ -15906,7 +15906,7 @@
           <p:cNvPr id="12" name="Picture 12">
             <a:extLst>
               <a:ext uri="{FF2B5EF4-FFF2-40B4-BE49-F238E27FC236}">
-                <a16:creationId xmlns="" xmlns:a16="http://schemas.microsoft.com/office/drawing/2014/main" id="{BCB28C98-A97C-401C-8299-EB6FC4F8EC07}"/>
+                <a16:creationId xmlns:a16="http://schemas.microsoft.com/office/drawing/2014/main" xmlns="" id="{BCB28C98-A97C-401C-8299-EB6FC4F8EC07}"/>
               </a:ext>
             </a:extLst>
           </p:cNvPr>
@@ -15942,7 +15942,7 @@
           <p:cNvPr id="15" name="TextBox 14">
             <a:extLst>
               <a:ext uri="{FF2B5EF4-FFF2-40B4-BE49-F238E27FC236}">
-                <a16:creationId xmlns="" xmlns:a16="http://schemas.microsoft.com/office/drawing/2014/main" id="{1AAE7903-DA0C-486B-BDC7-ADB80C60CE39}"/>
+                <a16:creationId xmlns:a16="http://schemas.microsoft.com/office/drawing/2014/main" xmlns="" id="{1AAE7903-DA0C-486B-BDC7-ADB80C60CE39}"/>
               </a:ext>
             </a:extLst>
           </p:cNvPr>
@@ -15982,7 +15982,7 @@
           <p:cNvPr id="16" name="Picture 16">
             <a:extLst>
               <a:ext uri="{FF2B5EF4-FFF2-40B4-BE49-F238E27FC236}">
-                <a16:creationId xmlns="" xmlns:a16="http://schemas.microsoft.com/office/drawing/2014/main" id="{C7C82433-1251-4B07-9C0F-DB83878FB6CB}"/>
+                <a16:creationId xmlns:a16="http://schemas.microsoft.com/office/drawing/2014/main" xmlns="" id="{C7C82433-1251-4B07-9C0F-DB83878FB6CB}"/>
               </a:ext>
             </a:extLst>
           </p:cNvPr>
@@ -16018,7 +16018,7 @@
           <p:cNvPr id="32" name="TextBox 31">
             <a:extLst>
               <a:ext uri="{FF2B5EF4-FFF2-40B4-BE49-F238E27FC236}">
-                <a16:creationId xmlns="" xmlns:a16="http://schemas.microsoft.com/office/drawing/2014/main" id="{95FFBCCC-62A7-4B35-95D9-9DDDAD7F90FD}"/>
+                <a16:creationId xmlns:a16="http://schemas.microsoft.com/office/drawing/2014/main" xmlns="" id="{95FFBCCC-62A7-4B35-95D9-9DDDAD7F90FD}"/>
               </a:ext>
             </a:extLst>
           </p:cNvPr>
@@ -16058,7 +16058,7 @@
           <p:cNvPr id="33" name="Picture 33">
             <a:extLst>
               <a:ext uri="{FF2B5EF4-FFF2-40B4-BE49-F238E27FC236}">
-                <a16:creationId xmlns="" xmlns:a16="http://schemas.microsoft.com/office/drawing/2014/main" id="{38088EDE-D1BD-4D90-BC05-DB9DB49BBAAD}"/>
+                <a16:creationId xmlns:a16="http://schemas.microsoft.com/office/drawing/2014/main" xmlns="" id="{38088EDE-D1BD-4D90-BC05-DB9DB49BBAAD}"/>
               </a:ext>
             </a:extLst>
           </p:cNvPr>
@@ -16097,7 +16097,7 @@
           <p:cNvPr id="3" name="Arrow: Right 2">
             <a:extLst>
               <a:ext uri="{FF2B5EF4-FFF2-40B4-BE49-F238E27FC236}">
-                <a16:creationId xmlns="" xmlns:a16="http://schemas.microsoft.com/office/drawing/2014/main" id="{A386E034-963A-452A-BA56-7A5B5FF1099E}"/>
+                <a16:creationId xmlns:a16="http://schemas.microsoft.com/office/drawing/2014/main" xmlns="" id="{A386E034-963A-452A-BA56-7A5B5FF1099E}"/>
               </a:ext>
             </a:extLst>
           </p:cNvPr>
@@ -16151,7 +16151,7 @@
           <p:cNvPr id="10" name="Arrow: Right 9">
             <a:extLst>
               <a:ext uri="{FF2B5EF4-FFF2-40B4-BE49-F238E27FC236}">
-                <a16:creationId xmlns="" xmlns:a16="http://schemas.microsoft.com/office/drawing/2014/main" id="{FC53BB6D-D8F9-4631-B0DB-C5D30F0A1ADE}"/>
+                <a16:creationId xmlns:a16="http://schemas.microsoft.com/office/drawing/2014/main" xmlns="" id="{FC53BB6D-D8F9-4631-B0DB-C5D30F0A1ADE}"/>
               </a:ext>
             </a:extLst>
           </p:cNvPr>
@@ -16528,7 +16528,7 @@
           <p:cNvPr id="2" name="Title 1">
             <a:extLst>
               <a:ext uri="{FF2B5EF4-FFF2-40B4-BE49-F238E27FC236}">
-                <a16:creationId xmlns="" xmlns:a16="http://schemas.microsoft.com/office/drawing/2014/main" id="{99760F66-ED22-4D99-83D9-AF132B641E2C}"/>
+                <a16:creationId xmlns:a16="http://schemas.microsoft.com/office/drawing/2014/main" xmlns="" id="{99760F66-ED22-4D99-83D9-AF132B641E2C}"/>
               </a:ext>
             </a:extLst>
           </p:cNvPr>
@@ -16559,7 +16559,7 @@
           <p:cNvPr id="4" name="Picture 3" descr="A close up of a logo&#10;&#10;Description generated with very high confidence">
             <a:extLst>
               <a:ext uri="{FF2B5EF4-FFF2-40B4-BE49-F238E27FC236}">
-                <a16:creationId xmlns="" xmlns:a16="http://schemas.microsoft.com/office/drawing/2014/main" id="{6E87F861-F9AC-4F21-B0C8-58EB55E95B97}"/>
+                <a16:creationId xmlns:a16="http://schemas.microsoft.com/office/drawing/2014/main" xmlns="" id="{6E87F861-F9AC-4F21-B0C8-58EB55E95B97}"/>
               </a:ext>
             </a:extLst>
           </p:cNvPr>
@@ -16589,7 +16589,7 @@
           <p:cNvPr id="6" name="Picture 5" descr="A picture containing clock&#10;&#10;Description generated with very high confidence">
             <a:extLst>
               <a:ext uri="{FF2B5EF4-FFF2-40B4-BE49-F238E27FC236}">
-                <a16:creationId xmlns="" xmlns:a16="http://schemas.microsoft.com/office/drawing/2014/main" id="{4616AC99-6BB6-4ADE-BDE8-48395933FE5F}"/>
+                <a16:creationId xmlns:a16="http://schemas.microsoft.com/office/drawing/2014/main" xmlns="" id="{4616AC99-6BB6-4ADE-BDE8-48395933FE5F}"/>
               </a:ext>
             </a:extLst>
           </p:cNvPr>
@@ -16619,7 +16619,7 @@
           <p:cNvPr id="8" name="Arrow: Down 7">
             <a:extLst>
               <a:ext uri="{FF2B5EF4-FFF2-40B4-BE49-F238E27FC236}">
-                <a16:creationId xmlns="" xmlns:a16="http://schemas.microsoft.com/office/drawing/2014/main" id="{82AB09DD-DB63-4806-A980-AE0CB9781D42}"/>
+                <a16:creationId xmlns:a16="http://schemas.microsoft.com/office/drawing/2014/main" xmlns="" id="{82AB09DD-DB63-4806-A980-AE0CB9781D42}"/>
               </a:ext>
             </a:extLst>
           </p:cNvPr>
@@ -16673,7 +16673,7 @@
           <p:cNvPr id="3" name="Picture 43" descr="A close up of a logo&#10;&#10;Description generated with very high confidence">
             <a:extLst>
               <a:ext uri="{FF2B5EF4-FFF2-40B4-BE49-F238E27FC236}">
-                <a16:creationId xmlns="" xmlns:a16="http://schemas.microsoft.com/office/drawing/2014/main" id="{1CFBEB4B-4C2C-468C-AD74-3B403A169AA1}"/>
+                <a16:creationId xmlns:a16="http://schemas.microsoft.com/office/drawing/2014/main" xmlns="" id="{1CFBEB4B-4C2C-468C-AD74-3B403A169AA1}"/>
               </a:ext>
             </a:extLst>
           </p:cNvPr>
@@ -16703,7 +16703,7 @@
           <p:cNvPr id="9" name="Picture 9" descr="A picture containing drawing&#10;&#10;Description generated with very high confidence">
             <a:extLst>
               <a:ext uri="{FF2B5EF4-FFF2-40B4-BE49-F238E27FC236}">
-                <a16:creationId xmlns="" xmlns:a16="http://schemas.microsoft.com/office/drawing/2014/main" id="{02B44993-3D5D-4B1E-B348-A8AA765D22E8}"/>
+                <a16:creationId xmlns:a16="http://schemas.microsoft.com/office/drawing/2014/main" xmlns="" id="{02B44993-3D5D-4B1E-B348-A8AA765D22E8}"/>
               </a:ext>
             </a:extLst>
           </p:cNvPr>
@@ -16733,7 +16733,7 @@
           <p:cNvPr id="11" name="Picture 11" descr="A picture containing object, clock, meter&#10;&#10;Description generated with very high confidence">
             <a:extLst>
               <a:ext uri="{FF2B5EF4-FFF2-40B4-BE49-F238E27FC236}">
-                <a16:creationId xmlns="" xmlns:a16="http://schemas.microsoft.com/office/drawing/2014/main" id="{50B5677A-E1FB-4742-A2BB-B165C8289492}"/>
+                <a16:creationId xmlns:a16="http://schemas.microsoft.com/office/drawing/2014/main" xmlns="" id="{50B5677A-E1FB-4742-A2BB-B165C8289492}"/>
               </a:ext>
             </a:extLst>
           </p:cNvPr>
@@ -16994,7 +16994,7 @@
           <p:cNvPr id="2" name="Title 1">
             <a:extLst>
               <a:ext uri="{FF2B5EF4-FFF2-40B4-BE49-F238E27FC236}">
-                <a16:creationId xmlns="" xmlns:a16="http://schemas.microsoft.com/office/drawing/2014/main" id="{99760F66-ED22-4D99-83D9-AF132B641E2C}"/>
+                <a16:creationId xmlns:a16="http://schemas.microsoft.com/office/drawing/2014/main" xmlns="" id="{99760F66-ED22-4D99-83D9-AF132B641E2C}"/>
               </a:ext>
             </a:extLst>
           </p:cNvPr>
@@ -17025,7 +17025,7 @@
           <p:cNvPr id="4" name="Picture 3" descr="A close up of a logo&#10;&#10;Description generated with very high confidence">
             <a:extLst>
               <a:ext uri="{FF2B5EF4-FFF2-40B4-BE49-F238E27FC236}">
-                <a16:creationId xmlns="" xmlns:a16="http://schemas.microsoft.com/office/drawing/2014/main" id="{6E87F861-F9AC-4F21-B0C8-58EB55E95B97}"/>
+                <a16:creationId xmlns:a16="http://schemas.microsoft.com/office/drawing/2014/main" xmlns="" id="{6E87F861-F9AC-4F21-B0C8-58EB55E95B97}"/>
               </a:ext>
             </a:extLst>
           </p:cNvPr>
@@ -17055,7 +17055,7 @@
           <p:cNvPr id="8" name="Arrow: Down 7">
             <a:extLst>
               <a:ext uri="{FF2B5EF4-FFF2-40B4-BE49-F238E27FC236}">
-                <a16:creationId xmlns="" xmlns:a16="http://schemas.microsoft.com/office/drawing/2014/main" id="{82AB09DD-DB63-4806-A980-AE0CB9781D42}"/>
+                <a16:creationId xmlns:a16="http://schemas.microsoft.com/office/drawing/2014/main" xmlns="" id="{82AB09DD-DB63-4806-A980-AE0CB9781D42}"/>
               </a:ext>
             </a:extLst>
           </p:cNvPr>
@@ -17109,7 +17109,7 @@
           <p:cNvPr id="13" name="Picture 13" descr="A close up of a logo&#10;&#10;Description generated with very high confidence">
             <a:extLst>
               <a:ext uri="{FF2B5EF4-FFF2-40B4-BE49-F238E27FC236}">
-                <a16:creationId xmlns="" xmlns:a16="http://schemas.microsoft.com/office/drawing/2014/main" id="{ECAD198D-1469-41D2-8E92-807888FE870D}"/>
+                <a16:creationId xmlns:a16="http://schemas.microsoft.com/office/drawing/2014/main" xmlns="" id="{ECAD198D-1469-41D2-8E92-807888FE870D}"/>
               </a:ext>
             </a:extLst>
           </p:cNvPr>
@@ -17139,7 +17139,7 @@
           <p:cNvPr id="5" name="Picture 6" descr="A close up of a logo&#10;&#10;Description generated with very high confidence">
             <a:extLst>
               <a:ext uri="{FF2B5EF4-FFF2-40B4-BE49-F238E27FC236}">
-                <a16:creationId xmlns="" xmlns:a16="http://schemas.microsoft.com/office/drawing/2014/main" id="{EB8556EE-68CC-40A7-B949-39599FC85FC9}"/>
+                <a16:creationId xmlns:a16="http://schemas.microsoft.com/office/drawing/2014/main" xmlns="" id="{EB8556EE-68CC-40A7-B949-39599FC85FC9}"/>
               </a:ext>
             </a:extLst>
           </p:cNvPr>
@@ -17169,7 +17169,7 @@
           <p:cNvPr id="10" name="Arrow: Up-Down 9">
             <a:extLst>
               <a:ext uri="{FF2B5EF4-FFF2-40B4-BE49-F238E27FC236}">
-                <a16:creationId xmlns="" xmlns:a16="http://schemas.microsoft.com/office/drawing/2014/main" id="{B955B9A0-C9CB-469D-A0ED-46BACD4AF8A9}"/>
+                <a16:creationId xmlns:a16="http://schemas.microsoft.com/office/drawing/2014/main" xmlns="" id="{B955B9A0-C9CB-469D-A0ED-46BACD4AF8A9}"/>
               </a:ext>
             </a:extLst>
           </p:cNvPr>
@@ -17215,7 +17215,7 @@
           <p:cNvPr id="12" name="Picture 5" descr="A close up of a sign&#10;&#10;Description generated with very high confidence">
             <a:extLst>
               <a:ext uri="{FF2B5EF4-FFF2-40B4-BE49-F238E27FC236}">
-                <a16:creationId xmlns="" xmlns:a16="http://schemas.microsoft.com/office/drawing/2014/main" id="{D150EFB3-437B-49AB-B6EA-481CED6C7865}"/>
+                <a16:creationId xmlns:a16="http://schemas.microsoft.com/office/drawing/2014/main" xmlns="" id="{D150EFB3-437B-49AB-B6EA-481CED6C7865}"/>
               </a:ext>
             </a:extLst>
           </p:cNvPr>
@@ -17245,7 +17245,7 @@
           <p:cNvPr id="19" name="TextBox 18">
             <a:extLst>
               <a:ext uri="{FF2B5EF4-FFF2-40B4-BE49-F238E27FC236}">
-                <a16:creationId xmlns="" xmlns:a16="http://schemas.microsoft.com/office/drawing/2014/main" id="{20B2480F-8E9E-46F5-8DB2-C398D4668F0A}"/>
+                <a16:creationId xmlns:a16="http://schemas.microsoft.com/office/drawing/2014/main" xmlns="" id="{20B2480F-8E9E-46F5-8DB2-C398D4668F0A}"/>
               </a:ext>
             </a:extLst>
           </p:cNvPr>
@@ -17293,7 +17293,7 @@
           <p:cNvPr id="20" name="TextBox 19">
             <a:extLst>
               <a:ext uri="{FF2B5EF4-FFF2-40B4-BE49-F238E27FC236}">
-                <a16:creationId xmlns="" xmlns:a16="http://schemas.microsoft.com/office/drawing/2014/main" id="{1F5BE492-E3B4-48FA-9694-8F82B920DAEB}"/>
+                <a16:creationId xmlns:a16="http://schemas.microsoft.com/office/drawing/2014/main" xmlns="" id="{1F5BE492-E3B4-48FA-9694-8F82B920DAEB}"/>
               </a:ext>
             </a:extLst>
           </p:cNvPr>
@@ -17341,7 +17341,7 @@
           <p:cNvPr id="22" name="TextBox 21">
             <a:extLst>
               <a:ext uri="{FF2B5EF4-FFF2-40B4-BE49-F238E27FC236}">
-                <a16:creationId xmlns="" xmlns:a16="http://schemas.microsoft.com/office/drawing/2014/main" id="{DCB07139-45CB-4B60-98DD-E2CBA1E8B558}"/>
+                <a16:creationId xmlns:a16="http://schemas.microsoft.com/office/drawing/2014/main" xmlns="" id="{DCB07139-45CB-4B60-98DD-E2CBA1E8B558}"/>
               </a:ext>
             </a:extLst>
           </p:cNvPr>
@@ -17390,7 +17390,7 @@
           <p:cNvPr id="16" name="Picture 9" descr="A picture containing drawing&#10;&#10;Description generated with very high confidence">
             <a:extLst>
               <a:ext uri="{FF2B5EF4-FFF2-40B4-BE49-F238E27FC236}">
-                <a16:creationId xmlns="" xmlns:a16="http://schemas.microsoft.com/office/drawing/2014/main" id="{02B44993-3D5D-4B1E-B348-A8AA765D22E8}"/>
+                <a16:creationId xmlns:a16="http://schemas.microsoft.com/office/drawing/2014/main" xmlns="" id="{02B44993-3D5D-4B1E-B348-A8AA765D22E8}"/>
               </a:ext>
             </a:extLst>
           </p:cNvPr>
@@ -17420,7 +17420,7 @@
           <p:cNvPr id="17" name="Picture 11" descr="A picture containing object, clock, meter&#10;&#10;Description generated with very high confidence">
             <a:extLst>
               <a:ext uri="{FF2B5EF4-FFF2-40B4-BE49-F238E27FC236}">
-                <a16:creationId xmlns="" xmlns:a16="http://schemas.microsoft.com/office/drawing/2014/main" id="{50B5677A-E1FB-4742-A2BB-B165C8289492}"/>
+                <a16:creationId xmlns:a16="http://schemas.microsoft.com/office/drawing/2014/main" xmlns="" id="{50B5677A-E1FB-4742-A2BB-B165C8289492}"/>
               </a:ext>
             </a:extLst>
           </p:cNvPr>
@@ -17714,7 +17714,7 @@
           <p:cNvPr id="2" name="Title 1">
             <a:extLst>
               <a:ext uri="{FF2B5EF4-FFF2-40B4-BE49-F238E27FC236}">
-                <a16:creationId xmlns="" xmlns:a16="http://schemas.microsoft.com/office/drawing/2014/main" id="{22DAD01F-DC17-4CB9-A59E-3B88FC10ACC0}"/>
+                <a16:creationId xmlns:a16="http://schemas.microsoft.com/office/drawing/2014/main" xmlns="" id="{22DAD01F-DC17-4CB9-A59E-3B88FC10ACC0}"/>
               </a:ext>
             </a:extLst>
           </p:cNvPr>
@@ -17745,7 +17745,7 @@
           <p:cNvPr id="4" name="Picture 6" descr="A close up of a logo&#10;&#10;Description generated with very high confidence">
             <a:extLst>
               <a:ext uri="{FF2B5EF4-FFF2-40B4-BE49-F238E27FC236}">
-                <a16:creationId xmlns="" xmlns:a16="http://schemas.microsoft.com/office/drawing/2014/main" id="{C0330C5C-C655-42A8-BF9C-90E788CC6A92}"/>
+                <a16:creationId xmlns:a16="http://schemas.microsoft.com/office/drawing/2014/main" xmlns="" id="{C0330C5C-C655-42A8-BF9C-90E788CC6A92}"/>
               </a:ext>
             </a:extLst>
           </p:cNvPr>
@@ -17780,7 +17780,7 @@
           <p:cNvPr id="6" name="Picture 9" descr="A picture containing drawing&#10;&#10;Description generated with very high confidence">
             <a:extLst>
               <a:ext uri="{FF2B5EF4-FFF2-40B4-BE49-F238E27FC236}">
-                <a16:creationId xmlns="" xmlns:a16="http://schemas.microsoft.com/office/drawing/2014/main" id="{69BBBA96-ED0F-4961-8C6B-6543A7A55BAE}"/>
+                <a16:creationId xmlns:a16="http://schemas.microsoft.com/office/drawing/2014/main" xmlns="" id="{69BBBA96-ED0F-4961-8C6B-6543A7A55BAE}"/>
               </a:ext>
             </a:extLst>
           </p:cNvPr>
@@ -17813,7 +17813,7 @@
           <p:cNvPr id="8" name="Picture 11" descr="A picture containing object, clock, meter&#10;&#10;Description generated with very high confidence">
             <a:extLst>
               <a:ext uri="{FF2B5EF4-FFF2-40B4-BE49-F238E27FC236}">
-                <a16:creationId xmlns="" xmlns:a16="http://schemas.microsoft.com/office/drawing/2014/main" id="{FF7323CE-66D1-43A5-B3E1-17A59B7D36B4}"/>
+                <a16:creationId xmlns:a16="http://schemas.microsoft.com/office/drawing/2014/main" xmlns="" id="{FF7323CE-66D1-43A5-B3E1-17A59B7D36B4}"/>
               </a:ext>
             </a:extLst>
           </p:cNvPr>
@@ -17846,7 +17846,7 @@
           <p:cNvPr id="9" name="Picture 9" descr="A close up of a logo&#10;&#10;Description generated with very high confidence">
             <a:extLst>
               <a:ext uri="{FF2B5EF4-FFF2-40B4-BE49-F238E27FC236}">
-                <a16:creationId xmlns="" xmlns:a16="http://schemas.microsoft.com/office/drawing/2014/main" id="{FE7DD4F2-A92E-4806-B792-8484FE70F8E3}"/>
+                <a16:creationId xmlns:a16="http://schemas.microsoft.com/office/drawing/2014/main" xmlns="" id="{FE7DD4F2-A92E-4806-B792-8484FE70F8E3}"/>
               </a:ext>
             </a:extLst>
           </p:cNvPr>
@@ -17876,7 +17876,7 @@
           <p:cNvPr id="18" name="Picture 18" descr="A picture containing clock&#10;&#10;Description generated with very high confidence">
             <a:extLst>
               <a:ext uri="{FF2B5EF4-FFF2-40B4-BE49-F238E27FC236}">
-                <a16:creationId xmlns="" xmlns:a16="http://schemas.microsoft.com/office/drawing/2014/main" id="{0554376B-EDEF-4D1D-9EAE-F4D103F6E769}"/>
+                <a16:creationId xmlns:a16="http://schemas.microsoft.com/office/drawing/2014/main" xmlns="" id="{0554376B-EDEF-4D1D-9EAE-F4D103F6E769}"/>
               </a:ext>
             </a:extLst>
           </p:cNvPr>
@@ -17906,7 +17906,7 @@
           <p:cNvPr id="24" name="Picture 24" descr="A picture containing clock, flower&#10;&#10;Description generated with very high confidence">
             <a:extLst>
               <a:ext uri="{FF2B5EF4-FFF2-40B4-BE49-F238E27FC236}">
-                <a16:creationId xmlns="" xmlns:a16="http://schemas.microsoft.com/office/drawing/2014/main" id="{A539457C-5E7D-4840-803E-FB9943A9E863}"/>
+                <a16:creationId xmlns:a16="http://schemas.microsoft.com/office/drawing/2014/main" xmlns="" id="{A539457C-5E7D-4840-803E-FB9943A9E863}"/>
               </a:ext>
             </a:extLst>
           </p:cNvPr>
@@ -17936,7 +17936,7 @@
           <p:cNvPr id="26" name="Picture 26" descr="A picture containing drawing&#10;&#10;Description generated with very high confidence">
             <a:extLst>
               <a:ext uri="{FF2B5EF4-FFF2-40B4-BE49-F238E27FC236}">
-                <a16:creationId xmlns="" xmlns:a16="http://schemas.microsoft.com/office/drawing/2014/main" id="{E9BBDA87-9334-48F6-B549-DF8332853EB8}"/>
+                <a16:creationId xmlns:a16="http://schemas.microsoft.com/office/drawing/2014/main" xmlns="" id="{E9BBDA87-9334-48F6-B549-DF8332853EB8}"/>
               </a:ext>
             </a:extLst>
           </p:cNvPr>
@@ -17966,7 +17966,7 @@
           <p:cNvPr id="28" name="Picture 28" descr="A close up of a logo&#10;&#10;Description generated with high confidence">
             <a:extLst>
               <a:ext uri="{FF2B5EF4-FFF2-40B4-BE49-F238E27FC236}">
-                <a16:creationId xmlns="" xmlns:a16="http://schemas.microsoft.com/office/drawing/2014/main" id="{81E243AB-F66C-4DE2-8AF3-5DB68711DB44}"/>
+                <a16:creationId xmlns:a16="http://schemas.microsoft.com/office/drawing/2014/main" xmlns="" id="{81E243AB-F66C-4DE2-8AF3-5DB68711DB44}"/>
               </a:ext>
             </a:extLst>
           </p:cNvPr>
@@ -17996,7 +17996,7 @@
           <p:cNvPr id="30" name="Picture 30" descr="A picture containing clock, meter&#10;&#10;Description generated with very high confidence">
             <a:extLst>
               <a:ext uri="{FF2B5EF4-FFF2-40B4-BE49-F238E27FC236}">
-                <a16:creationId xmlns="" xmlns:a16="http://schemas.microsoft.com/office/drawing/2014/main" id="{869F45C0-BEFD-4D0A-A30C-E3DE4CED26A1}"/>
+                <a16:creationId xmlns:a16="http://schemas.microsoft.com/office/drawing/2014/main" xmlns="" id="{869F45C0-BEFD-4D0A-A30C-E3DE4CED26A1}"/>
               </a:ext>
             </a:extLst>
           </p:cNvPr>
@@ -18026,7 +18026,7 @@
           <p:cNvPr id="32" name="Picture 32" descr="A close up of a logo&#10;&#10;Description generated with very high confidence">
             <a:extLst>
               <a:ext uri="{FF2B5EF4-FFF2-40B4-BE49-F238E27FC236}">
-                <a16:creationId xmlns="" xmlns:a16="http://schemas.microsoft.com/office/drawing/2014/main" id="{1ACF1988-3C5A-413A-B927-C4F08B32DC61}"/>
+                <a16:creationId xmlns:a16="http://schemas.microsoft.com/office/drawing/2014/main" xmlns="" id="{1ACF1988-3C5A-413A-B927-C4F08B32DC61}"/>
               </a:ext>
             </a:extLst>
           </p:cNvPr>
@@ -18056,7 +18056,7 @@
           <p:cNvPr id="34" name="Picture 34" descr="A close up of a logo&#10;&#10;Description generated with very high confidence">
             <a:extLst>
               <a:ext uri="{FF2B5EF4-FFF2-40B4-BE49-F238E27FC236}">
-                <a16:creationId xmlns="" xmlns:a16="http://schemas.microsoft.com/office/drawing/2014/main" id="{7923B112-21C2-45C5-A791-55128D24522B}"/>
+                <a16:creationId xmlns:a16="http://schemas.microsoft.com/office/drawing/2014/main" xmlns="" id="{7923B112-21C2-45C5-A791-55128D24522B}"/>
               </a:ext>
             </a:extLst>
           </p:cNvPr>
@@ -18086,7 +18086,7 @@
           <p:cNvPr id="38" name="Picture 38" descr="A picture containing clock&#10;&#10;Description generated with very high confidence">
             <a:extLst>
               <a:ext uri="{FF2B5EF4-FFF2-40B4-BE49-F238E27FC236}">
-                <a16:creationId xmlns="" xmlns:a16="http://schemas.microsoft.com/office/drawing/2014/main" id="{DDD232C9-6B70-4425-9087-619A72CFF32A}"/>
+                <a16:creationId xmlns:a16="http://schemas.microsoft.com/office/drawing/2014/main" xmlns="" id="{DDD232C9-6B70-4425-9087-619A72CFF32A}"/>
               </a:ext>
             </a:extLst>
           </p:cNvPr>
@@ -18116,7 +18116,7 @@
           <p:cNvPr id="40" name="Picture 40" descr="A close up of a logo&#10;&#10;Description generated with very high confidence">
             <a:extLst>
               <a:ext uri="{FF2B5EF4-FFF2-40B4-BE49-F238E27FC236}">
-                <a16:creationId xmlns="" xmlns:a16="http://schemas.microsoft.com/office/drawing/2014/main" id="{A85F4AA5-CF6F-417D-96A4-6AD1E292E6A5}"/>
+                <a16:creationId xmlns:a16="http://schemas.microsoft.com/office/drawing/2014/main" xmlns="" id="{A85F4AA5-CF6F-417D-96A4-6AD1E292E6A5}"/>
               </a:ext>
             </a:extLst>
           </p:cNvPr>
@@ -18146,7 +18146,7 @@
           <p:cNvPr id="43" name="Picture 43" descr="A close up of a logo&#10;&#10;Description generated with very high confidence">
             <a:extLst>
               <a:ext uri="{FF2B5EF4-FFF2-40B4-BE49-F238E27FC236}">
-                <a16:creationId xmlns="" xmlns:a16="http://schemas.microsoft.com/office/drawing/2014/main" id="{BAC78DDE-16D4-4F26-B28A-84F4415D8648}"/>
+                <a16:creationId xmlns:a16="http://schemas.microsoft.com/office/drawing/2014/main" xmlns="" id="{BAC78DDE-16D4-4F26-B28A-84F4415D8648}"/>
               </a:ext>
             </a:extLst>
           </p:cNvPr>
@@ -18176,7 +18176,7 @@
           <p:cNvPr id="45" name="Picture 45" descr="A picture containing clock&#10;&#10;Description generated with very high confidence">
             <a:extLst>
               <a:ext uri="{FF2B5EF4-FFF2-40B4-BE49-F238E27FC236}">
-                <a16:creationId xmlns="" xmlns:a16="http://schemas.microsoft.com/office/drawing/2014/main" id="{597ACDCF-1672-40B5-A8BF-D0F2FE28A71F}"/>
+                <a16:creationId xmlns:a16="http://schemas.microsoft.com/office/drawing/2014/main" xmlns="" id="{597ACDCF-1672-40B5-A8BF-D0F2FE28A71F}"/>
               </a:ext>
             </a:extLst>
           </p:cNvPr>
@@ -18206,7 +18206,7 @@
           <p:cNvPr id="47" name="Picture 40" descr="A close up of a logo&#10;&#10;Description generated with very high confidence">
             <a:extLst>
               <a:ext uri="{FF2B5EF4-FFF2-40B4-BE49-F238E27FC236}">
-                <a16:creationId xmlns="" xmlns:a16="http://schemas.microsoft.com/office/drawing/2014/main" id="{C45619DF-F101-4904-A04F-6621105A76DF}"/>
+                <a16:creationId xmlns:a16="http://schemas.microsoft.com/office/drawing/2014/main" xmlns="" id="{C45619DF-F101-4904-A04F-6621105A76DF}"/>
               </a:ext>
             </a:extLst>
           </p:cNvPr>
@@ -18236,7 +18236,7 @@
           <p:cNvPr id="48" name="Arrow: Right 47">
             <a:extLst>
               <a:ext uri="{FF2B5EF4-FFF2-40B4-BE49-F238E27FC236}">
-                <a16:creationId xmlns="" xmlns:a16="http://schemas.microsoft.com/office/drawing/2014/main" id="{2D05F327-8A08-41D8-93AF-95C1FFD2CEA2}"/>
+                <a16:creationId xmlns:a16="http://schemas.microsoft.com/office/drawing/2014/main" xmlns="" id="{2D05F327-8A08-41D8-93AF-95C1FFD2CEA2}"/>
               </a:ext>
             </a:extLst>
           </p:cNvPr>
@@ -18296,7 +18296,7 @@
           <p:cNvPr id="49" name="Arrow: Right 48">
             <a:extLst>
               <a:ext uri="{FF2B5EF4-FFF2-40B4-BE49-F238E27FC236}">
-                <a16:creationId xmlns="" xmlns:a16="http://schemas.microsoft.com/office/drawing/2014/main" id="{12342E48-7442-40ED-B882-627321DA0B53}"/>
+                <a16:creationId xmlns:a16="http://schemas.microsoft.com/office/drawing/2014/main" xmlns="" id="{12342E48-7442-40ED-B882-627321DA0B53}"/>
               </a:ext>
             </a:extLst>
           </p:cNvPr>
@@ -18356,7 +18356,7 @@
           <p:cNvPr id="50" name="Arrow: Right 49">
             <a:extLst>
               <a:ext uri="{FF2B5EF4-FFF2-40B4-BE49-F238E27FC236}">
-                <a16:creationId xmlns="" xmlns:a16="http://schemas.microsoft.com/office/drawing/2014/main" id="{67754761-3E3A-47A7-9447-7C60AA0E0358}"/>
+                <a16:creationId xmlns:a16="http://schemas.microsoft.com/office/drawing/2014/main" xmlns="" id="{67754761-3E3A-47A7-9447-7C60AA0E0358}"/>
               </a:ext>
             </a:extLst>
           </p:cNvPr>
@@ -19060,7 +19060,7 @@
           <p:cNvPr id="2" name="Title 1">
             <a:extLst>
               <a:ext uri="{FF2B5EF4-FFF2-40B4-BE49-F238E27FC236}">
-                <a16:creationId xmlns="" xmlns:a16="http://schemas.microsoft.com/office/drawing/2014/main" id="{22DAD01F-DC17-4CB9-A59E-3B88FC10ACC0}"/>
+                <a16:creationId xmlns:a16="http://schemas.microsoft.com/office/drawing/2014/main" xmlns="" id="{22DAD01F-DC17-4CB9-A59E-3B88FC10ACC0}"/>
               </a:ext>
             </a:extLst>
           </p:cNvPr>
@@ -19091,7 +19091,7 @@
           <p:cNvPr id="4" name="Picture 6" descr="A close up of a logo&#10;&#10;Description generated with very high confidence">
             <a:extLst>
               <a:ext uri="{FF2B5EF4-FFF2-40B4-BE49-F238E27FC236}">
-                <a16:creationId xmlns="" xmlns:a16="http://schemas.microsoft.com/office/drawing/2014/main" id="{C0330C5C-C655-42A8-BF9C-90E788CC6A92}"/>
+                <a16:creationId xmlns:a16="http://schemas.microsoft.com/office/drawing/2014/main" xmlns="" id="{C0330C5C-C655-42A8-BF9C-90E788CC6A92}"/>
               </a:ext>
             </a:extLst>
           </p:cNvPr>
@@ -19126,7 +19126,7 @@
           <p:cNvPr id="6" name="Picture 9" descr="A picture containing drawing&#10;&#10;Description generated with very high confidence">
             <a:extLst>
               <a:ext uri="{FF2B5EF4-FFF2-40B4-BE49-F238E27FC236}">
-                <a16:creationId xmlns="" xmlns:a16="http://schemas.microsoft.com/office/drawing/2014/main" id="{69BBBA96-ED0F-4961-8C6B-6543A7A55BAE}"/>
+                <a16:creationId xmlns:a16="http://schemas.microsoft.com/office/drawing/2014/main" xmlns="" id="{69BBBA96-ED0F-4961-8C6B-6543A7A55BAE}"/>
               </a:ext>
             </a:extLst>
           </p:cNvPr>
@@ -19159,7 +19159,7 @@
           <p:cNvPr id="8" name="Picture 11" descr="A picture containing object, clock, meter&#10;&#10;Description generated with very high confidence">
             <a:extLst>
               <a:ext uri="{FF2B5EF4-FFF2-40B4-BE49-F238E27FC236}">
-                <a16:creationId xmlns="" xmlns:a16="http://schemas.microsoft.com/office/drawing/2014/main" id="{FF7323CE-66D1-43A5-B3E1-17A59B7D36B4}"/>
+                <a16:creationId xmlns:a16="http://schemas.microsoft.com/office/drawing/2014/main" xmlns="" id="{FF7323CE-66D1-43A5-B3E1-17A59B7D36B4}"/>
               </a:ext>
             </a:extLst>
           </p:cNvPr>
@@ -19192,7 +19192,7 @@
           <p:cNvPr id="43" name="Picture 43" descr="A close up of a logo&#10;&#10;Description generated with very high confidence">
             <a:extLst>
               <a:ext uri="{FF2B5EF4-FFF2-40B4-BE49-F238E27FC236}">
-                <a16:creationId xmlns="" xmlns:a16="http://schemas.microsoft.com/office/drawing/2014/main" id="{BAC78DDE-16D4-4F26-B28A-84F4415D8648}"/>
+                <a16:creationId xmlns:a16="http://schemas.microsoft.com/office/drawing/2014/main" xmlns="" id="{BAC78DDE-16D4-4F26-B28A-84F4415D8648}"/>
               </a:ext>
             </a:extLst>
           </p:cNvPr>
@@ -19222,7 +19222,7 @@
           <p:cNvPr id="45" name="Picture 45" descr="A picture containing clock&#10;&#10;Description generated with very high confidence">
             <a:extLst>
               <a:ext uri="{FF2B5EF4-FFF2-40B4-BE49-F238E27FC236}">
-                <a16:creationId xmlns="" xmlns:a16="http://schemas.microsoft.com/office/drawing/2014/main" id="{597ACDCF-1672-40B5-A8BF-D0F2FE28A71F}"/>
+                <a16:creationId xmlns:a16="http://schemas.microsoft.com/office/drawing/2014/main" xmlns="" id="{597ACDCF-1672-40B5-A8BF-D0F2FE28A71F}"/>
               </a:ext>
             </a:extLst>
           </p:cNvPr>
@@ -19252,7 +19252,7 @@
           <p:cNvPr id="47" name="Picture 40" descr="A close up of a logo&#10;&#10;Description generated with very high confidence">
             <a:extLst>
               <a:ext uri="{FF2B5EF4-FFF2-40B4-BE49-F238E27FC236}">
-                <a16:creationId xmlns="" xmlns:a16="http://schemas.microsoft.com/office/drawing/2014/main" id="{C45619DF-F101-4904-A04F-6621105A76DF}"/>
+                <a16:creationId xmlns:a16="http://schemas.microsoft.com/office/drawing/2014/main" xmlns="" id="{C45619DF-F101-4904-A04F-6621105A76DF}"/>
               </a:ext>
             </a:extLst>
           </p:cNvPr>
@@ -19282,7 +19282,7 @@
           <p:cNvPr id="5" name="Picture 6" descr="A close up of a logo&#10;&#10;Description generated with very high confidence">
             <a:extLst>
               <a:ext uri="{FF2B5EF4-FFF2-40B4-BE49-F238E27FC236}">
-                <a16:creationId xmlns="" xmlns:a16="http://schemas.microsoft.com/office/drawing/2014/main" id="{BDB7C2E2-E916-4966-8640-B17B4BE28F3F}"/>
+                <a16:creationId xmlns:a16="http://schemas.microsoft.com/office/drawing/2014/main" xmlns="" id="{BDB7C2E2-E916-4966-8640-B17B4BE28F3F}"/>
               </a:ext>
             </a:extLst>
           </p:cNvPr>
@@ -19312,7 +19312,7 @@
           <p:cNvPr id="10" name="Picture 11" descr="A close up of a logo&#10;&#10;Description generated with very high confidence">
             <a:extLst>
               <a:ext uri="{FF2B5EF4-FFF2-40B4-BE49-F238E27FC236}">
-                <a16:creationId xmlns="" xmlns:a16="http://schemas.microsoft.com/office/drawing/2014/main" id="{775D7EFD-73DC-464B-8B91-4E49077509A6}"/>
+                <a16:creationId xmlns:a16="http://schemas.microsoft.com/office/drawing/2014/main" xmlns="" id="{775D7EFD-73DC-464B-8B91-4E49077509A6}"/>
               </a:ext>
             </a:extLst>
           </p:cNvPr>
@@ -19342,7 +19342,7 @@
           <p:cNvPr id="13" name="Picture 13" descr="A picture containing object, clock&#10;&#10;Description generated with very high confidence">
             <a:extLst>
               <a:ext uri="{FF2B5EF4-FFF2-40B4-BE49-F238E27FC236}">
-                <a16:creationId xmlns="" xmlns:a16="http://schemas.microsoft.com/office/drawing/2014/main" id="{5D923562-CC12-4447-985D-D04FC150126A}"/>
+                <a16:creationId xmlns:a16="http://schemas.microsoft.com/office/drawing/2014/main" xmlns="" id="{5D923562-CC12-4447-985D-D04FC150126A}"/>
               </a:ext>
             </a:extLst>
           </p:cNvPr>
@@ -19372,7 +19372,7 @@
           <p:cNvPr id="15" name="Picture 15" descr="A picture containing drawing&#10;&#10;Description generated with very high confidence">
             <a:extLst>
               <a:ext uri="{FF2B5EF4-FFF2-40B4-BE49-F238E27FC236}">
-                <a16:creationId xmlns="" xmlns:a16="http://schemas.microsoft.com/office/drawing/2014/main" id="{B93A8413-1715-41F4-9B7A-755CE9CFF50E}"/>
+                <a16:creationId xmlns:a16="http://schemas.microsoft.com/office/drawing/2014/main" xmlns="" id="{B93A8413-1715-41F4-9B7A-755CE9CFF50E}"/>
               </a:ext>
             </a:extLst>
           </p:cNvPr>
@@ -19402,7 +19402,7 @@
           <p:cNvPr id="19" name="Picture 19" descr="A close up of a logo&#10;&#10;Description generated with very high confidence">
             <a:extLst>
               <a:ext uri="{FF2B5EF4-FFF2-40B4-BE49-F238E27FC236}">
-                <a16:creationId xmlns="" xmlns:a16="http://schemas.microsoft.com/office/drawing/2014/main" id="{BF193353-5A74-4226-BBC8-CE1F5810E6E0}"/>
+                <a16:creationId xmlns:a16="http://schemas.microsoft.com/office/drawing/2014/main" xmlns="" id="{BF193353-5A74-4226-BBC8-CE1F5810E6E0}"/>
               </a:ext>
             </a:extLst>
           </p:cNvPr>
@@ -19432,7 +19432,7 @@
           <p:cNvPr id="21" name="TextBox 20">
             <a:extLst>
               <a:ext uri="{FF2B5EF4-FFF2-40B4-BE49-F238E27FC236}">
-                <a16:creationId xmlns="" xmlns:a16="http://schemas.microsoft.com/office/drawing/2014/main" id="{EB90B60B-55B1-438E-94CD-FD27D4371DD6}"/>
+                <a16:creationId xmlns:a16="http://schemas.microsoft.com/office/drawing/2014/main" xmlns="" id="{EB90B60B-55B1-438E-94CD-FD27D4371DD6}"/>
               </a:ext>
             </a:extLst>
           </p:cNvPr>
@@ -19471,7 +19471,7 @@
           <p:cNvPr id="22" name="Picture 16" descr="A close up of a logo&#10;&#10;Description generated with very high confidence">
             <a:extLst>
               <a:ext uri="{FF2B5EF4-FFF2-40B4-BE49-F238E27FC236}">
-                <a16:creationId xmlns="" xmlns:a16="http://schemas.microsoft.com/office/drawing/2014/main" id="{4B263D8A-1697-4233-B5A8-A0666187F79A}"/>
+                <a16:creationId xmlns:a16="http://schemas.microsoft.com/office/drawing/2014/main" xmlns="" id="{4B263D8A-1697-4233-B5A8-A0666187F79A}"/>
               </a:ext>
             </a:extLst>
           </p:cNvPr>
@@ -19506,7 +19506,7 @@
           <p:cNvPr id="25" name="Right Brace 24">
             <a:extLst>
               <a:ext uri="{FF2B5EF4-FFF2-40B4-BE49-F238E27FC236}">
-                <a16:creationId xmlns="" xmlns:a16="http://schemas.microsoft.com/office/drawing/2014/main" id="{B123DDFB-BA27-413F-8F72-48EF2FDDE207}"/>
+                <a16:creationId xmlns:a16="http://schemas.microsoft.com/office/drawing/2014/main" xmlns="" id="{B123DDFB-BA27-413F-8F72-48EF2FDDE207}"/>
               </a:ext>
             </a:extLst>
           </p:cNvPr>
@@ -19558,7 +19558,7 @@
           <p:cNvPr id="41" name="Right Brace 40">
             <a:extLst>
               <a:ext uri="{FF2B5EF4-FFF2-40B4-BE49-F238E27FC236}">
-                <a16:creationId xmlns="" xmlns:a16="http://schemas.microsoft.com/office/drawing/2014/main" id="{8D8C0313-13A4-4FAA-9612-4D1FC8C80DFF}"/>
+                <a16:creationId xmlns:a16="http://schemas.microsoft.com/office/drawing/2014/main" xmlns="" id="{8D8C0313-13A4-4FAA-9612-4D1FC8C80DFF}"/>
               </a:ext>
             </a:extLst>
           </p:cNvPr>
@@ -19610,7 +19610,7 @@
           <p:cNvPr id="27" name="Picture 28" descr="A close up of a sign&#10;&#10;Description generated with high confidence">
             <a:extLst>
               <a:ext uri="{FF2B5EF4-FFF2-40B4-BE49-F238E27FC236}">
-                <a16:creationId xmlns="" xmlns:a16="http://schemas.microsoft.com/office/drawing/2014/main" id="{A9F7282D-9E32-4A50-84EA-BE35636CF009}"/>
+                <a16:creationId xmlns:a16="http://schemas.microsoft.com/office/drawing/2014/main" xmlns="" id="{A9F7282D-9E32-4A50-84EA-BE35636CF009}"/>
               </a:ext>
             </a:extLst>
           </p:cNvPr>
@@ -19640,7 +19640,7 @@
           <p:cNvPr id="31" name="Picture 32" descr="A close up of a logo&#10;&#10;Description generated with very high confidence">
             <a:extLst>
               <a:ext uri="{FF2B5EF4-FFF2-40B4-BE49-F238E27FC236}">
-                <a16:creationId xmlns="" xmlns:a16="http://schemas.microsoft.com/office/drawing/2014/main" id="{7D7F121C-1B9A-47CF-A882-FA34E6A6E361}"/>
+                <a16:creationId xmlns:a16="http://schemas.microsoft.com/office/drawing/2014/main" xmlns="" id="{7D7F121C-1B9A-47CF-A882-FA34E6A6E361}"/>
               </a:ext>
             </a:extLst>
           </p:cNvPr>
@@ -19670,7 +19670,7 @@
           <p:cNvPr id="36" name="Picture 38" descr="A close up of a logo&#10;&#10;Description generated with very high confidence">
             <a:extLst>
               <a:ext uri="{FF2B5EF4-FFF2-40B4-BE49-F238E27FC236}">
-                <a16:creationId xmlns="" xmlns:a16="http://schemas.microsoft.com/office/drawing/2014/main" id="{420FFD42-44DD-44E8-A92B-9618CCA5334E}"/>
+                <a16:creationId xmlns:a16="http://schemas.microsoft.com/office/drawing/2014/main" xmlns="" id="{420FFD42-44DD-44E8-A92B-9618CCA5334E}"/>
               </a:ext>
             </a:extLst>
           </p:cNvPr>
@@ -19700,7 +19700,7 @@
           <p:cNvPr id="42" name="TextBox 41">
             <a:extLst>
               <a:ext uri="{FF2B5EF4-FFF2-40B4-BE49-F238E27FC236}">
-                <a16:creationId xmlns="" xmlns:a16="http://schemas.microsoft.com/office/drawing/2014/main" id="{4A1648FC-A785-47A2-972E-144548C6A37A}"/>
+                <a16:creationId xmlns:a16="http://schemas.microsoft.com/office/drawing/2014/main" xmlns="" id="{4A1648FC-A785-47A2-972E-144548C6A37A}"/>
               </a:ext>
             </a:extLst>
           </p:cNvPr>
@@ -19763,7 +19763,7 @@
           <p:cNvPr id="23" name="Arrow: Right 47">
             <a:extLst>
               <a:ext uri="{FF2B5EF4-FFF2-40B4-BE49-F238E27FC236}">
-                <a16:creationId xmlns="" xmlns:a16="http://schemas.microsoft.com/office/drawing/2014/main" id="{2D05F327-8A08-41D8-93AF-95C1FFD2CEA2}"/>
+                <a16:creationId xmlns:a16="http://schemas.microsoft.com/office/drawing/2014/main" xmlns="" id="{2D05F327-8A08-41D8-93AF-95C1FFD2CEA2}"/>
               </a:ext>
             </a:extLst>
           </p:cNvPr>
@@ -19823,7 +19823,7 @@
           <p:cNvPr id="24" name="Arrow: Right 47">
             <a:extLst>
               <a:ext uri="{FF2B5EF4-FFF2-40B4-BE49-F238E27FC236}">
-                <a16:creationId xmlns="" xmlns:a16="http://schemas.microsoft.com/office/drawing/2014/main" id="{2D05F327-8A08-41D8-93AF-95C1FFD2CEA2}"/>
+                <a16:creationId xmlns:a16="http://schemas.microsoft.com/office/drawing/2014/main" xmlns="" id="{2D05F327-8A08-41D8-93AF-95C1FFD2CEA2}"/>
               </a:ext>
             </a:extLst>
           </p:cNvPr>
@@ -19883,7 +19883,7 @@
           <p:cNvPr id="26" name="Arrow: Right 47">
             <a:extLst>
               <a:ext uri="{FF2B5EF4-FFF2-40B4-BE49-F238E27FC236}">
-                <a16:creationId xmlns="" xmlns:a16="http://schemas.microsoft.com/office/drawing/2014/main" id="{2D05F327-8A08-41D8-93AF-95C1FFD2CEA2}"/>
+                <a16:creationId xmlns:a16="http://schemas.microsoft.com/office/drawing/2014/main" xmlns="" id="{2D05F327-8A08-41D8-93AF-95C1FFD2CEA2}"/>
               </a:ext>
             </a:extLst>
           </p:cNvPr>
@@ -20726,7 +20726,7 @@
           <p:cNvPr id="4" name="Picture 6" descr="A close up of a logo&#10;&#10;Description generated with very high confidence">
             <a:extLst>
               <a:ext uri="{FF2B5EF4-FFF2-40B4-BE49-F238E27FC236}">
-                <a16:creationId xmlns="" xmlns:a16="http://schemas.microsoft.com/office/drawing/2014/main" id="{C0330C5C-C655-42A8-BF9C-90E788CC6A92}"/>
+                <a16:creationId xmlns:a16="http://schemas.microsoft.com/office/drawing/2014/main" xmlns="" id="{C0330C5C-C655-42A8-BF9C-90E788CC6A92}"/>
               </a:ext>
             </a:extLst>
           </p:cNvPr>
@@ -20761,7 +20761,7 @@
           <p:cNvPr id="6" name="Picture 9" descr="A picture containing drawing&#10;&#10;Description generated with very high confidence">
             <a:extLst>
               <a:ext uri="{FF2B5EF4-FFF2-40B4-BE49-F238E27FC236}">
-                <a16:creationId xmlns="" xmlns:a16="http://schemas.microsoft.com/office/drawing/2014/main" id="{69BBBA96-ED0F-4961-8C6B-6543A7A55BAE}"/>
+                <a16:creationId xmlns:a16="http://schemas.microsoft.com/office/drawing/2014/main" xmlns="" id="{69BBBA96-ED0F-4961-8C6B-6543A7A55BAE}"/>
               </a:ext>
             </a:extLst>
           </p:cNvPr>
@@ -20794,7 +20794,7 @@
           <p:cNvPr id="8" name="Picture 11" descr="A picture containing object, clock, meter&#10;&#10;Description generated with very high confidence">
             <a:extLst>
               <a:ext uri="{FF2B5EF4-FFF2-40B4-BE49-F238E27FC236}">
-                <a16:creationId xmlns="" xmlns:a16="http://schemas.microsoft.com/office/drawing/2014/main" id="{FF7323CE-66D1-43A5-B3E1-17A59B7D36B4}"/>
+                <a16:creationId xmlns:a16="http://schemas.microsoft.com/office/drawing/2014/main" xmlns="" id="{FF7323CE-66D1-43A5-B3E1-17A59B7D36B4}"/>
               </a:ext>
             </a:extLst>
           </p:cNvPr>
@@ -20827,7 +20827,7 @@
           <p:cNvPr id="9" name="Picture 9" descr="A close up of a logo&#10;&#10;Description generated with very high confidence">
             <a:extLst>
               <a:ext uri="{FF2B5EF4-FFF2-40B4-BE49-F238E27FC236}">
-                <a16:creationId xmlns="" xmlns:a16="http://schemas.microsoft.com/office/drawing/2014/main" id="{FE7DD4F2-A92E-4806-B792-8484FE70F8E3}"/>
+                <a16:creationId xmlns:a16="http://schemas.microsoft.com/office/drawing/2014/main" xmlns="" id="{FE7DD4F2-A92E-4806-B792-8484FE70F8E3}"/>
               </a:ext>
             </a:extLst>
           </p:cNvPr>
@@ -20857,7 +20857,7 @@
           <p:cNvPr id="18" name="Picture 18" descr="A picture containing clock&#10;&#10;Description generated with very high confidence">
             <a:extLst>
               <a:ext uri="{FF2B5EF4-FFF2-40B4-BE49-F238E27FC236}">
-                <a16:creationId xmlns="" xmlns:a16="http://schemas.microsoft.com/office/drawing/2014/main" id="{0554376B-EDEF-4D1D-9EAE-F4D103F6E769}"/>
+                <a16:creationId xmlns:a16="http://schemas.microsoft.com/office/drawing/2014/main" xmlns="" id="{0554376B-EDEF-4D1D-9EAE-F4D103F6E769}"/>
               </a:ext>
             </a:extLst>
           </p:cNvPr>
@@ -20887,7 +20887,7 @@
           <p:cNvPr id="24" name="Picture 24" descr="A picture containing clock, flower&#10;&#10;Description generated with very high confidence">
             <a:extLst>
               <a:ext uri="{FF2B5EF4-FFF2-40B4-BE49-F238E27FC236}">
-                <a16:creationId xmlns="" xmlns:a16="http://schemas.microsoft.com/office/drawing/2014/main" id="{A539457C-5E7D-4840-803E-FB9943A9E863}"/>
+                <a16:creationId xmlns:a16="http://schemas.microsoft.com/office/drawing/2014/main" xmlns="" id="{A539457C-5E7D-4840-803E-FB9943A9E863}"/>
               </a:ext>
             </a:extLst>
           </p:cNvPr>
@@ -20917,7 +20917,7 @@
           <p:cNvPr id="26" name="Picture 26" descr="A picture containing drawing&#10;&#10;Description generated with very high confidence">
             <a:extLst>
               <a:ext uri="{FF2B5EF4-FFF2-40B4-BE49-F238E27FC236}">
-                <a16:creationId xmlns="" xmlns:a16="http://schemas.microsoft.com/office/drawing/2014/main" id="{E9BBDA87-9334-48F6-B549-DF8332853EB8}"/>
+                <a16:creationId xmlns:a16="http://schemas.microsoft.com/office/drawing/2014/main" xmlns="" id="{E9BBDA87-9334-48F6-B549-DF8332853EB8}"/>
               </a:ext>
             </a:extLst>
           </p:cNvPr>
@@ -20947,7 +20947,7 @@
           <p:cNvPr id="30" name="Picture 30" descr="A picture containing clock, meter&#10;&#10;Description generated with very high confidence">
             <a:extLst>
               <a:ext uri="{FF2B5EF4-FFF2-40B4-BE49-F238E27FC236}">
-                <a16:creationId xmlns="" xmlns:a16="http://schemas.microsoft.com/office/drawing/2014/main" id="{869F45C0-BEFD-4D0A-A30C-E3DE4CED26A1}"/>
+                <a16:creationId xmlns:a16="http://schemas.microsoft.com/office/drawing/2014/main" xmlns="" id="{869F45C0-BEFD-4D0A-A30C-E3DE4CED26A1}"/>
               </a:ext>
             </a:extLst>
           </p:cNvPr>
@@ -20977,7 +20977,7 @@
           <p:cNvPr id="32" name="Picture 32" descr="A close up of a logo&#10;&#10;Description generated with very high confidence">
             <a:extLst>
               <a:ext uri="{FF2B5EF4-FFF2-40B4-BE49-F238E27FC236}">
-                <a16:creationId xmlns="" xmlns:a16="http://schemas.microsoft.com/office/drawing/2014/main" id="{1ACF1988-3C5A-413A-B927-C4F08B32DC61}"/>
+                <a16:creationId xmlns:a16="http://schemas.microsoft.com/office/drawing/2014/main" xmlns="" id="{1ACF1988-3C5A-413A-B927-C4F08B32DC61}"/>
               </a:ext>
             </a:extLst>
           </p:cNvPr>
@@ -21007,7 +21007,7 @@
           <p:cNvPr id="48" name="Arrow: Right 47">
             <a:extLst>
               <a:ext uri="{FF2B5EF4-FFF2-40B4-BE49-F238E27FC236}">
-                <a16:creationId xmlns="" xmlns:a16="http://schemas.microsoft.com/office/drawing/2014/main" id="{2D05F327-8A08-41D8-93AF-95C1FFD2CEA2}"/>
+                <a16:creationId xmlns:a16="http://schemas.microsoft.com/office/drawing/2014/main" xmlns="" id="{2D05F327-8A08-41D8-93AF-95C1FFD2CEA2}"/>
               </a:ext>
             </a:extLst>
           </p:cNvPr>
@@ -21067,7 +21067,7 @@
           <p:cNvPr id="49" name="Arrow: Right 48">
             <a:extLst>
               <a:ext uri="{FF2B5EF4-FFF2-40B4-BE49-F238E27FC236}">
-                <a16:creationId xmlns="" xmlns:a16="http://schemas.microsoft.com/office/drawing/2014/main" id="{12342E48-7442-40ED-B882-627321DA0B53}"/>
+                <a16:creationId xmlns:a16="http://schemas.microsoft.com/office/drawing/2014/main" xmlns="" id="{12342E48-7442-40ED-B882-627321DA0B53}"/>
               </a:ext>
             </a:extLst>
           </p:cNvPr>
@@ -21127,7 +21127,7 @@
           <p:cNvPr id="7" name="Picture 9" descr="A picture containing drawing, clock&#10;&#10;Description generated with very high confidence">
             <a:extLst>
               <a:ext uri="{FF2B5EF4-FFF2-40B4-BE49-F238E27FC236}">
-                <a16:creationId xmlns="" xmlns:a16="http://schemas.microsoft.com/office/drawing/2014/main" id="{E3BBF243-DE79-4A22-BEF9-948645E23353}"/>
+                <a16:creationId xmlns:a16="http://schemas.microsoft.com/office/drawing/2014/main" xmlns="" id="{E3BBF243-DE79-4A22-BEF9-948645E23353}"/>
               </a:ext>
             </a:extLst>
           </p:cNvPr>
@@ -21157,7 +21157,7 @@
           <p:cNvPr id="11" name="Picture 11" descr="A close up of a logo&#10;&#10;Description generated with very high confidence">
             <a:extLst>
               <a:ext uri="{FF2B5EF4-FFF2-40B4-BE49-F238E27FC236}">
-                <a16:creationId xmlns="" xmlns:a16="http://schemas.microsoft.com/office/drawing/2014/main" id="{D8A39830-8EDF-46BA-BE71-70D4C02DC930}"/>
+                <a16:creationId xmlns:a16="http://schemas.microsoft.com/office/drawing/2014/main" xmlns="" id="{D8A39830-8EDF-46BA-BE71-70D4C02DC930}"/>
               </a:ext>
             </a:extLst>
           </p:cNvPr>
@@ -21500,7 +21500,7 @@
           <p:cNvPr id="2" name="Title 1">
             <a:extLst>
               <a:ext uri="{FF2B5EF4-FFF2-40B4-BE49-F238E27FC236}">
-                <a16:creationId xmlns="" xmlns:a16="http://schemas.microsoft.com/office/drawing/2014/main" id="{22DAD01F-DC17-4CB9-A59E-3B88FC10ACC0}"/>
+                <a16:creationId xmlns:a16="http://schemas.microsoft.com/office/drawing/2014/main" xmlns="" id="{22DAD01F-DC17-4CB9-A59E-3B88FC10ACC0}"/>
               </a:ext>
             </a:extLst>
           </p:cNvPr>
@@ -21531,7 +21531,7 @@
           <p:cNvPr id="4" name="Picture 6" descr="A close up of a logo&#10;&#10;Description generated with very high confidence">
             <a:extLst>
               <a:ext uri="{FF2B5EF4-FFF2-40B4-BE49-F238E27FC236}">
-                <a16:creationId xmlns="" xmlns:a16="http://schemas.microsoft.com/office/drawing/2014/main" id="{C0330C5C-C655-42A8-BF9C-90E788CC6A92}"/>
+                <a16:creationId xmlns:a16="http://schemas.microsoft.com/office/drawing/2014/main" xmlns="" id="{C0330C5C-C655-42A8-BF9C-90E788CC6A92}"/>
               </a:ext>
             </a:extLst>
           </p:cNvPr>
@@ -21566,7 +21566,7 @@
           <p:cNvPr id="6" name="Picture 9" descr="A picture containing drawing&#10;&#10;Description generated with very high confidence">
             <a:extLst>
               <a:ext uri="{FF2B5EF4-FFF2-40B4-BE49-F238E27FC236}">
-                <a16:creationId xmlns="" xmlns:a16="http://schemas.microsoft.com/office/drawing/2014/main" id="{69BBBA96-ED0F-4961-8C6B-6543A7A55BAE}"/>
+                <a16:creationId xmlns:a16="http://schemas.microsoft.com/office/drawing/2014/main" xmlns="" id="{69BBBA96-ED0F-4961-8C6B-6543A7A55BAE}"/>
               </a:ext>
             </a:extLst>
           </p:cNvPr>
@@ -21599,7 +21599,7 @@
           <p:cNvPr id="8" name="Picture 11" descr="A picture containing object, clock, meter&#10;&#10;Description generated with very high confidence">
             <a:extLst>
               <a:ext uri="{FF2B5EF4-FFF2-40B4-BE49-F238E27FC236}">
-                <a16:creationId xmlns="" xmlns:a16="http://schemas.microsoft.com/office/drawing/2014/main" id="{FF7323CE-66D1-43A5-B3E1-17A59B7D36B4}"/>
+                <a16:creationId xmlns:a16="http://schemas.microsoft.com/office/drawing/2014/main" xmlns="" id="{FF7323CE-66D1-43A5-B3E1-17A59B7D36B4}"/>
               </a:ext>
             </a:extLst>
           </p:cNvPr>
@@ -21632,7 +21632,7 @@
           <p:cNvPr id="36" name="Picture 38" descr="A close up of a logo&#10;&#10;Description generated with very high confidence">
             <a:extLst>
               <a:ext uri="{FF2B5EF4-FFF2-40B4-BE49-F238E27FC236}">
-                <a16:creationId xmlns="" xmlns:a16="http://schemas.microsoft.com/office/drawing/2014/main" id="{420FFD42-44DD-44E8-A92B-9618CCA5334E}"/>
+                <a16:creationId xmlns:a16="http://schemas.microsoft.com/office/drawing/2014/main" xmlns="" id="{420FFD42-44DD-44E8-A92B-9618CCA5334E}"/>
               </a:ext>
             </a:extLst>
           </p:cNvPr>
@@ -21662,7 +21662,7 @@
           <p:cNvPr id="42" name="TextBox 41">
             <a:extLst>
               <a:ext uri="{FF2B5EF4-FFF2-40B4-BE49-F238E27FC236}">
-                <a16:creationId xmlns="" xmlns:a16="http://schemas.microsoft.com/office/drawing/2014/main" id="{4A1648FC-A785-47A2-972E-144548C6A37A}"/>
+                <a16:creationId xmlns:a16="http://schemas.microsoft.com/office/drawing/2014/main" xmlns="" id="{4A1648FC-A785-47A2-972E-144548C6A37A}"/>
               </a:ext>
             </a:extLst>
           </p:cNvPr>
@@ -21725,7 +21725,7 @@
           <p:cNvPr id="3" name="Picture 6" descr="A close up of a logo&#10;&#10;Description generated with very high confidence">
             <a:extLst>
               <a:ext uri="{FF2B5EF4-FFF2-40B4-BE49-F238E27FC236}">
-                <a16:creationId xmlns="" xmlns:a16="http://schemas.microsoft.com/office/drawing/2014/main" id="{EB0483D7-19D7-4ABE-BBD1-92C485E92A96}"/>
+                <a16:creationId xmlns:a16="http://schemas.microsoft.com/office/drawing/2014/main" xmlns="" id="{EB0483D7-19D7-4ABE-BBD1-92C485E92A96}"/>
               </a:ext>
             </a:extLst>
           </p:cNvPr>
@@ -21755,7 +21755,7 @@
           <p:cNvPr id="14" name="Picture 15" descr="A picture containing drawing&#10;&#10;Description generated with very high confidence">
             <a:extLst>
               <a:ext uri="{FF2B5EF4-FFF2-40B4-BE49-F238E27FC236}">
-                <a16:creationId xmlns="" xmlns:a16="http://schemas.microsoft.com/office/drawing/2014/main" id="{67173B02-00E6-431E-B1D9-2ED1D4D3BC15}"/>
+                <a16:creationId xmlns:a16="http://schemas.microsoft.com/office/drawing/2014/main" xmlns="" id="{67173B02-00E6-431E-B1D9-2ED1D4D3BC15}"/>
               </a:ext>
             </a:extLst>
           </p:cNvPr>
@@ -21785,7 +21785,7 @@
           <p:cNvPr id="17" name="Picture 17" descr="A close up of a sign&#10;&#10;Description generated with high confidence">
             <a:extLst>
               <a:ext uri="{FF2B5EF4-FFF2-40B4-BE49-F238E27FC236}">
-                <a16:creationId xmlns="" xmlns:a16="http://schemas.microsoft.com/office/drawing/2014/main" id="{0A8A96EA-BC25-47CB-9481-2730C59E39A6}"/>
+                <a16:creationId xmlns:a16="http://schemas.microsoft.com/office/drawing/2014/main" xmlns="" id="{0A8A96EA-BC25-47CB-9481-2730C59E39A6}"/>
               </a:ext>
             </a:extLst>
           </p:cNvPr>
@@ -21815,7 +21815,7 @@
           <p:cNvPr id="20" name="Picture 22" descr="A close up of a logo&#10;&#10;Description generated with very high confidence">
             <a:extLst>
               <a:ext uri="{FF2B5EF4-FFF2-40B4-BE49-F238E27FC236}">
-                <a16:creationId xmlns="" xmlns:a16="http://schemas.microsoft.com/office/drawing/2014/main" id="{37451824-955B-48FC-A9FB-296A676691EB}"/>
+                <a16:creationId xmlns:a16="http://schemas.microsoft.com/office/drawing/2014/main" xmlns="" id="{37451824-955B-48FC-A9FB-296A676691EB}"/>
               </a:ext>
             </a:extLst>
           </p:cNvPr>
@@ -21845,7 +21845,7 @@
           <p:cNvPr id="30" name="TextBox 29">
             <a:extLst>
               <a:ext uri="{FF2B5EF4-FFF2-40B4-BE49-F238E27FC236}">
-                <a16:creationId xmlns="" xmlns:a16="http://schemas.microsoft.com/office/drawing/2014/main" id="{BE57CFEE-F67A-4F41-9B77-19FF3D26D989}"/>
+                <a16:creationId xmlns:a16="http://schemas.microsoft.com/office/drawing/2014/main" xmlns="" id="{BE57CFEE-F67A-4F41-9B77-19FF3D26D989}"/>
               </a:ext>
             </a:extLst>
           </p:cNvPr>
@@ -21884,7 +21884,7 @@
           <p:cNvPr id="32" name="Picture 16" descr="A close up of a logo&#10;&#10;Description generated with very high confidence">
             <a:extLst>
               <a:ext uri="{FF2B5EF4-FFF2-40B4-BE49-F238E27FC236}">
-                <a16:creationId xmlns="" xmlns:a16="http://schemas.microsoft.com/office/drawing/2014/main" id="{B6710F19-314C-4D01-AF28-99CAA07A72BD}"/>
+                <a16:creationId xmlns:a16="http://schemas.microsoft.com/office/drawing/2014/main" xmlns="" id="{B6710F19-314C-4D01-AF28-99CAA07A72BD}"/>
               </a:ext>
             </a:extLst>
           </p:cNvPr>
@@ -21919,7 +21919,7 @@
           <p:cNvPr id="39" name="Picture 48">
             <a:extLst>
               <a:ext uri="{FF2B5EF4-FFF2-40B4-BE49-F238E27FC236}">
-                <a16:creationId xmlns="" xmlns:a16="http://schemas.microsoft.com/office/drawing/2014/main" id="{A41ED3DF-A72D-4512-BA28-3C8620D02B18}"/>
+                <a16:creationId xmlns:a16="http://schemas.microsoft.com/office/drawing/2014/main" xmlns="" id="{A41ED3DF-A72D-4512-BA28-3C8620D02B18}"/>
               </a:ext>
             </a:extLst>
           </p:cNvPr>
@@ -21960,7 +21960,7 @@
           <p:cNvPr id="50" name="Left Brace 49">
             <a:extLst>
               <a:ext uri="{FF2B5EF4-FFF2-40B4-BE49-F238E27FC236}">
-                <a16:creationId xmlns="" xmlns:a16="http://schemas.microsoft.com/office/drawing/2014/main" id="{B724A079-B0F7-4EA5-BD89-9E8660E7138E}"/>
+                <a16:creationId xmlns:a16="http://schemas.microsoft.com/office/drawing/2014/main" xmlns="" id="{B724A079-B0F7-4EA5-BD89-9E8660E7138E}"/>
               </a:ext>
             </a:extLst>
           </p:cNvPr>
@@ -22012,7 +22012,7 @@
           <p:cNvPr id="51" name="Left Brace 50">
             <a:extLst>
               <a:ext uri="{FF2B5EF4-FFF2-40B4-BE49-F238E27FC236}">
-                <a16:creationId xmlns="" xmlns:a16="http://schemas.microsoft.com/office/drawing/2014/main" id="{5CC00877-2B2F-4FF7-9F4E-CADACF95078F}"/>
+                <a16:creationId xmlns:a16="http://schemas.microsoft.com/office/drawing/2014/main" xmlns="" id="{5CC00877-2B2F-4FF7-9F4E-CADACF95078F}"/>
               </a:ext>
             </a:extLst>
           </p:cNvPr>
@@ -22064,7 +22064,7 @@
           <p:cNvPr id="52" name="Left Brace 51">
             <a:extLst>
               <a:ext uri="{FF2B5EF4-FFF2-40B4-BE49-F238E27FC236}">
-                <a16:creationId xmlns="" xmlns:a16="http://schemas.microsoft.com/office/drawing/2014/main" id="{13618B25-73AF-47A7-BEAF-393C5782156E}"/>
+                <a16:creationId xmlns:a16="http://schemas.microsoft.com/office/drawing/2014/main" xmlns="" id="{13618B25-73AF-47A7-BEAF-393C5782156E}"/>
               </a:ext>
             </a:extLst>
           </p:cNvPr>
@@ -22116,7 +22116,7 @@
           <p:cNvPr id="53" name="Left Brace 52">
             <a:extLst>
               <a:ext uri="{FF2B5EF4-FFF2-40B4-BE49-F238E27FC236}">
-                <a16:creationId xmlns="" xmlns:a16="http://schemas.microsoft.com/office/drawing/2014/main" id="{B0FCB8FB-0BF8-4D3B-A796-DF6C215E4800}"/>
+                <a16:creationId xmlns:a16="http://schemas.microsoft.com/office/drawing/2014/main" xmlns="" id="{B0FCB8FB-0BF8-4D3B-A796-DF6C215E4800}"/>
               </a:ext>
             </a:extLst>
           </p:cNvPr>
@@ -22168,7 +22168,7 @@
           <p:cNvPr id="54" name="Left Brace 53">
             <a:extLst>
               <a:ext uri="{FF2B5EF4-FFF2-40B4-BE49-F238E27FC236}">
-                <a16:creationId xmlns="" xmlns:a16="http://schemas.microsoft.com/office/drawing/2014/main" id="{878D048C-4583-4231-86E3-AD69D44F351C}"/>
+                <a16:creationId xmlns:a16="http://schemas.microsoft.com/office/drawing/2014/main" xmlns="" id="{878D048C-4583-4231-86E3-AD69D44F351C}"/>
               </a:ext>
             </a:extLst>
           </p:cNvPr>
@@ -22220,7 +22220,7 @@
           <p:cNvPr id="56" name="Left Brace 55">
             <a:extLst>
               <a:ext uri="{FF2B5EF4-FFF2-40B4-BE49-F238E27FC236}">
-                <a16:creationId xmlns="" xmlns:a16="http://schemas.microsoft.com/office/drawing/2014/main" id="{AC0A0AA7-85B9-4F8B-8302-7F14B47D63C8}"/>
+                <a16:creationId xmlns:a16="http://schemas.microsoft.com/office/drawing/2014/main" xmlns="" id="{AC0A0AA7-85B9-4F8B-8302-7F14B47D63C8}"/>
               </a:ext>
             </a:extLst>
           </p:cNvPr>
@@ -22272,7 +22272,7 @@
           <p:cNvPr id="57" name="TextBox 56">
             <a:extLst>
               <a:ext uri="{FF2B5EF4-FFF2-40B4-BE49-F238E27FC236}">
-                <a16:creationId xmlns="" xmlns:a16="http://schemas.microsoft.com/office/drawing/2014/main" id="{B9237312-2A37-4DA7-80C8-DD6DE0CA3F10}"/>
+                <a16:creationId xmlns:a16="http://schemas.microsoft.com/office/drawing/2014/main" xmlns="" id="{B9237312-2A37-4DA7-80C8-DD6DE0CA3F10}"/>
               </a:ext>
             </a:extLst>
           </p:cNvPr>
@@ -22311,7 +22311,7 @@
           <p:cNvPr id="58" name="Picture 58" descr="A close up of a logo&#10;&#10;Description generated with very high confidence">
             <a:extLst>
               <a:ext uri="{FF2B5EF4-FFF2-40B4-BE49-F238E27FC236}">
-                <a16:creationId xmlns="" xmlns:a16="http://schemas.microsoft.com/office/drawing/2014/main" id="{3B49DE5A-D97D-4BC4-A2BD-FA203356C5E4}"/>
+                <a16:creationId xmlns:a16="http://schemas.microsoft.com/office/drawing/2014/main" xmlns="" id="{3B49DE5A-D97D-4BC4-A2BD-FA203356C5E4}"/>
               </a:ext>
             </a:extLst>
           </p:cNvPr>
@@ -22341,7 +22341,7 @@
           <p:cNvPr id="60" name="Picture 60" descr="A picture containing object, clock&#10;&#10;Description generated with very high confidence">
             <a:extLst>
               <a:ext uri="{FF2B5EF4-FFF2-40B4-BE49-F238E27FC236}">
-                <a16:creationId xmlns="" xmlns:a16="http://schemas.microsoft.com/office/drawing/2014/main" id="{8DE5578F-2C71-4470-805B-58B6F36E89D7}"/>
+                <a16:creationId xmlns:a16="http://schemas.microsoft.com/office/drawing/2014/main" xmlns="" id="{8DE5578F-2C71-4470-805B-58B6F36E89D7}"/>
               </a:ext>
             </a:extLst>
           </p:cNvPr>
@@ -22371,7 +22371,7 @@
           <p:cNvPr id="62" name="Picture 62" descr="A picture containing drawing&#10;&#10;Description generated with very high confidence">
             <a:extLst>
               <a:ext uri="{FF2B5EF4-FFF2-40B4-BE49-F238E27FC236}">
-                <a16:creationId xmlns="" xmlns:a16="http://schemas.microsoft.com/office/drawing/2014/main" id="{E4E6676D-610B-47E8-8C2C-B0A327A4AC8D}"/>
+                <a16:creationId xmlns:a16="http://schemas.microsoft.com/office/drawing/2014/main" xmlns="" id="{E4E6676D-610B-47E8-8C2C-B0A327A4AC8D}"/>
               </a:ext>
             </a:extLst>
           </p:cNvPr>
@@ -22401,7 +22401,7 @@
           <p:cNvPr id="65" name="Picture 19" descr="A close up of a logo&#10;&#10;Description generated with very high confidence">
             <a:extLst>
               <a:ext uri="{FF2B5EF4-FFF2-40B4-BE49-F238E27FC236}">
-                <a16:creationId xmlns="" xmlns:a16="http://schemas.microsoft.com/office/drawing/2014/main" id="{7C31043C-B453-4648-893A-8B3CC0ADF1DB}"/>
+                <a16:creationId xmlns:a16="http://schemas.microsoft.com/office/drawing/2014/main" xmlns="" id="{7C31043C-B453-4648-893A-8B3CC0ADF1DB}"/>
               </a:ext>
             </a:extLst>
           </p:cNvPr>
@@ -22431,7 +22431,7 @@
           <p:cNvPr id="26" name="Arrow: Right 47">
             <a:extLst>
               <a:ext uri="{FF2B5EF4-FFF2-40B4-BE49-F238E27FC236}">
-                <a16:creationId xmlns="" xmlns:a16="http://schemas.microsoft.com/office/drawing/2014/main" id="{2D05F327-8A08-41D8-93AF-95C1FFD2CEA2}"/>
+                <a16:creationId xmlns:a16="http://schemas.microsoft.com/office/drawing/2014/main" xmlns="" id="{2D05F327-8A08-41D8-93AF-95C1FFD2CEA2}"/>
               </a:ext>
             </a:extLst>
           </p:cNvPr>
@@ -22671,7 +22671,7 @@
           <p:cNvPr id="34" name="Arrow: Right 48">
             <a:extLst>
               <a:ext uri="{FF2B5EF4-FFF2-40B4-BE49-F238E27FC236}">
-                <a16:creationId xmlns="" xmlns:a16="http://schemas.microsoft.com/office/drawing/2014/main" id="{12342E48-7442-40ED-B882-627321DA0B53}"/>
+                <a16:creationId xmlns:a16="http://schemas.microsoft.com/office/drawing/2014/main" xmlns="" id="{12342E48-7442-40ED-B882-627321DA0B53}"/>
               </a:ext>
             </a:extLst>
           </p:cNvPr>
@@ -22731,7 +22731,7 @@
           <p:cNvPr id="35" name="Arrow: Right 48">
             <a:extLst>
               <a:ext uri="{FF2B5EF4-FFF2-40B4-BE49-F238E27FC236}">
-                <a16:creationId xmlns="" xmlns:a16="http://schemas.microsoft.com/office/drawing/2014/main" id="{12342E48-7442-40ED-B882-627321DA0B53}"/>
+                <a16:creationId xmlns:a16="http://schemas.microsoft.com/office/drawing/2014/main" xmlns="" id="{12342E48-7442-40ED-B882-627321DA0B53}"/>
               </a:ext>
             </a:extLst>
           </p:cNvPr>
@@ -22791,7 +22791,7 @@
           <p:cNvPr id="37" name="Right Brace 36">
             <a:extLst>
               <a:ext uri="{FF2B5EF4-FFF2-40B4-BE49-F238E27FC236}">
-                <a16:creationId xmlns="" xmlns:a16="http://schemas.microsoft.com/office/drawing/2014/main" id="{B123DDFB-BA27-413F-8F72-48EF2FDDE207}"/>
+                <a16:creationId xmlns:a16="http://schemas.microsoft.com/office/drawing/2014/main" xmlns="" id="{B123DDFB-BA27-413F-8F72-48EF2FDDE207}"/>
               </a:ext>
             </a:extLst>
           </p:cNvPr>
@@ -22843,7 +22843,7 @@
           <p:cNvPr id="38" name="Right Brace 37">
             <a:extLst>
               <a:ext uri="{FF2B5EF4-FFF2-40B4-BE49-F238E27FC236}">
-                <a16:creationId xmlns="" xmlns:a16="http://schemas.microsoft.com/office/drawing/2014/main" id="{8D8C0313-13A4-4FAA-9612-4D1FC8C80DFF}"/>
+                <a16:creationId xmlns:a16="http://schemas.microsoft.com/office/drawing/2014/main" xmlns="" id="{8D8C0313-13A4-4FAA-9612-4D1FC8C80DFF}"/>
               </a:ext>
             </a:extLst>
           </p:cNvPr>
@@ -22895,7 +22895,7 @@
           <p:cNvPr id="40" name="Picture 28" descr="A close up of a sign&#10;&#10;Description generated with high confidence">
             <a:extLst>
               <a:ext uri="{FF2B5EF4-FFF2-40B4-BE49-F238E27FC236}">
-                <a16:creationId xmlns="" xmlns:a16="http://schemas.microsoft.com/office/drawing/2014/main" id="{A9F7282D-9E32-4A50-84EA-BE35636CF009}"/>
+                <a16:creationId xmlns:a16="http://schemas.microsoft.com/office/drawing/2014/main" xmlns="" id="{A9F7282D-9E32-4A50-84EA-BE35636CF009}"/>
               </a:ext>
             </a:extLst>
           </p:cNvPr>
@@ -22925,7 +22925,7 @@
           <p:cNvPr id="41" name="Picture 32" descr="A close up of a logo&#10;&#10;Description generated with very high confidence">
             <a:extLst>
               <a:ext uri="{FF2B5EF4-FFF2-40B4-BE49-F238E27FC236}">
-                <a16:creationId xmlns="" xmlns:a16="http://schemas.microsoft.com/office/drawing/2014/main" id="{7D7F121C-1B9A-47CF-A882-FA34E6A6E361}"/>
+                <a16:creationId xmlns:a16="http://schemas.microsoft.com/office/drawing/2014/main" xmlns="" id="{7D7F121C-1B9A-47CF-A882-FA34E6A6E361}"/>
               </a:ext>
             </a:extLst>
           </p:cNvPr>
@@ -24106,7 +24106,7 @@
           <p:cNvPr id="4" name="Picture 3" descr="A close up of a logo&#10;&#10;Description generated with very high confidence">
             <a:extLst>
               <a:ext uri="{FF2B5EF4-FFF2-40B4-BE49-F238E27FC236}">
-                <a16:creationId xmlns="" xmlns:a16="http://schemas.microsoft.com/office/drawing/2014/main" id="{6E87F861-F9AC-4F21-B0C8-58EB55E95B97}"/>
+                <a16:creationId xmlns:a16="http://schemas.microsoft.com/office/drawing/2014/main" xmlns="" id="{6E87F861-F9AC-4F21-B0C8-58EB55E95B97}"/>
               </a:ext>
             </a:extLst>
           </p:cNvPr>
@@ -24136,7 +24136,7 @@
           <p:cNvPr id="6" name="Arrow: Down 7">
             <a:extLst>
               <a:ext uri="{FF2B5EF4-FFF2-40B4-BE49-F238E27FC236}">
-                <a16:creationId xmlns="" xmlns:a16="http://schemas.microsoft.com/office/drawing/2014/main" id="{82AB09DD-DB63-4806-A980-AE0CB9781D42}"/>
+                <a16:creationId xmlns:a16="http://schemas.microsoft.com/office/drawing/2014/main" xmlns="" id="{82AB09DD-DB63-4806-A980-AE0CB9781D42}"/>
               </a:ext>
             </a:extLst>
           </p:cNvPr>
@@ -24190,7 +24190,7 @@
           <p:cNvPr id="12" name="TextBox 11">
             <a:extLst>
               <a:ext uri="{FF2B5EF4-FFF2-40B4-BE49-F238E27FC236}">
-                <a16:creationId xmlns="" xmlns:a16="http://schemas.microsoft.com/office/drawing/2014/main" id="{02939EE3-25E8-4AA1-A0EF-AEA68207BAAD}"/>
+                <a16:creationId xmlns:a16="http://schemas.microsoft.com/office/drawing/2014/main" xmlns="" id="{02939EE3-25E8-4AA1-A0EF-AEA68207BAAD}"/>
               </a:ext>
             </a:extLst>
           </p:cNvPr>
@@ -24313,7 +24313,7 @@
           <p:cNvPr id="21" name="Arrow: Down 7">
             <a:extLst>
               <a:ext uri="{FF2B5EF4-FFF2-40B4-BE49-F238E27FC236}">
-                <a16:creationId xmlns="" xmlns:a16="http://schemas.microsoft.com/office/drawing/2014/main" id="{82AB09DD-DB63-4806-A980-AE0CB9781D42}"/>
+                <a16:creationId xmlns:a16="http://schemas.microsoft.com/office/drawing/2014/main" xmlns="" id="{82AB09DD-DB63-4806-A980-AE0CB9781D42}"/>
               </a:ext>
             </a:extLst>
           </p:cNvPr>
@@ -24367,7 +24367,7 @@
           <p:cNvPr id="27" name="Arrow: Down 7">
             <a:extLst>
               <a:ext uri="{FF2B5EF4-FFF2-40B4-BE49-F238E27FC236}">
-                <a16:creationId xmlns="" xmlns:a16="http://schemas.microsoft.com/office/drawing/2014/main" id="{82AB09DD-DB63-4806-A980-AE0CB9781D42}"/>
+                <a16:creationId xmlns:a16="http://schemas.microsoft.com/office/drawing/2014/main" xmlns="" id="{82AB09DD-DB63-4806-A980-AE0CB9781D42}"/>
               </a:ext>
             </a:extLst>
           </p:cNvPr>
@@ -24555,7 +24555,7 @@
           <p:cNvPr id="34" name="TextBox 33">
             <a:extLst>
               <a:ext uri="{FF2B5EF4-FFF2-40B4-BE49-F238E27FC236}">
-                <a16:creationId xmlns="" xmlns:a16="http://schemas.microsoft.com/office/drawing/2014/main" id="{E8C512F0-66D0-4B8A-B0A7-993EEF9E5139}"/>
+                <a16:creationId xmlns:a16="http://schemas.microsoft.com/office/drawing/2014/main" xmlns="" id="{E8C512F0-66D0-4B8A-B0A7-993EEF9E5139}"/>
               </a:ext>
             </a:extLst>
           </p:cNvPr>
@@ -24614,7 +24614,7 @@
           <p:cNvPr id="35" name="TextBox 34">
             <a:extLst>
               <a:ext uri="{FF2B5EF4-FFF2-40B4-BE49-F238E27FC236}">
-                <a16:creationId xmlns="" xmlns:a16="http://schemas.microsoft.com/office/drawing/2014/main" id="{7E86E019-DB97-4D67-8777-EE3CB4990CA9}"/>
+                <a16:creationId xmlns:a16="http://schemas.microsoft.com/office/drawing/2014/main" xmlns="" id="{7E86E019-DB97-4D67-8777-EE3CB4990CA9}"/>
               </a:ext>
             </a:extLst>
           </p:cNvPr>
@@ -24673,7 +24673,7 @@
           <p:cNvPr id="38" name="Arrow: Right 13">
             <a:extLst>
               <a:ext uri="{FF2B5EF4-FFF2-40B4-BE49-F238E27FC236}">
-                <a16:creationId xmlns="" xmlns:a16="http://schemas.microsoft.com/office/drawing/2014/main" id="{169BB430-EBE9-48D3-BBC7-66B17AF3C24B}"/>
+                <a16:creationId xmlns:a16="http://schemas.microsoft.com/office/drawing/2014/main" xmlns="" id="{169BB430-EBE9-48D3-BBC7-66B17AF3C24B}"/>
               </a:ext>
             </a:extLst>
           </p:cNvPr>
@@ -24717,7 +24717,7 @@
           <p:cNvPr id="39" name="Arrow: Right 13">
             <a:extLst>
               <a:ext uri="{FF2B5EF4-FFF2-40B4-BE49-F238E27FC236}">
-                <a16:creationId xmlns="" xmlns:a16="http://schemas.microsoft.com/office/drawing/2014/main" id="{169BB430-EBE9-48D3-BBC7-66B17AF3C24B}"/>
+                <a16:creationId xmlns:a16="http://schemas.microsoft.com/office/drawing/2014/main" xmlns="" id="{169BB430-EBE9-48D3-BBC7-66B17AF3C24B}"/>
               </a:ext>
             </a:extLst>
           </p:cNvPr>
@@ -24761,7 +24761,7 @@
           <p:cNvPr id="17" name="Picture 13" descr="A close up of a logo&#10;&#10;Description generated with very high confidence">
             <a:extLst>
               <a:ext uri="{FF2B5EF4-FFF2-40B4-BE49-F238E27FC236}">
-                <a16:creationId xmlns="" xmlns:a16="http://schemas.microsoft.com/office/drawing/2014/main" id="{ECAD198D-1469-41D2-8E92-807888FE870D}"/>
+                <a16:creationId xmlns:a16="http://schemas.microsoft.com/office/drawing/2014/main" xmlns="" id="{ECAD198D-1469-41D2-8E92-807888FE870D}"/>
               </a:ext>
             </a:extLst>
           </p:cNvPr>
@@ -25289,7 +25289,7 @@
           <p:cNvPr id="4" name="Picture 3" descr="A close up of a logo&#10;&#10;Description generated with very high confidence">
             <a:extLst>
               <a:ext uri="{FF2B5EF4-FFF2-40B4-BE49-F238E27FC236}">
-                <a16:creationId xmlns="" xmlns:a16="http://schemas.microsoft.com/office/drawing/2014/main" id="{6E87F861-F9AC-4F21-B0C8-58EB55E95B97}"/>
+                <a16:creationId xmlns:a16="http://schemas.microsoft.com/office/drawing/2014/main" xmlns="" id="{6E87F861-F9AC-4F21-B0C8-58EB55E95B97}"/>
               </a:ext>
             </a:extLst>
           </p:cNvPr>
@@ -25319,7 +25319,7 @@
           <p:cNvPr id="6" name="Arrow: Down 7">
             <a:extLst>
               <a:ext uri="{FF2B5EF4-FFF2-40B4-BE49-F238E27FC236}">
-                <a16:creationId xmlns="" xmlns:a16="http://schemas.microsoft.com/office/drawing/2014/main" id="{82AB09DD-DB63-4806-A980-AE0CB9781D42}"/>
+                <a16:creationId xmlns:a16="http://schemas.microsoft.com/office/drawing/2014/main" xmlns="" id="{82AB09DD-DB63-4806-A980-AE0CB9781D42}"/>
               </a:ext>
             </a:extLst>
           </p:cNvPr>
@@ -25403,7 +25403,7 @@
           <p:cNvPr id="15" name="Picture 7" descr="A close up of a logo&#10;&#10;Description generated with very high confidence">
             <a:extLst>
               <a:ext uri="{FF2B5EF4-FFF2-40B4-BE49-F238E27FC236}">
-                <a16:creationId xmlns="" xmlns:a16="http://schemas.microsoft.com/office/drawing/2014/main" id="{CCA1FA7B-C942-4986-AB3B-54E0615F8F08}"/>
+                <a16:creationId xmlns:a16="http://schemas.microsoft.com/office/drawing/2014/main" xmlns="" id="{CCA1FA7B-C942-4986-AB3B-54E0615F8F08}"/>
               </a:ext>
             </a:extLst>
           </p:cNvPr>
@@ -25433,7 +25433,7 @@
           <p:cNvPr id="16" name="Arrow: Down 9">
             <a:extLst>
               <a:ext uri="{FF2B5EF4-FFF2-40B4-BE49-F238E27FC236}">
-                <a16:creationId xmlns="" xmlns:a16="http://schemas.microsoft.com/office/drawing/2014/main" id="{74C91D1A-CCF6-4DE0-B080-D77210A893FD}"/>
+                <a16:creationId xmlns:a16="http://schemas.microsoft.com/office/drawing/2014/main" xmlns="" id="{74C91D1A-CCF6-4DE0-B080-D77210A893FD}"/>
               </a:ext>
             </a:extLst>
           </p:cNvPr>
@@ -25487,7 +25487,7 @@
           <p:cNvPr id="17" name="TextBox 16">
             <a:extLst>
               <a:ext uri="{FF2B5EF4-FFF2-40B4-BE49-F238E27FC236}">
-                <a16:creationId xmlns="" xmlns:a16="http://schemas.microsoft.com/office/drawing/2014/main" id="{EBD1E537-F5C7-43D5-8C6F-6CFA11A95BD2}"/>
+                <a16:creationId xmlns:a16="http://schemas.microsoft.com/office/drawing/2014/main" xmlns="" id="{EBD1E537-F5C7-43D5-8C6F-6CFA11A95BD2}"/>
               </a:ext>
             </a:extLst>
           </p:cNvPr>
@@ -25821,7 +25821,7 @@
           <p:cNvPr id="15" name="Picture 7" descr="A close up of a logo&#10;&#10;Description generated with very high confidence">
             <a:extLst>
               <a:ext uri="{FF2B5EF4-FFF2-40B4-BE49-F238E27FC236}">
-                <a16:creationId xmlns="" xmlns:a16="http://schemas.microsoft.com/office/drawing/2014/main" id="{CCA1FA7B-C942-4986-AB3B-54E0615F8F08}"/>
+                <a16:creationId xmlns:a16="http://schemas.microsoft.com/office/drawing/2014/main" xmlns="" id="{CCA1FA7B-C942-4986-AB3B-54E0615F8F08}"/>
               </a:ext>
             </a:extLst>
           </p:cNvPr>
@@ -26066,7 +26066,7 @@
           <p:cNvPr id="15" name="Picture 7" descr="A close up of a logo&#10;&#10;Description generated with very high confidence">
             <a:extLst>
               <a:ext uri="{FF2B5EF4-FFF2-40B4-BE49-F238E27FC236}">
-                <a16:creationId xmlns="" xmlns:a16="http://schemas.microsoft.com/office/drawing/2014/main" id="{CCA1FA7B-C942-4986-AB3B-54E0615F8F08}"/>
+                <a16:creationId xmlns:a16="http://schemas.microsoft.com/office/drawing/2014/main" xmlns="" id="{CCA1FA7B-C942-4986-AB3B-54E0615F8F08}"/>
               </a:ext>
             </a:extLst>
           </p:cNvPr>
@@ -26306,7 +26306,7 @@
           <p:cNvPr id="18" name="Picture 7" descr="A close up of a logo&#10;&#10;Description generated with very high confidence">
             <a:extLst>
               <a:ext uri="{FF2B5EF4-FFF2-40B4-BE49-F238E27FC236}">
-                <a16:creationId xmlns="" xmlns:a16="http://schemas.microsoft.com/office/drawing/2014/main" id="{CCA1FA7B-C942-4986-AB3B-54E0615F8F08}"/>
+                <a16:creationId xmlns:a16="http://schemas.microsoft.com/office/drawing/2014/main" xmlns="" id="{CCA1FA7B-C942-4986-AB3B-54E0615F8F08}"/>
               </a:ext>
             </a:extLst>
           </p:cNvPr>
@@ -26396,7 +26396,7 @@
           <p:cNvPr id="24" name="Arrow: Down 7">
             <a:extLst>
               <a:ext uri="{FF2B5EF4-FFF2-40B4-BE49-F238E27FC236}">
-                <a16:creationId xmlns="" xmlns:a16="http://schemas.microsoft.com/office/drawing/2014/main" id="{82AB09DD-DB63-4806-A980-AE0CB9781D42}"/>
+                <a16:creationId xmlns:a16="http://schemas.microsoft.com/office/drawing/2014/main" xmlns="" id="{82AB09DD-DB63-4806-A980-AE0CB9781D42}"/>
               </a:ext>
             </a:extLst>
           </p:cNvPr>
@@ -26450,7 +26450,7 @@
           <p:cNvPr id="25" name="Arrow: Down 7">
             <a:extLst>
               <a:ext uri="{FF2B5EF4-FFF2-40B4-BE49-F238E27FC236}">
-                <a16:creationId xmlns="" xmlns:a16="http://schemas.microsoft.com/office/drawing/2014/main" id="{82AB09DD-DB63-4806-A980-AE0CB9781D42}"/>
+                <a16:creationId xmlns:a16="http://schemas.microsoft.com/office/drawing/2014/main" xmlns="" id="{82AB09DD-DB63-4806-A980-AE0CB9781D42}"/>
               </a:ext>
             </a:extLst>
           </p:cNvPr>
@@ -26649,7 +26649,7 @@
           <p:cNvPr id="2" name="Title 1">
             <a:extLst>
               <a:ext uri="{FF2B5EF4-FFF2-40B4-BE49-F238E27FC236}">
-                <a16:creationId xmlns="" xmlns:a16="http://schemas.microsoft.com/office/drawing/2014/main" id="{9B3E31B1-1524-4917-9285-17E913845064}"/>
+                <a16:creationId xmlns:a16="http://schemas.microsoft.com/office/drawing/2014/main" xmlns="" id="{9B3E31B1-1524-4917-9285-17E913845064}"/>
               </a:ext>
             </a:extLst>
           </p:cNvPr>
@@ -26680,7 +26680,7 @@
           <p:cNvPr id="7" name="TextBox 6">
             <a:extLst>
               <a:ext uri="{FF2B5EF4-FFF2-40B4-BE49-F238E27FC236}">
-                <a16:creationId xmlns="" xmlns:a16="http://schemas.microsoft.com/office/drawing/2014/main" id="{3C8D1A93-8E34-461B-AE33-3F2AF8EDEDE3}"/>
+                <a16:creationId xmlns:a16="http://schemas.microsoft.com/office/drawing/2014/main" xmlns="" id="{3C8D1A93-8E34-461B-AE33-3F2AF8EDEDE3}"/>
               </a:ext>
             </a:extLst>
           </p:cNvPr>
@@ -26721,7 +26721,7 @@
           <p:cNvPr id="12" name="Picture 12" descr="A close up of a logo&#10;&#10;Description generated with very high confidence">
             <a:extLst>
               <a:ext uri="{FF2B5EF4-FFF2-40B4-BE49-F238E27FC236}">
-                <a16:creationId xmlns="" xmlns:a16="http://schemas.microsoft.com/office/drawing/2014/main" id="{BCB28C98-A97C-401C-8299-EB6FC4F8EC07}"/>
+                <a16:creationId xmlns:a16="http://schemas.microsoft.com/office/drawing/2014/main" xmlns="" id="{BCB28C98-A97C-401C-8299-EB6FC4F8EC07}"/>
               </a:ext>
             </a:extLst>
           </p:cNvPr>
@@ -26751,7 +26751,7 @@
           <p:cNvPr id="15" name="TextBox 14">
             <a:extLst>
               <a:ext uri="{FF2B5EF4-FFF2-40B4-BE49-F238E27FC236}">
-                <a16:creationId xmlns="" xmlns:a16="http://schemas.microsoft.com/office/drawing/2014/main" id="{1AAE7903-DA0C-486B-BDC7-ADB80C60CE39}"/>
+                <a16:creationId xmlns:a16="http://schemas.microsoft.com/office/drawing/2014/main" xmlns="" id="{1AAE7903-DA0C-486B-BDC7-ADB80C60CE39}"/>
               </a:ext>
             </a:extLst>
           </p:cNvPr>
@@ -26790,7 +26790,7 @@
           <p:cNvPr id="16" name="Picture 16" descr="A close up of a logo&#10;&#10;Description generated with very high confidence">
             <a:extLst>
               <a:ext uri="{FF2B5EF4-FFF2-40B4-BE49-F238E27FC236}">
-                <a16:creationId xmlns="" xmlns:a16="http://schemas.microsoft.com/office/drawing/2014/main" id="{C7C82433-1251-4B07-9C0F-DB83878FB6CB}"/>
+                <a16:creationId xmlns:a16="http://schemas.microsoft.com/office/drawing/2014/main" xmlns="" id="{C7C82433-1251-4B07-9C0F-DB83878FB6CB}"/>
               </a:ext>
             </a:extLst>
           </p:cNvPr>
@@ -28921,7 +28921,7 @@
           <p:cNvPr id="2" name="Title 1">
             <a:extLst>
               <a:ext uri="{FF2B5EF4-FFF2-40B4-BE49-F238E27FC236}">
-                <a16:creationId xmlns="" xmlns:a16="http://schemas.microsoft.com/office/drawing/2014/main" id="{9B3E31B1-1524-4917-9285-17E913845064}"/>
+                <a16:creationId xmlns:a16="http://schemas.microsoft.com/office/drawing/2014/main" xmlns="" id="{9B3E31B1-1524-4917-9285-17E913845064}"/>
               </a:ext>
             </a:extLst>
           </p:cNvPr>
@@ -28952,7 +28952,7 @@
           <p:cNvPr id="7" name="TextBox 6">
             <a:extLst>
               <a:ext uri="{FF2B5EF4-FFF2-40B4-BE49-F238E27FC236}">
-                <a16:creationId xmlns="" xmlns:a16="http://schemas.microsoft.com/office/drawing/2014/main" id="{3C8D1A93-8E34-461B-AE33-3F2AF8EDEDE3}"/>
+                <a16:creationId xmlns:a16="http://schemas.microsoft.com/office/drawing/2014/main" xmlns="" id="{3C8D1A93-8E34-461B-AE33-3F2AF8EDEDE3}"/>
               </a:ext>
             </a:extLst>
           </p:cNvPr>
@@ -28993,7 +28993,7 @@
           <p:cNvPr id="12" name="Picture 12" descr="A close up of a logo&#10;&#10;Description generated with very high confidence">
             <a:extLst>
               <a:ext uri="{FF2B5EF4-FFF2-40B4-BE49-F238E27FC236}">
-                <a16:creationId xmlns="" xmlns:a16="http://schemas.microsoft.com/office/drawing/2014/main" id="{BCB28C98-A97C-401C-8299-EB6FC4F8EC07}"/>
+                <a16:creationId xmlns:a16="http://schemas.microsoft.com/office/drawing/2014/main" xmlns="" id="{BCB28C98-A97C-401C-8299-EB6FC4F8EC07}"/>
               </a:ext>
             </a:extLst>
           </p:cNvPr>
@@ -29023,7 +29023,7 @@
           <p:cNvPr id="15" name="TextBox 14">
             <a:extLst>
               <a:ext uri="{FF2B5EF4-FFF2-40B4-BE49-F238E27FC236}">
-                <a16:creationId xmlns="" xmlns:a16="http://schemas.microsoft.com/office/drawing/2014/main" id="{1AAE7903-DA0C-486B-BDC7-ADB80C60CE39}"/>
+                <a16:creationId xmlns:a16="http://schemas.microsoft.com/office/drawing/2014/main" xmlns="" id="{1AAE7903-DA0C-486B-BDC7-ADB80C60CE39}"/>
               </a:ext>
             </a:extLst>
           </p:cNvPr>
@@ -29062,7 +29062,7 @@
           <p:cNvPr id="16" name="Picture 16" descr="A close up of a logo&#10;&#10;Description generated with very high confidence">
             <a:extLst>
               <a:ext uri="{FF2B5EF4-FFF2-40B4-BE49-F238E27FC236}">
-                <a16:creationId xmlns="" xmlns:a16="http://schemas.microsoft.com/office/drawing/2014/main" id="{C7C82433-1251-4B07-9C0F-DB83878FB6CB}"/>
+                <a16:creationId xmlns:a16="http://schemas.microsoft.com/office/drawing/2014/main" xmlns="" id="{C7C82433-1251-4B07-9C0F-DB83878FB6CB}"/>
               </a:ext>
             </a:extLst>
           </p:cNvPr>
@@ -29092,7 +29092,7 @@
           <p:cNvPr id="32" name="TextBox 31">
             <a:extLst>
               <a:ext uri="{FF2B5EF4-FFF2-40B4-BE49-F238E27FC236}">
-                <a16:creationId xmlns="" xmlns:a16="http://schemas.microsoft.com/office/drawing/2014/main" id="{95FFBCCC-62A7-4B35-95D9-9DDDAD7F90FD}"/>
+                <a16:creationId xmlns:a16="http://schemas.microsoft.com/office/drawing/2014/main" xmlns="" id="{95FFBCCC-62A7-4B35-95D9-9DDDAD7F90FD}"/>
               </a:ext>
             </a:extLst>
           </p:cNvPr>
@@ -29131,7 +29131,7 @@
           <p:cNvPr id="33" name="Picture 33" descr="A close up of a logo&#10;&#10;Description generated with very high confidence">
             <a:extLst>
               <a:ext uri="{FF2B5EF4-FFF2-40B4-BE49-F238E27FC236}">
-                <a16:creationId xmlns="" xmlns:a16="http://schemas.microsoft.com/office/drawing/2014/main" id="{38088EDE-D1BD-4D90-BC05-DB9DB49BBAAD}"/>
+                <a16:creationId xmlns:a16="http://schemas.microsoft.com/office/drawing/2014/main" xmlns="" id="{38088EDE-D1BD-4D90-BC05-DB9DB49BBAAD}"/>
               </a:ext>
             </a:extLst>
           </p:cNvPr>
@@ -29166,7 +29166,7 @@
           <p:cNvPr id="3" name="Arrow: Right 2">
             <a:extLst>
               <a:ext uri="{FF2B5EF4-FFF2-40B4-BE49-F238E27FC236}">
-                <a16:creationId xmlns="" xmlns:a16="http://schemas.microsoft.com/office/drawing/2014/main" id="{A386E034-963A-452A-BA56-7A5B5FF1099E}"/>
+                <a16:creationId xmlns:a16="http://schemas.microsoft.com/office/drawing/2014/main" xmlns="" id="{A386E034-963A-452A-BA56-7A5B5FF1099E}"/>
               </a:ext>
             </a:extLst>
           </p:cNvPr>
@@ -29212,7 +29212,7 @@
           <p:cNvPr id="10" name="Arrow: Right 9">
             <a:extLst>
               <a:ext uri="{FF2B5EF4-FFF2-40B4-BE49-F238E27FC236}">
-                <a16:creationId xmlns="" xmlns:a16="http://schemas.microsoft.com/office/drawing/2014/main" id="{FC53BB6D-D8F9-4631-B0DB-C5D30F0A1ADE}"/>
+                <a16:creationId xmlns:a16="http://schemas.microsoft.com/office/drawing/2014/main" xmlns="" id="{FC53BB6D-D8F9-4631-B0DB-C5D30F0A1ADE}"/>
               </a:ext>
             </a:extLst>
           </p:cNvPr>
@@ -29295,7 +29295,7 @@
           <p:cNvPr id="2" name="Title 1">
             <a:extLst>
               <a:ext uri="{FF2B5EF4-FFF2-40B4-BE49-F238E27FC236}">
-                <a16:creationId xmlns="" xmlns:a16="http://schemas.microsoft.com/office/drawing/2014/main" id="{0F79825B-3723-4872-BC1F-C4E6A23AD3AC}"/>
+                <a16:creationId xmlns:a16="http://schemas.microsoft.com/office/drawing/2014/main" xmlns="" id="{0F79825B-3723-4872-BC1F-C4E6A23AD3AC}"/>
               </a:ext>
             </a:extLst>
           </p:cNvPr>
@@ -29326,7 +29326,7 @@
           <p:cNvPr id="7" name="Picture 7" descr="A close up of a logo&#10;&#10;Description generated with very high confidence">
             <a:extLst>
               <a:ext uri="{FF2B5EF4-FFF2-40B4-BE49-F238E27FC236}">
-                <a16:creationId xmlns="" xmlns:a16="http://schemas.microsoft.com/office/drawing/2014/main" id="{80B0312D-5F8E-47B4-92BF-FA66F656751D}"/>
+                <a16:creationId xmlns:a16="http://schemas.microsoft.com/office/drawing/2014/main" xmlns="" id="{80B0312D-5F8E-47B4-92BF-FA66F656751D}"/>
               </a:ext>
             </a:extLst>
           </p:cNvPr>
@@ -29359,7 +29359,7 @@
           <p:cNvPr id="13" name="TextBox 12">
             <a:extLst>
               <a:ext uri="{FF2B5EF4-FFF2-40B4-BE49-F238E27FC236}">
-                <a16:creationId xmlns="" xmlns:a16="http://schemas.microsoft.com/office/drawing/2014/main" id="{92238BA9-76D0-4E8E-B5FA-9F7DB40CA3C5}"/>
+                <a16:creationId xmlns:a16="http://schemas.microsoft.com/office/drawing/2014/main" xmlns="" id="{92238BA9-76D0-4E8E-B5FA-9F7DB40CA3C5}"/>
               </a:ext>
             </a:extLst>
           </p:cNvPr>
@@ -29402,7 +29402,7 @@
           <p:cNvPr id="19" name="Picture 19">
             <a:extLst>
               <a:ext uri="{FF2B5EF4-FFF2-40B4-BE49-F238E27FC236}">
-                <a16:creationId xmlns="" xmlns:a16="http://schemas.microsoft.com/office/drawing/2014/main" id="{F5FA65D8-C04D-46E6-9FC6-23843A758732}"/>
+                <a16:creationId xmlns:a16="http://schemas.microsoft.com/office/drawing/2014/main" xmlns="" id="{F5FA65D8-C04D-46E6-9FC6-23843A758732}"/>
               </a:ext>
             </a:extLst>
           </p:cNvPr>
@@ -29432,7 +29432,7 @@
           <p:cNvPr id="24" name="Picture 24" descr="A close up of a logo&#10;&#10;Description generated with very high confidence">
             <a:extLst>
               <a:ext uri="{FF2B5EF4-FFF2-40B4-BE49-F238E27FC236}">
-                <a16:creationId xmlns="" xmlns:a16="http://schemas.microsoft.com/office/drawing/2014/main" id="{E75973BA-2F48-4595-8A40-76F9628582C1}"/>
+                <a16:creationId xmlns:a16="http://schemas.microsoft.com/office/drawing/2014/main" xmlns="" id="{E75973BA-2F48-4595-8A40-76F9628582C1}"/>
               </a:ext>
             </a:extLst>
           </p:cNvPr>
@@ -29462,7 +29462,7 @@
           <p:cNvPr id="41" name="Picture 41" descr="A picture containing drawing&#10;&#10;Description generated with very high confidence">
             <a:extLst>
               <a:ext uri="{FF2B5EF4-FFF2-40B4-BE49-F238E27FC236}">
-                <a16:creationId xmlns="" xmlns:a16="http://schemas.microsoft.com/office/drawing/2014/main" id="{31E1483B-7194-4F70-B546-9D57F1B81B91}"/>
+                <a16:creationId xmlns:a16="http://schemas.microsoft.com/office/drawing/2014/main" xmlns="" id="{31E1483B-7194-4F70-B546-9D57F1B81B91}"/>
               </a:ext>
             </a:extLst>
           </p:cNvPr>
@@ -29492,7 +29492,7 @@
           <p:cNvPr id="49" name="Picture 49" descr="A picture containing clock, drawing, flower&#10;&#10;Description generated with very high confidence">
             <a:extLst>
               <a:ext uri="{FF2B5EF4-FFF2-40B4-BE49-F238E27FC236}">
-                <a16:creationId xmlns="" xmlns:a16="http://schemas.microsoft.com/office/drawing/2014/main" id="{E47A10BC-72DE-41B7-9EBD-B24B82C7CB84}"/>
+                <a16:creationId xmlns:a16="http://schemas.microsoft.com/office/drawing/2014/main" xmlns="" id="{E47A10BC-72DE-41B7-9EBD-B24B82C7CB84}"/>
               </a:ext>
             </a:extLst>
           </p:cNvPr>
@@ -29522,7 +29522,7 @@
           <p:cNvPr id="51" name="Picture 51" descr="A picture containing food, drawing&#10;&#10;Description generated with very high confidence">
             <a:extLst>
               <a:ext uri="{FF2B5EF4-FFF2-40B4-BE49-F238E27FC236}">
-                <a16:creationId xmlns="" xmlns:a16="http://schemas.microsoft.com/office/drawing/2014/main" id="{6971AD3C-9B53-470A-8695-765A33542705}"/>
+                <a16:creationId xmlns:a16="http://schemas.microsoft.com/office/drawing/2014/main" xmlns="" id="{6971AD3C-9B53-470A-8695-765A33542705}"/>
               </a:ext>
             </a:extLst>
           </p:cNvPr>
@@ -29552,7 +29552,7 @@
           <p:cNvPr id="58" name="Picture 58" descr="A picture containing traffic&#10;&#10;Description generated with very high confidence">
             <a:extLst>
               <a:ext uri="{FF2B5EF4-FFF2-40B4-BE49-F238E27FC236}">
-                <a16:creationId xmlns="" xmlns:a16="http://schemas.microsoft.com/office/drawing/2014/main" id="{561102FE-26B9-45F1-9736-025A946AD7B5}"/>
+                <a16:creationId xmlns:a16="http://schemas.microsoft.com/office/drawing/2014/main" xmlns="" id="{561102FE-26B9-45F1-9736-025A946AD7B5}"/>
               </a:ext>
             </a:extLst>
           </p:cNvPr>
@@ -29640,7 +29640,7 @@
           <p:cNvPr id="61" name="Picture 61">
             <a:extLst>
               <a:ext uri="{FF2B5EF4-FFF2-40B4-BE49-F238E27FC236}">
-                <a16:creationId xmlns="" xmlns:a16="http://schemas.microsoft.com/office/drawing/2014/main" id="{395E44A0-5BF1-4541-8A51-BFC69EE47E4F}"/>
+                <a16:creationId xmlns:a16="http://schemas.microsoft.com/office/drawing/2014/main" xmlns="" id="{395E44A0-5BF1-4541-8A51-BFC69EE47E4F}"/>
               </a:ext>
             </a:extLst>
           </p:cNvPr>
@@ -29670,7 +29670,7 @@
           <p:cNvPr id="28" name="Picture 28" descr="A close up of a logo&#10;&#10;Description generated with very high confidence">
             <a:extLst>
               <a:ext uri="{FF2B5EF4-FFF2-40B4-BE49-F238E27FC236}">
-                <a16:creationId xmlns="" xmlns:a16="http://schemas.microsoft.com/office/drawing/2014/main" id="{84736375-8BEC-4102-BBD3-CD5BA93BE13D}"/>
+                <a16:creationId xmlns:a16="http://schemas.microsoft.com/office/drawing/2014/main" xmlns="" id="{84736375-8BEC-4102-BBD3-CD5BA93BE13D}"/>
               </a:ext>
             </a:extLst>
           </p:cNvPr>
@@ -29700,7 +29700,7 @@
           <p:cNvPr id="18" name="Straight Arrow Connector 17">
             <a:extLst>
               <a:ext uri="{FF2B5EF4-FFF2-40B4-BE49-F238E27FC236}">
-                <a16:creationId xmlns="" xmlns:a16="http://schemas.microsoft.com/office/drawing/2014/main" id="{1A9D56D8-0796-41CA-BDAE-A54AEFA6AB4A}"/>
+                <a16:creationId xmlns:a16="http://schemas.microsoft.com/office/drawing/2014/main" xmlns="" id="{1A9D56D8-0796-41CA-BDAE-A54AEFA6AB4A}"/>
               </a:ext>
             </a:extLst>
           </p:cNvPr>
@@ -29742,7 +29742,7 @@
           <p:cNvPr id="21" name="Oval 20">
             <a:extLst>
               <a:ext uri="{FF2B5EF4-FFF2-40B4-BE49-F238E27FC236}">
-                <a16:creationId xmlns="" xmlns:a16="http://schemas.microsoft.com/office/drawing/2014/main" id="{4DC6CE08-D971-4012-9665-4D26EF0B351E}"/>
+                <a16:creationId xmlns:a16="http://schemas.microsoft.com/office/drawing/2014/main" xmlns="" id="{4DC6CE08-D971-4012-9665-4D26EF0B351E}"/>
               </a:ext>
             </a:extLst>
           </p:cNvPr>
@@ -29796,7 +29796,7 @@
           <p:cNvPr id="22" name="Oval 21">
             <a:extLst>
               <a:ext uri="{FF2B5EF4-FFF2-40B4-BE49-F238E27FC236}">
-                <a16:creationId xmlns="" xmlns:a16="http://schemas.microsoft.com/office/drawing/2014/main" id="{34D78DA4-4F5A-479F-8EF7-090D7E100DF8}"/>
+                <a16:creationId xmlns:a16="http://schemas.microsoft.com/office/drawing/2014/main" xmlns="" id="{34D78DA4-4F5A-479F-8EF7-090D7E100DF8}"/>
               </a:ext>
             </a:extLst>
           </p:cNvPr>
@@ -29850,7 +29850,7 @@
           <p:cNvPr id="32" name="Oval 31">
             <a:extLst>
               <a:ext uri="{FF2B5EF4-FFF2-40B4-BE49-F238E27FC236}">
-                <a16:creationId xmlns="" xmlns:a16="http://schemas.microsoft.com/office/drawing/2014/main" id="{087D8941-8777-474C-A035-46A42D21194B}"/>
+                <a16:creationId xmlns:a16="http://schemas.microsoft.com/office/drawing/2014/main" xmlns="" id="{087D8941-8777-474C-A035-46A42D21194B}"/>
               </a:ext>
             </a:extLst>
           </p:cNvPr>
@@ -30439,7 +30439,7 @@
           <p:cNvPr id="3" name="Picture 3" descr="A screenshot of a cell phone&#10;&#10;Description generated with high confidence">
             <a:extLst>
               <a:ext uri="{FF2B5EF4-FFF2-40B4-BE49-F238E27FC236}">
-                <a16:creationId xmlns="" xmlns:a16="http://schemas.microsoft.com/office/drawing/2014/main" id="{F8414E6B-2443-4E39-8C88-1D6EF2C433DD}"/>
+                <a16:creationId xmlns:a16="http://schemas.microsoft.com/office/drawing/2014/main" xmlns="" id="{F8414E6B-2443-4E39-8C88-1D6EF2C433DD}"/>
               </a:ext>
             </a:extLst>
           </p:cNvPr>
@@ -30469,7 +30469,7 @@
           <p:cNvPr id="5" name="Picture 5" descr="A screenshot of a cell phone&#10;&#10;Description generated with high confidence">
             <a:extLst>
               <a:ext uri="{FF2B5EF4-FFF2-40B4-BE49-F238E27FC236}">
-                <a16:creationId xmlns="" xmlns:a16="http://schemas.microsoft.com/office/drawing/2014/main" id="{141DEEF9-3327-4771-AA7C-A61F22A1003B}"/>
+                <a16:creationId xmlns:a16="http://schemas.microsoft.com/office/drawing/2014/main" xmlns="" id="{141DEEF9-3327-4771-AA7C-A61F22A1003B}"/>
               </a:ext>
             </a:extLst>
           </p:cNvPr>
@@ -30499,7 +30499,7 @@
           <p:cNvPr id="9" name="Picture 9">
             <a:extLst>
               <a:ext uri="{FF2B5EF4-FFF2-40B4-BE49-F238E27FC236}">
-                <a16:creationId xmlns="" xmlns:a16="http://schemas.microsoft.com/office/drawing/2014/main" id="{9030CC14-41AA-4F14-9CF8-9294BB72EC97}"/>
+                <a16:creationId xmlns:a16="http://schemas.microsoft.com/office/drawing/2014/main" xmlns="" id="{9030CC14-41AA-4F14-9CF8-9294BB72EC97}"/>
               </a:ext>
             </a:extLst>
           </p:cNvPr>
@@ -30529,7 +30529,7 @@
           <p:cNvPr id="13" name="Picture 13">
             <a:extLst>
               <a:ext uri="{FF2B5EF4-FFF2-40B4-BE49-F238E27FC236}">
-                <a16:creationId xmlns="" xmlns:a16="http://schemas.microsoft.com/office/drawing/2014/main" id="{DA1A5E4F-3A85-4D7B-8CF0-95B63A5C4851}"/>
+                <a16:creationId xmlns:a16="http://schemas.microsoft.com/office/drawing/2014/main" xmlns="" id="{DA1A5E4F-3A85-4D7B-8CF0-95B63A5C4851}"/>
               </a:ext>
             </a:extLst>
           </p:cNvPr>
@@ -30559,7 +30559,7 @@
           <p:cNvPr id="15" name="Picture 15">
             <a:extLst>
               <a:ext uri="{FF2B5EF4-FFF2-40B4-BE49-F238E27FC236}">
-                <a16:creationId xmlns="" xmlns:a16="http://schemas.microsoft.com/office/drawing/2014/main" id="{D6EA385D-793B-495B-B262-A517A508F172}"/>
+                <a16:creationId xmlns:a16="http://schemas.microsoft.com/office/drawing/2014/main" xmlns="" id="{D6EA385D-793B-495B-B262-A517A508F172}"/>
               </a:ext>
             </a:extLst>
           </p:cNvPr>
@@ -30589,7 +30589,7 @@
           <p:cNvPr id="17" name="Picture 17">
             <a:extLst>
               <a:ext uri="{FF2B5EF4-FFF2-40B4-BE49-F238E27FC236}">
-                <a16:creationId xmlns="" xmlns:a16="http://schemas.microsoft.com/office/drawing/2014/main" id="{A016E024-287F-44DB-AD73-696C65001B48}"/>
+                <a16:creationId xmlns:a16="http://schemas.microsoft.com/office/drawing/2014/main" xmlns="" id="{A016E024-287F-44DB-AD73-696C65001B48}"/>
               </a:ext>
             </a:extLst>
           </p:cNvPr>
@@ -30619,7 +30619,7 @@
           <p:cNvPr id="21" name="Picture 21">
             <a:extLst>
               <a:ext uri="{FF2B5EF4-FFF2-40B4-BE49-F238E27FC236}">
-                <a16:creationId xmlns="" xmlns:a16="http://schemas.microsoft.com/office/drawing/2014/main" id="{A0ECE790-E592-4680-BDA3-D5CECC5E35F5}"/>
+                <a16:creationId xmlns:a16="http://schemas.microsoft.com/office/drawing/2014/main" xmlns="" id="{A0ECE790-E592-4680-BDA3-D5CECC5E35F5}"/>
               </a:ext>
             </a:extLst>
           </p:cNvPr>
@@ -30649,7 +30649,7 @@
           <p:cNvPr id="23" name="Picture 23">
             <a:extLst>
               <a:ext uri="{FF2B5EF4-FFF2-40B4-BE49-F238E27FC236}">
-                <a16:creationId xmlns="" xmlns:a16="http://schemas.microsoft.com/office/drawing/2014/main" id="{604B44D1-CA16-473F-905A-FD7EDF44C561}"/>
+                <a16:creationId xmlns:a16="http://schemas.microsoft.com/office/drawing/2014/main" xmlns="" id="{604B44D1-CA16-473F-905A-FD7EDF44C561}"/>
               </a:ext>
             </a:extLst>
           </p:cNvPr>
@@ -30679,7 +30679,7 @@
           <p:cNvPr id="25" name="Picture 25">
             <a:extLst>
               <a:ext uri="{FF2B5EF4-FFF2-40B4-BE49-F238E27FC236}">
-                <a16:creationId xmlns="" xmlns:a16="http://schemas.microsoft.com/office/drawing/2014/main" id="{DC42FEE6-2F1D-4826-B249-5A31BA693CC0}"/>
+                <a16:creationId xmlns:a16="http://schemas.microsoft.com/office/drawing/2014/main" xmlns="" id="{DC42FEE6-2F1D-4826-B249-5A31BA693CC0}"/>
               </a:ext>
             </a:extLst>
           </p:cNvPr>
@@ -30709,7 +30709,7 @@
           <p:cNvPr id="27" name="Picture 27">
             <a:extLst>
               <a:ext uri="{FF2B5EF4-FFF2-40B4-BE49-F238E27FC236}">
-                <a16:creationId xmlns="" xmlns:a16="http://schemas.microsoft.com/office/drawing/2014/main" id="{638891BB-BA96-4E4F-B8CE-CF4323CB75A4}"/>
+                <a16:creationId xmlns:a16="http://schemas.microsoft.com/office/drawing/2014/main" xmlns="" id="{638891BB-BA96-4E4F-B8CE-CF4323CB75A4}"/>
               </a:ext>
             </a:extLst>
           </p:cNvPr>
@@ -30739,7 +30739,7 @@
           <p:cNvPr id="31" name="Picture 31" descr="A close up of a logo&#10;&#10;Description generated with very high confidence">
             <a:extLst>
               <a:ext uri="{FF2B5EF4-FFF2-40B4-BE49-F238E27FC236}">
-                <a16:creationId xmlns="" xmlns:a16="http://schemas.microsoft.com/office/drawing/2014/main" id="{1D2FEFB3-F612-49EC-9C5A-6C49223C299B}"/>
+                <a16:creationId xmlns:a16="http://schemas.microsoft.com/office/drawing/2014/main" xmlns="" id="{1D2FEFB3-F612-49EC-9C5A-6C49223C299B}"/>
               </a:ext>
             </a:extLst>
           </p:cNvPr>
@@ -30769,7 +30769,7 @@
           <p:cNvPr id="33" name="Picture 33" descr="A close up of a logo&#10;&#10;Description generated with very high confidence">
             <a:extLst>
               <a:ext uri="{FF2B5EF4-FFF2-40B4-BE49-F238E27FC236}">
-                <a16:creationId xmlns="" xmlns:a16="http://schemas.microsoft.com/office/drawing/2014/main" id="{45805758-60E6-408F-AE18-4BF571D58215}"/>
+                <a16:creationId xmlns:a16="http://schemas.microsoft.com/office/drawing/2014/main" xmlns="" id="{45805758-60E6-408F-AE18-4BF571D58215}"/>
               </a:ext>
             </a:extLst>
           </p:cNvPr>
@@ -30799,7 +30799,7 @@
           <p:cNvPr id="35" name="Picture 35" descr="A clock in the dark&#10;&#10;Description generated with high confidence">
             <a:extLst>
               <a:ext uri="{FF2B5EF4-FFF2-40B4-BE49-F238E27FC236}">
-                <a16:creationId xmlns="" xmlns:a16="http://schemas.microsoft.com/office/drawing/2014/main" id="{C21B3B7F-7772-4C24-86CE-377F26867F83}"/>
+                <a16:creationId xmlns:a16="http://schemas.microsoft.com/office/drawing/2014/main" xmlns="" id="{C21B3B7F-7772-4C24-86CE-377F26867F83}"/>
               </a:ext>
             </a:extLst>
           </p:cNvPr>
@@ -30829,7 +30829,7 @@
           <p:cNvPr id="37" name="Picture 37" descr="A clock sitting in the dark&#10;&#10;Description generated with high confidence">
             <a:extLst>
               <a:ext uri="{FF2B5EF4-FFF2-40B4-BE49-F238E27FC236}">
-                <a16:creationId xmlns="" xmlns:a16="http://schemas.microsoft.com/office/drawing/2014/main" id="{81EB908A-9066-4231-A575-CF0C6DFDC80A}"/>
+                <a16:creationId xmlns:a16="http://schemas.microsoft.com/office/drawing/2014/main" xmlns="" id="{81EB908A-9066-4231-A575-CF0C6DFDC80A}"/>
               </a:ext>
             </a:extLst>
           </p:cNvPr>
@@ -30859,7 +30859,7 @@
           <p:cNvPr id="42" name="TextBox 41">
             <a:extLst>
               <a:ext uri="{FF2B5EF4-FFF2-40B4-BE49-F238E27FC236}">
-                <a16:creationId xmlns="" xmlns:a16="http://schemas.microsoft.com/office/drawing/2014/main" id="{609F857E-3EAC-4901-B569-0DBD589577A4}"/>
+                <a16:creationId xmlns:a16="http://schemas.microsoft.com/office/drawing/2014/main" xmlns="" id="{609F857E-3EAC-4901-B569-0DBD589577A4}"/>
               </a:ext>
             </a:extLst>
           </p:cNvPr>
@@ -30900,7 +30900,7 @@
           <p:cNvPr id="44" name="TextBox 43">
             <a:extLst>
               <a:ext uri="{FF2B5EF4-FFF2-40B4-BE49-F238E27FC236}">
-                <a16:creationId xmlns="" xmlns:a16="http://schemas.microsoft.com/office/drawing/2014/main" id="{89A462EF-7DE6-41C9-875A-AAC89906E8A3}"/>
+                <a16:creationId xmlns:a16="http://schemas.microsoft.com/office/drawing/2014/main" xmlns="" id="{89A462EF-7DE6-41C9-875A-AAC89906E8A3}"/>
               </a:ext>
             </a:extLst>
           </p:cNvPr>
@@ -30939,7 +30939,7 @@
           <p:cNvPr id="45" name="Straight Arrow Connector 44">
             <a:extLst>
               <a:ext uri="{FF2B5EF4-FFF2-40B4-BE49-F238E27FC236}">
-                <a16:creationId xmlns="" xmlns:a16="http://schemas.microsoft.com/office/drawing/2014/main" id="{FAB80D67-F59C-4B06-834D-F3F3A9EC5522}"/>
+                <a16:creationId xmlns:a16="http://schemas.microsoft.com/office/drawing/2014/main" xmlns="" id="{FAB80D67-F59C-4B06-834D-F3F3A9EC5522}"/>
               </a:ext>
             </a:extLst>
           </p:cNvPr>
@@ -30981,7 +30981,7 @@
           <p:cNvPr id="47" name="Straight Arrow Connector 46">
             <a:extLst>
               <a:ext uri="{FF2B5EF4-FFF2-40B4-BE49-F238E27FC236}">
-                <a16:creationId xmlns="" xmlns:a16="http://schemas.microsoft.com/office/drawing/2014/main" id="{EBE041AA-BC24-4A0B-8BE1-8AA71FA1D9EE}"/>
+                <a16:creationId xmlns:a16="http://schemas.microsoft.com/office/drawing/2014/main" xmlns="" id="{EBE041AA-BC24-4A0B-8BE1-8AA71FA1D9EE}"/>
               </a:ext>
             </a:extLst>
           </p:cNvPr>
@@ -31025,7 +31025,7 @@
           <p:cNvPr id="2" name="Picture 3" descr="A close up of a logo&#10;&#10;Description generated with very high confidence">
             <a:extLst>
               <a:ext uri="{FF2B5EF4-FFF2-40B4-BE49-F238E27FC236}">
-                <a16:creationId xmlns="" xmlns:a16="http://schemas.microsoft.com/office/drawing/2014/main" id="{BCB4413D-CF3A-44E8-ACAD-26265ED98CFC}"/>
+                <a16:creationId xmlns:a16="http://schemas.microsoft.com/office/drawing/2014/main" xmlns="" id="{BCB4413D-CF3A-44E8-ACAD-26265ED98CFC}"/>
               </a:ext>
             </a:extLst>
           </p:cNvPr>
@@ -31055,7 +31055,7 @@
           <p:cNvPr id="6" name="Picture 6" descr="A close up of a logo&#10;&#10;Description generated with very high confidence">
             <a:extLst>
               <a:ext uri="{FF2B5EF4-FFF2-40B4-BE49-F238E27FC236}">
-                <a16:creationId xmlns="" xmlns:a16="http://schemas.microsoft.com/office/drawing/2014/main" id="{10224506-3EA4-41AC-B2F3-502E07BF19D3}"/>
+                <a16:creationId xmlns:a16="http://schemas.microsoft.com/office/drawing/2014/main" xmlns="" id="{10224506-3EA4-41AC-B2F3-502E07BF19D3}"/>
               </a:ext>
             </a:extLst>
           </p:cNvPr>
@@ -31085,7 +31085,7 @@
           <p:cNvPr id="18" name="Picture 18" descr="A close up of a logo&#10;&#10;Description generated with very high confidence">
             <a:extLst>
               <a:ext uri="{FF2B5EF4-FFF2-40B4-BE49-F238E27FC236}">
-                <a16:creationId xmlns="" xmlns:a16="http://schemas.microsoft.com/office/drawing/2014/main" id="{7D02541C-0C39-4204-A698-2888678BC31E}"/>
+                <a16:creationId xmlns:a16="http://schemas.microsoft.com/office/drawing/2014/main" xmlns="" id="{7D02541C-0C39-4204-A698-2888678BC31E}"/>
               </a:ext>
             </a:extLst>
           </p:cNvPr>
@@ -31115,7 +31115,7 @@
           <p:cNvPr id="20" name="Picture 21" descr="A close up of a logo&#10;&#10;Description generated with very high confidence">
             <a:extLst>
               <a:ext uri="{FF2B5EF4-FFF2-40B4-BE49-F238E27FC236}">
-                <a16:creationId xmlns="" xmlns:a16="http://schemas.microsoft.com/office/drawing/2014/main" id="{0C9735ED-B5CE-4501-BB0B-F94DAF67438F}"/>
+                <a16:creationId xmlns:a16="http://schemas.microsoft.com/office/drawing/2014/main" xmlns="" id="{0C9735ED-B5CE-4501-BB0B-F94DAF67438F}"/>
               </a:ext>
             </a:extLst>
           </p:cNvPr>
@@ -31145,7 +31145,7 @@
           <p:cNvPr id="24" name="TextBox 23">
             <a:extLst>
               <a:ext uri="{FF2B5EF4-FFF2-40B4-BE49-F238E27FC236}">
-                <a16:creationId xmlns="" xmlns:a16="http://schemas.microsoft.com/office/drawing/2014/main" id="{FD7791DA-B6E9-447C-B562-16C63C68485F}"/>
+                <a16:creationId xmlns:a16="http://schemas.microsoft.com/office/drawing/2014/main" xmlns="" id="{FD7791DA-B6E9-447C-B562-16C63C68485F}"/>
               </a:ext>
             </a:extLst>
           </p:cNvPr>
@@ -31200,7 +31200,7 @@
           <p:cNvPr id="26" name="TextBox 25">
             <a:extLst>
               <a:ext uri="{FF2B5EF4-FFF2-40B4-BE49-F238E27FC236}">
-                <a16:creationId xmlns="" xmlns:a16="http://schemas.microsoft.com/office/drawing/2014/main" id="{20C434AC-340F-4D02-802E-9088BE20D090}"/>
+                <a16:creationId xmlns:a16="http://schemas.microsoft.com/office/drawing/2014/main" xmlns="" id="{20C434AC-340F-4D02-802E-9088BE20D090}"/>
               </a:ext>
             </a:extLst>
           </p:cNvPr>
@@ -31525,7 +31525,7 @@
           <p:cNvPr id="2" name="Title 1">
             <a:extLst>
               <a:ext uri="{FF2B5EF4-FFF2-40B4-BE49-F238E27FC236}">
-                <a16:creationId xmlns="" xmlns:a16="http://schemas.microsoft.com/office/drawing/2014/main" id="{8026EC4C-6E25-4172-BE37-528F585CEF1B}"/>
+                <a16:creationId xmlns:a16="http://schemas.microsoft.com/office/drawing/2014/main" xmlns="" id="{8026EC4C-6E25-4172-BE37-528F585CEF1B}"/>
               </a:ext>
             </a:extLst>
           </p:cNvPr>
@@ -31556,7 +31556,7 @@
           <p:cNvPr id="3" name="Picture 3" descr="A close up of a logo&#10;&#10;Description generated with very high confidence">
             <a:extLst>
               <a:ext uri="{FF2B5EF4-FFF2-40B4-BE49-F238E27FC236}">
-                <a16:creationId xmlns="" xmlns:a16="http://schemas.microsoft.com/office/drawing/2014/main" id="{DA6334C1-3239-46DA-A32D-FDD4442F1795}"/>
+                <a16:creationId xmlns:a16="http://schemas.microsoft.com/office/drawing/2014/main" xmlns="" id="{DA6334C1-3239-46DA-A32D-FDD4442F1795}"/>
               </a:ext>
             </a:extLst>
           </p:cNvPr>
@@ -31586,7 +31586,7 @@
           <p:cNvPr id="5" name="Picture 5" descr="A picture containing clock&#10;&#10;Description generated with very high confidence">
             <a:extLst>
               <a:ext uri="{FF2B5EF4-FFF2-40B4-BE49-F238E27FC236}">
-                <a16:creationId xmlns="" xmlns:a16="http://schemas.microsoft.com/office/drawing/2014/main" id="{93A331CE-46F7-4243-83C4-BE9E3F1825B0}"/>
+                <a16:creationId xmlns:a16="http://schemas.microsoft.com/office/drawing/2014/main" xmlns="" id="{93A331CE-46F7-4243-83C4-BE9E3F1825B0}"/>
               </a:ext>
             </a:extLst>
           </p:cNvPr>
@@ -31616,7 +31616,7 @@
           <p:cNvPr id="7" name="Picture 7" descr="A close up of a logo&#10;&#10;Description generated with very high confidence">
             <a:extLst>
               <a:ext uri="{FF2B5EF4-FFF2-40B4-BE49-F238E27FC236}">
-                <a16:creationId xmlns="" xmlns:a16="http://schemas.microsoft.com/office/drawing/2014/main" id="{CCA1FA7B-C942-4986-AB3B-54E0615F8F08}"/>
+                <a16:creationId xmlns:a16="http://schemas.microsoft.com/office/drawing/2014/main" xmlns="" id="{CCA1FA7B-C942-4986-AB3B-54E0615F8F08}"/>
               </a:ext>
             </a:extLst>
           </p:cNvPr>
@@ -31646,7 +31646,7 @@
           <p:cNvPr id="9" name="Arrow: Down 8">
             <a:extLst>
               <a:ext uri="{FF2B5EF4-FFF2-40B4-BE49-F238E27FC236}">
-                <a16:creationId xmlns="" xmlns:a16="http://schemas.microsoft.com/office/drawing/2014/main" id="{D88FA45F-BC7E-4719-9194-7E0AE71F0C1D}"/>
+                <a16:creationId xmlns:a16="http://schemas.microsoft.com/office/drawing/2014/main" xmlns="" id="{D88FA45F-BC7E-4719-9194-7E0AE71F0C1D}"/>
               </a:ext>
             </a:extLst>
           </p:cNvPr>
@@ -31700,7 +31700,7 @@
           <p:cNvPr id="10" name="Arrow: Down 9">
             <a:extLst>
               <a:ext uri="{FF2B5EF4-FFF2-40B4-BE49-F238E27FC236}">
-                <a16:creationId xmlns="" xmlns:a16="http://schemas.microsoft.com/office/drawing/2014/main" id="{74C91D1A-CCF6-4DE0-B080-D77210A893FD}"/>
+                <a16:creationId xmlns:a16="http://schemas.microsoft.com/office/drawing/2014/main" xmlns="" id="{74C91D1A-CCF6-4DE0-B080-D77210A893FD}"/>
               </a:ext>
             </a:extLst>
           </p:cNvPr>
@@ -31754,7 +31754,7 @@
           <p:cNvPr id="11" name="TextBox 10">
             <a:extLst>
               <a:ext uri="{FF2B5EF4-FFF2-40B4-BE49-F238E27FC236}">
-                <a16:creationId xmlns="" xmlns:a16="http://schemas.microsoft.com/office/drawing/2014/main" id="{EBD1E537-F5C7-43D5-8C6F-6CFA11A95BD2}"/>
+                <a16:creationId xmlns:a16="http://schemas.microsoft.com/office/drawing/2014/main" xmlns="" id="{EBD1E537-F5C7-43D5-8C6F-6CFA11A95BD2}"/>
               </a:ext>
             </a:extLst>
           </p:cNvPr>
@@ -31802,7 +31802,7 @@
           <p:cNvPr id="12" name="Picture 12" descr="A picture containing flower&#10;&#10;Description generated with very high confidence">
             <a:extLst>
               <a:ext uri="{FF2B5EF4-FFF2-40B4-BE49-F238E27FC236}">
-                <a16:creationId xmlns="" xmlns:a16="http://schemas.microsoft.com/office/drawing/2014/main" id="{A3F53263-2B7C-4937-AC64-FBA05A97C1D8}"/>
+                <a16:creationId xmlns:a16="http://schemas.microsoft.com/office/drawing/2014/main" xmlns="" id="{A3F53263-2B7C-4937-AC64-FBA05A97C1D8}"/>
               </a:ext>
             </a:extLst>
           </p:cNvPr>
@@ -31832,7 +31832,7 @@
           <p:cNvPr id="14" name="Picture 14" descr="A close up of a logo&#10;&#10;Description generated with very high confidence">
             <a:extLst>
               <a:ext uri="{FF2B5EF4-FFF2-40B4-BE49-F238E27FC236}">
-                <a16:creationId xmlns="" xmlns:a16="http://schemas.microsoft.com/office/drawing/2014/main" id="{8AE7F551-0647-4AF3-B9D9-4EBA16AD7CEA}"/>
+                <a16:creationId xmlns:a16="http://schemas.microsoft.com/office/drawing/2014/main" xmlns="" id="{8AE7F551-0647-4AF3-B9D9-4EBA16AD7CEA}"/>
               </a:ext>
             </a:extLst>
           </p:cNvPr>
@@ -31862,7 +31862,7 @@
           <p:cNvPr id="16" name="Arrow: Down 15">
             <a:extLst>
               <a:ext uri="{FF2B5EF4-FFF2-40B4-BE49-F238E27FC236}">
-                <a16:creationId xmlns="" xmlns:a16="http://schemas.microsoft.com/office/drawing/2014/main" id="{1BA7CD1C-8F04-405F-8C24-56C054B8567A}"/>
+                <a16:creationId xmlns:a16="http://schemas.microsoft.com/office/drawing/2014/main" xmlns="" id="{1BA7CD1C-8F04-405F-8C24-56C054B8567A}"/>
               </a:ext>
             </a:extLst>
           </p:cNvPr>
@@ -31916,7 +31916,7 @@
           <p:cNvPr id="17" name="Picture 17" descr="A close up of a logo&#10;&#10;Description generated with very high confidence">
             <a:extLst>
               <a:ext uri="{FF2B5EF4-FFF2-40B4-BE49-F238E27FC236}">
-                <a16:creationId xmlns="" xmlns:a16="http://schemas.microsoft.com/office/drawing/2014/main" id="{21EE91BF-B774-456B-B010-99066ADB15B8}"/>
+                <a16:creationId xmlns:a16="http://schemas.microsoft.com/office/drawing/2014/main" xmlns="" id="{21EE91BF-B774-456B-B010-99066ADB15B8}"/>
               </a:ext>
             </a:extLst>
           </p:cNvPr>
@@ -31946,7 +31946,7 @@
           <p:cNvPr id="19" name="Arrow: Down 18">
             <a:extLst>
               <a:ext uri="{FF2B5EF4-FFF2-40B4-BE49-F238E27FC236}">
-                <a16:creationId xmlns="" xmlns:a16="http://schemas.microsoft.com/office/drawing/2014/main" id="{ACBABBB2-7A08-4A20-AD31-44F3B08A5363}"/>
+                <a16:creationId xmlns:a16="http://schemas.microsoft.com/office/drawing/2014/main" xmlns="" id="{ACBABBB2-7A08-4A20-AD31-44F3B08A5363}"/>
               </a:ext>
             </a:extLst>
           </p:cNvPr>
@@ -32000,7 +32000,7 @@
           <p:cNvPr id="20" name="TextBox 19">
             <a:extLst>
               <a:ext uri="{FF2B5EF4-FFF2-40B4-BE49-F238E27FC236}">
-                <a16:creationId xmlns="" xmlns:a16="http://schemas.microsoft.com/office/drawing/2014/main" id="{C6F99357-B5AE-419B-B827-3D66E8EEE6E4}"/>
+                <a16:creationId xmlns:a16="http://schemas.microsoft.com/office/drawing/2014/main" xmlns="" id="{C6F99357-B5AE-419B-B827-3D66E8EEE6E4}"/>
               </a:ext>
             </a:extLst>
           </p:cNvPr>
@@ -32048,7 +32048,7 @@
           <p:cNvPr id="21" name="TextBox 20">
             <a:extLst>
               <a:ext uri="{FF2B5EF4-FFF2-40B4-BE49-F238E27FC236}">
-                <a16:creationId xmlns="" xmlns:a16="http://schemas.microsoft.com/office/drawing/2014/main" id="{628CFEC0-1408-43A1-9AD3-72018D2BD8ED}"/>
+                <a16:creationId xmlns:a16="http://schemas.microsoft.com/office/drawing/2014/main" xmlns="" id="{628CFEC0-1408-43A1-9AD3-72018D2BD8ED}"/>
               </a:ext>
             </a:extLst>
           </p:cNvPr>
@@ -32106,7 +32106,7 @@
           <p:cNvPr id="22" name="Rectangle 21">
             <a:extLst>
               <a:ext uri="{FF2B5EF4-FFF2-40B4-BE49-F238E27FC236}">
-                <a16:creationId xmlns="" xmlns:a16="http://schemas.microsoft.com/office/drawing/2014/main" id="{6247A618-C733-4F7E-898A-3F618CE68229}"/>
+                <a16:creationId xmlns:a16="http://schemas.microsoft.com/office/drawing/2014/main" xmlns="" id="{6247A618-C733-4F7E-898A-3F618CE68229}"/>
               </a:ext>
             </a:extLst>
           </p:cNvPr>
@@ -32158,7 +32158,7 @@
           <p:cNvPr id="23" name="TextBox 22">
             <a:extLst>
               <a:ext uri="{FF2B5EF4-FFF2-40B4-BE49-F238E27FC236}">
-                <a16:creationId xmlns="" xmlns:a16="http://schemas.microsoft.com/office/drawing/2014/main" id="{E447A0F9-F033-4FD7-8BCE-0F79A029878A}"/>
+                <a16:creationId xmlns:a16="http://schemas.microsoft.com/office/drawing/2014/main" xmlns="" id="{E447A0F9-F033-4FD7-8BCE-0F79A029878A}"/>
               </a:ext>
             </a:extLst>
           </p:cNvPr>
@@ -32788,7 +32788,7 @@
           <p:cNvPr id="2" name="Title 1">
             <a:extLst>
               <a:ext uri="{FF2B5EF4-FFF2-40B4-BE49-F238E27FC236}">
-                <a16:creationId xmlns="" xmlns:a16="http://schemas.microsoft.com/office/drawing/2014/main" id="{99760F66-ED22-4D99-83D9-AF132B641E2C}"/>
+                <a16:creationId xmlns:a16="http://schemas.microsoft.com/office/drawing/2014/main" xmlns="" id="{99760F66-ED22-4D99-83D9-AF132B641E2C}"/>
               </a:ext>
             </a:extLst>
           </p:cNvPr>
@@ -32819,7 +32819,7 @@
           <p:cNvPr id="4" name="Picture 3" descr="A close up of a logo&#10;&#10;Description generated with very high confidence">
             <a:extLst>
               <a:ext uri="{FF2B5EF4-FFF2-40B4-BE49-F238E27FC236}">
-                <a16:creationId xmlns="" xmlns:a16="http://schemas.microsoft.com/office/drawing/2014/main" id="{6E87F861-F9AC-4F21-B0C8-58EB55E95B97}"/>
+                <a16:creationId xmlns:a16="http://schemas.microsoft.com/office/drawing/2014/main" xmlns="" id="{6E87F861-F9AC-4F21-B0C8-58EB55E95B97}"/>
               </a:ext>
             </a:extLst>
           </p:cNvPr>
@@ -32849,7 +32849,7 @@
           <p:cNvPr id="6" name="Picture 5" descr="A picture containing clock&#10;&#10;Description generated with very high confidence">
             <a:extLst>
               <a:ext uri="{FF2B5EF4-FFF2-40B4-BE49-F238E27FC236}">
-                <a16:creationId xmlns="" xmlns:a16="http://schemas.microsoft.com/office/drawing/2014/main" id="{4616AC99-6BB6-4ADE-BDE8-48395933FE5F}"/>
+                <a16:creationId xmlns:a16="http://schemas.microsoft.com/office/drawing/2014/main" xmlns="" id="{4616AC99-6BB6-4ADE-BDE8-48395933FE5F}"/>
               </a:ext>
             </a:extLst>
           </p:cNvPr>
@@ -32879,7 +32879,7 @@
           <p:cNvPr id="8" name="Arrow: Down 7">
             <a:extLst>
               <a:ext uri="{FF2B5EF4-FFF2-40B4-BE49-F238E27FC236}">
-                <a16:creationId xmlns="" xmlns:a16="http://schemas.microsoft.com/office/drawing/2014/main" id="{82AB09DD-DB63-4806-A980-AE0CB9781D42}"/>
+                <a16:creationId xmlns:a16="http://schemas.microsoft.com/office/drawing/2014/main" xmlns="" id="{82AB09DD-DB63-4806-A980-AE0CB9781D42}"/>
               </a:ext>
             </a:extLst>
           </p:cNvPr>

</xml_diff>